<commit_message>
adj scriptA and fix typos
</commit_message>
<xml_diff>
--- a/C_Wednesday/GSERM_Wedsnesday_UnsupervisedApproaches.pptx
+++ b/C_Wednesday/GSERM_Wedsnesday_UnsupervisedApproaches.pptx
@@ -1109,11 +1109,11 @@
           <c:showPercent val="0"/>
           <c:showBubbleSize val="0"/>
         </c:dLbls>
-        <c:axId val="326809840"/>
-        <c:axId val="326808664"/>
+        <c:axId val="294305616"/>
+        <c:axId val="294306400"/>
       </c:scatterChart>
       <c:valAx>
-        <c:axId val="326809840"/>
+        <c:axId val="294305616"/>
         <c:scaling>
           <c:orientation val="minMax"/>
         </c:scaling>
@@ -1155,12 +1155,12 @@
             <a:endParaRPr lang="en-US"/>
           </a:p>
         </c:txPr>
-        <c:crossAx val="326808664"/>
+        <c:crossAx val="294306400"/>
         <c:crosses val="autoZero"/>
         <c:crossBetween val="midCat"/>
       </c:valAx>
       <c:valAx>
-        <c:axId val="326808664"/>
+        <c:axId val="294306400"/>
         <c:scaling>
           <c:orientation val="minMax"/>
         </c:scaling>
@@ -1203,7 +1203,7 @@
             <a:endParaRPr lang="en-US"/>
           </a:p>
         </c:txPr>
-        <c:crossAx val="326809840"/>
+        <c:crossAx val="294305616"/>
         <c:crosses val="autoZero"/>
         <c:crossBetween val="midCat"/>
       </c:valAx>
@@ -2177,11 +2177,11 @@
           <c:showPercent val="0"/>
           <c:showBubbleSize val="0"/>
         </c:dLbls>
-        <c:axId val="403082792"/>
-        <c:axId val="403083968"/>
+        <c:axId val="294303656"/>
+        <c:axId val="294300520"/>
       </c:scatterChart>
       <c:valAx>
-        <c:axId val="403082792"/>
+        <c:axId val="294303656"/>
         <c:scaling>
           <c:orientation val="minMax"/>
         </c:scaling>
@@ -2223,12 +2223,12 @@
             <a:endParaRPr lang="en-US"/>
           </a:p>
         </c:txPr>
-        <c:crossAx val="403083968"/>
+        <c:crossAx val="294300520"/>
         <c:crosses val="autoZero"/>
         <c:crossBetween val="midCat"/>
       </c:valAx>
       <c:valAx>
-        <c:axId val="403083968"/>
+        <c:axId val="294300520"/>
         <c:scaling>
           <c:orientation val="minMax"/>
         </c:scaling>
@@ -2271,7 +2271,7 @@
             <a:endParaRPr lang="en-US"/>
           </a:p>
         </c:txPr>
-        <c:crossAx val="403082792"/>
+        <c:crossAx val="294303656"/>
         <c:crosses val="autoZero"/>
         <c:crossBetween val="midCat"/>
       </c:valAx>
@@ -3245,11 +3245,11 @@
           <c:showPercent val="0"/>
           <c:showBubbleSize val="0"/>
         </c:dLbls>
-        <c:axId val="403087496"/>
-        <c:axId val="403086712"/>
+        <c:axId val="294304048"/>
+        <c:axId val="294300912"/>
       </c:scatterChart>
       <c:valAx>
-        <c:axId val="403087496"/>
+        <c:axId val="294304048"/>
         <c:scaling>
           <c:orientation val="minMax"/>
         </c:scaling>
@@ -3291,12 +3291,12 @@
             <a:endParaRPr lang="en-US"/>
           </a:p>
         </c:txPr>
-        <c:crossAx val="403086712"/>
+        <c:crossAx val="294300912"/>
         <c:crosses val="autoZero"/>
         <c:crossBetween val="midCat"/>
       </c:valAx>
       <c:valAx>
-        <c:axId val="403086712"/>
+        <c:axId val="294300912"/>
         <c:scaling>
           <c:orientation val="minMax"/>
         </c:scaling>
@@ -3339,7 +3339,7 @@
             <a:endParaRPr lang="en-US"/>
           </a:p>
         </c:txPr>
-        <c:crossAx val="403087496"/>
+        <c:crossAx val="294304048"/>
         <c:crosses val="autoZero"/>
         <c:crossBetween val="midCat"/>
       </c:valAx>
@@ -4313,11 +4313,11 @@
           <c:showPercent val="0"/>
           <c:showBubbleSize val="0"/>
         </c:dLbls>
-        <c:axId val="403083576"/>
-        <c:axId val="403084360"/>
+        <c:axId val="294302088"/>
+        <c:axId val="294302872"/>
       </c:scatterChart>
       <c:valAx>
-        <c:axId val="403083576"/>
+        <c:axId val="294302088"/>
         <c:scaling>
           <c:orientation val="minMax"/>
         </c:scaling>
@@ -4359,12 +4359,12 @@
             <a:endParaRPr lang="en-US"/>
           </a:p>
         </c:txPr>
-        <c:crossAx val="403084360"/>
+        <c:crossAx val="294302872"/>
         <c:crosses val="autoZero"/>
         <c:crossBetween val="midCat"/>
       </c:valAx>
       <c:valAx>
-        <c:axId val="403084360"/>
+        <c:axId val="294302872"/>
         <c:scaling>
           <c:orientation val="minMax"/>
         </c:scaling>
@@ -4407,7 +4407,7 @@
             <a:endParaRPr lang="en-US"/>
           </a:p>
         </c:txPr>
-        <c:crossAx val="403083576"/>
+        <c:crossAx val="294302088"/>
         <c:crosses val="autoZero"/>
         <c:crossBetween val="midCat"/>
       </c:valAx>
@@ -5381,11 +5381,11 @@
           <c:showPercent val="0"/>
           <c:showBubbleSize val="0"/>
         </c:dLbls>
-        <c:axId val="403085928"/>
-        <c:axId val="403090240"/>
+        <c:axId val="364784800"/>
+        <c:axId val="364780488"/>
       </c:scatterChart>
       <c:valAx>
-        <c:axId val="403085928"/>
+        <c:axId val="364784800"/>
         <c:scaling>
           <c:orientation val="minMax"/>
         </c:scaling>
@@ -5427,12 +5427,12 @@
             <a:endParaRPr lang="en-US"/>
           </a:p>
         </c:txPr>
-        <c:crossAx val="403090240"/>
+        <c:crossAx val="364780488"/>
         <c:crosses val="autoZero"/>
         <c:crossBetween val="midCat"/>
       </c:valAx>
       <c:valAx>
-        <c:axId val="403090240"/>
+        <c:axId val="364780488"/>
         <c:scaling>
           <c:orientation val="minMax"/>
         </c:scaling>
@@ -5475,7 +5475,7 @@
             <a:endParaRPr lang="en-US"/>
           </a:p>
         </c:txPr>
-        <c:crossAx val="403085928"/>
+        <c:crossAx val="364784800"/>
         <c:crosses val="autoZero"/>
         <c:crossBetween val="midCat"/>
       </c:valAx>
@@ -6449,11 +6449,11 @@
           <c:showPercent val="0"/>
           <c:showBubbleSize val="0"/>
         </c:dLbls>
-        <c:axId val="403086320"/>
-        <c:axId val="403087888"/>
+        <c:axId val="364779704"/>
+        <c:axId val="364782056"/>
       </c:scatterChart>
       <c:valAx>
-        <c:axId val="403086320"/>
+        <c:axId val="364779704"/>
         <c:scaling>
           <c:orientation val="minMax"/>
         </c:scaling>
@@ -6495,12 +6495,12 @@
             <a:endParaRPr lang="en-US"/>
           </a:p>
         </c:txPr>
-        <c:crossAx val="403087888"/>
+        <c:crossAx val="364782056"/>
         <c:crosses val="autoZero"/>
         <c:crossBetween val="midCat"/>
       </c:valAx>
       <c:valAx>
-        <c:axId val="403087888"/>
+        <c:axId val="364782056"/>
         <c:scaling>
           <c:orientation val="minMax"/>
         </c:scaling>
@@ -6543,7 +6543,7 @@
             <a:endParaRPr lang="en-US"/>
           </a:p>
         </c:txPr>
-        <c:crossAx val="403086320"/>
+        <c:crossAx val="364779704"/>
         <c:crosses val="autoZero"/>
         <c:crossBetween val="midCat"/>
       </c:valAx>
@@ -7517,11 +7517,11 @@
           <c:showPercent val="0"/>
           <c:showBubbleSize val="0"/>
         </c:dLbls>
-        <c:axId val="403089064"/>
-        <c:axId val="330314632"/>
+        <c:axId val="364781664"/>
+        <c:axId val="364783232"/>
       </c:scatterChart>
       <c:valAx>
-        <c:axId val="403089064"/>
+        <c:axId val="364781664"/>
         <c:scaling>
           <c:orientation val="minMax"/>
         </c:scaling>
@@ -7563,12 +7563,12 @@
             <a:endParaRPr lang="en-US"/>
           </a:p>
         </c:txPr>
-        <c:crossAx val="330314632"/>
+        <c:crossAx val="364783232"/>
         <c:crosses val="autoZero"/>
         <c:crossBetween val="midCat"/>
       </c:valAx>
       <c:valAx>
-        <c:axId val="330314632"/>
+        <c:axId val="364783232"/>
         <c:scaling>
           <c:orientation val="minMax"/>
         </c:scaling>
@@ -7611,7 +7611,7 @@
             <a:endParaRPr lang="en-US"/>
           </a:p>
         </c:txPr>
-        <c:crossAx val="403089064"/>
+        <c:crossAx val="364781664"/>
         <c:crosses val="autoZero"/>
         <c:crossBetween val="midCat"/>
       </c:valAx>
@@ -8585,11 +8585,11 @@
           <c:showPercent val="0"/>
           <c:showBubbleSize val="0"/>
         </c:dLbls>
-        <c:axId val="330311104"/>
-        <c:axId val="330311496"/>
+        <c:axId val="364783624"/>
+        <c:axId val="364782448"/>
       </c:scatterChart>
       <c:valAx>
-        <c:axId val="330311104"/>
+        <c:axId val="364783624"/>
         <c:scaling>
           <c:orientation val="minMax"/>
         </c:scaling>
@@ -8631,12 +8631,12 @@
             <a:endParaRPr lang="en-US"/>
           </a:p>
         </c:txPr>
-        <c:crossAx val="330311496"/>
+        <c:crossAx val="364782448"/>
         <c:crosses val="autoZero"/>
         <c:crossBetween val="midCat"/>
       </c:valAx>
       <c:valAx>
-        <c:axId val="330311496"/>
+        <c:axId val="364782448"/>
         <c:scaling>
           <c:orientation val="minMax"/>
         </c:scaling>
@@ -8679,7 +8679,7 @@
             <a:endParaRPr lang="en-US"/>
           </a:p>
         </c:txPr>
-        <c:crossAx val="330311104"/>
+        <c:crossAx val="364783624"/>
         <c:crosses val="autoZero"/>
         <c:crossBetween val="midCat"/>
       </c:valAx>
@@ -9653,11 +9653,11 @@
           <c:showPercent val="0"/>
           <c:showBubbleSize val="0"/>
         </c:dLbls>
-        <c:axId val="330312280"/>
-        <c:axId val="330315808"/>
+        <c:axId val="364786760"/>
+        <c:axId val="364787152"/>
       </c:scatterChart>
       <c:valAx>
-        <c:axId val="330312280"/>
+        <c:axId val="364786760"/>
         <c:scaling>
           <c:orientation val="minMax"/>
         </c:scaling>
@@ -9699,12 +9699,12 @@
             <a:endParaRPr lang="en-US"/>
           </a:p>
         </c:txPr>
-        <c:crossAx val="330315808"/>
+        <c:crossAx val="364787152"/>
         <c:crosses val="autoZero"/>
         <c:crossBetween val="midCat"/>
       </c:valAx>
       <c:valAx>
-        <c:axId val="330315808"/>
+        <c:axId val="364787152"/>
         <c:scaling>
           <c:orientation val="minMax"/>
         </c:scaling>
@@ -9747,7 +9747,7 @@
             <a:endParaRPr lang="en-US"/>
           </a:p>
         </c:txPr>
-        <c:crossAx val="330312280"/>
+        <c:crossAx val="364786760"/>
         <c:crosses val="autoZero"/>
         <c:crossBetween val="midCat"/>
       </c:valAx>
@@ -14872,7 +14872,7 @@
           <a:p>
             <a:fld id="{B0C0A60C-850A-4EA4-9C14-A8FE98B94505}" type="datetimeFigureOut">
               <a:rPr lang="en-US" smtClean="0"/>
-              <a:t>6/7/2019</a:t>
+              <a:t>6/18/2019</a:t>
             </a:fld>
             <a:endParaRPr lang="en-US"/>
           </a:p>
@@ -15439,7 +15439,7 @@
           <a:p>
             <a:fld id="{5738B90E-0779-4C36-915C-6F05FCD89456}" type="datetime1">
               <a:rPr lang="en-US" smtClean="0"/>
-              <a:t>6/7/2019</a:t>
+              <a:t>6/18/2019</a:t>
             </a:fld>
             <a:endParaRPr lang="en-US"/>
           </a:p>
@@ -15636,7 +15636,7 @@
           <a:p>
             <a:fld id="{7B9EA29D-D431-42FE-B7B6-AAE4454C77D3}" type="datetime1">
               <a:rPr lang="en-US" smtClean="0"/>
-              <a:t>6/7/2019</a:t>
+              <a:t>6/18/2019</a:t>
             </a:fld>
             <a:endParaRPr lang="en-US"/>
           </a:p>
@@ -15991,7 +15991,7 @@
           <a:p>
             <a:fld id="{690D8A1E-EA8F-46C1-B891-AE0C00D9C314}" type="datetime1">
               <a:rPr lang="en-US" smtClean="0"/>
-              <a:t>6/7/2019</a:t>
+              <a:t>6/18/2019</a:t>
             </a:fld>
             <a:endParaRPr lang="en-US"/>
           </a:p>
@@ -16299,7 +16299,7 @@
           <a:p>
             <a:fld id="{D753EFC8-4232-4598-94F6-94C0EBAFC469}" type="datetime1">
               <a:rPr lang="en-US" smtClean="0"/>
-              <a:t>6/7/2019</a:t>
+              <a:t>6/18/2019</a:t>
             </a:fld>
             <a:endParaRPr lang="en-US"/>
           </a:p>
@@ -16628,7 +16628,7 @@
           <a:p>
             <a:fld id="{F3161074-1C18-4AE7-957D-F18524378C85}" type="datetime1">
               <a:rPr lang="en-US" smtClean="0"/>
-              <a:t>6/7/2019</a:t>
+              <a:t>6/18/2019</a:t>
             </a:fld>
             <a:endParaRPr lang="en-US"/>
           </a:p>
@@ -16881,7 +16881,7 @@
           <a:p>
             <a:fld id="{69BE256C-8D9A-4404-B47D-41A1AE514425}" type="datetime1">
               <a:rPr lang="en-US" smtClean="0"/>
-              <a:t>6/7/2019</a:t>
+              <a:t>6/18/2019</a:t>
             </a:fld>
             <a:endParaRPr lang="en-US"/>
           </a:p>
@@ -17329,7 +17329,7 @@
           <a:p>
             <a:fld id="{66CB2154-9035-4012-8189-BAAB61C5A5EE}" type="datetime1">
               <a:rPr lang="en-US" smtClean="0"/>
-              <a:t>6/7/2019</a:t>
+              <a:t>6/18/2019</a:t>
             </a:fld>
             <a:endParaRPr lang="en-US"/>
           </a:p>
@@ -17517,7 +17517,7 @@
           <a:p>
             <a:fld id="{6700A58B-DD98-43D0-B791-721480A02982}" type="datetime1">
               <a:rPr lang="en-US" smtClean="0"/>
-              <a:t>6/7/2019</a:t>
+              <a:t>6/18/2019</a:t>
             </a:fld>
             <a:endParaRPr lang="en-US"/>
           </a:p>
@@ -17723,7 +17723,7 @@
           <a:p>
             <a:fld id="{7DB6E382-4F61-4E24-BE1A-377EC83D0E3A}" type="datetime1">
               <a:rPr lang="en-US" smtClean="0"/>
-              <a:t>6/7/2019</a:t>
+              <a:t>6/18/2019</a:t>
             </a:fld>
             <a:endParaRPr lang="en-US"/>
           </a:p>
@@ -18129,7 +18129,7 @@
           <a:p>
             <a:fld id="{4142EED6-FC16-45B9-B8C4-2BC5DBA88325}" type="datetime1">
               <a:rPr lang="en-US" smtClean="0"/>
-              <a:t>6/7/2019</a:t>
+              <a:t>6/18/2019</a:t>
             </a:fld>
             <a:endParaRPr lang="en-US"/>
           </a:p>
@@ -18461,7 +18461,7 @@
           <a:p>
             <a:fld id="{DF59512B-4F1D-43D7-8819-2F53FEF69650}" type="datetime1">
               <a:rPr lang="en-US" smtClean="0"/>
-              <a:t>6/7/2019</a:t>
+              <a:t>6/18/2019</a:t>
             </a:fld>
             <a:endParaRPr lang="en-US"/>
           </a:p>
@@ -18751,7 +18751,7 @@
           <a:p>
             <a:fld id="{08437B94-E2BF-44DC-ADC5-B05FC9934E9D}" type="datetime1">
               <a:rPr lang="en-US" smtClean="0"/>
-              <a:t>6/7/2019</a:t>
+              <a:t>6/18/2019</a:t>
             </a:fld>
             <a:endParaRPr lang="en-US"/>
           </a:p>
@@ -19281,7 +19281,7 @@
             <a:fld id="{5738B90E-0779-4C36-915C-6F05FCD89456}" type="datetime1">
               <a:rPr lang="en-US" smtClean="0"/>
               <a:pPr/>
-              <a:t>6/7/2019</a:t>
+              <a:t>6/18/2019</a:t>
             </a:fld>
             <a:endParaRPr lang="en-US"/>
           </a:p>
@@ -19344,6 +19344,13 @@
   <p:clrMapOvr>
     <a:masterClrMapping/>
   </p:clrMapOvr>
+  <p:timing>
+    <p:tnLst>
+      <p:par>
+        <p:cTn id="1" dur="indefinite" restart="never" nodeType="tmRoot"/>
+      </p:par>
+    </p:tnLst>
+  </p:timing>
 </p:sld>
 </file>
 
@@ -19369,7 +19376,7 @@
           <p:cNvPr id="2" name="Date Placeholder 1">
             <a:extLst>
               <a:ext uri="{FF2B5EF4-FFF2-40B4-BE49-F238E27FC236}">
-                <a16:creationId xmlns="" xmlns:a16="http://schemas.microsoft.com/office/drawing/2014/main" id="{F0C49392-A6AB-454B-A8CE-1A222F99465B}"/>
+                <a16:creationId xmlns:a16="http://schemas.microsoft.com/office/drawing/2014/main" xmlns="" id="{F0C49392-A6AB-454B-A8CE-1A222F99465B}"/>
               </a:ext>
             </a:extLst>
           </p:cNvPr>
@@ -19387,7 +19394,7 @@
           <a:p>
             <a:fld id="{6700A58B-DD98-43D0-B791-721480A02982}" type="datetime1">
               <a:rPr lang="en-US" smtClean="0"/>
-              <a:t>6/7/2019</a:t>
+              <a:t>6/18/2019</a:t>
             </a:fld>
             <a:endParaRPr lang="en-US"/>
           </a:p>
@@ -19398,7 +19405,7 @@
           <p:cNvPr id="3" name="Title 2">
             <a:extLst>
               <a:ext uri="{FF2B5EF4-FFF2-40B4-BE49-F238E27FC236}">
-                <a16:creationId xmlns="" xmlns:a16="http://schemas.microsoft.com/office/drawing/2014/main" id="{84D6A954-5268-46B6-A543-95112466DB47}"/>
+                <a16:creationId xmlns:a16="http://schemas.microsoft.com/office/drawing/2014/main" xmlns="" id="{84D6A954-5268-46B6-A543-95112466DB47}"/>
               </a:ext>
             </a:extLst>
           </p:cNvPr>
@@ -19426,7 +19433,7 @@
           <p:cNvPr id="4" name="Footer Placeholder 3">
             <a:extLst>
               <a:ext uri="{FF2B5EF4-FFF2-40B4-BE49-F238E27FC236}">
-                <a16:creationId xmlns="" xmlns:a16="http://schemas.microsoft.com/office/drawing/2014/main" id="{4BC7F7B4-D656-41A4-A871-BFDE44C52003}"/>
+                <a16:creationId xmlns:a16="http://schemas.microsoft.com/office/drawing/2014/main" xmlns="" id="{4BC7F7B4-D656-41A4-A871-BFDE44C52003}"/>
               </a:ext>
             </a:extLst>
           </p:cNvPr>
@@ -19455,7 +19462,7 @@
           <p:cNvPr id="5" name="Slide Number Placeholder 4">
             <a:extLst>
               <a:ext uri="{FF2B5EF4-FFF2-40B4-BE49-F238E27FC236}">
-                <a16:creationId xmlns="" xmlns:a16="http://schemas.microsoft.com/office/drawing/2014/main" id="{A6021B5F-8FDA-4E62-A89E-D815A486DD8E}"/>
+                <a16:creationId xmlns:a16="http://schemas.microsoft.com/office/drawing/2014/main" xmlns="" id="{A6021B5F-8FDA-4E62-A89E-D815A486DD8E}"/>
               </a:ext>
             </a:extLst>
           </p:cNvPr>
@@ -19485,7 +19492,7 @@
           <p:cNvPr id="6" name="Rectangle 5">
             <a:extLst>
               <a:ext uri="{FF2B5EF4-FFF2-40B4-BE49-F238E27FC236}">
-                <a16:creationId xmlns="" xmlns:a16="http://schemas.microsoft.com/office/drawing/2014/main" id="{0551F8BD-DC5B-4CDE-B3CC-716D55A4B32F}"/>
+                <a16:creationId xmlns:a16="http://schemas.microsoft.com/office/drawing/2014/main" xmlns="" id="{0551F8BD-DC5B-4CDE-B3CC-716D55A4B32F}"/>
               </a:ext>
             </a:extLst>
           </p:cNvPr>
@@ -19540,7 +19547,7 @@
           <p:cNvPr id="7" name="Rectangle 6">
             <a:extLst>
               <a:ext uri="{FF2B5EF4-FFF2-40B4-BE49-F238E27FC236}">
-                <a16:creationId xmlns="" xmlns:a16="http://schemas.microsoft.com/office/drawing/2014/main" id="{30C04625-BB82-4F8B-88E1-7D53E1BE9899}"/>
+                <a16:creationId xmlns:a16="http://schemas.microsoft.com/office/drawing/2014/main" xmlns="" id="{30C04625-BB82-4F8B-88E1-7D53E1BE9899}"/>
               </a:ext>
             </a:extLst>
           </p:cNvPr>
@@ -19595,7 +19602,7 @@
           <p:cNvPr id="8" name="TextBox 7">
             <a:extLst>
               <a:ext uri="{FF2B5EF4-FFF2-40B4-BE49-F238E27FC236}">
-                <a16:creationId xmlns="" xmlns:a16="http://schemas.microsoft.com/office/drawing/2014/main" id="{F93AAA8F-CCD8-47AF-ACD5-9B3FE1A08D75}"/>
+                <a16:creationId xmlns:a16="http://schemas.microsoft.com/office/drawing/2014/main" xmlns="" id="{F93AAA8F-CCD8-47AF-ACD5-9B3FE1A08D75}"/>
               </a:ext>
             </a:extLst>
           </p:cNvPr>
@@ -19649,7 +19656,7 @@
           <p:cNvPr id="13" name="TextBox 12">
             <a:extLst>
               <a:ext uri="{FF2B5EF4-FFF2-40B4-BE49-F238E27FC236}">
-                <a16:creationId xmlns="" xmlns:a16="http://schemas.microsoft.com/office/drawing/2014/main" id="{243A2CD2-CDC4-4055-BE5C-7ACF1E7F8744}"/>
+                <a16:creationId xmlns:a16="http://schemas.microsoft.com/office/drawing/2014/main" xmlns="" id="{243A2CD2-CDC4-4055-BE5C-7ACF1E7F8744}"/>
               </a:ext>
             </a:extLst>
           </p:cNvPr>
@@ -19684,7 +19691,7 @@
           <p:cNvPr id="14" name="Picture 2" descr="Image result for urgent care meme">
             <a:extLst>
               <a:ext uri="{FF2B5EF4-FFF2-40B4-BE49-F238E27FC236}">
-                <a16:creationId xmlns="" xmlns:a16="http://schemas.microsoft.com/office/drawing/2014/main" id="{EC2819AE-2602-4F99-A8F9-D64374B3D21B}"/>
+                <a16:creationId xmlns:a16="http://schemas.microsoft.com/office/drawing/2014/main" xmlns="" id="{EC2819AE-2602-4F99-A8F9-D64374B3D21B}"/>
               </a:ext>
             </a:extLst>
           </p:cNvPr>
@@ -19761,7 +19768,7 @@
           <p:cNvPr id="2" name="Date Placeholder 1">
             <a:extLst>
               <a:ext uri="{FF2B5EF4-FFF2-40B4-BE49-F238E27FC236}">
-                <a16:creationId xmlns="" xmlns:a16="http://schemas.microsoft.com/office/drawing/2014/main" id="{22F58142-1FC6-48E2-930A-1ABCA90382F2}"/>
+                <a16:creationId xmlns:a16="http://schemas.microsoft.com/office/drawing/2014/main" xmlns="" id="{22F58142-1FC6-48E2-930A-1ABCA90382F2}"/>
               </a:ext>
             </a:extLst>
           </p:cNvPr>
@@ -19779,7 +19786,7 @@
           <a:p>
             <a:fld id="{6700A58B-DD98-43D0-B791-721480A02982}" type="datetime1">
               <a:rPr lang="en-US" smtClean="0"/>
-              <a:t>6/7/2019</a:t>
+              <a:t>6/18/2019</a:t>
             </a:fld>
             <a:endParaRPr lang="en-US"/>
           </a:p>
@@ -19790,7 +19797,7 @@
           <p:cNvPr id="3" name="Title 2">
             <a:extLst>
               <a:ext uri="{FF2B5EF4-FFF2-40B4-BE49-F238E27FC236}">
-                <a16:creationId xmlns="" xmlns:a16="http://schemas.microsoft.com/office/drawing/2014/main" id="{7DCBF78D-BB30-4EA4-92FF-5894C071CDEA}"/>
+                <a16:creationId xmlns:a16="http://schemas.microsoft.com/office/drawing/2014/main" xmlns="" id="{7DCBF78D-BB30-4EA4-92FF-5894C071CDEA}"/>
               </a:ext>
             </a:extLst>
           </p:cNvPr>
@@ -19827,7 +19834,7 @@
           <p:cNvPr id="4" name="Footer Placeholder 3">
             <a:extLst>
               <a:ext uri="{FF2B5EF4-FFF2-40B4-BE49-F238E27FC236}">
-                <a16:creationId xmlns="" xmlns:a16="http://schemas.microsoft.com/office/drawing/2014/main" id="{D63754AC-4F6B-470A-A2CB-89FECF37CBF9}"/>
+                <a16:creationId xmlns:a16="http://schemas.microsoft.com/office/drawing/2014/main" xmlns="" id="{D63754AC-4F6B-470A-A2CB-89FECF37CBF9}"/>
               </a:ext>
             </a:extLst>
           </p:cNvPr>
@@ -19856,7 +19863,7 @@
           <p:cNvPr id="5" name="Slide Number Placeholder 4">
             <a:extLst>
               <a:ext uri="{FF2B5EF4-FFF2-40B4-BE49-F238E27FC236}">
-                <a16:creationId xmlns="" xmlns:a16="http://schemas.microsoft.com/office/drawing/2014/main" id="{526D72EA-36BA-4EE2-AC65-5EEDC382AA55}"/>
+                <a16:creationId xmlns:a16="http://schemas.microsoft.com/office/drawing/2014/main" xmlns="" id="{526D72EA-36BA-4EE2-AC65-5EEDC382AA55}"/>
               </a:ext>
             </a:extLst>
           </p:cNvPr>
@@ -19886,7 +19893,7 @@
           <p:cNvPr id="6" name="TextBox 5">
             <a:extLst>
               <a:ext uri="{FF2B5EF4-FFF2-40B4-BE49-F238E27FC236}">
-                <a16:creationId xmlns="" xmlns:a16="http://schemas.microsoft.com/office/drawing/2014/main" id="{3E747EA3-1AA2-44C7-B883-3A43CAA0B9EE}"/>
+                <a16:creationId xmlns:a16="http://schemas.microsoft.com/office/drawing/2014/main" xmlns="" id="{3E747EA3-1AA2-44C7-B883-3A43CAA0B9EE}"/>
               </a:ext>
             </a:extLst>
           </p:cNvPr>
@@ -19992,7 +19999,7 @@
           <p:cNvPr id="2" name="Date Placeholder 1">
             <a:extLst>
               <a:ext uri="{FF2B5EF4-FFF2-40B4-BE49-F238E27FC236}">
-                <a16:creationId xmlns="" xmlns:a16="http://schemas.microsoft.com/office/drawing/2014/main" id="{CF3303AE-DC79-4075-87D8-B19C4044C6BA}"/>
+                <a16:creationId xmlns:a16="http://schemas.microsoft.com/office/drawing/2014/main" xmlns="" id="{CF3303AE-DC79-4075-87D8-B19C4044C6BA}"/>
               </a:ext>
             </a:extLst>
           </p:cNvPr>
@@ -20010,7 +20017,7 @@
           <a:p>
             <a:fld id="{6700A58B-DD98-43D0-B791-721480A02982}" type="datetime1">
               <a:rPr lang="en-US" smtClean="0"/>
-              <a:t>6/7/2019</a:t>
+              <a:t>6/18/2019</a:t>
             </a:fld>
             <a:endParaRPr lang="en-US"/>
           </a:p>
@@ -20021,7 +20028,7 @@
           <p:cNvPr id="3" name="Title 2">
             <a:extLst>
               <a:ext uri="{FF2B5EF4-FFF2-40B4-BE49-F238E27FC236}">
-                <a16:creationId xmlns="" xmlns:a16="http://schemas.microsoft.com/office/drawing/2014/main" id="{5447F8C8-CE7F-43AE-BEA1-8436CB220DA4}"/>
+                <a16:creationId xmlns:a16="http://schemas.microsoft.com/office/drawing/2014/main" xmlns="" id="{5447F8C8-CE7F-43AE-BEA1-8436CB220DA4}"/>
               </a:ext>
             </a:extLst>
           </p:cNvPr>
@@ -20054,7 +20061,7 @@
           <p:cNvPr id="4" name="Footer Placeholder 3">
             <a:extLst>
               <a:ext uri="{FF2B5EF4-FFF2-40B4-BE49-F238E27FC236}">
-                <a16:creationId xmlns="" xmlns:a16="http://schemas.microsoft.com/office/drawing/2014/main" id="{1BDC3D80-3A8C-4952-A46E-D5B8414D6B8D}"/>
+                <a16:creationId xmlns:a16="http://schemas.microsoft.com/office/drawing/2014/main" xmlns="" id="{1BDC3D80-3A8C-4952-A46E-D5B8414D6B8D}"/>
               </a:ext>
             </a:extLst>
           </p:cNvPr>
@@ -20083,7 +20090,7 @@
           <p:cNvPr id="5" name="Slide Number Placeholder 4">
             <a:extLst>
               <a:ext uri="{FF2B5EF4-FFF2-40B4-BE49-F238E27FC236}">
-                <a16:creationId xmlns="" xmlns:a16="http://schemas.microsoft.com/office/drawing/2014/main" id="{CC1B7AE3-7AE3-45B8-B0B3-1193239D0230}"/>
+                <a16:creationId xmlns:a16="http://schemas.microsoft.com/office/drawing/2014/main" xmlns="" id="{CC1B7AE3-7AE3-45B8-B0B3-1193239D0230}"/>
               </a:ext>
             </a:extLst>
           </p:cNvPr>
@@ -20113,7 +20120,7 @@
           <p:cNvPr id="6" name="TextBox 5">
             <a:extLst>
               <a:ext uri="{FF2B5EF4-FFF2-40B4-BE49-F238E27FC236}">
-                <a16:creationId xmlns="" xmlns:a16="http://schemas.microsoft.com/office/drawing/2014/main" id="{FF943204-89BF-4A6A-AA3F-6612D4C6618A}"/>
+                <a16:creationId xmlns:a16="http://schemas.microsoft.com/office/drawing/2014/main" xmlns="" id="{FF943204-89BF-4A6A-AA3F-6612D4C6618A}"/>
               </a:ext>
             </a:extLst>
           </p:cNvPr>
@@ -20209,7 +20216,7 @@
           <p:cNvPr id="8" name="Picture 7">
             <a:extLst>
               <a:ext uri="{FF2B5EF4-FFF2-40B4-BE49-F238E27FC236}">
-                <a16:creationId xmlns="" xmlns:a16="http://schemas.microsoft.com/office/drawing/2014/main" id="{2F6EC7DB-B710-4963-AD64-DBEFF3146C97}"/>
+                <a16:creationId xmlns:a16="http://schemas.microsoft.com/office/drawing/2014/main" xmlns="" id="{2F6EC7DB-B710-4963-AD64-DBEFF3146C97}"/>
               </a:ext>
             </a:extLst>
           </p:cNvPr>
@@ -20239,7 +20246,7 @@
           <p:cNvPr id="9" name="Rectangle 8">
             <a:extLst>
               <a:ext uri="{FF2B5EF4-FFF2-40B4-BE49-F238E27FC236}">
-                <a16:creationId xmlns="" xmlns:a16="http://schemas.microsoft.com/office/drawing/2014/main" id="{F3B99C2F-44A4-47F7-B59A-FA519F8B32C1}"/>
+                <a16:creationId xmlns:a16="http://schemas.microsoft.com/office/drawing/2014/main" xmlns="" id="{F3B99C2F-44A4-47F7-B59A-FA519F8B32C1}"/>
               </a:ext>
             </a:extLst>
           </p:cNvPr>
@@ -20248,7 +20255,7 @@
         </p:nvSpPr>
         <p:spPr>
           <a:xfrm rot="19487604">
-            <a:off x="3489485" y="4382462"/>
+            <a:off x="3028950" y="4382462"/>
             <a:ext cx="3086100" cy="714895"/>
           </a:xfrm>
           <a:prstGeom prst="rect">
@@ -20278,8 +20285,13 @@
             <a:pPr algn="ctr"/>
             <a:r>
               <a:rPr lang="en-US" dirty="0"/>
-              <a:t>Don’t worry about !</a:t>
-            </a:r>
+              <a:t>Don’t worry about </a:t>
+            </a:r>
+            <a:r>
+              <a:rPr lang="en-US" dirty="0" smtClean="0"/>
+              <a:t>it!</a:t>
+            </a:r>
+            <a:endParaRPr lang="en-US" dirty="0"/>
           </a:p>
         </p:txBody>
       </p:sp>
@@ -20293,6 +20305,13 @@
   <p:clrMapOvr>
     <a:masterClrMapping/>
   </p:clrMapOvr>
+  <p:timing>
+    <p:tnLst>
+      <p:par>
+        <p:cTn id="1" dur="indefinite" restart="never" nodeType="tmRoot"/>
+      </p:par>
+    </p:tnLst>
+  </p:timing>
 </p:sld>
 </file>
 
@@ -20318,7 +20337,7 @@
           <p:cNvPr id="2" name="Date Placeholder 1">
             <a:extLst>
               <a:ext uri="{FF2B5EF4-FFF2-40B4-BE49-F238E27FC236}">
-                <a16:creationId xmlns="" xmlns:a16="http://schemas.microsoft.com/office/drawing/2014/main" id="{57E0559B-108E-42BA-B148-3A7379225216}"/>
+                <a16:creationId xmlns:a16="http://schemas.microsoft.com/office/drawing/2014/main" xmlns="" id="{57E0559B-108E-42BA-B148-3A7379225216}"/>
               </a:ext>
             </a:extLst>
           </p:cNvPr>
@@ -20336,7 +20355,7 @@
           <a:p>
             <a:fld id="{6700A58B-DD98-43D0-B791-721480A02982}" type="datetime1">
               <a:rPr lang="en-US" smtClean="0"/>
-              <a:t>6/7/2019</a:t>
+              <a:t>6/18/2019</a:t>
             </a:fld>
             <a:endParaRPr lang="en-US"/>
           </a:p>
@@ -20347,7 +20366,7 @@
           <p:cNvPr id="4" name="Footer Placeholder 3">
             <a:extLst>
               <a:ext uri="{FF2B5EF4-FFF2-40B4-BE49-F238E27FC236}">
-                <a16:creationId xmlns="" xmlns:a16="http://schemas.microsoft.com/office/drawing/2014/main" id="{14B786CE-7946-4E43-8B50-45FD4C2912D4}"/>
+                <a16:creationId xmlns:a16="http://schemas.microsoft.com/office/drawing/2014/main" xmlns="" id="{14B786CE-7946-4E43-8B50-45FD4C2912D4}"/>
               </a:ext>
             </a:extLst>
           </p:cNvPr>
@@ -20376,7 +20395,7 @@
           <p:cNvPr id="5" name="Slide Number Placeholder 4">
             <a:extLst>
               <a:ext uri="{FF2B5EF4-FFF2-40B4-BE49-F238E27FC236}">
-                <a16:creationId xmlns="" xmlns:a16="http://schemas.microsoft.com/office/drawing/2014/main" id="{A1645270-A7E1-4DC5-80A2-101C114D5BC6}"/>
+                <a16:creationId xmlns:a16="http://schemas.microsoft.com/office/drawing/2014/main" xmlns="" id="{A1645270-A7E1-4DC5-80A2-101C114D5BC6}"/>
               </a:ext>
             </a:extLst>
           </p:cNvPr>
@@ -20406,7 +20425,7 @@
           <p:cNvPr id="6" name="Isosceles Triangle 5">
             <a:extLst>
               <a:ext uri="{FF2B5EF4-FFF2-40B4-BE49-F238E27FC236}">
-                <a16:creationId xmlns="" xmlns:a16="http://schemas.microsoft.com/office/drawing/2014/main" id="{568C45E7-36F0-437E-814C-29EDFCBBABCB}"/>
+                <a16:creationId xmlns:a16="http://schemas.microsoft.com/office/drawing/2014/main" xmlns="" id="{568C45E7-36F0-437E-814C-29EDFCBBABCB}"/>
               </a:ext>
             </a:extLst>
           </p:cNvPr>
@@ -20460,7 +20479,7 @@
           <p:cNvPr id="7" name="Title 6">
             <a:extLst>
               <a:ext uri="{FF2B5EF4-FFF2-40B4-BE49-F238E27FC236}">
-                <a16:creationId xmlns="" xmlns:a16="http://schemas.microsoft.com/office/drawing/2014/main" id="{8042F69E-D8CD-41F9-9A70-4D28C8B938E1}"/>
+                <a16:creationId xmlns:a16="http://schemas.microsoft.com/office/drawing/2014/main" xmlns="" id="{8042F69E-D8CD-41F9-9A70-4D28C8B938E1}"/>
               </a:ext>
             </a:extLst>
           </p:cNvPr>
@@ -20473,8 +20492,8 @@
         </p:nvSpPr>
         <p:spPr>
           <a:xfrm>
-            <a:off x="628650" y="365125"/>
-            <a:ext cx="7981865" cy="549381"/>
+            <a:off x="431411" y="365125"/>
+            <a:ext cx="8281178" cy="480131"/>
           </a:xfrm>
           <a:prstGeom prst="rect">
             <a:avLst/>
@@ -20488,8 +20507,24 @@
           <a:lstStyle/>
           <a:p>
             <a:r>
-              <a:rPr lang="en-US" dirty="0"/>
-              <a:t>K = 3: vectors &amp; 3 corresponding probabilities</a:t>
+              <a:rPr lang="en-US" sz="2800" dirty="0"/>
+              <a:t>K = 3: </a:t>
+            </a:r>
+            <a:r>
+              <a:rPr lang="en-US" sz="2800" dirty="0" smtClean="0"/>
+              <a:t>Three vectors </a:t>
+            </a:r>
+            <a:r>
+              <a:rPr lang="en-US" sz="2800" dirty="0"/>
+              <a:t>&amp; </a:t>
+            </a:r>
+            <a:r>
+              <a:rPr lang="en-US" sz="2800" dirty="0" smtClean="0"/>
+              <a:t>Three </a:t>
+            </a:r>
+            <a:r>
+              <a:rPr lang="en-US" sz="2800" dirty="0"/>
+              <a:t>corresponding probabilities</a:t>
             </a:r>
           </a:p>
         </p:txBody>
@@ -20499,7 +20534,7 @@
           <p:cNvPr id="8" name="TextBox 7">
             <a:extLst>
               <a:ext uri="{FF2B5EF4-FFF2-40B4-BE49-F238E27FC236}">
-                <a16:creationId xmlns="" xmlns:a16="http://schemas.microsoft.com/office/drawing/2014/main" id="{BDFAF5B9-53B8-43CC-8FDC-C9AD1C1AFDFE}"/>
+                <a16:creationId xmlns:a16="http://schemas.microsoft.com/office/drawing/2014/main" xmlns="" id="{BDFAF5B9-53B8-43CC-8FDC-C9AD1C1AFDFE}"/>
               </a:ext>
             </a:extLst>
           </p:cNvPr>
@@ -20534,7 +20569,7 @@
           <p:cNvPr id="9" name="TextBox 8">
             <a:extLst>
               <a:ext uri="{FF2B5EF4-FFF2-40B4-BE49-F238E27FC236}">
-                <a16:creationId xmlns="" xmlns:a16="http://schemas.microsoft.com/office/drawing/2014/main" id="{36E6C273-906A-46F4-AA13-4DA9F8AE5CCA}"/>
+                <a16:creationId xmlns:a16="http://schemas.microsoft.com/office/drawing/2014/main" xmlns="" id="{36E6C273-906A-46F4-AA13-4DA9F8AE5CCA}"/>
               </a:ext>
             </a:extLst>
           </p:cNvPr>
@@ -20569,7 +20604,7 @@
           <p:cNvPr id="10" name="TextBox 9">
             <a:extLst>
               <a:ext uri="{FF2B5EF4-FFF2-40B4-BE49-F238E27FC236}">
-                <a16:creationId xmlns="" xmlns:a16="http://schemas.microsoft.com/office/drawing/2014/main" id="{B305ABF0-9764-4BC9-AFB1-61C7DC54FCDE}"/>
+                <a16:creationId xmlns:a16="http://schemas.microsoft.com/office/drawing/2014/main" xmlns="" id="{B305ABF0-9764-4BC9-AFB1-61C7DC54FCDE}"/>
               </a:ext>
             </a:extLst>
           </p:cNvPr>
@@ -20604,7 +20639,7 @@
           <p:cNvPr id="11" name="Oval 10">
             <a:extLst>
               <a:ext uri="{FF2B5EF4-FFF2-40B4-BE49-F238E27FC236}">
-                <a16:creationId xmlns="" xmlns:a16="http://schemas.microsoft.com/office/drawing/2014/main" id="{5035009E-8D02-43BD-8B4B-91651CACFE75}"/>
+                <a16:creationId xmlns:a16="http://schemas.microsoft.com/office/drawing/2014/main" xmlns="" id="{5035009E-8D02-43BD-8B4B-91651CACFE75}"/>
               </a:ext>
             </a:extLst>
           </p:cNvPr>
@@ -20650,7 +20685,7 @@
           <p:cNvPr id="12" name="Oval 11">
             <a:extLst>
               <a:ext uri="{FF2B5EF4-FFF2-40B4-BE49-F238E27FC236}">
-                <a16:creationId xmlns="" xmlns:a16="http://schemas.microsoft.com/office/drawing/2014/main" id="{CDE8AAA5-77F6-4054-9B18-5D2F04908586}"/>
+                <a16:creationId xmlns:a16="http://schemas.microsoft.com/office/drawing/2014/main" xmlns="" id="{CDE8AAA5-77F6-4054-9B18-5D2F04908586}"/>
               </a:ext>
             </a:extLst>
           </p:cNvPr>
@@ -20696,7 +20731,7 @@
           <p:cNvPr id="13" name="Oval 12">
             <a:extLst>
               <a:ext uri="{FF2B5EF4-FFF2-40B4-BE49-F238E27FC236}">
-                <a16:creationId xmlns="" xmlns:a16="http://schemas.microsoft.com/office/drawing/2014/main" id="{94E01DF5-0702-4F9D-99BE-16C86DDC4001}"/>
+                <a16:creationId xmlns:a16="http://schemas.microsoft.com/office/drawing/2014/main" xmlns="" id="{94E01DF5-0702-4F9D-99BE-16C86DDC4001}"/>
               </a:ext>
             </a:extLst>
           </p:cNvPr>
@@ -20747,6 +20782,13 @@
   <p:clrMapOvr>
     <a:masterClrMapping/>
   </p:clrMapOvr>
+  <p:timing>
+    <p:tnLst>
+      <p:par>
+        <p:cTn id="1" dur="indefinite" restart="never" nodeType="tmRoot"/>
+      </p:par>
+    </p:tnLst>
+  </p:timing>
 </p:sld>
 </file>
 
@@ -20772,7 +20814,7 @@
           <p:cNvPr id="2" name="Date Placeholder 1">
             <a:extLst>
               <a:ext uri="{FF2B5EF4-FFF2-40B4-BE49-F238E27FC236}">
-                <a16:creationId xmlns="" xmlns:a16="http://schemas.microsoft.com/office/drawing/2014/main" id="{57E0559B-108E-42BA-B148-3A7379225216}"/>
+                <a16:creationId xmlns:a16="http://schemas.microsoft.com/office/drawing/2014/main" xmlns="" id="{57E0559B-108E-42BA-B148-3A7379225216}"/>
               </a:ext>
             </a:extLst>
           </p:cNvPr>
@@ -20790,7 +20832,7 @@
           <a:p>
             <a:fld id="{6700A58B-DD98-43D0-B791-721480A02982}" type="datetime1">
               <a:rPr lang="en-US" smtClean="0"/>
-              <a:t>6/7/2019</a:t>
+              <a:t>6/18/2019</a:t>
             </a:fld>
             <a:endParaRPr lang="en-US"/>
           </a:p>
@@ -20801,7 +20843,7 @@
           <p:cNvPr id="4" name="Footer Placeholder 3">
             <a:extLst>
               <a:ext uri="{FF2B5EF4-FFF2-40B4-BE49-F238E27FC236}">
-                <a16:creationId xmlns="" xmlns:a16="http://schemas.microsoft.com/office/drawing/2014/main" id="{14B786CE-7946-4E43-8B50-45FD4C2912D4}"/>
+                <a16:creationId xmlns:a16="http://schemas.microsoft.com/office/drawing/2014/main" xmlns="" id="{14B786CE-7946-4E43-8B50-45FD4C2912D4}"/>
               </a:ext>
             </a:extLst>
           </p:cNvPr>
@@ -20830,7 +20872,7 @@
           <p:cNvPr id="5" name="Slide Number Placeholder 4">
             <a:extLst>
               <a:ext uri="{FF2B5EF4-FFF2-40B4-BE49-F238E27FC236}">
-                <a16:creationId xmlns="" xmlns:a16="http://schemas.microsoft.com/office/drawing/2014/main" id="{A1645270-A7E1-4DC5-80A2-101C114D5BC6}"/>
+                <a16:creationId xmlns:a16="http://schemas.microsoft.com/office/drawing/2014/main" xmlns="" id="{A1645270-A7E1-4DC5-80A2-101C114D5BC6}"/>
               </a:ext>
             </a:extLst>
           </p:cNvPr>
@@ -20860,7 +20902,7 @@
           <p:cNvPr id="6" name="Isosceles Triangle 5">
             <a:extLst>
               <a:ext uri="{FF2B5EF4-FFF2-40B4-BE49-F238E27FC236}">
-                <a16:creationId xmlns="" xmlns:a16="http://schemas.microsoft.com/office/drawing/2014/main" id="{568C45E7-36F0-437E-814C-29EDFCBBABCB}"/>
+                <a16:creationId xmlns:a16="http://schemas.microsoft.com/office/drawing/2014/main" xmlns="" id="{568C45E7-36F0-437E-814C-29EDFCBBABCB}"/>
               </a:ext>
             </a:extLst>
           </p:cNvPr>
@@ -20914,7 +20956,7 @@
           <p:cNvPr id="7" name="Title 6">
             <a:extLst>
               <a:ext uri="{FF2B5EF4-FFF2-40B4-BE49-F238E27FC236}">
-                <a16:creationId xmlns="" xmlns:a16="http://schemas.microsoft.com/office/drawing/2014/main" id="{8042F69E-D8CD-41F9-9A70-4D28C8B938E1}"/>
+                <a16:creationId xmlns:a16="http://schemas.microsoft.com/office/drawing/2014/main" xmlns="" id="{8042F69E-D8CD-41F9-9A70-4D28C8B938E1}"/>
               </a:ext>
             </a:extLst>
           </p:cNvPr>
@@ -20953,7 +20995,7 @@
           <p:cNvPr id="9" name="TextBox 8">
             <a:extLst>
               <a:ext uri="{FF2B5EF4-FFF2-40B4-BE49-F238E27FC236}">
-                <a16:creationId xmlns="" xmlns:a16="http://schemas.microsoft.com/office/drawing/2014/main" id="{36E6C273-906A-46F4-AA13-4DA9F8AE5CCA}"/>
+                <a16:creationId xmlns:a16="http://schemas.microsoft.com/office/drawing/2014/main" xmlns="" id="{36E6C273-906A-46F4-AA13-4DA9F8AE5CCA}"/>
               </a:ext>
             </a:extLst>
           </p:cNvPr>
@@ -20988,7 +21030,7 @@
           <p:cNvPr id="10" name="TextBox 9">
             <a:extLst>
               <a:ext uri="{FF2B5EF4-FFF2-40B4-BE49-F238E27FC236}">
-                <a16:creationId xmlns="" xmlns:a16="http://schemas.microsoft.com/office/drawing/2014/main" id="{B305ABF0-9764-4BC9-AFB1-61C7DC54FCDE}"/>
+                <a16:creationId xmlns:a16="http://schemas.microsoft.com/office/drawing/2014/main" xmlns="" id="{B305ABF0-9764-4BC9-AFB1-61C7DC54FCDE}"/>
               </a:ext>
             </a:extLst>
           </p:cNvPr>
@@ -21023,7 +21065,7 @@
           <p:cNvPr id="11" name="Oval 10">
             <a:extLst>
               <a:ext uri="{FF2B5EF4-FFF2-40B4-BE49-F238E27FC236}">
-                <a16:creationId xmlns="" xmlns:a16="http://schemas.microsoft.com/office/drawing/2014/main" id="{B906B13D-5844-40B6-BCAB-011FB5C3D997}"/>
+                <a16:creationId xmlns:a16="http://schemas.microsoft.com/office/drawing/2014/main" xmlns="" id="{B906B13D-5844-40B6-BCAB-011FB5C3D997}"/>
               </a:ext>
             </a:extLst>
           </p:cNvPr>
@@ -21069,7 +21111,7 @@
           <p:cNvPr id="12" name="Oval 11">
             <a:extLst>
               <a:ext uri="{FF2B5EF4-FFF2-40B4-BE49-F238E27FC236}">
-                <a16:creationId xmlns="" xmlns:a16="http://schemas.microsoft.com/office/drawing/2014/main" id="{C1200B6D-C0CF-435D-9C0E-B289CA598BB6}"/>
+                <a16:creationId xmlns:a16="http://schemas.microsoft.com/office/drawing/2014/main" xmlns="" id="{C1200B6D-C0CF-435D-9C0E-B289CA598BB6}"/>
               </a:ext>
             </a:extLst>
           </p:cNvPr>
@@ -21120,6 +21162,13 @@
   <p:clrMapOvr>
     <a:masterClrMapping/>
   </p:clrMapOvr>
+  <p:timing>
+    <p:tnLst>
+      <p:par>
+        <p:cTn id="1" dur="indefinite" restart="never" nodeType="tmRoot"/>
+      </p:par>
+    </p:tnLst>
+  </p:timing>
 </p:sld>
 </file>
 
@@ -21145,7 +21194,7 @@
           <p:cNvPr id="2" name="Date Placeholder 1">
             <a:extLst>
               <a:ext uri="{FF2B5EF4-FFF2-40B4-BE49-F238E27FC236}">
-                <a16:creationId xmlns="" xmlns:a16="http://schemas.microsoft.com/office/drawing/2014/main" id="{22F37A0D-00C5-409F-A411-69923C02062B}"/>
+                <a16:creationId xmlns:a16="http://schemas.microsoft.com/office/drawing/2014/main" xmlns="" id="{22F37A0D-00C5-409F-A411-69923C02062B}"/>
               </a:ext>
             </a:extLst>
           </p:cNvPr>
@@ -21163,7 +21212,7 @@
           <a:p>
             <a:fld id="{6700A58B-DD98-43D0-B791-721480A02982}" type="datetime1">
               <a:rPr lang="en-US" smtClean="0"/>
-              <a:t>6/7/2019</a:t>
+              <a:t>6/18/2019</a:t>
             </a:fld>
             <a:endParaRPr lang="en-US"/>
           </a:p>
@@ -21174,7 +21223,7 @@
           <p:cNvPr id="3" name="Title 2">
             <a:extLst>
               <a:ext uri="{FF2B5EF4-FFF2-40B4-BE49-F238E27FC236}">
-                <a16:creationId xmlns="" xmlns:a16="http://schemas.microsoft.com/office/drawing/2014/main" id="{BC48205D-72D5-4364-B962-8D1738A7D06F}"/>
+                <a16:creationId xmlns:a16="http://schemas.microsoft.com/office/drawing/2014/main" xmlns="" id="{BC48205D-72D5-4364-B962-8D1738A7D06F}"/>
               </a:ext>
             </a:extLst>
           </p:cNvPr>
@@ -21202,7 +21251,7 @@
           <p:cNvPr id="4" name="Footer Placeholder 3">
             <a:extLst>
               <a:ext uri="{FF2B5EF4-FFF2-40B4-BE49-F238E27FC236}">
-                <a16:creationId xmlns="" xmlns:a16="http://schemas.microsoft.com/office/drawing/2014/main" id="{C2AB79FF-FB43-45BB-A5DF-3520D893F70A}"/>
+                <a16:creationId xmlns:a16="http://schemas.microsoft.com/office/drawing/2014/main" xmlns="" id="{C2AB79FF-FB43-45BB-A5DF-3520D893F70A}"/>
               </a:ext>
             </a:extLst>
           </p:cNvPr>
@@ -21231,7 +21280,7 @@
           <p:cNvPr id="5" name="Slide Number Placeholder 4">
             <a:extLst>
               <a:ext uri="{FF2B5EF4-FFF2-40B4-BE49-F238E27FC236}">
-                <a16:creationId xmlns="" xmlns:a16="http://schemas.microsoft.com/office/drawing/2014/main" id="{05A8748C-3062-4F86-A2FC-23AE608875E8}"/>
+                <a16:creationId xmlns:a16="http://schemas.microsoft.com/office/drawing/2014/main" xmlns="" id="{05A8748C-3062-4F86-A2FC-23AE608875E8}"/>
               </a:ext>
             </a:extLst>
           </p:cNvPr>
@@ -21261,7 +21310,7 @@
           <p:cNvPr id="11" name="TextBox 10">
             <a:extLst>
               <a:ext uri="{FF2B5EF4-FFF2-40B4-BE49-F238E27FC236}">
-                <a16:creationId xmlns="" xmlns:a16="http://schemas.microsoft.com/office/drawing/2014/main" id="{F8E40CA8-E36E-4944-B913-427A3979C01B}"/>
+                <a16:creationId xmlns:a16="http://schemas.microsoft.com/office/drawing/2014/main" xmlns="" id="{F8E40CA8-E36E-4944-B913-427A3979C01B}"/>
               </a:ext>
             </a:extLst>
           </p:cNvPr>
@@ -21310,7 +21359,7 @@
           <p:cNvPr id="13" name="Picture 12">
             <a:extLst>
               <a:ext uri="{FF2B5EF4-FFF2-40B4-BE49-F238E27FC236}">
-                <a16:creationId xmlns="" xmlns:a16="http://schemas.microsoft.com/office/drawing/2014/main" id="{A63871AF-8798-4AE2-84AD-E116086DB1BE}"/>
+                <a16:creationId xmlns:a16="http://schemas.microsoft.com/office/drawing/2014/main" xmlns="" id="{A63871AF-8798-4AE2-84AD-E116086DB1BE}"/>
               </a:ext>
             </a:extLst>
           </p:cNvPr>
@@ -21345,6 +21394,13 @@
   <p:clrMapOvr>
     <a:masterClrMapping/>
   </p:clrMapOvr>
+  <p:timing>
+    <p:tnLst>
+      <p:par>
+        <p:cTn id="1" dur="indefinite" restart="never" nodeType="tmRoot"/>
+      </p:par>
+    </p:tnLst>
+  </p:timing>
 </p:sld>
 </file>
 
@@ -21370,7 +21426,7 @@
           <p:cNvPr id="2" name="Date Placeholder 1">
             <a:extLst>
               <a:ext uri="{FF2B5EF4-FFF2-40B4-BE49-F238E27FC236}">
-                <a16:creationId xmlns="" xmlns:a16="http://schemas.microsoft.com/office/drawing/2014/main" id="{22F37A0D-00C5-409F-A411-69923C02062B}"/>
+                <a16:creationId xmlns:a16="http://schemas.microsoft.com/office/drawing/2014/main" xmlns="" id="{22F37A0D-00C5-409F-A411-69923C02062B}"/>
               </a:ext>
             </a:extLst>
           </p:cNvPr>
@@ -21388,7 +21444,7 @@
           <a:p>
             <a:fld id="{6700A58B-DD98-43D0-B791-721480A02982}" type="datetime1">
               <a:rPr lang="en-US" smtClean="0"/>
-              <a:t>6/7/2019</a:t>
+              <a:t>6/18/2019</a:t>
             </a:fld>
             <a:endParaRPr lang="en-US"/>
           </a:p>
@@ -21399,7 +21455,7 @@
           <p:cNvPr id="3" name="Title 2">
             <a:extLst>
               <a:ext uri="{FF2B5EF4-FFF2-40B4-BE49-F238E27FC236}">
-                <a16:creationId xmlns="" xmlns:a16="http://schemas.microsoft.com/office/drawing/2014/main" id="{BC48205D-72D5-4364-B962-8D1738A7D06F}"/>
+                <a16:creationId xmlns:a16="http://schemas.microsoft.com/office/drawing/2014/main" xmlns="" id="{BC48205D-72D5-4364-B962-8D1738A7D06F}"/>
               </a:ext>
             </a:extLst>
           </p:cNvPr>
@@ -21427,7 +21483,7 @@
           <p:cNvPr id="4" name="Footer Placeholder 3">
             <a:extLst>
               <a:ext uri="{FF2B5EF4-FFF2-40B4-BE49-F238E27FC236}">
-                <a16:creationId xmlns="" xmlns:a16="http://schemas.microsoft.com/office/drawing/2014/main" id="{C2AB79FF-FB43-45BB-A5DF-3520D893F70A}"/>
+                <a16:creationId xmlns:a16="http://schemas.microsoft.com/office/drawing/2014/main" xmlns="" id="{C2AB79FF-FB43-45BB-A5DF-3520D893F70A}"/>
               </a:ext>
             </a:extLst>
           </p:cNvPr>
@@ -21456,7 +21512,7 @@
           <p:cNvPr id="5" name="Slide Number Placeholder 4">
             <a:extLst>
               <a:ext uri="{FF2B5EF4-FFF2-40B4-BE49-F238E27FC236}">
-                <a16:creationId xmlns="" xmlns:a16="http://schemas.microsoft.com/office/drawing/2014/main" id="{05A8748C-3062-4F86-A2FC-23AE608875E8}"/>
+                <a16:creationId xmlns:a16="http://schemas.microsoft.com/office/drawing/2014/main" xmlns="" id="{05A8748C-3062-4F86-A2FC-23AE608875E8}"/>
               </a:ext>
             </a:extLst>
           </p:cNvPr>
@@ -21486,7 +21542,7 @@
           <p:cNvPr id="9" name="Picture 2" descr="https://upload.wikimedia.org/wikipedia/commons/thumb/5/54/LogDirichletDensity-alpha_0.3_to_alpha_2.0.gif/250px-LogDirichletDensity-alpha_0.3_to_alpha_2.0.gif">
             <a:extLst>
               <a:ext uri="{FF2B5EF4-FFF2-40B4-BE49-F238E27FC236}">
-                <a16:creationId xmlns="" xmlns:a16="http://schemas.microsoft.com/office/drawing/2014/main" id="{431EFBA7-B5DA-4972-BB79-4049700E4E78}"/>
+                <a16:creationId xmlns:a16="http://schemas.microsoft.com/office/drawing/2014/main" xmlns="" id="{431EFBA7-B5DA-4972-BB79-4049700E4E78}"/>
               </a:ext>
             </a:extLst>
           </p:cNvPr>
@@ -21533,7 +21589,7 @@
           <p:cNvPr id="11" name="TextBox 10">
             <a:extLst>
               <a:ext uri="{FF2B5EF4-FFF2-40B4-BE49-F238E27FC236}">
-                <a16:creationId xmlns="" xmlns:a16="http://schemas.microsoft.com/office/drawing/2014/main" id="{F8E40CA8-E36E-4944-B913-427A3979C01B}"/>
+                <a16:creationId xmlns:a16="http://schemas.microsoft.com/office/drawing/2014/main" xmlns="" id="{F8E40CA8-E36E-4944-B913-427A3979C01B}"/>
               </a:ext>
             </a:extLst>
           </p:cNvPr>
@@ -21577,6 +21633,13 @@
   <p:clrMapOvr>
     <a:masterClrMapping/>
   </p:clrMapOvr>
+  <p:timing>
+    <p:tnLst>
+      <p:par>
+        <p:cTn id="1" dur="indefinite" restart="never" nodeType="tmRoot"/>
+      </p:par>
+    </p:tnLst>
+  </p:timing>
 </p:sld>
 </file>
 
@@ -21602,7 +21665,7 @@
           <p:cNvPr id="2" name="Date Placeholder 1">
             <a:extLst>
               <a:ext uri="{FF2B5EF4-FFF2-40B4-BE49-F238E27FC236}">
-                <a16:creationId xmlns="" xmlns:a16="http://schemas.microsoft.com/office/drawing/2014/main" id="{612AF962-D159-495F-94AE-9D1650A29A11}"/>
+                <a16:creationId xmlns:a16="http://schemas.microsoft.com/office/drawing/2014/main" xmlns="" id="{612AF962-D159-495F-94AE-9D1650A29A11}"/>
               </a:ext>
             </a:extLst>
           </p:cNvPr>
@@ -21620,7 +21683,7 @@
           <a:p>
             <a:fld id="{6700A58B-DD98-43D0-B791-721480A02982}" type="datetime1">
               <a:rPr lang="en-US" smtClean="0"/>
-              <a:t>6/7/2019</a:t>
+              <a:t>6/18/2019</a:t>
             </a:fld>
             <a:endParaRPr lang="en-US"/>
           </a:p>
@@ -21631,7 +21694,7 @@
           <p:cNvPr id="3" name="Title 2">
             <a:extLst>
               <a:ext uri="{FF2B5EF4-FFF2-40B4-BE49-F238E27FC236}">
-                <a16:creationId xmlns="" xmlns:a16="http://schemas.microsoft.com/office/drawing/2014/main" id="{DE2336EF-9AF2-4CD8-ADF3-2AA1A4645F3F}"/>
+                <a16:creationId xmlns:a16="http://schemas.microsoft.com/office/drawing/2014/main" xmlns="" id="{DE2336EF-9AF2-4CD8-ADF3-2AA1A4645F3F}"/>
               </a:ext>
             </a:extLst>
           </p:cNvPr>
@@ -21659,7 +21722,7 @@
           <p:cNvPr id="4" name="Footer Placeholder 3">
             <a:extLst>
               <a:ext uri="{FF2B5EF4-FFF2-40B4-BE49-F238E27FC236}">
-                <a16:creationId xmlns="" xmlns:a16="http://schemas.microsoft.com/office/drawing/2014/main" id="{25BC9103-9F85-4DF1-B87B-168EE8A47590}"/>
+                <a16:creationId xmlns:a16="http://schemas.microsoft.com/office/drawing/2014/main" xmlns="" id="{25BC9103-9F85-4DF1-B87B-168EE8A47590}"/>
               </a:ext>
             </a:extLst>
           </p:cNvPr>
@@ -21688,7 +21751,7 @@
           <p:cNvPr id="5" name="Slide Number Placeholder 4">
             <a:extLst>
               <a:ext uri="{FF2B5EF4-FFF2-40B4-BE49-F238E27FC236}">
-                <a16:creationId xmlns="" xmlns:a16="http://schemas.microsoft.com/office/drawing/2014/main" id="{0E06C221-C357-47E5-8219-724674DFA438}"/>
+                <a16:creationId xmlns:a16="http://schemas.microsoft.com/office/drawing/2014/main" xmlns="" id="{0E06C221-C357-47E5-8219-724674DFA438}"/>
               </a:ext>
             </a:extLst>
           </p:cNvPr>
@@ -21718,7 +21781,7 @@
           <p:cNvPr id="6" name="TextBox 5">
             <a:extLst>
               <a:ext uri="{FF2B5EF4-FFF2-40B4-BE49-F238E27FC236}">
-                <a16:creationId xmlns="" xmlns:a16="http://schemas.microsoft.com/office/drawing/2014/main" id="{F4C1B3C6-29E0-460A-B856-5710DDE6EC4B}"/>
+                <a16:creationId xmlns:a16="http://schemas.microsoft.com/office/drawing/2014/main" xmlns="" id="{F4C1B3C6-29E0-460A-B856-5710DDE6EC4B}"/>
               </a:ext>
             </a:extLst>
           </p:cNvPr>
@@ -21756,7 +21819,7 @@
           <p:cNvPr id="5122" name="Picture 2" descr="https://www.objectorientedsubject.net/wpdir/wp-content/uploads/2017/12/topicmodeling-lda-intuitions-700x449.png">
             <a:extLst>
               <a:ext uri="{FF2B5EF4-FFF2-40B4-BE49-F238E27FC236}">
-                <a16:creationId xmlns="" xmlns:a16="http://schemas.microsoft.com/office/drawing/2014/main" id="{33C4A265-23B9-4A70-AA91-E67AB49110A1}"/>
+                <a16:creationId xmlns:a16="http://schemas.microsoft.com/office/drawing/2014/main" xmlns="" id="{33C4A265-23B9-4A70-AA91-E67AB49110A1}"/>
               </a:ext>
             </a:extLst>
           </p:cNvPr>
@@ -21808,6 +21871,13 @@
   <p:clrMapOvr>
     <a:masterClrMapping/>
   </p:clrMapOvr>
+  <p:timing>
+    <p:tnLst>
+      <p:par>
+        <p:cTn id="1" dur="indefinite" restart="never" nodeType="tmRoot"/>
+      </p:par>
+    </p:tnLst>
+  </p:timing>
 </p:sld>
 </file>
 
@@ -21833,7 +21903,7 @@
           <p:cNvPr id="2" name="Date Placeholder 1">
             <a:extLst>
               <a:ext uri="{FF2B5EF4-FFF2-40B4-BE49-F238E27FC236}">
-                <a16:creationId xmlns="" xmlns:a16="http://schemas.microsoft.com/office/drawing/2014/main" id="{BD0FB113-F15D-425D-8FEB-E051306B5B11}"/>
+                <a16:creationId xmlns:a16="http://schemas.microsoft.com/office/drawing/2014/main" xmlns="" id="{BD0FB113-F15D-425D-8FEB-E051306B5B11}"/>
               </a:ext>
             </a:extLst>
           </p:cNvPr>
@@ -21851,7 +21921,7 @@
           <a:p>
             <a:fld id="{6700A58B-DD98-43D0-B791-721480A02982}" type="datetime1">
               <a:rPr lang="en-US" smtClean="0"/>
-              <a:t>6/7/2019</a:t>
+              <a:t>6/18/2019</a:t>
             </a:fld>
             <a:endParaRPr lang="en-US"/>
           </a:p>
@@ -21862,7 +21932,7 @@
           <p:cNvPr id="3" name="Title 2">
             <a:extLst>
               <a:ext uri="{FF2B5EF4-FFF2-40B4-BE49-F238E27FC236}">
-                <a16:creationId xmlns="" xmlns:a16="http://schemas.microsoft.com/office/drawing/2014/main" id="{EFD3F5D3-1E38-4F52-8298-D78245B3C28B}"/>
+                <a16:creationId xmlns:a16="http://schemas.microsoft.com/office/drawing/2014/main" xmlns="" id="{EFD3F5D3-1E38-4F52-8298-D78245B3C28B}"/>
               </a:ext>
             </a:extLst>
           </p:cNvPr>
@@ -21895,7 +21965,7 @@
           <p:cNvPr id="4" name="Footer Placeholder 3">
             <a:extLst>
               <a:ext uri="{FF2B5EF4-FFF2-40B4-BE49-F238E27FC236}">
-                <a16:creationId xmlns="" xmlns:a16="http://schemas.microsoft.com/office/drawing/2014/main" id="{8D9A779D-C17D-4BAD-9CB4-F63421714926}"/>
+                <a16:creationId xmlns:a16="http://schemas.microsoft.com/office/drawing/2014/main" xmlns="" id="{8D9A779D-C17D-4BAD-9CB4-F63421714926}"/>
               </a:ext>
             </a:extLst>
           </p:cNvPr>
@@ -21924,7 +21994,7 @@
           <p:cNvPr id="5" name="Slide Number Placeholder 4">
             <a:extLst>
               <a:ext uri="{FF2B5EF4-FFF2-40B4-BE49-F238E27FC236}">
-                <a16:creationId xmlns="" xmlns:a16="http://schemas.microsoft.com/office/drawing/2014/main" id="{D99DEF9E-54AF-4FC4-A213-C24639AEB6D6}"/>
+                <a16:creationId xmlns:a16="http://schemas.microsoft.com/office/drawing/2014/main" xmlns="" id="{D99DEF9E-54AF-4FC4-A213-C24639AEB6D6}"/>
               </a:ext>
             </a:extLst>
           </p:cNvPr>
@@ -21954,7 +22024,7 @@
           <p:cNvPr id="2050" name="Picture 2" descr="Image result for after lunch meme">
             <a:extLst>
               <a:ext uri="{FF2B5EF4-FFF2-40B4-BE49-F238E27FC236}">
-                <a16:creationId xmlns="" xmlns:a16="http://schemas.microsoft.com/office/drawing/2014/main" id="{AD246B8A-E953-4FDC-916C-B60D048FE8A0}"/>
+                <a16:creationId xmlns:a16="http://schemas.microsoft.com/office/drawing/2014/main" xmlns="" id="{AD246B8A-E953-4FDC-916C-B60D048FE8A0}"/>
               </a:ext>
             </a:extLst>
           </p:cNvPr>
@@ -22006,6 +22076,13 @@
   <p:clrMapOvr>
     <a:masterClrMapping/>
   </p:clrMapOvr>
+  <p:timing>
+    <p:tnLst>
+      <p:par>
+        <p:cTn id="1" dur="indefinite" restart="never" nodeType="tmRoot"/>
+      </p:par>
+    </p:tnLst>
+  </p:timing>
 </p:sld>
 </file>
 
@@ -22031,7 +22108,7 @@
           <p:cNvPr id="2" name="Date Placeholder 1">
             <a:extLst>
               <a:ext uri="{FF2B5EF4-FFF2-40B4-BE49-F238E27FC236}">
-                <a16:creationId xmlns="" xmlns:a16="http://schemas.microsoft.com/office/drawing/2014/main" id="{483710AC-7DD4-47F9-9E7C-2515755D0AB2}"/>
+                <a16:creationId xmlns:a16="http://schemas.microsoft.com/office/drawing/2014/main" xmlns="" id="{483710AC-7DD4-47F9-9E7C-2515755D0AB2}"/>
               </a:ext>
             </a:extLst>
           </p:cNvPr>
@@ -22049,7 +22126,7 @@
           <a:p>
             <a:fld id="{6700A58B-DD98-43D0-B791-721480A02982}" type="datetime1">
               <a:rPr lang="en-US" smtClean="0"/>
-              <a:t>6/7/2019</a:t>
+              <a:t>6/18/2019</a:t>
             </a:fld>
             <a:endParaRPr lang="en-US"/>
           </a:p>
@@ -22060,7 +22137,7 @@
           <p:cNvPr id="3" name="Title 2">
             <a:extLst>
               <a:ext uri="{FF2B5EF4-FFF2-40B4-BE49-F238E27FC236}">
-                <a16:creationId xmlns="" xmlns:a16="http://schemas.microsoft.com/office/drawing/2014/main" id="{2A4513BF-7E9B-49A2-A3AE-8CA02D2714C6}"/>
+                <a16:creationId xmlns:a16="http://schemas.microsoft.com/office/drawing/2014/main" xmlns="" id="{2A4513BF-7E9B-49A2-A3AE-8CA02D2714C6}"/>
               </a:ext>
             </a:extLst>
           </p:cNvPr>
@@ -22092,7 +22169,7 @@
           <p:cNvPr id="4" name="Footer Placeholder 3">
             <a:extLst>
               <a:ext uri="{FF2B5EF4-FFF2-40B4-BE49-F238E27FC236}">
-                <a16:creationId xmlns="" xmlns:a16="http://schemas.microsoft.com/office/drawing/2014/main" id="{D410471F-BB86-4D1F-961D-76EF0B1C69BF}"/>
+                <a16:creationId xmlns:a16="http://schemas.microsoft.com/office/drawing/2014/main" xmlns="" id="{D410471F-BB86-4D1F-961D-76EF0B1C69BF}"/>
               </a:ext>
             </a:extLst>
           </p:cNvPr>
@@ -22121,7 +22198,7 @@
           <p:cNvPr id="5" name="Slide Number Placeholder 4">
             <a:extLst>
               <a:ext uri="{FF2B5EF4-FFF2-40B4-BE49-F238E27FC236}">
-                <a16:creationId xmlns="" xmlns:a16="http://schemas.microsoft.com/office/drawing/2014/main" id="{80D1B1A1-237A-4A88-83EE-2540EC7B8A5B}"/>
+                <a16:creationId xmlns:a16="http://schemas.microsoft.com/office/drawing/2014/main" xmlns="" id="{80D1B1A1-237A-4A88-83EE-2540EC7B8A5B}"/>
               </a:ext>
             </a:extLst>
           </p:cNvPr>
@@ -22151,7 +22228,7 @@
           <p:cNvPr id="7" name="Picture 6">
             <a:extLst>
               <a:ext uri="{FF2B5EF4-FFF2-40B4-BE49-F238E27FC236}">
-                <a16:creationId xmlns="" xmlns:a16="http://schemas.microsoft.com/office/drawing/2014/main" id="{E93A5FBC-D708-427D-BF31-B80DEA2C874D}"/>
+                <a16:creationId xmlns:a16="http://schemas.microsoft.com/office/drawing/2014/main" xmlns="" id="{E93A5FBC-D708-427D-BF31-B80DEA2C874D}"/>
               </a:ext>
             </a:extLst>
           </p:cNvPr>
@@ -22181,7 +22258,7 @@
           <p:cNvPr id="9" name="Straight Arrow Connector 8">
             <a:extLst>
               <a:ext uri="{FF2B5EF4-FFF2-40B4-BE49-F238E27FC236}">
-                <a16:creationId xmlns="" xmlns:a16="http://schemas.microsoft.com/office/drawing/2014/main" id="{E3113C13-BEBD-4C74-8520-D10122A5DD1C}"/>
+                <a16:creationId xmlns:a16="http://schemas.microsoft.com/office/drawing/2014/main" xmlns="" id="{E3113C13-BEBD-4C74-8520-D10122A5DD1C}"/>
               </a:ext>
             </a:extLst>
           </p:cNvPr>
@@ -22221,7 +22298,7 @@
           <p:cNvPr id="11" name="Straight Arrow Connector 10">
             <a:extLst>
               <a:ext uri="{FF2B5EF4-FFF2-40B4-BE49-F238E27FC236}">
-                <a16:creationId xmlns="" xmlns:a16="http://schemas.microsoft.com/office/drawing/2014/main" id="{427AB6EB-0C39-4A7E-B2DA-029B2D27471D}"/>
+                <a16:creationId xmlns:a16="http://schemas.microsoft.com/office/drawing/2014/main" xmlns="" id="{427AB6EB-0C39-4A7E-B2DA-029B2D27471D}"/>
               </a:ext>
             </a:extLst>
           </p:cNvPr>
@@ -22261,7 +22338,7 @@
           <p:cNvPr id="12" name="TextBox 11">
             <a:extLst>
               <a:ext uri="{FF2B5EF4-FFF2-40B4-BE49-F238E27FC236}">
-                <a16:creationId xmlns="" xmlns:a16="http://schemas.microsoft.com/office/drawing/2014/main" id="{2AB74F40-A16E-4329-9538-A52306AE0D35}"/>
+                <a16:creationId xmlns:a16="http://schemas.microsoft.com/office/drawing/2014/main" xmlns="" id="{2AB74F40-A16E-4329-9538-A52306AE0D35}"/>
               </a:ext>
             </a:extLst>
           </p:cNvPr>
@@ -22296,7 +22373,7 @@
           <p:cNvPr id="13" name="TextBox 12">
             <a:extLst>
               <a:ext uri="{FF2B5EF4-FFF2-40B4-BE49-F238E27FC236}">
-                <a16:creationId xmlns="" xmlns:a16="http://schemas.microsoft.com/office/drawing/2014/main" id="{32C5EB55-5408-49B4-9F17-1654637EA46C}"/>
+                <a16:creationId xmlns:a16="http://schemas.microsoft.com/office/drawing/2014/main" xmlns="" id="{32C5EB55-5408-49B4-9F17-1654637EA46C}"/>
               </a:ext>
             </a:extLst>
           </p:cNvPr>
@@ -22331,7 +22408,7 @@
           <p:cNvPr id="14" name="TextBox 13">
             <a:extLst>
               <a:ext uri="{FF2B5EF4-FFF2-40B4-BE49-F238E27FC236}">
-                <a16:creationId xmlns="" xmlns:a16="http://schemas.microsoft.com/office/drawing/2014/main" id="{7F395135-E9A4-4370-94BA-E392EB89C420}"/>
+                <a16:creationId xmlns:a16="http://schemas.microsoft.com/office/drawing/2014/main" xmlns="" id="{7F395135-E9A4-4370-94BA-E392EB89C420}"/>
               </a:ext>
             </a:extLst>
           </p:cNvPr>
@@ -22366,7 +22443,7 @@
           <p:cNvPr id="15" name="TextBox 14">
             <a:extLst>
               <a:ext uri="{FF2B5EF4-FFF2-40B4-BE49-F238E27FC236}">
-                <a16:creationId xmlns="" xmlns:a16="http://schemas.microsoft.com/office/drawing/2014/main" id="{0B27258B-6F51-4225-A5C1-5E031308278F}"/>
+                <a16:creationId xmlns:a16="http://schemas.microsoft.com/office/drawing/2014/main" xmlns="" id="{0B27258B-6F51-4225-A5C1-5E031308278F}"/>
               </a:ext>
             </a:extLst>
           </p:cNvPr>
@@ -22406,6 +22483,13 @@
   <p:clrMapOvr>
     <a:masterClrMapping/>
   </p:clrMapOvr>
+  <p:timing>
+    <p:tnLst>
+      <p:par>
+        <p:cTn id="1" dur="indefinite" restart="never" nodeType="tmRoot"/>
+      </p:par>
+    </p:tnLst>
+  </p:timing>
 </p:sld>
 </file>
 
@@ -22482,21 +22566,21 @@
                 <a:gridCol w="1238445">
                   <a:extLst>
                     <a:ext uri="{9D8B030D-6E8A-4147-A177-3AD203B41FA5}">
-                      <a16:colId xmlns="" xmlns:a16="http://schemas.microsoft.com/office/drawing/2014/main" val="20000"/>
+                      <a16:colId xmlns:a16="http://schemas.microsoft.com/office/drawing/2014/main" xmlns="" val="20000"/>
                     </a:ext>
                   </a:extLst>
                 </a:gridCol>
                 <a:gridCol w="858274">
                   <a:extLst>
                     <a:ext uri="{9D8B030D-6E8A-4147-A177-3AD203B41FA5}">
-                      <a16:colId xmlns="" xmlns:a16="http://schemas.microsoft.com/office/drawing/2014/main" val="20001"/>
+                      <a16:colId xmlns:a16="http://schemas.microsoft.com/office/drawing/2014/main" xmlns="" val="20001"/>
                     </a:ext>
                   </a:extLst>
                 </a:gridCol>
                 <a:gridCol w="5790787">
                   <a:extLst>
                     <a:ext uri="{9D8B030D-6E8A-4147-A177-3AD203B41FA5}">
-                      <a16:colId xmlns="" xmlns:a16="http://schemas.microsoft.com/office/drawing/2014/main" val="20002"/>
+                      <a16:colId xmlns:a16="http://schemas.microsoft.com/office/drawing/2014/main" xmlns="" val="20002"/>
                     </a:ext>
                   </a:extLst>
                 </a:gridCol>
@@ -22725,7 +22809,7 @@
                 </a:tc>
                 <a:extLst>
                   <a:ext uri="{0D108BD9-81ED-4DB2-BD59-A6C34878D82A}">
-                    <a16:rowId xmlns="" xmlns:a16="http://schemas.microsoft.com/office/drawing/2014/main" val="10000"/>
+                    <a16:rowId xmlns:a16="http://schemas.microsoft.com/office/drawing/2014/main" xmlns="" val="10000"/>
                   </a:ext>
                 </a:extLst>
               </a:tr>
@@ -22822,7 +22906,7 @@
                 </a:tc>
                 <a:extLst>
                   <a:ext uri="{0D108BD9-81ED-4DB2-BD59-A6C34878D82A}">
-                    <a16:rowId xmlns="" xmlns:a16="http://schemas.microsoft.com/office/drawing/2014/main" val="10001"/>
+                    <a16:rowId xmlns:a16="http://schemas.microsoft.com/office/drawing/2014/main" xmlns="" val="10001"/>
                   </a:ext>
                 </a:extLst>
               </a:tr>
@@ -22889,7 +22973,7 @@
                 </a:tc>
                 <a:extLst>
                   <a:ext uri="{0D108BD9-81ED-4DB2-BD59-A6C34878D82A}">
-                    <a16:rowId xmlns="" xmlns:a16="http://schemas.microsoft.com/office/drawing/2014/main" val="10002"/>
+                    <a16:rowId xmlns:a16="http://schemas.microsoft.com/office/drawing/2014/main" xmlns="" val="10002"/>
                   </a:ext>
                 </a:extLst>
               </a:tr>
@@ -22956,7 +23040,7 @@
                 </a:tc>
                 <a:extLst>
                   <a:ext uri="{0D108BD9-81ED-4DB2-BD59-A6C34878D82A}">
-                    <a16:rowId xmlns="" xmlns:a16="http://schemas.microsoft.com/office/drawing/2014/main" val="10003"/>
+                    <a16:rowId xmlns:a16="http://schemas.microsoft.com/office/drawing/2014/main" xmlns="" val="10003"/>
                   </a:ext>
                 </a:extLst>
               </a:tr>
@@ -23023,7 +23107,7 @@
                 </a:tc>
                 <a:extLst>
                   <a:ext uri="{0D108BD9-81ED-4DB2-BD59-A6C34878D82A}">
-                    <a16:rowId xmlns="" xmlns:a16="http://schemas.microsoft.com/office/drawing/2014/main" val="10004"/>
+                    <a16:rowId xmlns:a16="http://schemas.microsoft.com/office/drawing/2014/main" xmlns="" val="10004"/>
                   </a:ext>
                 </a:extLst>
               </a:tr>
@@ -23107,7 +23191,7 @@
                 </a:tc>
                 <a:extLst>
                   <a:ext uri="{0D108BD9-81ED-4DB2-BD59-A6C34878D82A}">
-                    <a16:rowId xmlns="" xmlns:a16="http://schemas.microsoft.com/office/drawing/2014/main" val="10005"/>
+                    <a16:rowId xmlns:a16="http://schemas.microsoft.com/office/drawing/2014/main" xmlns="" val="10005"/>
                   </a:ext>
                 </a:extLst>
               </a:tr>
@@ -23174,7 +23258,7 @@
                 </a:tc>
                 <a:extLst>
                   <a:ext uri="{0D108BD9-81ED-4DB2-BD59-A6C34878D82A}">
-                    <a16:rowId xmlns="" xmlns:a16="http://schemas.microsoft.com/office/drawing/2014/main" val="10006"/>
+                    <a16:rowId xmlns:a16="http://schemas.microsoft.com/office/drawing/2014/main" xmlns="" val="10006"/>
                   </a:ext>
                 </a:extLst>
               </a:tr>
@@ -23278,7 +23362,7 @@
                 </a:tc>
                 <a:extLst>
                   <a:ext uri="{0D108BD9-81ED-4DB2-BD59-A6C34878D82A}">
-                    <a16:rowId xmlns="" xmlns:a16="http://schemas.microsoft.com/office/drawing/2014/main" val="10007"/>
+                    <a16:rowId xmlns:a16="http://schemas.microsoft.com/office/drawing/2014/main" xmlns="" val="10007"/>
                   </a:ext>
                 </a:extLst>
               </a:tr>
@@ -23345,7 +23429,7 @@
                 </a:tc>
                 <a:extLst>
                   <a:ext uri="{0D108BD9-81ED-4DB2-BD59-A6C34878D82A}">
-                    <a16:rowId xmlns="" xmlns:a16="http://schemas.microsoft.com/office/drawing/2014/main" val="10008"/>
+                    <a16:rowId xmlns:a16="http://schemas.microsoft.com/office/drawing/2014/main" xmlns="" val="10008"/>
                   </a:ext>
                 </a:extLst>
               </a:tr>
@@ -23370,7 +23454,7 @@
           <a:p>
             <a:fld id="{9B19E99B-5349-415A-8E56-8E989211A366}" type="datetime1">
               <a:rPr lang="en-US" smtClean="0"/>
-              <a:t>6/7/2019</a:t>
+              <a:t>6/18/2019</a:t>
             </a:fld>
             <a:endParaRPr lang="en-US"/>
           </a:p>
@@ -23432,6 +23516,13 @@
   <p:clrMapOvr>
     <a:masterClrMapping/>
   </p:clrMapOvr>
+  <p:timing>
+    <p:tnLst>
+      <p:par>
+        <p:cTn id="1" dur="indefinite" restart="never" nodeType="tmRoot"/>
+      </p:par>
+    </p:tnLst>
+  </p:timing>
 </p:sld>
 </file>
 
@@ -23457,7 +23548,7 @@
           <p:cNvPr id="2" name="Date Placeholder 1">
             <a:extLst>
               <a:ext uri="{FF2B5EF4-FFF2-40B4-BE49-F238E27FC236}">
-                <a16:creationId xmlns="" xmlns:a16="http://schemas.microsoft.com/office/drawing/2014/main" id="{69B4E7CC-AA1B-4156-9EE4-64316FF4A7F2}"/>
+                <a16:creationId xmlns:a16="http://schemas.microsoft.com/office/drawing/2014/main" xmlns="" id="{69B4E7CC-AA1B-4156-9EE4-64316FF4A7F2}"/>
               </a:ext>
             </a:extLst>
           </p:cNvPr>
@@ -23475,7 +23566,7 @@
           <a:p>
             <a:fld id="{6700A58B-DD98-43D0-B791-721480A02982}" type="datetime1">
               <a:rPr lang="en-US" smtClean="0"/>
-              <a:t>6/7/2019</a:t>
+              <a:t>6/18/2019</a:t>
             </a:fld>
             <a:endParaRPr lang="en-US"/>
           </a:p>
@@ -23486,7 +23577,7 @@
           <p:cNvPr id="3" name="Title 2">
             <a:extLst>
               <a:ext uri="{FF2B5EF4-FFF2-40B4-BE49-F238E27FC236}">
-                <a16:creationId xmlns="" xmlns:a16="http://schemas.microsoft.com/office/drawing/2014/main" id="{D0518808-7363-4D87-A35D-6587D555674A}"/>
+                <a16:creationId xmlns:a16="http://schemas.microsoft.com/office/drawing/2014/main" xmlns="" id="{D0518808-7363-4D87-A35D-6587D555674A}"/>
               </a:ext>
             </a:extLst>
           </p:cNvPr>
@@ -23522,7 +23613,7 @@
           <p:cNvPr id="4" name="Footer Placeholder 3">
             <a:extLst>
               <a:ext uri="{FF2B5EF4-FFF2-40B4-BE49-F238E27FC236}">
-                <a16:creationId xmlns="" xmlns:a16="http://schemas.microsoft.com/office/drawing/2014/main" id="{85DC7D7E-456C-4600-9038-F17E96DFE9EB}"/>
+                <a16:creationId xmlns:a16="http://schemas.microsoft.com/office/drawing/2014/main" xmlns="" id="{85DC7D7E-456C-4600-9038-F17E96DFE9EB}"/>
               </a:ext>
             </a:extLst>
           </p:cNvPr>
@@ -23551,7 +23642,7 @@
           <p:cNvPr id="5" name="Slide Number Placeholder 4">
             <a:extLst>
               <a:ext uri="{FF2B5EF4-FFF2-40B4-BE49-F238E27FC236}">
-                <a16:creationId xmlns="" xmlns:a16="http://schemas.microsoft.com/office/drawing/2014/main" id="{57EDC159-BE26-4478-8AF5-F405D818C734}"/>
+                <a16:creationId xmlns:a16="http://schemas.microsoft.com/office/drawing/2014/main" xmlns="" id="{57EDC159-BE26-4478-8AF5-F405D818C734}"/>
               </a:ext>
             </a:extLst>
           </p:cNvPr>
@@ -23581,7 +23672,7 @@
           <p:cNvPr id="6" name="Picture 5">
             <a:extLst>
               <a:ext uri="{FF2B5EF4-FFF2-40B4-BE49-F238E27FC236}">
-                <a16:creationId xmlns="" xmlns:a16="http://schemas.microsoft.com/office/drawing/2014/main" id="{C6A1F8E6-766C-4F37-B944-3CF5627EED4C}"/>
+                <a16:creationId xmlns:a16="http://schemas.microsoft.com/office/drawing/2014/main" xmlns="" id="{C6A1F8E6-766C-4F37-B944-3CF5627EED4C}"/>
               </a:ext>
             </a:extLst>
           </p:cNvPr>
@@ -23616,6 +23707,13 @@
   <p:clrMapOvr>
     <a:masterClrMapping/>
   </p:clrMapOvr>
+  <p:timing>
+    <p:tnLst>
+      <p:par>
+        <p:cTn id="1" dur="indefinite" restart="never" nodeType="tmRoot"/>
+      </p:par>
+    </p:tnLst>
+  </p:timing>
 </p:sld>
 </file>
 
@@ -23641,7 +23739,7 @@
           <p:cNvPr id="2" name="Date Placeholder 1">
             <a:extLst>
               <a:ext uri="{FF2B5EF4-FFF2-40B4-BE49-F238E27FC236}">
-                <a16:creationId xmlns="" xmlns:a16="http://schemas.microsoft.com/office/drawing/2014/main" id="{9BA4292B-986D-44A5-AC64-1181E2865657}"/>
+                <a16:creationId xmlns:a16="http://schemas.microsoft.com/office/drawing/2014/main" xmlns="" id="{9BA4292B-986D-44A5-AC64-1181E2865657}"/>
               </a:ext>
             </a:extLst>
           </p:cNvPr>
@@ -23659,7 +23757,7 @@
           <a:p>
             <a:fld id="{6700A58B-DD98-43D0-B791-721480A02982}" type="datetime1">
               <a:rPr lang="en-US" smtClean="0"/>
-              <a:t>6/7/2019</a:t>
+              <a:t>6/18/2019</a:t>
             </a:fld>
             <a:endParaRPr lang="en-US"/>
           </a:p>
@@ -23670,7 +23768,7 @@
           <p:cNvPr id="3" name="Title 2">
             <a:extLst>
               <a:ext uri="{FF2B5EF4-FFF2-40B4-BE49-F238E27FC236}">
-                <a16:creationId xmlns="" xmlns:a16="http://schemas.microsoft.com/office/drawing/2014/main" id="{B3E5548B-DA7A-422C-B64C-7BC37E5A3E51}"/>
+                <a16:creationId xmlns:a16="http://schemas.microsoft.com/office/drawing/2014/main" xmlns="" id="{B3E5548B-DA7A-422C-B64C-7BC37E5A3E51}"/>
               </a:ext>
             </a:extLst>
           </p:cNvPr>
@@ -23706,7 +23804,7 @@
           <p:cNvPr id="4" name="Footer Placeholder 3">
             <a:extLst>
               <a:ext uri="{FF2B5EF4-FFF2-40B4-BE49-F238E27FC236}">
-                <a16:creationId xmlns="" xmlns:a16="http://schemas.microsoft.com/office/drawing/2014/main" id="{48A07C27-6293-49AD-8099-D3F50CA43B5A}"/>
+                <a16:creationId xmlns:a16="http://schemas.microsoft.com/office/drawing/2014/main" xmlns="" id="{48A07C27-6293-49AD-8099-D3F50CA43B5A}"/>
               </a:ext>
             </a:extLst>
           </p:cNvPr>
@@ -23735,7 +23833,7 @@
           <p:cNvPr id="5" name="Slide Number Placeholder 4">
             <a:extLst>
               <a:ext uri="{FF2B5EF4-FFF2-40B4-BE49-F238E27FC236}">
-                <a16:creationId xmlns="" xmlns:a16="http://schemas.microsoft.com/office/drawing/2014/main" id="{7F40F8E2-C7CD-4446-BDBF-1668AED3FA20}"/>
+                <a16:creationId xmlns:a16="http://schemas.microsoft.com/office/drawing/2014/main" xmlns="" id="{7F40F8E2-C7CD-4446-BDBF-1668AED3FA20}"/>
               </a:ext>
             </a:extLst>
           </p:cNvPr>
@@ -23765,7 +23863,7 @@
           <p:cNvPr id="6" name="Picture 5">
             <a:extLst>
               <a:ext uri="{FF2B5EF4-FFF2-40B4-BE49-F238E27FC236}">
-                <a16:creationId xmlns="" xmlns:a16="http://schemas.microsoft.com/office/drawing/2014/main" id="{70CFDBC9-F6F2-483D-9295-01B03890A9A9}"/>
+                <a16:creationId xmlns:a16="http://schemas.microsoft.com/office/drawing/2014/main" xmlns="" id="{70CFDBC9-F6F2-483D-9295-01B03890A9A9}"/>
               </a:ext>
             </a:extLst>
           </p:cNvPr>
@@ -23795,7 +23893,7 @@
           <p:cNvPr id="7" name="TextBox 6">
             <a:extLst>
               <a:ext uri="{FF2B5EF4-FFF2-40B4-BE49-F238E27FC236}">
-                <a16:creationId xmlns="" xmlns:a16="http://schemas.microsoft.com/office/drawing/2014/main" id="{87CEC70F-FD4B-4DCC-92E6-66BC30369DA1}"/>
+                <a16:creationId xmlns:a16="http://schemas.microsoft.com/office/drawing/2014/main" xmlns="" id="{87CEC70F-FD4B-4DCC-92E6-66BC30369DA1}"/>
               </a:ext>
             </a:extLst>
           </p:cNvPr>
@@ -23842,7 +23940,7 @@
           <p:cNvPr id="8" name="Rectangle 7">
             <a:extLst>
               <a:ext uri="{FF2B5EF4-FFF2-40B4-BE49-F238E27FC236}">
-                <a16:creationId xmlns="" xmlns:a16="http://schemas.microsoft.com/office/drawing/2014/main" id="{517953C8-5097-4896-9433-C5729BC0F0A4}"/>
+                <a16:creationId xmlns:a16="http://schemas.microsoft.com/office/drawing/2014/main" xmlns="" id="{517953C8-5097-4896-9433-C5729BC0F0A4}"/>
               </a:ext>
             </a:extLst>
           </p:cNvPr>
@@ -23905,6 +24003,13 @@
   <p:clrMapOvr>
     <a:masterClrMapping/>
   </p:clrMapOvr>
+  <p:timing>
+    <p:tnLst>
+      <p:par>
+        <p:cTn id="1" dur="indefinite" restart="never" nodeType="tmRoot"/>
+      </p:par>
+    </p:tnLst>
+  </p:timing>
 </p:sld>
 </file>
 
@@ -23981,21 +24086,21 @@
                 <a:gridCol w="1238445">
                   <a:extLst>
                     <a:ext uri="{9D8B030D-6E8A-4147-A177-3AD203B41FA5}">
-                      <a16:colId xmlns="" xmlns:a16="http://schemas.microsoft.com/office/drawing/2014/main" val="20000"/>
+                      <a16:colId xmlns:a16="http://schemas.microsoft.com/office/drawing/2014/main" xmlns="" val="20000"/>
                     </a:ext>
                   </a:extLst>
                 </a:gridCol>
                 <a:gridCol w="858274">
                   <a:extLst>
                     <a:ext uri="{9D8B030D-6E8A-4147-A177-3AD203B41FA5}">
-                      <a16:colId xmlns="" xmlns:a16="http://schemas.microsoft.com/office/drawing/2014/main" val="20001"/>
+                      <a16:colId xmlns:a16="http://schemas.microsoft.com/office/drawing/2014/main" xmlns="" val="20001"/>
                     </a:ext>
                   </a:extLst>
                 </a:gridCol>
                 <a:gridCol w="5790787">
                   <a:extLst>
                     <a:ext uri="{9D8B030D-6E8A-4147-A177-3AD203B41FA5}">
-                      <a16:colId xmlns="" xmlns:a16="http://schemas.microsoft.com/office/drawing/2014/main" val="20002"/>
+                      <a16:colId xmlns:a16="http://schemas.microsoft.com/office/drawing/2014/main" xmlns="" val="20002"/>
                     </a:ext>
                   </a:extLst>
                 </a:gridCol>
@@ -24224,7 +24329,7 @@
                 </a:tc>
                 <a:extLst>
                   <a:ext uri="{0D108BD9-81ED-4DB2-BD59-A6C34878D82A}">
-                    <a16:rowId xmlns="" xmlns:a16="http://schemas.microsoft.com/office/drawing/2014/main" val="10000"/>
+                    <a16:rowId xmlns:a16="http://schemas.microsoft.com/office/drawing/2014/main" xmlns="" val="10000"/>
                   </a:ext>
                 </a:extLst>
               </a:tr>
@@ -24321,7 +24426,7 @@
                 </a:tc>
                 <a:extLst>
                   <a:ext uri="{0D108BD9-81ED-4DB2-BD59-A6C34878D82A}">
-                    <a16:rowId xmlns="" xmlns:a16="http://schemas.microsoft.com/office/drawing/2014/main" val="10001"/>
+                    <a16:rowId xmlns:a16="http://schemas.microsoft.com/office/drawing/2014/main" xmlns="" val="10001"/>
                   </a:ext>
                 </a:extLst>
               </a:tr>
@@ -24388,7 +24493,7 @@
                 </a:tc>
                 <a:extLst>
                   <a:ext uri="{0D108BD9-81ED-4DB2-BD59-A6C34878D82A}">
-                    <a16:rowId xmlns="" xmlns:a16="http://schemas.microsoft.com/office/drawing/2014/main" val="10002"/>
+                    <a16:rowId xmlns:a16="http://schemas.microsoft.com/office/drawing/2014/main" xmlns="" val="10002"/>
                   </a:ext>
                 </a:extLst>
               </a:tr>
@@ -24455,7 +24560,7 @@
                 </a:tc>
                 <a:extLst>
                   <a:ext uri="{0D108BD9-81ED-4DB2-BD59-A6C34878D82A}">
-                    <a16:rowId xmlns="" xmlns:a16="http://schemas.microsoft.com/office/drawing/2014/main" val="10003"/>
+                    <a16:rowId xmlns:a16="http://schemas.microsoft.com/office/drawing/2014/main" xmlns="" val="10003"/>
                   </a:ext>
                 </a:extLst>
               </a:tr>
@@ -24522,7 +24627,7 @@
                 </a:tc>
                 <a:extLst>
                   <a:ext uri="{0D108BD9-81ED-4DB2-BD59-A6C34878D82A}">
-                    <a16:rowId xmlns="" xmlns:a16="http://schemas.microsoft.com/office/drawing/2014/main" val="10004"/>
+                    <a16:rowId xmlns:a16="http://schemas.microsoft.com/office/drawing/2014/main" xmlns="" val="10004"/>
                   </a:ext>
                 </a:extLst>
               </a:tr>
@@ -24606,7 +24711,7 @@
                 </a:tc>
                 <a:extLst>
                   <a:ext uri="{0D108BD9-81ED-4DB2-BD59-A6C34878D82A}">
-                    <a16:rowId xmlns="" xmlns:a16="http://schemas.microsoft.com/office/drawing/2014/main" val="10005"/>
+                    <a16:rowId xmlns:a16="http://schemas.microsoft.com/office/drawing/2014/main" xmlns="" val="10005"/>
                   </a:ext>
                 </a:extLst>
               </a:tr>
@@ -24673,7 +24778,7 @@
                 </a:tc>
                 <a:extLst>
                   <a:ext uri="{0D108BD9-81ED-4DB2-BD59-A6C34878D82A}">
-                    <a16:rowId xmlns="" xmlns:a16="http://schemas.microsoft.com/office/drawing/2014/main" val="10006"/>
+                    <a16:rowId xmlns:a16="http://schemas.microsoft.com/office/drawing/2014/main" xmlns="" val="10006"/>
                   </a:ext>
                 </a:extLst>
               </a:tr>
@@ -24777,7 +24882,7 @@
                 </a:tc>
                 <a:extLst>
                   <a:ext uri="{0D108BD9-81ED-4DB2-BD59-A6C34878D82A}">
-                    <a16:rowId xmlns="" xmlns:a16="http://schemas.microsoft.com/office/drawing/2014/main" val="10007"/>
+                    <a16:rowId xmlns:a16="http://schemas.microsoft.com/office/drawing/2014/main" xmlns="" val="10007"/>
                   </a:ext>
                 </a:extLst>
               </a:tr>
@@ -24844,7 +24949,7 @@
                 </a:tc>
                 <a:extLst>
                   <a:ext uri="{0D108BD9-81ED-4DB2-BD59-A6C34878D82A}">
-                    <a16:rowId xmlns="" xmlns:a16="http://schemas.microsoft.com/office/drawing/2014/main" val="10008"/>
+                    <a16:rowId xmlns:a16="http://schemas.microsoft.com/office/drawing/2014/main" xmlns="" val="10008"/>
                   </a:ext>
                 </a:extLst>
               </a:tr>
@@ -24869,7 +24974,7 @@
           <a:p>
             <a:fld id="{9B19E99B-5349-415A-8E56-8E989211A366}" type="datetime1">
               <a:rPr lang="en-US" smtClean="0"/>
-              <a:t>6/7/2019</a:t>
+              <a:t>6/18/2019</a:t>
             </a:fld>
             <a:endParaRPr lang="en-US"/>
           </a:p>
@@ -24931,6 +25036,13 @@
   <p:clrMapOvr>
     <a:masterClrMapping/>
   </p:clrMapOvr>
+  <p:timing>
+    <p:tnLst>
+      <p:par>
+        <p:cTn id="1" dur="indefinite" restart="never" nodeType="tmRoot"/>
+      </p:par>
+    </p:tnLst>
+  </p:timing>
 </p:sld>
 </file>
 
@@ -24956,7 +25068,7 @@
           <p:cNvPr id="2" name="Date Placeholder 1">
             <a:extLst>
               <a:ext uri="{FF2B5EF4-FFF2-40B4-BE49-F238E27FC236}">
-                <a16:creationId xmlns="" xmlns:a16="http://schemas.microsoft.com/office/drawing/2014/main" id="{6BF190EE-92E3-4313-92EF-4C495CE58CEA}"/>
+                <a16:creationId xmlns:a16="http://schemas.microsoft.com/office/drawing/2014/main" xmlns="" id="{6BF190EE-92E3-4313-92EF-4C495CE58CEA}"/>
               </a:ext>
             </a:extLst>
           </p:cNvPr>
@@ -24974,7 +25086,7 @@
           <a:p>
             <a:fld id="{6700A58B-DD98-43D0-B791-721480A02982}" type="datetime1">
               <a:rPr lang="en-US" smtClean="0"/>
-              <a:t>6/7/2019</a:t>
+              <a:t>6/18/2019</a:t>
             </a:fld>
             <a:endParaRPr lang="en-US"/>
           </a:p>
@@ -24985,7 +25097,7 @@
           <p:cNvPr id="3" name="Title 2">
             <a:extLst>
               <a:ext uri="{FF2B5EF4-FFF2-40B4-BE49-F238E27FC236}">
-                <a16:creationId xmlns="" xmlns:a16="http://schemas.microsoft.com/office/drawing/2014/main" id="{5AD8170E-B4B0-4284-8636-D6CCC59E4E9F}"/>
+                <a16:creationId xmlns:a16="http://schemas.microsoft.com/office/drawing/2014/main" xmlns="" id="{5AD8170E-B4B0-4284-8636-D6CCC59E4E9F}"/>
               </a:ext>
             </a:extLst>
           </p:cNvPr>
@@ -25010,7 +25122,7 @@
           <p:cNvPr id="4" name="Footer Placeholder 3">
             <a:extLst>
               <a:ext uri="{FF2B5EF4-FFF2-40B4-BE49-F238E27FC236}">
-                <a16:creationId xmlns="" xmlns:a16="http://schemas.microsoft.com/office/drawing/2014/main" id="{FC8FA931-BB9C-48A1-AE45-F4359BFB5036}"/>
+                <a16:creationId xmlns:a16="http://schemas.microsoft.com/office/drawing/2014/main" xmlns="" id="{FC8FA931-BB9C-48A1-AE45-F4359BFB5036}"/>
               </a:ext>
             </a:extLst>
           </p:cNvPr>
@@ -25039,7 +25151,7 @@
           <p:cNvPr id="5" name="Slide Number Placeholder 4">
             <a:extLst>
               <a:ext uri="{FF2B5EF4-FFF2-40B4-BE49-F238E27FC236}">
-                <a16:creationId xmlns="" xmlns:a16="http://schemas.microsoft.com/office/drawing/2014/main" id="{461FE6D3-DBEB-484F-A373-86A1AD977524}"/>
+                <a16:creationId xmlns:a16="http://schemas.microsoft.com/office/drawing/2014/main" xmlns="" id="{461FE6D3-DBEB-484F-A373-86A1AD977524}"/>
               </a:ext>
             </a:extLst>
           </p:cNvPr>
@@ -25069,7 +25181,7 @@
           <p:cNvPr id="1026" name="Picture 2" descr="Image result for after lunch meme">
             <a:extLst>
               <a:ext uri="{FF2B5EF4-FFF2-40B4-BE49-F238E27FC236}">
-                <a16:creationId xmlns="" xmlns:a16="http://schemas.microsoft.com/office/drawing/2014/main" id="{DA7178C5-ED14-4BAE-99EA-602851F9FF72}"/>
+                <a16:creationId xmlns:a16="http://schemas.microsoft.com/office/drawing/2014/main" xmlns="" id="{DA7178C5-ED14-4BAE-99EA-602851F9FF72}"/>
               </a:ext>
             </a:extLst>
           </p:cNvPr>
@@ -25121,6 +25233,13 @@
   <p:clrMapOvr>
     <a:masterClrMapping/>
   </p:clrMapOvr>
+  <p:timing>
+    <p:tnLst>
+      <p:par>
+        <p:cTn id="1" dur="indefinite" restart="never" nodeType="tmRoot"/>
+      </p:par>
+    </p:tnLst>
+  </p:timing>
 </p:sld>
 </file>
 
@@ -25146,7 +25265,7 @@
           <p:cNvPr id="2" name="Date Placeholder 1">
             <a:extLst>
               <a:ext uri="{FF2B5EF4-FFF2-40B4-BE49-F238E27FC236}">
-                <a16:creationId xmlns="" xmlns:a16="http://schemas.microsoft.com/office/drawing/2014/main" id="{7C3C0867-65AB-4C21-BC3F-CA1D2EB94711}"/>
+                <a16:creationId xmlns:a16="http://schemas.microsoft.com/office/drawing/2014/main" xmlns="" id="{7C3C0867-65AB-4C21-BC3F-CA1D2EB94711}"/>
               </a:ext>
             </a:extLst>
           </p:cNvPr>
@@ -25164,7 +25283,7 @@
           <a:p>
             <a:fld id="{6700A58B-DD98-43D0-B791-721480A02982}" type="datetime1">
               <a:rPr lang="en-US" smtClean="0"/>
-              <a:t>6/7/2019</a:t>
+              <a:t>6/18/2019</a:t>
             </a:fld>
             <a:endParaRPr lang="en-US"/>
           </a:p>
@@ -25175,7 +25294,7 @@
           <p:cNvPr id="3" name="Title 2">
             <a:extLst>
               <a:ext uri="{FF2B5EF4-FFF2-40B4-BE49-F238E27FC236}">
-                <a16:creationId xmlns="" xmlns:a16="http://schemas.microsoft.com/office/drawing/2014/main" id="{0803362D-3381-4564-88FC-AE4323988CC8}"/>
+                <a16:creationId xmlns:a16="http://schemas.microsoft.com/office/drawing/2014/main" xmlns="" id="{0803362D-3381-4564-88FC-AE4323988CC8}"/>
               </a:ext>
             </a:extLst>
           </p:cNvPr>
@@ -25204,7 +25323,7 @@
           <p:cNvPr id="4" name="Footer Placeholder 3">
             <a:extLst>
               <a:ext uri="{FF2B5EF4-FFF2-40B4-BE49-F238E27FC236}">
-                <a16:creationId xmlns="" xmlns:a16="http://schemas.microsoft.com/office/drawing/2014/main" id="{A623A14B-73AB-442E-AE75-3E5FFE0C99FE}"/>
+                <a16:creationId xmlns:a16="http://schemas.microsoft.com/office/drawing/2014/main" xmlns="" id="{A623A14B-73AB-442E-AE75-3E5FFE0C99FE}"/>
               </a:ext>
             </a:extLst>
           </p:cNvPr>
@@ -25233,7 +25352,7 @@
           <p:cNvPr id="5" name="Slide Number Placeholder 4">
             <a:extLst>
               <a:ext uri="{FF2B5EF4-FFF2-40B4-BE49-F238E27FC236}">
-                <a16:creationId xmlns="" xmlns:a16="http://schemas.microsoft.com/office/drawing/2014/main" id="{A621A574-0926-4BA6-87B8-D57DD5571C37}"/>
+                <a16:creationId xmlns:a16="http://schemas.microsoft.com/office/drawing/2014/main" xmlns="" id="{A621A574-0926-4BA6-87B8-D57DD5571C37}"/>
               </a:ext>
             </a:extLst>
           </p:cNvPr>
@@ -25345,6 +25464,13 @@
   <p:clrMapOvr>
     <a:masterClrMapping/>
   </p:clrMapOvr>
+  <p:timing>
+    <p:tnLst>
+      <p:par>
+        <p:cTn id="1" dur="indefinite" restart="never" nodeType="tmRoot"/>
+      </p:par>
+    </p:tnLst>
+  </p:timing>
 </p:sld>
 </file>
 
@@ -25370,7 +25496,7 @@
           <p:cNvPr id="2" name="Date Placeholder 1">
             <a:extLst>
               <a:ext uri="{FF2B5EF4-FFF2-40B4-BE49-F238E27FC236}">
-                <a16:creationId xmlns="" xmlns:a16="http://schemas.microsoft.com/office/drawing/2014/main" id="{7C3C0867-65AB-4C21-BC3F-CA1D2EB94711}"/>
+                <a16:creationId xmlns:a16="http://schemas.microsoft.com/office/drawing/2014/main" xmlns="" id="{7C3C0867-65AB-4C21-BC3F-CA1D2EB94711}"/>
               </a:ext>
             </a:extLst>
           </p:cNvPr>
@@ -25388,7 +25514,7 @@
           <a:p>
             <a:fld id="{6700A58B-DD98-43D0-B791-721480A02982}" type="datetime1">
               <a:rPr lang="en-US" smtClean="0"/>
-              <a:t>6/7/2019</a:t>
+              <a:t>6/18/2019</a:t>
             </a:fld>
             <a:endParaRPr lang="en-US"/>
           </a:p>
@@ -25399,7 +25525,7 @@
           <p:cNvPr id="3" name="Title 2">
             <a:extLst>
               <a:ext uri="{FF2B5EF4-FFF2-40B4-BE49-F238E27FC236}">
-                <a16:creationId xmlns="" xmlns:a16="http://schemas.microsoft.com/office/drawing/2014/main" id="{0803362D-3381-4564-88FC-AE4323988CC8}"/>
+                <a16:creationId xmlns:a16="http://schemas.microsoft.com/office/drawing/2014/main" xmlns="" id="{0803362D-3381-4564-88FC-AE4323988CC8}"/>
               </a:ext>
             </a:extLst>
           </p:cNvPr>
@@ -25428,7 +25554,7 @@
           <p:cNvPr id="4" name="Footer Placeholder 3">
             <a:extLst>
               <a:ext uri="{FF2B5EF4-FFF2-40B4-BE49-F238E27FC236}">
-                <a16:creationId xmlns="" xmlns:a16="http://schemas.microsoft.com/office/drawing/2014/main" id="{A623A14B-73AB-442E-AE75-3E5FFE0C99FE}"/>
+                <a16:creationId xmlns:a16="http://schemas.microsoft.com/office/drawing/2014/main" xmlns="" id="{A623A14B-73AB-442E-AE75-3E5FFE0C99FE}"/>
               </a:ext>
             </a:extLst>
           </p:cNvPr>
@@ -25457,7 +25583,7 @@
           <p:cNvPr id="5" name="Slide Number Placeholder 4">
             <a:extLst>
               <a:ext uri="{FF2B5EF4-FFF2-40B4-BE49-F238E27FC236}">
-                <a16:creationId xmlns="" xmlns:a16="http://schemas.microsoft.com/office/drawing/2014/main" id="{A621A574-0926-4BA6-87B8-D57DD5571C37}"/>
+                <a16:creationId xmlns:a16="http://schemas.microsoft.com/office/drawing/2014/main" xmlns="" id="{A621A574-0926-4BA6-87B8-D57DD5571C37}"/>
               </a:ext>
             </a:extLst>
           </p:cNvPr>
@@ -25818,6 +25944,13 @@
   <p:clrMapOvr>
     <a:masterClrMapping/>
   </p:clrMapOvr>
+  <p:timing>
+    <p:tnLst>
+      <p:par>
+        <p:cTn id="1" dur="indefinite" restart="never" nodeType="tmRoot"/>
+      </p:par>
+    </p:tnLst>
+  </p:timing>
 </p:sld>
 </file>
 
@@ -25860,7 +25993,7 @@
           <a:graphicData uri="http://schemas.openxmlformats.org/presentationml/2006/ole">
             <mc:AlternateContent xmlns:mc="http://schemas.openxmlformats.org/markup-compatibility/2006">
               <mc:Choice xmlns:v="urn:schemas-microsoft-com:vml" Requires="v">
-                <p:oleObj spid="_x0000_s1033" name="Document" r:id="rId3" imgW="2858268" imgH="544757" progId="Word.Document.12">
+                <p:oleObj spid="_x0000_s1040" name="Document" r:id="rId3" imgW="2858268" imgH="544757" progId="Word.Document.12">
                   <p:embed/>
                 </p:oleObj>
               </mc:Choice>
@@ -25936,7 +26069,7 @@
           <p:cNvPr id="2" name="Date Placeholder 1">
             <a:extLst>
               <a:ext uri="{FF2B5EF4-FFF2-40B4-BE49-F238E27FC236}">
-                <a16:creationId xmlns="" xmlns:a16="http://schemas.microsoft.com/office/drawing/2014/main" id="{FEB02FB2-73D4-4729-A58C-B94EE1FC52A1}"/>
+                <a16:creationId xmlns:a16="http://schemas.microsoft.com/office/drawing/2014/main" xmlns="" id="{FEB02FB2-73D4-4729-A58C-B94EE1FC52A1}"/>
               </a:ext>
             </a:extLst>
           </p:cNvPr>
@@ -25954,7 +26087,7 @@
           <a:p>
             <a:fld id="{6700A58B-DD98-43D0-B791-721480A02982}" type="datetime1">
               <a:rPr lang="en-US" smtClean="0"/>
-              <a:t>6/7/2019</a:t>
+              <a:t>6/18/2019</a:t>
             </a:fld>
             <a:endParaRPr lang="en-US"/>
           </a:p>
@@ -25965,7 +26098,7 @@
           <p:cNvPr id="3" name="Title 2">
             <a:extLst>
               <a:ext uri="{FF2B5EF4-FFF2-40B4-BE49-F238E27FC236}">
-                <a16:creationId xmlns="" xmlns:a16="http://schemas.microsoft.com/office/drawing/2014/main" id="{77E938A7-01E0-477E-9303-809145BC8EE8}"/>
+                <a16:creationId xmlns:a16="http://schemas.microsoft.com/office/drawing/2014/main" xmlns="" id="{77E938A7-01E0-477E-9303-809145BC8EE8}"/>
               </a:ext>
             </a:extLst>
           </p:cNvPr>
@@ -25993,7 +26126,7 @@
           <p:cNvPr id="4" name="Footer Placeholder 3">
             <a:extLst>
               <a:ext uri="{FF2B5EF4-FFF2-40B4-BE49-F238E27FC236}">
-                <a16:creationId xmlns="" xmlns:a16="http://schemas.microsoft.com/office/drawing/2014/main" id="{60BD5936-3DE0-4EBD-B007-692DDA8320B3}"/>
+                <a16:creationId xmlns:a16="http://schemas.microsoft.com/office/drawing/2014/main" xmlns="" id="{60BD5936-3DE0-4EBD-B007-692DDA8320B3}"/>
               </a:ext>
             </a:extLst>
           </p:cNvPr>
@@ -26022,7 +26155,7 @@
           <p:cNvPr id="5" name="Slide Number Placeholder 4">
             <a:extLst>
               <a:ext uri="{FF2B5EF4-FFF2-40B4-BE49-F238E27FC236}">
-                <a16:creationId xmlns="" xmlns:a16="http://schemas.microsoft.com/office/drawing/2014/main" id="{76D93A47-CBE7-4000-9944-AF364E2CC2A1}"/>
+                <a16:creationId xmlns:a16="http://schemas.microsoft.com/office/drawing/2014/main" xmlns="" id="{76D93A47-CBE7-4000-9944-AF364E2CC2A1}"/>
               </a:ext>
             </a:extLst>
           </p:cNvPr>
@@ -26398,6 +26531,13 @@
   <p:clrMapOvr>
     <a:masterClrMapping/>
   </p:clrMapOvr>
+  <p:timing>
+    <p:tnLst>
+      <p:par>
+        <p:cTn id="1" dur="indefinite" restart="never" nodeType="tmRoot"/>
+      </p:par>
+    </p:tnLst>
+  </p:timing>
 </p:sld>
 </file>
 
@@ -26435,7 +26575,7 @@
           <a:p>
             <a:fld id="{6700A58B-DD98-43D0-B791-721480A02982}" type="datetime1">
               <a:rPr lang="en-US" smtClean="0"/>
-              <a:t>6/7/2019</a:t>
+              <a:t>6/18/2019</a:t>
             </a:fld>
             <a:endParaRPr lang="en-US"/>
           </a:p>
@@ -27392,6 +27532,13 @@
   <p:clrMapOvr>
     <a:masterClrMapping/>
   </p:clrMapOvr>
+  <p:timing>
+    <p:tnLst>
+      <p:par>
+        <p:cTn id="1" dur="indefinite" restart="never" nodeType="tmRoot"/>
+      </p:par>
+    </p:tnLst>
+  </p:timing>
 </p:sld>
 </file>
 
@@ -27417,7 +27564,7 @@
           <p:cNvPr id="2" name="Date Placeholder 1">
             <a:extLst>
               <a:ext uri="{FF2B5EF4-FFF2-40B4-BE49-F238E27FC236}">
-                <a16:creationId xmlns="" xmlns:a16="http://schemas.microsoft.com/office/drawing/2014/main" id="{7C3C0867-65AB-4C21-BC3F-CA1D2EB94711}"/>
+                <a16:creationId xmlns:a16="http://schemas.microsoft.com/office/drawing/2014/main" xmlns="" id="{7C3C0867-65AB-4C21-BC3F-CA1D2EB94711}"/>
               </a:ext>
             </a:extLst>
           </p:cNvPr>
@@ -27435,7 +27582,7 @@
           <a:p>
             <a:fld id="{6700A58B-DD98-43D0-B791-721480A02982}" type="datetime1">
               <a:rPr lang="en-US" smtClean="0"/>
-              <a:t>6/7/2019</a:t>
+              <a:t>6/18/2019</a:t>
             </a:fld>
             <a:endParaRPr lang="en-US"/>
           </a:p>
@@ -27446,7 +27593,7 @@
           <p:cNvPr id="3" name="Title 2">
             <a:extLst>
               <a:ext uri="{FF2B5EF4-FFF2-40B4-BE49-F238E27FC236}">
-                <a16:creationId xmlns="" xmlns:a16="http://schemas.microsoft.com/office/drawing/2014/main" id="{0803362D-3381-4564-88FC-AE4323988CC8}"/>
+                <a16:creationId xmlns:a16="http://schemas.microsoft.com/office/drawing/2014/main" xmlns="" id="{0803362D-3381-4564-88FC-AE4323988CC8}"/>
               </a:ext>
             </a:extLst>
           </p:cNvPr>
@@ -27480,7 +27627,7 @@
           <p:cNvPr id="4" name="Footer Placeholder 3">
             <a:extLst>
               <a:ext uri="{FF2B5EF4-FFF2-40B4-BE49-F238E27FC236}">
-                <a16:creationId xmlns="" xmlns:a16="http://schemas.microsoft.com/office/drawing/2014/main" id="{A623A14B-73AB-442E-AE75-3E5FFE0C99FE}"/>
+                <a16:creationId xmlns:a16="http://schemas.microsoft.com/office/drawing/2014/main" xmlns="" id="{A623A14B-73AB-442E-AE75-3E5FFE0C99FE}"/>
               </a:ext>
             </a:extLst>
           </p:cNvPr>
@@ -27509,7 +27656,7 @@
           <p:cNvPr id="5" name="Slide Number Placeholder 4">
             <a:extLst>
               <a:ext uri="{FF2B5EF4-FFF2-40B4-BE49-F238E27FC236}">
-                <a16:creationId xmlns="" xmlns:a16="http://schemas.microsoft.com/office/drawing/2014/main" id="{A621A574-0926-4BA6-87B8-D57DD5571C37}"/>
+                <a16:creationId xmlns:a16="http://schemas.microsoft.com/office/drawing/2014/main" xmlns="" id="{A621A574-0926-4BA6-87B8-D57DD5571C37}"/>
               </a:ext>
             </a:extLst>
           </p:cNvPr>
@@ -27818,6 +27965,13 @@
   <p:clrMapOvr>
     <a:masterClrMapping/>
   </p:clrMapOvr>
+  <p:timing>
+    <p:tnLst>
+      <p:par>
+        <p:cTn id="1" dur="indefinite" restart="never" nodeType="tmRoot"/>
+      </p:par>
+    </p:tnLst>
+  </p:timing>
 </p:sld>
 </file>
 
@@ -27843,7 +27997,7 @@
           <p:cNvPr id="2" name="Date Placeholder 1">
             <a:extLst>
               <a:ext uri="{FF2B5EF4-FFF2-40B4-BE49-F238E27FC236}">
-                <a16:creationId xmlns="" xmlns:a16="http://schemas.microsoft.com/office/drawing/2014/main" id="{7C3C0867-65AB-4C21-BC3F-CA1D2EB94711}"/>
+                <a16:creationId xmlns:a16="http://schemas.microsoft.com/office/drawing/2014/main" xmlns="" id="{7C3C0867-65AB-4C21-BC3F-CA1D2EB94711}"/>
               </a:ext>
             </a:extLst>
           </p:cNvPr>
@@ -27862,7 +28016,7 @@
             <a:fld id="{6700A58B-DD98-43D0-B791-721480A02982}" type="datetime1">
               <a:rPr lang="en-US" smtClean="0"/>
               <a:pPr/>
-              <a:t>6/7/2019</a:t>
+              <a:t>6/18/2019</a:t>
             </a:fld>
             <a:endParaRPr lang="en-US"/>
           </a:p>
@@ -27873,7 +28027,7 @@
           <p:cNvPr id="3" name="Title 2">
             <a:extLst>
               <a:ext uri="{FF2B5EF4-FFF2-40B4-BE49-F238E27FC236}">
-                <a16:creationId xmlns="" xmlns:a16="http://schemas.microsoft.com/office/drawing/2014/main" id="{0803362D-3381-4564-88FC-AE4323988CC8}"/>
+                <a16:creationId xmlns:a16="http://schemas.microsoft.com/office/drawing/2014/main" xmlns="" id="{0803362D-3381-4564-88FC-AE4323988CC8}"/>
               </a:ext>
             </a:extLst>
           </p:cNvPr>
@@ -27902,7 +28056,7 @@
           <p:cNvPr id="4" name="Footer Placeholder 3">
             <a:extLst>
               <a:ext uri="{FF2B5EF4-FFF2-40B4-BE49-F238E27FC236}">
-                <a16:creationId xmlns="" xmlns:a16="http://schemas.microsoft.com/office/drawing/2014/main" id="{A623A14B-73AB-442E-AE75-3E5FFE0C99FE}"/>
+                <a16:creationId xmlns:a16="http://schemas.microsoft.com/office/drawing/2014/main" xmlns="" id="{A623A14B-73AB-442E-AE75-3E5FFE0C99FE}"/>
               </a:ext>
             </a:extLst>
           </p:cNvPr>
@@ -27931,7 +28085,7 @@
           <p:cNvPr id="5" name="Slide Number Placeholder 4">
             <a:extLst>
               <a:ext uri="{FF2B5EF4-FFF2-40B4-BE49-F238E27FC236}">
-                <a16:creationId xmlns="" xmlns:a16="http://schemas.microsoft.com/office/drawing/2014/main" id="{A621A574-0926-4BA6-87B8-D57DD5571C37}"/>
+                <a16:creationId xmlns:a16="http://schemas.microsoft.com/office/drawing/2014/main" xmlns="" id="{A621A574-0926-4BA6-87B8-D57DD5571C37}"/>
               </a:ext>
             </a:extLst>
           </p:cNvPr>
@@ -28348,6 +28502,13 @@
   <p:clrMapOvr>
     <a:masterClrMapping/>
   </p:clrMapOvr>
+  <p:timing>
+    <p:tnLst>
+      <p:par>
+        <p:cTn id="1" dur="indefinite" restart="never" nodeType="tmRoot"/>
+      </p:par>
+    </p:tnLst>
+  </p:timing>
 </p:sld>
 </file>
 
@@ -28373,7 +28534,7 @@
           <p:cNvPr id="2" name="Date Placeholder 1">
             <a:extLst>
               <a:ext uri="{FF2B5EF4-FFF2-40B4-BE49-F238E27FC236}">
-                <a16:creationId xmlns="" xmlns:a16="http://schemas.microsoft.com/office/drawing/2014/main" id="{3728DC17-3484-4A87-A056-F55CBA2C41BB}"/>
+                <a16:creationId xmlns:a16="http://schemas.microsoft.com/office/drawing/2014/main" xmlns="" id="{3728DC17-3484-4A87-A056-F55CBA2C41BB}"/>
               </a:ext>
             </a:extLst>
           </p:cNvPr>
@@ -28391,7 +28552,7 @@
           <a:p>
             <a:fld id="{6700A58B-DD98-43D0-B791-721480A02982}" type="datetime1">
               <a:rPr lang="en-US" smtClean="0"/>
-              <a:t>6/7/2019</a:t>
+              <a:t>6/18/2019</a:t>
             </a:fld>
             <a:endParaRPr lang="en-US"/>
           </a:p>
@@ -28402,7 +28563,7 @@
           <p:cNvPr id="3" name="Title 2">
             <a:extLst>
               <a:ext uri="{FF2B5EF4-FFF2-40B4-BE49-F238E27FC236}">
-                <a16:creationId xmlns="" xmlns:a16="http://schemas.microsoft.com/office/drawing/2014/main" id="{50A1C8B0-E959-485F-8DF7-20C85B3661D4}"/>
+                <a16:creationId xmlns:a16="http://schemas.microsoft.com/office/drawing/2014/main" xmlns="" id="{50A1C8B0-E959-485F-8DF7-20C85B3661D4}"/>
               </a:ext>
             </a:extLst>
           </p:cNvPr>
@@ -28430,7 +28591,7 @@
           <p:cNvPr id="4" name="Footer Placeholder 3">
             <a:extLst>
               <a:ext uri="{FF2B5EF4-FFF2-40B4-BE49-F238E27FC236}">
-                <a16:creationId xmlns="" xmlns:a16="http://schemas.microsoft.com/office/drawing/2014/main" id="{EC170510-B545-44DA-B6F4-501A364A2A68}"/>
+                <a16:creationId xmlns:a16="http://schemas.microsoft.com/office/drawing/2014/main" xmlns="" id="{EC170510-B545-44DA-B6F4-501A364A2A68}"/>
               </a:ext>
             </a:extLst>
           </p:cNvPr>
@@ -28459,7 +28620,7 @@
           <p:cNvPr id="5" name="Slide Number Placeholder 4">
             <a:extLst>
               <a:ext uri="{FF2B5EF4-FFF2-40B4-BE49-F238E27FC236}">
-                <a16:creationId xmlns="" xmlns:a16="http://schemas.microsoft.com/office/drawing/2014/main" id="{99B04A1B-4969-4AB5-9F4D-39ECB9F302FA}"/>
+                <a16:creationId xmlns:a16="http://schemas.microsoft.com/office/drawing/2014/main" xmlns="" id="{99B04A1B-4969-4AB5-9F4D-39ECB9F302FA}"/>
               </a:ext>
             </a:extLst>
           </p:cNvPr>
@@ -28489,7 +28650,7 @@
           <p:cNvPr id="6" name="Content Placeholder 2">
             <a:extLst>
               <a:ext uri="{FF2B5EF4-FFF2-40B4-BE49-F238E27FC236}">
-                <a16:creationId xmlns="" xmlns:a16="http://schemas.microsoft.com/office/drawing/2014/main" id="{491D4F80-9D6B-4F61-896F-18C90E064806}"/>
+                <a16:creationId xmlns:a16="http://schemas.microsoft.com/office/drawing/2014/main" xmlns="" id="{491D4F80-9D6B-4F61-896F-18C90E064806}"/>
               </a:ext>
             </a:extLst>
           </p:cNvPr>
@@ -28746,6 +28907,13 @@
   <p:clrMapOvr>
     <a:masterClrMapping/>
   </p:clrMapOvr>
+  <p:timing>
+    <p:tnLst>
+      <p:par>
+        <p:cTn id="1" dur="indefinite" restart="never" nodeType="tmRoot"/>
+      </p:par>
+    </p:tnLst>
+  </p:timing>
 </p:sld>
 </file>
 
@@ -28771,7 +28939,7 @@
           <p:cNvPr id="2" name="Date Placeholder 1">
             <a:extLst>
               <a:ext uri="{FF2B5EF4-FFF2-40B4-BE49-F238E27FC236}">
-                <a16:creationId xmlns="" xmlns:a16="http://schemas.microsoft.com/office/drawing/2014/main" id="{7C3C0867-65AB-4C21-BC3F-CA1D2EB94711}"/>
+                <a16:creationId xmlns:a16="http://schemas.microsoft.com/office/drawing/2014/main" xmlns="" id="{7C3C0867-65AB-4C21-BC3F-CA1D2EB94711}"/>
               </a:ext>
             </a:extLst>
           </p:cNvPr>
@@ -28790,7 +28958,7 @@
             <a:fld id="{6700A58B-DD98-43D0-B791-721480A02982}" type="datetime1">
               <a:rPr lang="en-US" smtClean="0"/>
               <a:pPr/>
-              <a:t>6/7/2019</a:t>
+              <a:t>6/18/2019</a:t>
             </a:fld>
             <a:endParaRPr lang="en-US"/>
           </a:p>
@@ -28801,7 +28969,7 @@
           <p:cNvPr id="3" name="Title 2">
             <a:extLst>
               <a:ext uri="{FF2B5EF4-FFF2-40B4-BE49-F238E27FC236}">
-                <a16:creationId xmlns="" xmlns:a16="http://schemas.microsoft.com/office/drawing/2014/main" id="{0803362D-3381-4564-88FC-AE4323988CC8}"/>
+                <a16:creationId xmlns:a16="http://schemas.microsoft.com/office/drawing/2014/main" xmlns="" id="{0803362D-3381-4564-88FC-AE4323988CC8}"/>
               </a:ext>
             </a:extLst>
           </p:cNvPr>
@@ -28830,7 +28998,7 @@
           <p:cNvPr id="4" name="Footer Placeholder 3">
             <a:extLst>
               <a:ext uri="{FF2B5EF4-FFF2-40B4-BE49-F238E27FC236}">
-                <a16:creationId xmlns="" xmlns:a16="http://schemas.microsoft.com/office/drawing/2014/main" id="{A623A14B-73AB-442E-AE75-3E5FFE0C99FE}"/>
+                <a16:creationId xmlns:a16="http://schemas.microsoft.com/office/drawing/2014/main" xmlns="" id="{A623A14B-73AB-442E-AE75-3E5FFE0C99FE}"/>
               </a:ext>
             </a:extLst>
           </p:cNvPr>
@@ -28859,7 +29027,7 @@
           <p:cNvPr id="5" name="Slide Number Placeholder 4">
             <a:extLst>
               <a:ext uri="{FF2B5EF4-FFF2-40B4-BE49-F238E27FC236}">
-                <a16:creationId xmlns="" xmlns:a16="http://schemas.microsoft.com/office/drawing/2014/main" id="{A621A574-0926-4BA6-87B8-D57DD5571C37}"/>
+                <a16:creationId xmlns:a16="http://schemas.microsoft.com/office/drawing/2014/main" xmlns="" id="{A621A574-0926-4BA6-87B8-D57DD5571C37}"/>
               </a:ext>
             </a:extLst>
           </p:cNvPr>
@@ -29325,6 +29493,13 @@
   <p:clrMapOvr>
     <a:masterClrMapping/>
   </p:clrMapOvr>
+  <p:timing>
+    <p:tnLst>
+      <p:par>
+        <p:cTn id="1" dur="indefinite" restart="never" nodeType="tmRoot"/>
+      </p:par>
+    </p:tnLst>
+  </p:timing>
 </p:sld>
 </file>
 
@@ -29350,7 +29525,7 @@
           <p:cNvPr id="2" name="Date Placeholder 1">
             <a:extLst>
               <a:ext uri="{FF2B5EF4-FFF2-40B4-BE49-F238E27FC236}">
-                <a16:creationId xmlns="" xmlns:a16="http://schemas.microsoft.com/office/drawing/2014/main" id="{7C3C0867-65AB-4C21-BC3F-CA1D2EB94711}"/>
+                <a16:creationId xmlns:a16="http://schemas.microsoft.com/office/drawing/2014/main" xmlns="" id="{7C3C0867-65AB-4C21-BC3F-CA1D2EB94711}"/>
               </a:ext>
             </a:extLst>
           </p:cNvPr>
@@ -29369,7 +29544,7 @@
             <a:fld id="{6700A58B-DD98-43D0-B791-721480A02982}" type="datetime1">
               <a:rPr lang="en-US" smtClean="0"/>
               <a:pPr/>
-              <a:t>6/7/2019</a:t>
+              <a:t>6/18/2019</a:t>
             </a:fld>
             <a:endParaRPr lang="en-US"/>
           </a:p>
@@ -29380,7 +29555,7 @@
           <p:cNvPr id="3" name="Title 2">
             <a:extLst>
               <a:ext uri="{FF2B5EF4-FFF2-40B4-BE49-F238E27FC236}">
-                <a16:creationId xmlns="" xmlns:a16="http://schemas.microsoft.com/office/drawing/2014/main" id="{0803362D-3381-4564-88FC-AE4323988CC8}"/>
+                <a16:creationId xmlns:a16="http://schemas.microsoft.com/office/drawing/2014/main" xmlns="" id="{0803362D-3381-4564-88FC-AE4323988CC8}"/>
               </a:ext>
             </a:extLst>
           </p:cNvPr>
@@ -29409,7 +29584,7 @@
           <p:cNvPr id="4" name="Footer Placeholder 3">
             <a:extLst>
               <a:ext uri="{FF2B5EF4-FFF2-40B4-BE49-F238E27FC236}">
-                <a16:creationId xmlns="" xmlns:a16="http://schemas.microsoft.com/office/drawing/2014/main" id="{A623A14B-73AB-442E-AE75-3E5FFE0C99FE}"/>
+                <a16:creationId xmlns:a16="http://schemas.microsoft.com/office/drawing/2014/main" xmlns="" id="{A623A14B-73AB-442E-AE75-3E5FFE0C99FE}"/>
               </a:ext>
             </a:extLst>
           </p:cNvPr>
@@ -29438,7 +29613,7 @@
           <p:cNvPr id="5" name="Slide Number Placeholder 4">
             <a:extLst>
               <a:ext uri="{FF2B5EF4-FFF2-40B4-BE49-F238E27FC236}">
-                <a16:creationId xmlns="" xmlns:a16="http://schemas.microsoft.com/office/drawing/2014/main" id="{A621A574-0926-4BA6-87B8-D57DD5571C37}"/>
+                <a16:creationId xmlns:a16="http://schemas.microsoft.com/office/drawing/2014/main" xmlns="" id="{A621A574-0926-4BA6-87B8-D57DD5571C37}"/>
               </a:ext>
             </a:extLst>
           </p:cNvPr>
@@ -30015,6 +30190,13 @@
   <p:clrMapOvr>
     <a:masterClrMapping/>
   </p:clrMapOvr>
+  <p:timing>
+    <p:tnLst>
+      <p:par>
+        <p:cTn id="1" dur="indefinite" restart="never" nodeType="tmRoot"/>
+      </p:par>
+    </p:tnLst>
+  </p:timing>
 </p:sld>
 </file>
 
@@ -30040,7 +30222,7 @@
           <p:cNvPr id="2" name="Date Placeholder 1">
             <a:extLst>
               <a:ext uri="{FF2B5EF4-FFF2-40B4-BE49-F238E27FC236}">
-                <a16:creationId xmlns="" xmlns:a16="http://schemas.microsoft.com/office/drawing/2014/main" id="{7C3C0867-65AB-4C21-BC3F-CA1D2EB94711}"/>
+                <a16:creationId xmlns:a16="http://schemas.microsoft.com/office/drawing/2014/main" xmlns="" id="{7C3C0867-65AB-4C21-BC3F-CA1D2EB94711}"/>
               </a:ext>
             </a:extLst>
           </p:cNvPr>
@@ -30059,7 +30241,7 @@
             <a:fld id="{6700A58B-DD98-43D0-B791-721480A02982}" type="datetime1">
               <a:rPr lang="en-US" smtClean="0"/>
               <a:pPr/>
-              <a:t>6/7/2019</a:t>
+              <a:t>6/18/2019</a:t>
             </a:fld>
             <a:endParaRPr lang="en-US"/>
           </a:p>
@@ -30070,7 +30252,7 @@
           <p:cNvPr id="3" name="Title 2">
             <a:extLst>
               <a:ext uri="{FF2B5EF4-FFF2-40B4-BE49-F238E27FC236}">
-                <a16:creationId xmlns="" xmlns:a16="http://schemas.microsoft.com/office/drawing/2014/main" id="{0803362D-3381-4564-88FC-AE4323988CC8}"/>
+                <a16:creationId xmlns:a16="http://schemas.microsoft.com/office/drawing/2014/main" xmlns="" id="{0803362D-3381-4564-88FC-AE4323988CC8}"/>
               </a:ext>
             </a:extLst>
           </p:cNvPr>
@@ -30099,7 +30281,7 @@
           <p:cNvPr id="4" name="Footer Placeholder 3">
             <a:extLst>
               <a:ext uri="{FF2B5EF4-FFF2-40B4-BE49-F238E27FC236}">
-                <a16:creationId xmlns="" xmlns:a16="http://schemas.microsoft.com/office/drawing/2014/main" id="{A623A14B-73AB-442E-AE75-3E5FFE0C99FE}"/>
+                <a16:creationId xmlns:a16="http://schemas.microsoft.com/office/drawing/2014/main" xmlns="" id="{A623A14B-73AB-442E-AE75-3E5FFE0C99FE}"/>
               </a:ext>
             </a:extLst>
           </p:cNvPr>
@@ -30128,7 +30310,7 @@
           <p:cNvPr id="5" name="Slide Number Placeholder 4">
             <a:extLst>
               <a:ext uri="{FF2B5EF4-FFF2-40B4-BE49-F238E27FC236}">
-                <a16:creationId xmlns="" xmlns:a16="http://schemas.microsoft.com/office/drawing/2014/main" id="{A621A574-0926-4BA6-87B8-D57DD5571C37}"/>
+                <a16:creationId xmlns:a16="http://schemas.microsoft.com/office/drawing/2014/main" xmlns="" id="{A621A574-0926-4BA6-87B8-D57DD5571C37}"/>
               </a:ext>
             </a:extLst>
           </p:cNvPr>
@@ -30735,6 +30917,13 @@
   <p:clrMapOvr>
     <a:masterClrMapping/>
   </p:clrMapOvr>
+  <p:timing>
+    <p:tnLst>
+      <p:par>
+        <p:cTn id="1" dur="indefinite" restart="never" nodeType="tmRoot"/>
+      </p:par>
+    </p:tnLst>
+  </p:timing>
 </p:sld>
 </file>
 
@@ -30760,7 +30949,7 @@
           <p:cNvPr id="2" name="Date Placeholder 1">
             <a:extLst>
               <a:ext uri="{FF2B5EF4-FFF2-40B4-BE49-F238E27FC236}">
-                <a16:creationId xmlns="" xmlns:a16="http://schemas.microsoft.com/office/drawing/2014/main" id="{7C3C0867-65AB-4C21-BC3F-CA1D2EB94711}"/>
+                <a16:creationId xmlns:a16="http://schemas.microsoft.com/office/drawing/2014/main" xmlns="" id="{7C3C0867-65AB-4C21-BC3F-CA1D2EB94711}"/>
               </a:ext>
             </a:extLst>
           </p:cNvPr>
@@ -30778,7 +30967,7 @@
           <a:p>
             <a:fld id="{6700A58B-DD98-43D0-B791-721480A02982}" type="datetime1">
               <a:rPr lang="en-US" smtClean="0"/>
-              <a:t>6/7/2019</a:t>
+              <a:t>6/18/2019</a:t>
             </a:fld>
             <a:endParaRPr lang="en-US"/>
           </a:p>
@@ -30789,7 +30978,7 @@
           <p:cNvPr id="3" name="Title 2">
             <a:extLst>
               <a:ext uri="{FF2B5EF4-FFF2-40B4-BE49-F238E27FC236}">
-                <a16:creationId xmlns="" xmlns:a16="http://schemas.microsoft.com/office/drawing/2014/main" id="{0803362D-3381-4564-88FC-AE4323988CC8}"/>
+                <a16:creationId xmlns:a16="http://schemas.microsoft.com/office/drawing/2014/main" xmlns="" id="{0803362D-3381-4564-88FC-AE4323988CC8}"/>
               </a:ext>
             </a:extLst>
           </p:cNvPr>
@@ -30823,7 +31012,7 @@
           <p:cNvPr id="4" name="Footer Placeholder 3">
             <a:extLst>
               <a:ext uri="{FF2B5EF4-FFF2-40B4-BE49-F238E27FC236}">
-                <a16:creationId xmlns="" xmlns:a16="http://schemas.microsoft.com/office/drawing/2014/main" id="{A623A14B-73AB-442E-AE75-3E5FFE0C99FE}"/>
+                <a16:creationId xmlns:a16="http://schemas.microsoft.com/office/drawing/2014/main" xmlns="" id="{A623A14B-73AB-442E-AE75-3E5FFE0C99FE}"/>
               </a:ext>
             </a:extLst>
           </p:cNvPr>
@@ -30852,7 +31041,7 @@
           <p:cNvPr id="5" name="Slide Number Placeholder 4">
             <a:extLst>
               <a:ext uri="{FF2B5EF4-FFF2-40B4-BE49-F238E27FC236}">
-                <a16:creationId xmlns="" xmlns:a16="http://schemas.microsoft.com/office/drawing/2014/main" id="{A621A574-0926-4BA6-87B8-D57DD5571C37}"/>
+                <a16:creationId xmlns:a16="http://schemas.microsoft.com/office/drawing/2014/main" xmlns="" id="{A621A574-0926-4BA6-87B8-D57DD5571C37}"/>
               </a:ext>
             </a:extLst>
           </p:cNvPr>
@@ -31406,6 +31595,13 @@
   <p:clrMapOvr>
     <a:masterClrMapping/>
   </p:clrMapOvr>
+  <p:timing>
+    <p:tnLst>
+      <p:par>
+        <p:cTn id="1" dur="indefinite" restart="never" nodeType="tmRoot"/>
+      </p:par>
+    </p:tnLst>
+  </p:timing>
 </p:sld>
 </file>
 
@@ -31431,7 +31627,7 @@
           <p:cNvPr id="2" name="Date Placeholder 1">
             <a:extLst>
               <a:ext uri="{FF2B5EF4-FFF2-40B4-BE49-F238E27FC236}">
-                <a16:creationId xmlns="" xmlns:a16="http://schemas.microsoft.com/office/drawing/2014/main" id="{7C3C0867-65AB-4C21-BC3F-CA1D2EB94711}"/>
+                <a16:creationId xmlns:a16="http://schemas.microsoft.com/office/drawing/2014/main" xmlns="" id="{7C3C0867-65AB-4C21-BC3F-CA1D2EB94711}"/>
               </a:ext>
             </a:extLst>
           </p:cNvPr>
@@ -31450,7 +31646,7 @@
             <a:fld id="{6700A58B-DD98-43D0-B791-721480A02982}" type="datetime1">
               <a:rPr lang="en-US" smtClean="0"/>
               <a:pPr/>
-              <a:t>6/7/2019</a:t>
+              <a:t>6/18/2019</a:t>
             </a:fld>
             <a:endParaRPr lang="en-US"/>
           </a:p>
@@ -31461,7 +31657,7 @@
           <p:cNvPr id="3" name="Title 2">
             <a:extLst>
               <a:ext uri="{FF2B5EF4-FFF2-40B4-BE49-F238E27FC236}">
-                <a16:creationId xmlns="" xmlns:a16="http://schemas.microsoft.com/office/drawing/2014/main" id="{0803362D-3381-4564-88FC-AE4323988CC8}"/>
+                <a16:creationId xmlns:a16="http://schemas.microsoft.com/office/drawing/2014/main" xmlns="" id="{0803362D-3381-4564-88FC-AE4323988CC8}"/>
               </a:ext>
             </a:extLst>
           </p:cNvPr>
@@ -31490,7 +31686,7 @@
           <p:cNvPr id="4" name="Footer Placeholder 3">
             <a:extLst>
               <a:ext uri="{FF2B5EF4-FFF2-40B4-BE49-F238E27FC236}">
-                <a16:creationId xmlns="" xmlns:a16="http://schemas.microsoft.com/office/drawing/2014/main" id="{A623A14B-73AB-442E-AE75-3E5FFE0C99FE}"/>
+                <a16:creationId xmlns:a16="http://schemas.microsoft.com/office/drawing/2014/main" xmlns="" id="{A623A14B-73AB-442E-AE75-3E5FFE0C99FE}"/>
               </a:ext>
             </a:extLst>
           </p:cNvPr>
@@ -31519,7 +31715,7 @@
           <p:cNvPr id="5" name="Slide Number Placeholder 4">
             <a:extLst>
               <a:ext uri="{FF2B5EF4-FFF2-40B4-BE49-F238E27FC236}">
-                <a16:creationId xmlns="" xmlns:a16="http://schemas.microsoft.com/office/drawing/2014/main" id="{A621A574-0926-4BA6-87B8-D57DD5571C37}"/>
+                <a16:creationId xmlns:a16="http://schemas.microsoft.com/office/drawing/2014/main" xmlns="" id="{A621A574-0926-4BA6-87B8-D57DD5571C37}"/>
               </a:ext>
             </a:extLst>
           </p:cNvPr>
@@ -31820,7 +32016,19 @@
             </a:r>
             <a:r>
               <a:rPr lang="en-US" sz="1600" dirty="0" smtClean="0"/>
-              <a:t> assignments again moves the centroid.  The process repeats until there no reassignments occur after moving the centroids.</a:t>
+              <a:t> assignments again moves the centroid.  The process repeats until </a:t>
+            </a:r>
+            <a:r>
+              <a:rPr lang="en-US" sz="1600" dirty="0" smtClean="0"/>
+              <a:t>no </a:t>
+            </a:r>
+            <a:r>
+              <a:rPr lang="en-US" sz="1600" dirty="0" smtClean="0"/>
+              <a:t>reassignments occur after moving the </a:t>
+            </a:r>
+            <a:r>
+              <a:rPr lang="en-US" sz="1600" dirty="0" smtClean="0"/>
+              <a:t>centroids (convergence).</a:t>
             </a:r>
             <a:endParaRPr lang="en-US" sz="1600" dirty="0"/>
           </a:p>
@@ -32324,7 +32532,7 @@
           <p:cNvPr id="2" name="Date Placeholder 1">
             <a:extLst>
               <a:ext uri="{FF2B5EF4-FFF2-40B4-BE49-F238E27FC236}">
-                <a16:creationId xmlns="" xmlns:a16="http://schemas.microsoft.com/office/drawing/2014/main" id="{FEB02FB2-73D4-4729-A58C-B94EE1FC52A1}"/>
+                <a16:creationId xmlns:a16="http://schemas.microsoft.com/office/drawing/2014/main" xmlns="" id="{FEB02FB2-73D4-4729-A58C-B94EE1FC52A1}"/>
               </a:ext>
             </a:extLst>
           </p:cNvPr>
@@ -32342,7 +32550,7 @@
           <a:p>
             <a:fld id="{6700A58B-DD98-43D0-B791-721480A02982}" type="datetime1">
               <a:rPr lang="en-US" smtClean="0"/>
-              <a:t>6/7/2019</a:t>
+              <a:t>6/18/2019</a:t>
             </a:fld>
             <a:endParaRPr lang="en-US"/>
           </a:p>
@@ -32353,7 +32561,7 @@
           <p:cNvPr id="3" name="Title 2">
             <a:extLst>
               <a:ext uri="{FF2B5EF4-FFF2-40B4-BE49-F238E27FC236}">
-                <a16:creationId xmlns="" xmlns:a16="http://schemas.microsoft.com/office/drawing/2014/main" id="{77E938A7-01E0-477E-9303-809145BC8EE8}"/>
+                <a16:creationId xmlns:a16="http://schemas.microsoft.com/office/drawing/2014/main" xmlns="" id="{77E938A7-01E0-477E-9303-809145BC8EE8}"/>
               </a:ext>
             </a:extLst>
           </p:cNvPr>
@@ -32381,7 +32589,7 @@
           <p:cNvPr id="4" name="Footer Placeholder 3">
             <a:extLst>
               <a:ext uri="{FF2B5EF4-FFF2-40B4-BE49-F238E27FC236}">
-                <a16:creationId xmlns="" xmlns:a16="http://schemas.microsoft.com/office/drawing/2014/main" id="{60BD5936-3DE0-4EBD-B007-692DDA8320B3}"/>
+                <a16:creationId xmlns:a16="http://schemas.microsoft.com/office/drawing/2014/main" xmlns="" id="{60BD5936-3DE0-4EBD-B007-692DDA8320B3}"/>
               </a:ext>
             </a:extLst>
           </p:cNvPr>
@@ -32410,7 +32618,7 @@
           <p:cNvPr id="5" name="Slide Number Placeholder 4">
             <a:extLst>
               <a:ext uri="{FF2B5EF4-FFF2-40B4-BE49-F238E27FC236}">
-                <a16:creationId xmlns="" xmlns:a16="http://schemas.microsoft.com/office/drawing/2014/main" id="{76D93A47-CBE7-4000-9944-AF364E2CC2A1}"/>
+                <a16:creationId xmlns:a16="http://schemas.microsoft.com/office/drawing/2014/main" xmlns="" id="{76D93A47-CBE7-4000-9944-AF364E2CC2A1}"/>
               </a:ext>
             </a:extLst>
           </p:cNvPr>
@@ -32858,7 +33066,7 @@
           <a:p>
             <a:fld id="{6700A58B-DD98-43D0-B791-721480A02982}" type="datetime1">
               <a:rPr lang="en-US" smtClean="0"/>
-              <a:t>6/7/2019</a:t>
+              <a:t>6/18/2019</a:t>
             </a:fld>
             <a:endParaRPr lang="en-US"/>
           </a:p>
@@ -33056,7 +33264,7 @@
           <a:p>
             <a:fld id="{6700A58B-DD98-43D0-B791-721480A02982}" type="datetime1">
               <a:rPr lang="en-US" smtClean="0"/>
-              <a:t>6/7/2019</a:t>
+              <a:t>6/18/2019</a:t>
             </a:fld>
             <a:endParaRPr lang="en-US"/>
           </a:p>
@@ -33302,7 +33510,7 @@
           <p:cNvPr id="2" name="Date Placeholder 1">
             <a:extLst>
               <a:ext uri="{FF2B5EF4-FFF2-40B4-BE49-F238E27FC236}">
-                <a16:creationId xmlns="" xmlns:a16="http://schemas.microsoft.com/office/drawing/2014/main" id="{5983191B-4E53-4811-A794-E51255BCE8A0}"/>
+                <a16:creationId xmlns:a16="http://schemas.microsoft.com/office/drawing/2014/main" xmlns="" id="{5983191B-4E53-4811-A794-E51255BCE8A0}"/>
               </a:ext>
             </a:extLst>
           </p:cNvPr>
@@ -33320,7 +33528,7 @@
           <a:p>
             <a:fld id="{6700A58B-DD98-43D0-B791-721480A02982}" type="datetime1">
               <a:rPr lang="en-US" smtClean="0"/>
-              <a:t>6/7/2019</a:t>
+              <a:t>6/18/2019</a:t>
             </a:fld>
             <a:endParaRPr lang="en-US"/>
           </a:p>
@@ -33331,7 +33539,7 @@
           <p:cNvPr id="3" name="Title 2">
             <a:extLst>
               <a:ext uri="{FF2B5EF4-FFF2-40B4-BE49-F238E27FC236}">
-                <a16:creationId xmlns="" xmlns:a16="http://schemas.microsoft.com/office/drawing/2014/main" id="{F90B9183-00C9-4877-AB29-E262769190A0}"/>
+                <a16:creationId xmlns:a16="http://schemas.microsoft.com/office/drawing/2014/main" xmlns="" id="{F90B9183-00C9-4877-AB29-E262769190A0}"/>
               </a:ext>
             </a:extLst>
           </p:cNvPr>
@@ -33367,7 +33575,7 @@
           <p:cNvPr id="4" name="Footer Placeholder 3">
             <a:extLst>
               <a:ext uri="{FF2B5EF4-FFF2-40B4-BE49-F238E27FC236}">
-                <a16:creationId xmlns="" xmlns:a16="http://schemas.microsoft.com/office/drawing/2014/main" id="{1837290B-A78F-4CE0-B1D1-626B8BF8BEBD}"/>
+                <a16:creationId xmlns:a16="http://schemas.microsoft.com/office/drawing/2014/main" xmlns="" id="{1837290B-A78F-4CE0-B1D1-626B8BF8BEBD}"/>
               </a:ext>
             </a:extLst>
           </p:cNvPr>
@@ -33396,7 +33604,7 @@
           <p:cNvPr id="5" name="Slide Number Placeholder 4">
             <a:extLst>
               <a:ext uri="{FF2B5EF4-FFF2-40B4-BE49-F238E27FC236}">
-                <a16:creationId xmlns="" xmlns:a16="http://schemas.microsoft.com/office/drawing/2014/main" id="{D2A7EA73-C18D-468E-8650-F40ADF2720B4}"/>
+                <a16:creationId xmlns:a16="http://schemas.microsoft.com/office/drawing/2014/main" xmlns="" id="{D2A7EA73-C18D-468E-8650-F40ADF2720B4}"/>
               </a:ext>
             </a:extLst>
           </p:cNvPr>
@@ -33462,12 +33670,12 @@
               <a:t>Less </a:t>
             </a:r>
             <a:r>
-              <a:rPr lang="en-US" dirty="0" err="1" smtClean="0"/>
-              <a:t>imipacted</a:t>
-            </a:r>
-            <a:r>
               <a:rPr lang="en-US" dirty="0" smtClean="0"/>
-              <a:t> by outliers</a:t>
+              <a:t>impacted </a:t>
+            </a:r>
+            <a:r>
+              <a:rPr lang="en-US" dirty="0" smtClean="0"/>
+              <a:t>by outliers</a:t>
             </a:r>
           </a:p>
           <a:p>
@@ -33619,7 +33827,7 @@
           <p:cNvPr id="2" name="Date Placeholder 1">
             <a:extLst>
               <a:ext uri="{FF2B5EF4-FFF2-40B4-BE49-F238E27FC236}">
-                <a16:creationId xmlns="" xmlns:a16="http://schemas.microsoft.com/office/drawing/2014/main" id="{F2044BC4-137A-48C9-AC90-557A74AB3C65}"/>
+                <a16:creationId xmlns:a16="http://schemas.microsoft.com/office/drawing/2014/main" xmlns="" id="{F2044BC4-137A-48C9-AC90-557A74AB3C65}"/>
               </a:ext>
             </a:extLst>
           </p:cNvPr>
@@ -33637,7 +33845,7 @@
           <a:p>
             <a:fld id="{6700A58B-DD98-43D0-B791-721480A02982}" type="datetime1">
               <a:rPr lang="en-US" smtClean="0"/>
-              <a:t>6/7/2019</a:t>
+              <a:t>6/18/2019</a:t>
             </a:fld>
             <a:endParaRPr lang="en-US"/>
           </a:p>
@@ -33648,7 +33856,7 @@
           <p:cNvPr id="3" name="Title 2">
             <a:extLst>
               <a:ext uri="{FF2B5EF4-FFF2-40B4-BE49-F238E27FC236}">
-                <a16:creationId xmlns="" xmlns:a16="http://schemas.microsoft.com/office/drawing/2014/main" id="{194FC0B8-AD59-42B6-87BD-C5F47E278813}"/>
+                <a16:creationId xmlns:a16="http://schemas.microsoft.com/office/drawing/2014/main" xmlns="" id="{194FC0B8-AD59-42B6-87BD-C5F47E278813}"/>
               </a:ext>
             </a:extLst>
           </p:cNvPr>
@@ -33680,7 +33888,7 @@
           <p:cNvPr id="4" name="Footer Placeholder 3">
             <a:extLst>
               <a:ext uri="{FF2B5EF4-FFF2-40B4-BE49-F238E27FC236}">
-                <a16:creationId xmlns="" xmlns:a16="http://schemas.microsoft.com/office/drawing/2014/main" id="{BB32AB7D-41C8-4C00-BF84-12E12E513EA0}"/>
+                <a16:creationId xmlns:a16="http://schemas.microsoft.com/office/drawing/2014/main" xmlns="" id="{BB32AB7D-41C8-4C00-BF84-12E12E513EA0}"/>
               </a:ext>
             </a:extLst>
           </p:cNvPr>
@@ -33709,7 +33917,7 @@
           <p:cNvPr id="5" name="Slide Number Placeholder 4">
             <a:extLst>
               <a:ext uri="{FF2B5EF4-FFF2-40B4-BE49-F238E27FC236}">
-                <a16:creationId xmlns="" xmlns:a16="http://schemas.microsoft.com/office/drawing/2014/main" id="{B123BEAB-D46C-458F-B5E4-79AB83F49BB7}"/>
+                <a16:creationId xmlns:a16="http://schemas.microsoft.com/office/drawing/2014/main" xmlns="" id="{B123BEAB-D46C-458F-B5E4-79AB83F49BB7}"/>
               </a:ext>
             </a:extLst>
           </p:cNvPr>
@@ -33994,7 +34202,7 @@
           <p:cNvPr id="2" name="Date Placeholder 1">
             <a:extLst>
               <a:ext uri="{FF2B5EF4-FFF2-40B4-BE49-F238E27FC236}">
-                <a16:creationId xmlns="" xmlns:a16="http://schemas.microsoft.com/office/drawing/2014/main" id="{69EBB200-FD53-443C-A445-1CEB0D6AF095}"/>
+                <a16:creationId xmlns:a16="http://schemas.microsoft.com/office/drawing/2014/main" xmlns="" id="{69EBB200-FD53-443C-A445-1CEB0D6AF095}"/>
               </a:ext>
             </a:extLst>
           </p:cNvPr>
@@ -34012,7 +34220,7 @@
           <a:p>
             <a:fld id="{6700A58B-DD98-43D0-B791-721480A02982}" type="datetime1">
               <a:rPr lang="en-US" smtClean="0"/>
-              <a:t>6/7/2019</a:t>
+              <a:t>6/18/2019</a:t>
             </a:fld>
             <a:endParaRPr lang="en-US"/>
           </a:p>
@@ -34023,7 +34231,7 @@
           <p:cNvPr id="3" name="Title 2">
             <a:extLst>
               <a:ext uri="{FF2B5EF4-FFF2-40B4-BE49-F238E27FC236}">
-                <a16:creationId xmlns="" xmlns:a16="http://schemas.microsoft.com/office/drawing/2014/main" id="{73278885-94D7-46C5-A6EF-8284E42A997B}"/>
+                <a16:creationId xmlns:a16="http://schemas.microsoft.com/office/drawing/2014/main" xmlns="" id="{73278885-94D7-46C5-A6EF-8284E42A997B}"/>
               </a:ext>
             </a:extLst>
           </p:cNvPr>
@@ -34051,7 +34259,7 @@
           <p:cNvPr id="4" name="Footer Placeholder 3">
             <a:extLst>
               <a:ext uri="{FF2B5EF4-FFF2-40B4-BE49-F238E27FC236}">
-                <a16:creationId xmlns="" xmlns:a16="http://schemas.microsoft.com/office/drawing/2014/main" id="{628E2758-EAB0-48B2-A657-DA1A3686F691}"/>
+                <a16:creationId xmlns:a16="http://schemas.microsoft.com/office/drawing/2014/main" xmlns="" id="{628E2758-EAB0-48B2-A657-DA1A3686F691}"/>
               </a:ext>
             </a:extLst>
           </p:cNvPr>
@@ -34080,7 +34288,7 @@
           <p:cNvPr id="5" name="Slide Number Placeholder 4">
             <a:extLst>
               <a:ext uri="{FF2B5EF4-FFF2-40B4-BE49-F238E27FC236}">
-                <a16:creationId xmlns="" xmlns:a16="http://schemas.microsoft.com/office/drawing/2014/main" id="{613D23F0-EACF-4BCF-928D-60A2538E152B}"/>
+                <a16:creationId xmlns:a16="http://schemas.microsoft.com/office/drawing/2014/main" xmlns="" id="{613D23F0-EACF-4BCF-928D-60A2538E152B}"/>
               </a:ext>
             </a:extLst>
           </p:cNvPr>
@@ -34110,7 +34318,7 @@
           <p:cNvPr id="6" name="Shape 278">
             <a:extLst>
               <a:ext uri="{FF2B5EF4-FFF2-40B4-BE49-F238E27FC236}">
-                <a16:creationId xmlns="" xmlns:a16="http://schemas.microsoft.com/office/drawing/2014/main" id="{914AFED0-5CA1-4EEB-B9AD-33A2C567EACA}"/>
+                <a16:creationId xmlns:a16="http://schemas.microsoft.com/office/drawing/2014/main" xmlns="" id="{914AFED0-5CA1-4EEB-B9AD-33A2C567EACA}"/>
               </a:ext>
             </a:extLst>
           </p:cNvPr>
@@ -34158,7 +34366,7 @@
           <p:cNvPr id="7" name="Shape 279">
             <a:extLst>
               <a:ext uri="{FF2B5EF4-FFF2-40B4-BE49-F238E27FC236}">
-                <a16:creationId xmlns="" xmlns:a16="http://schemas.microsoft.com/office/drawing/2014/main" id="{5FF15F1E-6456-4033-AED8-8A1E1406D2ED}"/>
+                <a16:creationId xmlns:a16="http://schemas.microsoft.com/office/drawing/2014/main" xmlns="" id="{5FF15F1E-6456-4033-AED8-8A1E1406D2ED}"/>
               </a:ext>
             </a:extLst>
           </p:cNvPr>
@@ -34201,7 +34409,7 @@
           <p:cNvPr id="8" name="Shape 280">
             <a:extLst>
               <a:ext uri="{FF2B5EF4-FFF2-40B4-BE49-F238E27FC236}">
-                <a16:creationId xmlns="" xmlns:a16="http://schemas.microsoft.com/office/drawing/2014/main" id="{89D91387-F3AF-4970-B655-1BAB74AD1B9B}"/>
+                <a16:creationId xmlns:a16="http://schemas.microsoft.com/office/drawing/2014/main" xmlns="" id="{89D91387-F3AF-4970-B655-1BAB74AD1B9B}"/>
               </a:ext>
             </a:extLst>
           </p:cNvPr>
@@ -34221,7 +34429,7 @@
             <p:cNvPr id="9" name="Shape 281">
               <a:extLst>
                 <a:ext uri="{FF2B5EF4-FFF2-40B4-BE49-F238E27FC236}">
-                  <a16:creationId xmlns="" xmlns:a16="http://schemas.microsoft.com/office/drawing/2014/main" id="{9466159C-F683-4701-8EE6-240B15CE49CE}"/>
+                  <a16:creationId xmlns:a16="http://schemas.microsoft.com/office/drawing/2014/main" xmlns="" id="{9466159C-F683-4701-8EE6-240B15CE49CE}"/>
                 </a:ext>
               </a:extLst>
             </p:cNvPr>
@@ -34264,7 +34472,7 @@
             <p:cNvPr id="10" name="Shape 282">
               <a:extLst>
                 <a:ext uri="{FF2B5EF4-FFF2-40B4-BE49-F238E27FC236}">
-                  <a16:creationId xmlns="" xmlns:a16="http://schemas.microsoft.com/office/drawing/2014/main" id="{397336C6-986A-4222-8529-A81F1650FA7C}"/>
+                  <a16:creationId xmlns:a16="http://schemas.microsoft.com/office/drawing/2014/main" xmlns="" id="{397336C6-986A-4222-8529-A81F1650FA7C}"/>
                 </a:ext>
               </a:extLst>
             </p:cNvPr>
@@ -34307,7 +34515,7 @@
             <p:cNvPr id="11" name="Shape 283">
               <a:extLst>
                 <a:ext uri="{FF2B5EF4-FFF2-40B4-BE49-F238E27FC236}">
-                  <a16:creationId xmlns="" xmlns:a16="http://schemas.microsoft.com/office/drawing/2014/main" id="{BAA57546-2820-4A33-AA79-9E90A0CC752B}"/>
+                  <a16:creationId xmlns:a16="http://schemas.microsoft.com/office/drawing/2014/main" xmlns="" id="{BAA57546-2820-4A33-AA79-9E90A0CC752B}"/>
                 </a:ext>
               </a:extLst>
             </p:cNvPr>
@@ -34350,7 +34558,7 @@
             <p:cNvPr id="12" name="Shape 284">
               <a:extLst>
                 <a:ext uri="{FF2B5EF4-FFF2-40B4-BE49-F238E27FC236}">
-                  <a16:creationId xmlns="" xmlns:a16="http://schemas.microsoft.com/office/drawing/2014/main" id="{207050D0-A7CB-4C7B-A0BF-FEF395EEF480}"/>
+                  <a16:creationId xmlns:a16="http://schemas.microsoft.com/office/drawing/2014/main" xmlns="" id="{207050D0-A7CB-4C7B-A0BF-FEF395EEF480}"/>
                 </a:ext>
               </a:extLst>
             </p:cNvPr>
@@ -34394,7 +34602,7 @@
           <p:cNvPr id="13" name="Shape 285">
             <a:extLst>
               <a:ext uri="{FF2B5EF4-FFF2-40B4-BE49-F238E27FC236}">
-                <a16:creationId xmlns="" xmlns:a16="http://schemas.microsoft.com/office/drawing/2014/main" id="{C4E3B576-7840-41EE-B54D-02E70DEFD9F5}"/>
+                <a16:creationId xmlns:a16="http://schemas.microsoft.com/office/drawing/2014/main" xmlns="" id="{C4E3B576-7840-41EE-B54D-02E70DEFD9F5}"/>
               </a:ext>
             </a:extLst>
           </p:cNvPr>
@@ -34438,7 +34646,7 @@
           <p:cNvPr id="14" name="Shape 286">
             <a:extLst>
               <a:ext uri="{FF2B5EF4-FFF2-40B4-BE49-F238E27FC236}">
-                <a16:creationId xmlns="" xmlns:a16="http://schemas.microsoft.com/office/drawing/2014/main" id="{26E5CBC5-6D55-4FE8-AD6B-51D531BC4DAF}"/>
+                <a16:creationId xmlns:a16="http://schemas.microsoft.com/office/drawing/2014/main" xmlns="" id="{26E5CBC5-6D55-4FE8-AD6B-51D531BC4DAF}"/>
               </a:ext>
             </a:extLst>
           </p:cNvPr>
@@ -34482,7 +34690,7 @@
           <p:cNvPr id="15" name="Shape 287">
             <a:extLst>
               <a:ext uri="{FF2B5EF4-FFF2-40B4-BE49-F238E27FC236}">
-                <a16:creationId xmlns="" xmlns:a16="http://schemas.microsoft.com/office/drawing/2014/main" id="{226197BF-BB15-426F-BE12-7DC2402E3B38}"/>
+                <a16:creationId xmlns:a16="http://schemas.microsoft.com/office/drawing/2014/main" xmlns="" id="{226197BF-BB15-426F-BE12-7DC2402E3B38}"/>
               </a:ext>
             </a:extLst>
           </p:cNvPr>
@@ -34544,7 +34752,7 @@
           <p:cNvPr id="16" name="Shape 288">
             <a:extLst>
               <a:ext uri="{FF2B5EF4-FFF2-40B4-BE49-F238E27FC236}">
-                <a16:creationId xmlns="" xmlns:a16="http://schemas.microsoft.com/office/drawing/2014/main" id="{43814FBE-B194-497C-A05C-F36EF7B124A8}"/>
+                <a16:creationId xmlns:a16="http://schemas.microsoft.com/office/drawing/2014/main" xmlns="" id="{43814FBE-B194-497C-A05C-F36EF7B124A8}"/>
               </a:ext>
             </a:extLst>
           </p:cNvPr>
@@ -34587,7 +34795,7 @@
           <p:cNvPr id="17" name="Shape 289">
             <a:extLst>
               <a:ext uri="{FF2B5EF4-FFF2-40B4-BE49-F238E27FC236}">
-                <a16:creationId xmlns="" xmlns:a16="http://schemas.microsoft.com/office/drawing/2014/main" id="{0188B232-1AFD-4B8A-8E85-A505C81B5749}"/>
+                <a16:creationId xmlns:a16="http://schemas.microsoft.com/office/drawing/2014/main" xmlns="" id="{0188B232-1AFD-4B8A-8E85-A505C81B5749}"/>
               </a:ext>
             </a:extLst>
           </p:cNvPr>
@@ -34630,7 +34838,7 @@
           <p:cNvPr id="18" name="Shape 290">
             <a:extLst>
               <a:ext uri="{FF2B5EF4-FFF2-40B4-BE49-F238E27FC236}">
-                <a16:creationId xmlns="" xmlns:a16="http://schemas.microsoft.com/office/drawing/2014/main" id="{2D2EC717-53D3-4DED-ABBD-FBC1EAEE62D9}"/>
+                <a16:creationId xmlns:a16="http://schemas.microsoft.com/office/drawing/2014/main" xmlns="" id="{2D2EC717-53D3-4DED-ABBD-FBC1EAEE62D9}"/>
               </a:ext>
             </a:extLst>
           </p:cNvPr>
@@ -34674,7 +34882,7 @@
           <p:cNvPr id="19" name="Shape 292">
             <a:extLst>
               <a:ext uri="{FF2B5EF4-FFF2-40B4-BE49-F238E27FC236}">
-                <a16:creationId xmlns="" xmlns:a16="http://schemas.microsoft.com/office/drawing/2014/main" id="{0656DA3D-C3E5-4017-85BF-E87801ABB5EC}"/>
+                <a16:creationId xmlns:a16="http://schemas.microsoft.com/office/drawing/2014/main" xmlns="" id="{0656DA3D-C3E5-4017-85BF-E87801ABB5EC}"/>
               </a:ext>
             </a:extLst>
           </p:cNvPr>
@@ -34718,7 +34926,7 @@
           <p:cNvPr id="20" name="Shape 293">
             <a:extLst>
               <a:ext uri="{FF2B5EF4-FFF2-40B4-BE49-F238E27FC236}">
-                <a16:creationId xmlns="" xmlns:a16="http://schemas.microsoft.com/office/drawing/2014/main" id="{831C07E6-2935-43C3-9F17-8F771CA84AD0}"/>
+                <a16:creationId xmlns:a16="http://schemas.microsoft.com/office/drawing/2014/main" xmlns="" id="{831C07E6-2935-43C3-9F17-8F771CA84AD0}"/>
               </a:ext>
             </a:extLst>
           </p:cNvPr>
@@ -34770,7 +34978,7 @@
           <p:cNvPr id="21" name="Shape 294">
             <a:extLst>
               <a:ext uri="{FF2B5EF4-FFF2-40B4-BE49-F238E27FC236}">
-                <a16:creationId xmlns="" xmlns:a16="http://schemas.microsoft.com/office/drawing/2014/main" id="{0121AB00-D320-4AB1-818E-A9C81D4AC036}"/>
+                <a16:creationId xmlns:a16="http://schemas.microsoft.com/office/drawing/2014/main" xmlns="" id="{0121AB00-D320-4AB1-818E-A9C81D4AC036}"/>
               </a:ext>
             </a:extLst>
           </p:cNvPr>
@@ -34828,7 +35036,7 @@
           <p:cNvPr id="22" name="Shape 296">
             <a:extLst>
               <a:ext uri="{FF2B5EF4-FFF2-40B4-BE49-F238E27FC236}">
-                <a16:creationId xmlns="" xmlns:a16="http://schemas.microsoft.com/office/drawing/2014/main" id="{6445DD1F-C5F2-4A5C-96FC-AD9C6A057ACE}"/>
+                <a16:creationId xmlns:a16="http://schemas.microsoft.com/office/drawing/2014/main" xmlns="" id="{6445DD1F-C5F2-4A5C-96FC-AD9C6A057ACE}"/>
               </a:ext>
             </a:extLst>
           </p:cNvPr>
@@ -34871,7 +35079,7 @@
           <p:cNvPr id="23" name="Shape 297">
             <a:extLst>
               <a:ext uri="{FF2B5EF4-FFF2-40B4-BE49-F238E27FC236}">
-                <a16:creationId xmlns="" xmlns:a16="http://schemas.microsoft.com/office/drawing/2014/main" id="{4605CDF1-BA5A-44AB-8EB2-9BF8A886E0C0}"/>
+                <a16:creationId xmlns:a16="http://schemas.microsoft.com/office/drawing/2014/main" xmlns="" id="{4605CDF1-BA5A-44AB-8EB2-9BF8A886E0C0}"/>
               </a:ext>
             </a:extLst>
           </p:cNvPr>
@@ -34905,7 +35113,7 @@
           <p:cNvPr id="24" name="Shape 298">
             <a:extLst>
               <a:ext uri="{FF2B5EF4-FFF2-40B4-BE49-F238E27FC236}">
-                <a16:creationId xmlns="" xmlns:a16="http://schemas.microsoft.com/office/drawing/2014/main" id="{67309BC7-34DE-4F5A-9BFE-9C0BCA90456A}"/>
+                <a16:creationId xmlns:a16="http://schemas.microsoft.com/office/drawing/2014/main" xmlns="" id="{67309BC7-34DE-4F5A-9BFE-9C0BCA90456A}"/>
               </a:ext>
             </a:extLst>
           </p:cNvPr>
@@ -34939,7 +35147,7 @@
           <p:cNvPr id="25" name="Shape 299">
             <a:extLst>
               <a:ext uri="{FF2B5EF4-FFF2-40B4-BE49-F238E27FC236}">
-                <a16:creationId xmlns="" xmlns:a16="http://schemas.microsoft.com/office/drawing/2014/main" id="{41316317-FC53-4748-95B7-8CC8A8532066}"/>
+                <a16:creationId xmlns:a16="http://schemas.microsoft.com/office/drawing/2014/main" xmlns="" id="{41316317-FC53-4748-95B7-8CC8A8532066}"/>
               </a:ext>
             </a:extLst>
           </p:cNvPr>
@@ -34959,7 +35167,7 @@
             <p:cNvPr id="26" name="Shape 300">
               <a:extLst>
                 <a:ext uri="{FF2B5EF4-FFF2-40B4-BE49-F238E27FC236}">
-                  <a16:creationId xmlns="" xmlns:a16="http://schemas.microsoft.com/office/drawing/2014/main" id="{C16932D2-2E6E-4E3E-95DF-170747ED04A3}"/>
+                  <a16:creationId xmlns:a16="http://schemas.microsoft.com/office/drawing/2014/main" xmlns="" id="{C16932D2-2E6E-4E3E-95DF-170747ED04A3}"/>
                 </a:ext>
               </a:extLst>
             </p:cNvPr>
@@ -34979,7 +35187,7 @@
               <p:cNvPr id="30" name="Shape 301">
                 <a:extLst>
                   <a:ext uri="{FF2B5EF4-FFF2-40B4-BE49-F238E27FC236}">
-                    <a16:creationId xmlns="" xmlns:a16="http://schemas.microsoft.com/office/drawing/2014/main" id="{B14D9B44-D24B-4363-A7CA-08F873A55B81}"/>
+                    <a16:creationId xmlns:a16="http://schemas.microsoft.com/office/drawing/2014/main" xmlns="" id="{B14D9B44-D24B-4363-A7CA-08F873A55B81}"/>
                   </a:ext>
                 </a:extLst>
               </p:cNvPr>
@@ -35022,7 +35230,7 @@
               <p:cNvPr id="31" name="Shape 302">
                 <a:extLst>
                   <a:ext uri="{FF2B5EF4-FFF2-40B4-BE49-F238E27FC236}">
-                    <a16:creationId xmlns="" xmlns:a16="http://schemas.microsoft.com/office/drawing/2014/main" id="{E8A3D05E-D2A3-4A73-A968-874034906CF9}"/>
+                    <a16:creationId xmlns:a16="http://schemas.microsoft.com/office/drawing/2014/main" xmlns="" id="{E8A3D05E-D2A3-4A73-A968-874034906CF9}"/>
                   </a:ext>
                 </a:extLst>
               </p:cNvPr>
@@ -35065,7 +35273,7 @@
               <p:cNvPr id="32" name="Shape 303">
                 <a:extLst>
                   <a:ext uri="{FF2B5EF4-FFF2-40B4-BE49-F238E27FC236}">
-                    <a16:creationId xmlns="" xmlns:a16="http://schemas.microsoft.com/office/drawing/2014/main" id="{12759A16-DEA8-4A6A-8994-2C0103C299E6}"/>
+                    <a16:creationId xmlns:a16="http://schemas.microsoft.com/office/drawing/2014/main" xmlns="" id="{12759A16-DEA8-4A6A-8994-2C0103C299E6}"/>
                   </a:ext>
                 </a:extLst>
               </p:cNvPr>
@@ -35108,7 +35316,7 @@
               <p:cNvPr id="33" name="Shape 304">
                 <a:extLst>
                   <a:ext uri="{FF2B5EF4-FFF2-40B4-BE49-F238E27FC236}">
-                    <a16:creationId xmlns="" xmlns:a16="http://schemas.microsoft.com/office/drawing/2014/main" id="{C387BBBD-5D9D-40DB-BE82-9275CD2717C7}"/>
+                    <a16:creationId xmlns:a16="http://schemas.microsoft.com/office/drawing/2014/main" xmlns="" id="{C387BBBD-5D9D-40DB-BE82-9275CD2717C7}"/>
                   </a:ext>
                 </a:extLst>
               </p:cNvPr>
@@ -35152,7 +35360,7 @@
             <p:cNvPr id="27" name="Shape 305">
               <a:extLst>
                 <a:ext uri="{FF2B5EF4-FFF2-40B4-BE49-F238E27FC236}">
-                  <a16:creationId xmlns="" xmlns:a16="http://schemas.microsoft.com/office/drawing/2014/main" id="{E77BFAA6-78F2-4910-945F-9D2682BAD5D5}"/>
+                  <a16:creationId xmlns:a16="http://schemas.microsoft.com/office/drawing/2014/main" xmlns="" id="{E77BFAA6-78F2-4910-945F-9D2682BAD5D5}"/>
                 </a:ext>
               </a:extLst>
             </p:cNvPr>
@@ -35186,7 +35394,7 @@
             <p:cNvPr id="28" name="Shape 306">
               <a:extLst>
                 <a:ext uri="{FF2B5EF4-FFF2-40B4-BE49-F238E27FC236}">
-                  <a16:creationId xmlns="" xmlns:a16="http://schemas.microsoft.com/office/drawing/2014/main" id="{821BB7C8-EEAB-4B95-82B3-78E894CF6A80}"/>
+                  <a16:creationId xmlns:a16="http://schemas.microsoft.com/office/drawing/2014/main" xmlns="" id="{821BB7C8-EEAB-4B95-82B3-78E894CF6A80}"/>
                 </a:ext>
               </a:extLst>
             </p:cNvPr>
@@ -35220,7 +35428,7 @@
             <p:cNvPr id="29" name="Shape 307">
               <a:extLst>
                 <a:ext uri="{FF2B5EF4-FFF2-40B4-BE49-F238E27FC236}">
-                  <a16:creationId xmlns="" xmlns:a16="http://schemas.microsoft.com/office/drawing/2014/main" id="{42D1DBA9-0D7A-4331-88FA-79C8524A703C}"/>
+                  <a16:creationId xmlns:a16="http://schemas.microsoft.com/office/drawing/2014/main" xmlns="" id="{42D1DBA9-0D7A-4331-88FA-79C8524A703C}"/>
                 </a:ext>
               </a:extLst>
             </p:cNvPr>
@@ -35264,7 +35472,7 @@
           <p:cNvPr id="34" name="Shape 308">
             <a:extLst>
               <a:ext uri="{FF2B5EF4-FFF2-40B4-BE49-F238E27FC236}">
-                <a16:creationId xmlns="" xmlns:a16="http://schemas.microsoft.com/office/drawing/2014/main" id="{AB810761-D369-4074-B6FA-C5064A740985}"/>
+                <a16:creationId xmlns:a16="http://schemas.microsoft.com/office/drawing/2014/main" xmlns="" id="{AB810761-D369-4074-B6FA-C5064A740985}"/>
               </a:ext>
             </a:extLst>
           </p:cNvPr>
@@ -35301,6 +35509,13 @@
   <p:clrMapOvr>
     <a:masterClrMapping/>
   </p:clrMapOvr>
+  <p:timing>
+    <p:tnLst>
+      <p:par>
+        <p:cTn id="1" dur="indefinite" restart="never" nodeType="tmRoot"/>
+      </p:par>
+    </p:tnLst>
+  </p:timing>
 </p:sld>
 </file>
 
@@ -35326,7 +35541,7 @@
           <p:cNvPr id="2" name="Date Placeholder 1">
             <a:extLst>
               <a:ext uri="{FF2B5EF4-FFF2-40B4-BE49-F238E27FC236}">
-                <a16:creationId xmlns="" xmlns:a16="http://schemas.microsoft.com/office/drawing/2014/main" id="{F2044BC4-137A-48C9-AC90-557A74AB3C65}"/>
+                <a16:creationId xmlns:a16="http://schemas.microsoft.com/office/drawing/2014/main" xmlns="" id="{F2044BC4-137A-48C9-AC90-557A74AB3C65}"/>
               </a:ext>
             </a:extLst>
           </p:cNvPr>
@@ -35344,7 +35559,7 @@
           <a:p>
             <a:fld id="{6700A58B-DD98-43D0-B791-721480A02982}" type="datetime1">
               <a:rPr lang="en-US" smtClean="0"/>
-              <a:t>6/7/2019</a:t>
+              <a:t>6/18/2019</a:t>
             </a:fld>
             <a:endParaRPr lang="en-US"/>
           </a:p>
@@ -35355,7 +35570,7 @@
           <p:cNvPr id="3" name="Title 2">
             <a:extLst>
               <a:ext uri="{FF2B5EF4-FFF2-40B4-BE49-F238E27FC236}">
-                <a16:creationId xmlns="" xmlns:a16="http://schemas.microsoft.com/office/drawing/2014/main" id="{194FC0B8-AD59-42B6-87BD-C5F47E278813}"/>
+                <a16:creationId xmlns:a16="http://schemas.microsoft.com/office/drawing/2014/main" xmlns="" id="{194FC0B8-AD59-42B6-87BD-C5F47E278813}"/>
               </a:ext>
             </a:extLst>
           </p:cNvPr>
@@ -35383,7 +35598,7 @@
           <p:cNvPr id="4" name="Footer Placeholder 3">
             <a:extLst>
               <a:ext uri="{FF2B5EF4-FFF2-40B4-BE49-F238E27FC236}">
-                <a16:creationId xmlns="" xmlns:a16="http://schemas.microsoft.com/office/drawing/2014/main" id="{BB32AB7D-41C8-4C00-BF84-12E12E513EA0}"/>
+                <a16:creationId xmlns:a16="http://schemas.microsoft.com/office/drawing/2014/main" xmlns="" id="{BB32AB7D-41C8-4C00-BF84-12E12E513EA0}"/>
               </a:ext>
             </a:extLst>
           </p:cNvPr>
@@ -35412,7 +35627,7 @@
           <p:cNvPr id="5" name="Slide Number Placeholder 4">
             <a:extLst>
               <a:ext uri="{FF2B5EF4-FFF2-40B4-BE49-F238E27FC236}">
-                <a16:creationId xmlns="" xmlns:a16="http://schemas.microsoft.com/office/drawing/2014/main" id="{B123BEAB-D46C-458F-B5E4-79AB83F49BB7}"/>
+                <a16:creationId xmlns:a16="http://schemas.microsoft.com/office/drawing/2014/main" xmlns="" id="{B123BEAB-D46C-458F-B5E4-79AB83F49BB7}"/>
               </a:ext>
             </a:extLst>
           </p:cNvPr>
@@ -35677,7 +35892,7 @@
           <a:p>
             <a:fld id="{6700A58B-DD98-43D0-B791-721480A02982}" type="datetime1">
               <a:rPr lang="en-US" smtClean="0"/>
-              <a:t>6/7/2019</a:t>
+              <a:t>6/18/2019</a:t>
             </a:fld>
             <a:endParaRPr lang="en-US"/>
           </a:p>
@@ -35828,7 +36043,7 @@
           <a:p>
             <a:fld id="{6700A58B-DD98-43D0-B791-721480A02982}" type="datetime1">
               <a:rPr lang="en-US" smtClean="0"/>
-              <a:t>6/7/2019</a:t>
+              <a:t>6/18/2019</a:t>
             </a:fld>
             <a:endParaRPr lang="en-US"/>
           </a:p>
@@ -36014,7 +36229,7 @@
           <p:cNvPr id="2" name="Date Placeholder 1">
             <a:extLst>
               <a:ext uri="{FF2B5EF4-FFF2-40B4-BE49-F238E27FC236}">
-                <a16:creationId xmlns="" xmlns:a16="http://schemas.microsoft.com/office/drawing/2014/main" id="{AB52415D-80F9-4EB9-8BA7-C2A978A69297}"/>
+                <a16:creationId xmlns:a16="http://schemas.microsoft.com/office/drawing/2014/main" xmlns="" id="{AB52415D-80F9-4EB9-8BA7-C2A978A69297}"/>
               </a:ext>
             </a:extLst>
           </p:cNvPr>
@@ -36032,7 +36247,7 @@
           <a:p>
             <a:fld id="{6700A58B-DD98-43D0-B791-721480A02982}" type="datetime1">
               <a:rPr lang="en-US" smtClean="0"/>
-              <a:t>6/7/2019</a:t>
+              <a:t>6/18/2019</a:t>
             </a:fld>
             <a:endParaRPr lang="en-US"/>
           </a:p>
@@ -36043,7 +36258,7 @@
           <p:cNvPr id="3" name="Title 2">
             <a:extLst>
               <a:ext uri="{FF2B5EF4-FFF2-40B4-BE49-F238E27FC236}">
-                <a16:creationId xmlns="" xmlns:a16="http://schemas.microsoft.com/office/drawing/2014/main" id="{FAD8764D-2274-4DF5-958E-CF9BB346C3ED}"/>
+                <a16:creationId xmlns:a16="http://schemas.microsoft.com/office/drawing/2014/main" xmlns="" id="{FAD8764D-2274-4DF5-958E-CF9BB346C3ED}"/>
               </a:ext>
             </a:extLst>
           </p:cNvPr>
@@ -36071,7 +36286,7 @@
           <p:cNvPr id="4" name="Footer Placeholder 3">
             <a:extLst>
               <a:ext uri="{FF2B5EF4-FFF2-40B4-BE49-F238E27FC236}">
-                <a16:creationId xmlns="" xmlns:a16="http://schemas.microsoft.com/office/drawing/2014/main" id="{4D33D3F6-DAA2-438C-8852-DCC7AB6E9162}"/>
+                <a16:creationId xmlns:a16="http://schemas.microsoft.com/office/drawing/2014/main" xmlns="" id="{4D33D3F6-DAA2-438C-8852-DCC7AB6E9162}"/>
               </a:ext>
             </a:extLst>
           </p:cNvPr>
@@ -36100,7 +36315,7 @@
           <p:cNvPr id="5" name="Slide Number Placeholder 4">
             <a:extLst>
               <a:ext uri="{FF2B5EF4-FFF2-40B4-BE49-F238E27FC236}">
-                <a16:creationId xmlns="" xmlns:a16="http://schemas.microsoft.com/office/drawing/2014/main" id="{4233A2DF-7076-4BB0-8206-0B50536182B6}"/>
+                <a16:creationId xmlns:a16="http://schemas.microsoft.com/office/drawing/2014/main" xmlns="" id="{4233A2DF-7076-4BB0-8206-0B50536182B6}"/>
               </a:ext>
             </a:extLst>
           </p:cNvPr>
@@ -36130,7 +36345,7 @@
           <p:cNvPr id="6" name="TextBox 5">
             <a:extLst>
               <a:ext uri="{FF2B5EF4-FFF2-40B4-BE49-F238E27FC236}">
-                <a16:creationId xmlns="" xmlns:a16="http://schemas.microsoft.com/office/drawing/2014/main" id="{30B25324-6EF1-4D65-9C1A-DB49D24BFFAF}"/>
+                <a16:creationId xmlns:a16="http://schemas.microsoft.com/office/drawing/2014/main" xmlns="" id="{30B25324-6EF1-4D65-9C1A-DB49D24BFFAF}"/>
               </a:ext>
             </a:extLst>
           </p:cNvPr>
@@ -36217,7 +36432,7 @@
           <p:cNvPr id="9218" name="Picture 2" descr="Image result for professor meme">
             <a:extLst>
               <a:ext uri="{FF2B5EF4-FFF2-40B4-BE49-F238E27FC236}">
-                <a16:creationId xmlns="" xmlns:a16="http://schemas.microsoft.com/office/drawing/2014/main" id="{5D0EA8E1-0165-4C0D-911D-97F50C9A01AC}"/>
+                <a16:creationId xmlns:a16="http://schemas.microsoft.com/office/drawing/2014/main" xmlns="" id="{5D0EA8E1-0165-4C0D-911D-97F50C9A01AC}"/>
               </a:ext>
             </a:extLst>
           </p:cNvPr>
@@ -36294,7 +36509,7 @@
           <p:cNvPr id="2" name="Date Placeholder 1">
             <a:extLst>
               <a:ext uri="{FF2B5EF4-FFF2-40B4-BE49-F238E27FC236}">
-                <a16:creationId xmlns="" xmlns:a16="http://schemas.microsoft.com/office/drawing/2014/main" id="{38B5C42E-683C-4425-ABD1-02308F60C3D8}"/>
+                <a16:creationId xmlns:a16="http://schemas.microsoft.com/office/drawing/2014/main" xmlns="" id="{38B5C42E-683C-4425-ABD1-02308F60C3D8}"/>
               </a:ext>
             </a:extLst>
           </p:cNvPr>
@@ -36312,7 +36527,7 @@
           <a:p>
             <a:fld id="{6700A58B-DD98-43D0-B791-721480A02982}" type="datetime1">
               <a:rPr lang="en-US" smtClean="0"/>
-              <a:t>6/7/2019</a:t>
+              <a:t>6/18/2019</a:t>
             </a:fld>
             <a:endParaRPr lang="en-US"/>
           </a:p>
@@ -36323,7 +36538,7 @@
           <p:cNvPr id="3" name="Title 2">
             <a:extLst>
               <a:ext uri="{FF2B5EF4-FFF2-40B4-BE49-F238E27FC236}">
-                <a16:creationId xmlns="" xmlns:a16="http://schemas.microsoft.com/office/drawing/2014/main" id="{311F6C59-D5C1-4C48-9CAE-313150C6B940}"/>
+                <a16:creationId xmlns:a16="http://schemas.microsoft.com/office/drawing/2014/main" xmlns="" id="{311F6C59-D5C1-4C48-9CAE-313150C6B940}"/>
               </a:ext>
             </a:extLst>
           </p:cNvPr>
@@ -36351,7 +36566,7 @@
           <p:cNvPr id="4" name="Footer Placeholder 3">
             <a:extLst>
               <a:ext uri="{FF2B5EF4-FFF2-40B4-BE49-F238E27FC236}">
-                <a16:creationId xmlns="" xmlns:a16="http://schemas.microsoft.com/office/drawing/2014/main" id="{EB6ABA55-77A2-4208-9C68-4EED6DAC5637}"/>
+                <a16:creationId xmlns:a16="http://schemas.microsoft.com/office/drawing/2014/main" xmlns="" id="{EB6ABA55-77A2-4208-9C68-4EED6DAC5637}"/>
               </a:ext>
             </a:extLst>
           </p:cNvPr>
@@ -36380,7 +36595,7 @@
           <p:cNvPr id="5" name="Slide Number Placeholder 4">
             <a:extLst>
               <a:ext uri="{FF2B5EF4-FFF2-40B4-BE49-F238E27FC236}">
-                <a16:creationId xmlns="" xmlns:a16="http://schemas.microsoft.com/office/drawing/2014/main" id="{465B6F0D-C07E-45D7-8154-18A7802F0920}"/>
+                <a16:creationId xmlns:a16="http://schemas.microsoft.com/office/drawing/2014/main" xmlns="" id="{465B6F0D-C07E-45D7-8154-18A7802F0920}"/>
               </a:ext>
             </a:extLst>
           </p:cNvPr>
@@ -36410,7 +36625,7 @@
           <p:cNvPr id="6" name="TextBox 5">
             <a:extLst>
               <a:ext uri="{FF2B5EF4-FFF2-40B4-BE49-F238E27FC236}">
-                <a16:creationId xmlns="" xmlns:a16="http://schemas.microsoft.com/office/drawing/2014/main" id="{5D68324B-36C0-45B5-BD33-A444BB3D2561}"/>
+                <a16:creationId xmlns:a16="http://schemas.microsoft.com/office/drawing/2014/main" xmlns="" id="{5D68324B-36C0-45B5-BD33-A444BB3D2561}"/>
               </a:ext>
             </a:extLst>
           </p:cNvPr>
@@ -36513,7 +36728,7 @@
           <p:cNvPr id="2" name="Date Placeholder 1">
             <a:extLst>
               <a:ext uri="{FF2B5EF4-FFF2-40B4-BE49-F238E27FC236}">
-                <a16:creationId xmlns="" xmlns:a16="http://schemas.microsoft.com/office/drawing/2014/main" id="{05374BC4-5CA7-41AE-A3FE-E7F6A16DB20B}"/>
+                <a16:creationId xmlns:a16="http://schemas.microsoft.com/office/drawing/2014/main" xmlns="" id="{05374BC4-5CA7-41AE-A3FE-E7F6A16DB20B}"/>
               </a:ext>
             </a:extLst>
           </p:cNvPr>
@@ -36531,7 +36746,7 @@
           <a:p>
             <a:fld id="{6700A58B-DD98-43D0-B791-721480A02982}" type="datetime1">
               <a:rPr lang="en-US" smtClean="0"/>
-              <a:t>6/7/2019</a:t>
+              <a:t>6/18/2019</a:t>
             </a:fld>
             <a:endParaRPr lang="en-US"/>
           </a:p>
@@ -36542,7 +36757,7 @@
           <p:cNvPr id="3" name="Title 2">
             <a:extLst>
               <a:ext uri="{FF2B5EF4-FFF2-40B4-BE49-F238E27FC236}">
-                <a16:creationId xmlns="" xmlns:a16="http://schemas.microsoft.com/office/drawing/2014/main" id="{8EF1F1BE-EAA4-483B-AB28-0E98E01DB3A5}"/>
+                <a16:creationId xmlns:a16="http://schemas.microsoft.com/office/drawing/2014/main" xmlns="" id="{8EF1F1BE-EAA4-483B-AB28-0E98E01DB3A5}"/>
               </a:ext>
             </a:extLst>
           </p:cNvPr>
@@ -36570,7 +36785,7 @@
           <p:cNvPr id="4" name="Footer Placeholder 3">
             <a:extLst>
               <a:ext uri="{FF2B5EF4-FFF2-40B4-BE49-F238E27FC236}">
-                <a16:creationId xmlns="" xmlns:a16="http://schemas.microsoft.com/office/drawing/2014/main" id="{078806BB-E54E-4349-A652-F45615C285C9}"/>
+                <a16:creationId xmlns:a16="http://schemas.microsoft.com/office/drawing/2014/main" xmlns="" id="{078806BB-E54E-4349-A652-F45615C285C9}"/>
               </a:ext>
             </a:extLst>
           </p:cNvPr>
@@ -36599,7 +36814,7 @@
           <p:cNvPr id="5" name="Slide Number Placeholder 4">
             <a:extLst>
               <a:ext uri="{FF2B5EF4-FFF2-40B4-BE49-F238E27FC236}">
-                <a16:creationId xmlns="" xmlns:a16="http://schemas.microsoft.com/office/drawing/2014/main" id="{2DB954FC-566C-4D1E-A2EC-9B04283D3F56}"/>
+                <a16:creationId xmlns:a16="http://schemas.microsoft.com/office/drawing/2014/main" xmlns="" id="{2DB954FC-566C-4D1E-A2EC-9B04283D3F56}"/>
               </a:ext>
             </a:extLst>
           </p:cNvPr>
@@ -36629,7 +36844,7 @@
           <p:cNvPr id="6" name="Content Placeholder 2">
             <a:extLst>
               <a:ext uri="{FF2B5EF4-FFF2-40B4-BE49-F238E27FC236}">
-                <a16:creationId xmlns="" xmlns:a16="http://schemas.microsoft.com/office/drawing/2014/main" id="{E5FDA6E8-1A19-4845-BBF5-E31365C797B7}"/>
+                <a16:creationId xmlns:a16="http://schemas.microsoft.com/office/drawing/2014/main" xmlns="" id="{E5FDA6E8-1A19-4845-BBF5-E31365C797B7}"/>
               </a:ext>
             </a:extLst>
           </p:cNvPr>
@@ -36815,40 +37030,49 @@
           </a:lstStyle>
           <a:p>
             <a:r>
-              <a:rPr lang="en-US" altLang="en-US">
+              <a:rPr lang="en-US" altLang="en-US" dirty="0">
                 <a:latin typeface="Franklin Gothic Book" pitchFamily="34" charset="0"/>
               </a:rPr>
               <a:t>Goal: Segment data into meaningful segments; detect patterns</a:t>
             </a:r>
           </a:p>
           <a:p>
-            <a:endParaRPr lang="en-US" altLang="en-US">
+            <a:endParaRPr lang="en-US" altLang="en-US" dirty="0">
               <a:latin typeface="Franklin Gothic Book" pitchFamily="34" charset="0"/>
             </a:endParaRPr>
           </a:p>
           <a:p>
             <a:r>
-              <a:rPr lang="en-US" altLang="en-US">
+              <a:rPr lang="en-US" altLang="en-US" dirty="0">
                 <a:latin typeface="Franklin Gothic Book" pitchFamily="34" charset="0"/>
               </a:rPr>
               <a:t>There is no target (outcome) variable to predict or classify</a:t>
             </a:r>
           </a:p>
           <a:p>
-            <a:endParaRPr lang="en-US" altLang="en-US">
-              <a:latin typeface="Franklin Gothic Book" pitchFamily="34" charset="0"/>
-            </a:endParaRPr>
-          </a:p>
-          <a:p>
-            <a:r>
-              <a:rPr lang="en-US" altLang="en-US">
-                <a:latin typeface="Franklin Gothic Book" pitchFamily="34" charset="0"/>
-              </a:rPr>
-              <a:t>Methods: Association rules, data reduction &amp; exploration, visualization</a:t>
-            </a:r>
             <a:endParaRPr lang="en-US" altLang="en-US" dirty="0">
               <a:latin typeface="Franklin Gothic Book" pitchFamily="34" charset="0"/>
             </a:endParaRPr>
+          </a:p>
+          <a:p>
+            <a:r>
+              <a:rPr lang="en-US" altLang="en-US" dirty="0">
+                <a:latin typeface="Franklin Gothic Book" pitchFamily="34" charset="0"/>
+              </a:rPr>
+              <a:t>Methods: Association rules, </a:t>
+            </a:r>
+            <a:r>
+              <a:rPr lang="en-US" altLang="en-US" dirty="0" smtClean="0">
+                <a:latin typeface="Franklin Gothic Book" pitchFamily="34" charset="0"/>
+              </a:rPr>
+              <a:t>clustering, data </a:t>
+            </a:r>
+            <a:r>
+              <a:rPr lang="en-US" altLang="en-US" dirty="0">
+                <a:latin typeface="Franklin Gothic Book" pitchFamily="34" charset="0"/>
+              </a:rPr>
+              <a:t>reduction &amp; exploration, visualization</a:t>
+            </a:r>
           </a:p>
         </p:txBody>
       </p:sp>
@@ -36887,7 +37111,7 @@
           <p:cNvPr id="2" name="Date Placeholder 1">
             <a:extLst>
               <a:ext uri="{FF2B5EF4-FFF2-40B4-BE49-F238E27FC236}">
-                <a16:creationId xmlns="" xmlns:a16="http://schemas.microsoft.com/office/drawing/2014/main" id="{EBF86C61-4D40-48D9-91D6-FE14DA82446F}"/>
+                <a16:creationId xmlns:a16="http://schemas.microsoft.com/office/drawing/2014/main" xmlns="" id="{EBF86C61-4D40-48D9-91D6-FE14DA82446F}"/>
               </a:ext>
             </a:extLst>
           </p:cNvPr>
@@ -36905,7 +37129,7 @@
           <a:p>
             <a:fld id="{6700A58B-DD98-43D0-B791-721480A02982}" type="datetime1">
               <a:rPr lang="en-US" smtClean="0"/>
-              <a:t>6/7/2019</a:t>
+              <a:t>6/18/2019</a:t>
             </a:fld>
             <a:endParaRPr lang="en-US"/>
           </a:p>
@@ -36916,7 +37140,7 @@
           <p:cNvPr id="3" name="Title 2">
             <a:extLst>
               <a:ext uri="{FF2B5EF4-FFF2-40B4-BE49-F238E27FC236}">
-                <a16:creationId xmlns="" xmlns:a16="http://schemas.microsoft.com/office/drawing/2014/main" id="{12AED3E6-890D-452D-B80F-BB83E47E2AFA}"/>
+                <a16:creationId xmlns:a16="http://schemas.microsoft.com/office/drawing/2014/main" xmlns="" id="{12AED3E6-890D-452D-B80F-BB83E47E2AFA}"/>
               </a:ext>
             </a:extLst>
           </p:cNvPr>
@@ -36944,7 +37168,7 @@
           <p:cNvPr id="4" name="Footer Placeholder 3">
             <a:extLst>
               <a:ext uri="{FF2B5EF4-FFF2-40B4-BE49-F238E27FC236}">
-                <a16:creationId xmlns="" xmlns:a16="http://schemas.microsoft.com/office/drawing/2014/main" id="{D448FD2A-B986-43F8-AB22-0E7B94EB03EB}"/>
+                <a16:creationId xmlns:a16="http://schemas.microsoft.com/office/drawing/2014/main" xmlns="" id="{D448FD2A-B986-43F8-AB22-0E7B94EB03EB}"/>
               </a:ext>
             </a:extLst>
           </p:cNvPr>
@@ -36973,7 +37197,7 @@
           <p:cNvPr id="5" name="Slide Number Placeholder 4">
             <a:extLst>
               <a:ext uri="{FF2B5EF4-FFF2-40B4-BE49-F238E27FC236}">
-                <a16:creationId xmlns="" xmlns:a16="http://schemas.microsoft.com/office/drawing/2014/main" id="{9D09D7D4-E343-4CA0-915E-C1E9A7D66EAB}"/>
+                <a16:creationId xmlns:a16="http://schemas.microsoft.com/office/drawing/2014/main" xmlns="" id="{9D09D7D4-E343-4CA0-915E-C1E9A7D66EAB}"/>
               </a:ext>
             </a:extLst>
           </p:cNvPr>
@@ -37003,7 +37227,7 @@
           <p:cNvPr id="6" name="Shape 239">
             <a:extLst>
               <a:ext uri="{FF2B5EF4-FFF2-40B4-BE49-F238E27FC236}">
-                <a16:creationId xmlns="" xmlns:a16="http://schemas.microsoft.com/office/drawing/2014/main" id="{47C77ADE-F2A3-4236-BE40-68B51DF79378}"/>
+                <a16:creationId xmlns:a16="http://schemas.microsoft.com/office/drawing/2014/main" xmlns="" id="{47C77ADE-F2A3-4236-BE40-68B51DF79378}"/>
               </a:ext>
             </a:extLst>
           </p:cNvPr>
@@ -37051,7 +37275,7 @@
           <p:cNvPr id="7" name="Shape 240">
             <a:extLst>
               <a:ext uri="{FF2B5EF4-FFF2-40B4-BE49-F238E27FC236}">
-                <a16:creationId xmlns="" xmlns:a16="http://schemas.microsoft.com/office/drawing/2014/main" id="{536C7D8C-0FEA-4FF6-A0DE-5EF4EEBAA497}"/>
+                <a16:creationId xmlns:a16="http://schemas.microsoft.com/office/drawing/2014/main" xmlns="" id="{536C7D8C-0FEA-4FF6-A0DE-5EF4EEBAA497}"/>
               </a:ext>
             </a:extLst>
           </p:cNvPr>
@@ -37094,7 +37318,7 @@
           <p:cNvPr id="8" name="Shape 231">
             <a:extLst>
               <a:ext uri="{FF2B5EF4-FFF2-40B4-BE49-F238E27FC236}">
-                <a16:creationId xmlns="" xmlns:a16="http://schemas.microsoft.com/office/drawing/2014/main" id="{4330E06C-C231-49A3-AE30-EAAB1A8F08B6}"/>
+                <a16:creationId xmlns:a16="http://schemas.microsoft.com/office/drawing/2014/main" xmlns="" id="{4330E06C-C231-49A3-AE30-EAAB1A8F08B6}"/>
               </a:ext>
             </a:extLst>
           </p:cNvPr>
@@ -37114,7 +37338,7 @@
             <p:cNvPr id="9" name="Shape 232">
               <a:extLst>
                 <a:ext uri="{FF2B5EF4-FFF2-40B4-BE49-F238E27FC236}">
-                  <a16:creationId xmlns="" xmlns:a16="http://schemas.microsoft.com/office/drawing/2014/main" id="{F3270045-39C1-4164-A3A5-A955A4D6BDA8}"/>
+                  <a16:creationId xmlns:a16="http://schemas.microsoft.com/office/drawing/2014/main" xmlns="" id="{F3270045-39C1-4164-A3A5-A955A4D6BDA8}"/>
                 </a:ext>
               </a:extLst>
             </p:cNvPr>
@@ -37157,7 +37381,7 @@
             <p:cNvPr id="10" name="Shape 233">
               <a:extLst>
                 <a:ext uri="{FF2B5EF4-FFF2-40B4-BE49-F238E27FC236}">
-                  <a16:creationId xmlns="" xmlns:a16="http://schemas.microsoft.com/office/drawing/2014/main" id="{6FE3A028-274E-44DF-A00C-5D5C75964E30}"/>
+                  <a16:creationId xmlns:a16="http://schemas.microsoft.com/office/drawing/2014/main" xmlns="" id="{6FE3A028-274E-44DF-A00C-5D5C75964E30}"/>
                 </a:ext>
               </a:extLst>
             </p:cNvPr>
@@ -37200,7 +37424,7 @@
             <p:cNvPr id="11" name="Shape 234">
               <a:extLst>
                 <a:ext uri="{FF2B5EF4-FFF2-40B4-BE49-F238E27FC236}">
-                  <a16:creationId xmlns="" xmlns:a16="http://schemas.microsoft.com/office/drawing/2014/main" id="{D96704CA-772B-4B45-A7FA-E01B1E407EAA}"/>
+                  <a16:creationId xmlns:a16="http://schemas.microsoft.com/office/drawing/2014/main" xmlns="" id="{D96704CA-772B-4B45-A7FA-E01B1E407EAA}"/>
                 </a:ext>
               </a:extLst>
             </p:cNvPr>
@@ -37243,7 +37467,7 @@
             <p:cNvPr id="12" name="Shape 235">
               <a:extLst>
                 <a:ext uri="{FF2B5EF4-FFF2-40B4-BE49-F238E27FC236}">
-                  <a16:creationId xmlns="" xmlns:a16="http://schemas.microsoft.com/office/drawing/2014/main" id="{0628A70E-9052-4749-961F-E90671E1BBA9}"/>
+                  <a16:creationId xmlns:a16="http://schemas.microsoft.com/office/drawing/2014/main" xmlns="" id="{0628A70E-9052-4749-961F-E90671E1BBA9}"/>
                 </a:ext>
               </a:extLst>
             </p:cNvPr>
@@ -37287,7 +37511,7 @@
           <p:cNvPr id="13" name="Shape 241">
             <a:extLst>
               <a:ext uri="{FF2B5EF4-FFF2-40B4-BE49-F238E27FC236}">
-                <a16:creationId xmlns="" xmlns:a16="http://schemas.microsoft.com/office/drawing/2014/main" id="{191C209D-41BE-445A-8F56-4606D5A5F0E9}"/>
+                <a16:creationId xmlns:a16="http://schemas.microsoft.com/office/drawing/2014/main" xmlns="" id="{191C209D-41BE-445A-8F56-4606D5A5F0E9}"/>
               </a:ext>
             </a:extLst>
           </p:cNvPr>
@@ -37307,7 +37531,7 @@
             <p:cNvPr id="14" name="Shape 242">
               <a:extLst>
                 <a:ext uri="{FF2B5EF4-FFF2-40B4-BE49-F238E27FC236}">
-                  <a16:creationId xmlns="" xmlns:a16="http://schemas.microsoft.com/office/drawing/2014/main" id="{85E246BC-25B0-468E-9999-13E7346EC9F0}"/>
+                  <a16:creationId xmlns:a16="http://schemas.microsoft.com/office/drawing/2014/main" xmlns="" id="{85E246BC-25B0-468E-9999-13E7346EC9F0}"/>
                 </a:ext>
               </a:extLst>
             </p:cNvPr>
@@ -37350,7 +37574,7 @@
             <p:cNvPr id="15" name="Shape 243">
               <a:extLst>
                 <a:ext uri="{FF2B5EF4-FFF2-40B4-BE49-F238E27FC236}">
-                  <a16:creationId xmlns="" xmlns:a16="http://schemas.microsoft.com/office/drawing/2014/main" id="{C1D52266-27CB-4A1F-BAE7-52BAE94D115F}"/>
+                  <a16:creationId xmlns:a16="http://schemas.microsoft.com/office/drawing/2014/main" xmlns="" id="{C1D52266-27CB-4A1F-BAE7-52BAE94D115F}"/>
                 </a:ext>
               </a:extLst>
             </p:cNvPr>
@@ -37393,7 +37617,7 @@
             <p:cNvPr id="16" name="Shape 244">
               <a:extLst>
                 <a:ext uri="{FF2B5EF4-FFF2-40B4-BE49-F238E27FC236}">
-                  <a16:creationId xmlns="" xmlns:a16="http://schemas.microsoft.com/office/drawing/2014/main" id="{059233CE-70EB-4DBF-903F-EE0AC68FCEB0}"/>
+                  <a16:creationId xmlns:a16="http://schemas.microsoft.com/office/drawing/2014/main" xmlns="" id="{059233CE-70EB-4DBF-903F-EE0AC68FCEB0}"/>
                 </a:ext>
               </a:extLst>
             </p:cNvPr>
@@ -37436,7 +37660,7 @@
             <p:cNvPr id="17" name="Shape 245">
               <a:extLst>
                 <a:ext uri="{FF2B5EF4-FFF2-40B4-BE49-F238E27FC236}">
-                  <a16:creationId xmlns="" xmlns:a16="http://schemas.microsoft.com/office/drawing/2014/main" id="{8B6A0396-DF61-4783-A621-0CF46CBF4DC6}"/>
+                  <a16:creationId xmlns:a16="http://schemas.microsoft.com/office/drawing/2014/main" xmlns="" id="{8B6A0396-DF61-4783-A621-0CF46CBF4DC6}"/>
                 </a:ext>
               </a:extLst>
             </p:cNvPr>
@@ -37480,7 +37704,7 @@
           <p:cNvPr id="18" name="Shape 246">
             <a:extLst>
               <a:ext uri="{FF2B5EF4-FFF2-40B4-BE49-F238E27FC236}">
-                <a16:creationId xmlns="" xmlns:a16="http://schemas.microsoft.com/office/drawing/2014/main" id="{E15F5042-624D-41A8-9E01-67992CF141F8}"/>
+                <a16:creationId xmlns:a16="http://schemas.microsoft.com/office/drawing/2014/main" xmlns="" id="{E15F5042-624D-41A8-9E01-67992CF141F8}"/>
               </a:ext>
             </a:extLst>
           </p:cNvPr>
@@ -37514,7 +37738,7 @@
           <p:cNvPr id="19" name="Shape 247">
             <a:extLst>
               <a:ext uri="{FF2B5EF4-FFF2-40B4-BE49-F238E27FC236}">
-                <a16:creationId xmlns="" xmlns:a16="http://schemas.microsoft.com/office/drawing/2014/main" id="{990B4EA5-B321-4AA7-8C2D-916580BCABA2}"/>
+                <a16:creationId xmlns:a16="http://schemas.microsoft.com/office/drawing/2014/main" xmlns="" id="{990B4EA5-B321-4AA7-8C2D-916580BCABA2}"/>
               </a:ext>
             </a:extLst>
           </p:cNvPr>
@@ -37558,7 +37782,7 @@
           <p:cNvPr id="20" name="Shape 249">
             <a:extLst>
               <a:ext uri="{FF2B5EF4-FFF2-40B4-BE49-F238E27FC236}">
-                <a16:creationId xmlns="" xmlns:a16="http://schemas.microsoft.com/office/drawing/2014/main" id="{A11BC223-9284-41F0-A96F-9A020AF5F95C}"/>
+                <a16:creationId xmlns:a16="http://schemas.microsoft.com/office/drawing/2014/main" xmlns="" id="{A11BC223-9284-41F0-A96F-9A020AF5F95C}"/>
               </a:ext>
             </a:extLst>
           </p:cNvPr>
@@ -37602,7 +37826,7 @@
           <p:cNvPr id="21" name="Shape 250">
             <a:extLst>
               <a:ext uri="{FF2B5EF4-FFF2-40B4-BE49-F238E27FC236}">
-                <a16:creationId xmlns="" xmlns:a16="http://schemas.microsoft.com/office/drawing/2014/main" id="{541B85F8-23E7-474A-96C6-83F926E7EE39}"/>
+                <a16:creationId xmlns:a16="http://schemas.microsoft.com/office/drawing/2014/main" xmlns="" id="{541B85F8-23E7-474A-96C6-83F926E7EE39}"/>
               </a:ext>
             </a:extLst>
           </p:cNvPr>
@@ -37622,7 +37846,7 @@
             <p:cNvPr id="22" name="Shape 251">
               <a:extLst>
                 <a:ext uri="{FF2B5EF4-FFF2-40B4-BE49-F238E27FC236}">
-                  <a16:creationId xmlns="" xmlns:a16="http://schemas.microsoft.com/office/drawing/2014/main" id="{5426F7FB-26C3-43C9-B21C-842ADF5C12D8}"/>
+                  <a16:creationId xmlns:a16="http://schemas.microsoft.com/office/drawing/2014/main" xmlns="" id="{5426F7FB-26C3-43C9-B21C-842ADF5C12D8}"/>
                 </a:ext>
               </a:extLst>
             </p:cNvPr>
@@ -37665,7 +37889,7 @@
             <p:cNvPr id="23" name="Shape 252">
               <a:extLst>
                 <a:ext uri="{FF2B5EF4-FFF2-40B4-BE49-F238E27FC236}">
-                  <a16:creationId xmlns="" xmlns:a16="http://schemas.microsoft.com/office/drawing/2014/main" id="{1B87E3CA-020C-4D4B-936C-0CFAEE4CB85B}"/>
+                  <a16:creationId xmlns:a16="http://schemas.microsoft.com/office/drawing/2014/main" xmlns="" id="{1B87E3CA-020C-4D4B-936C-0CFAEE4CB85B}"/>
                 </a:ext>
               </a:extLst>
             </p:cNvPr>
@@ -37708,7 +37932,7 @@
             <p:cNvPr id="24" name="Shape 253">
               <a:extLst>
                 <a:ext uri="{FF2B5EF4-FFF2-40B4-BE49-F238E27FC236}">
-                  <a16:creationId xmlns="" xmlns:a16="http://schemas.microsoft.com/office/drawing/2014/main" id="{65353976-FBE4-4C68-9FC5-C7AE165C9D67}"/>
+                  <a16:creationId xmlns:a16="http://schemas.microsoft.com/office/drawing/2014/main" xmlns="" id="{65353976-FBE4-4C68-9FC5-C7AE165C9D67}"/>
                 </a:ext>
               </a:extLst>
             </p:cNvPr>
@@ -37753,7 +37977,7 @@
             <p:cNvPr id="25" name="Shape 254">
               <a:extLst>
                 <a:ext uri="{FF2B5EF4-FFF2-40B4-BE49-F238E27FC236}">
-                  <a16:creationId xmlns="" xmlns:a16="http://schemas.microsoft.com/office/drawing/2014/main" id="{3364260B-6989-4066-97F8-C0A90AC3B43C}"/>
+                  <a16:creationId xmlns:a16="http://schemas.microsoft.com/office/drawing/2014/main" xmlns="" id="{3364260B-6989-4066-97F8-C0A90AC3B43C}"/>
                 </a:ext>
               </a:extLst>
             </p:cNvPr>
@@ -37796,7 +38020,7 @@
             <p:cNvPr id="26" name="Shape 255">
               <a:extLst>
                 <a:ext uri="{FF2B5EF4-FFF2-40B4-BE49-F238E27FC236}">
-                  <a16:creationId xmlns="" xmlns:a16="http://schemas.microsoft.com/office/drawing/2014/main" id="{30F5135C-AA30-463F-8E97-B498E2705E5E}"/>
+                  <a16:creationId xmlns:a16="http://schemas.microsoft.com/office/drawing/2014/main" xmlns="" id="{30F5135C-AA30-463F-8E97-B498E2705E5E}"/>
                 </a:ext>
               </a:extLst>
             </p:cNvPr>
@@ -37839,7 +38063,7 @@
             <p:cNvPr id="27" name="Shape 256">
               <a:extLst>
                 <a:ext uri="{FF2B5EF4-FFF2-40B4-BE49-F238E27FC236}">
-                  <a16:creationId xmlns="" xmlns:a16="http://schemas.microsoft.com/office/drawing/2014/main" id="{BF84871C-25E7-4056-A109-42092838DA26}"/>
+                  <a16:creationId xmlns:a16="http://schemas.microsoft.com/office/drawing/2014/main" xmlns="" id="{BF84871C-25E7-4056-A109-42092838DA26}"/>
                 </a:ext>
               </a:extLst>
             </p:cNvPr>
@@ -37882,7 +38106,7 @@
             <p:cNvPr id="28" name="Shape 257">
               <a:extLst>
                 <a:ext uri="{FF2B5EF4-FFF2-40B4-BE49-F238E27FC236}">
-                  <a16:creationId xmlns="" xmlns:a16="http://schemas.microsoft.com/office/drawing/2014/main" id="{9A652748-E156-4500-B302-B54AE96EA84D}"/>
+                  <a16:creationId xmlns:a16="http://schemas.microsoft.com/office/drawing/2014/main" xmlns="" id="{9A652748-E156-4500-B302-B54AE96EA84D}"/>
                 </a:ext>
               </a:extLst>
             </p:cNvPr>
@@ -37926,7 +38150,7 @@
           <p:cNvPr id="29" name="Shape 258">
             <a:extLst>
               <a:ext uri="{FF2B5EF4-FFF2-40B4-BE49-F238E27FC236}">
-                <a16:creationId xmlns="" xmlns:a16="http://schemas.microsoft.com/office/drawing/2014/main" id="{8DC23100-BB85-40BE-A7B5-3EFF49919F3D}"/>
+                <a16:creationId xmlns:a16="http://schemas.microsoft.com/office/drawing/2014/main" xmlns="" id="{8DC23100-BB85-40BE-A7B5-3EFF49919F3D}"/>
               </a:ext>
             </a:extLst>
           </p:cNvPr>
@@ -37969,7 +38193,7 @@
           <p:cNvPr id="30" name="Shape 259">
             <a:extLst>
               <a:ext uri="{FF2B5EF4-FFF2-40B4-BE49-F238E27FC236}">
-                <a16:creationId xmlns="" xmlns:a16="http://schemas.microsoft.com/office/drawing/2014/main" id="{561BA874-797E-4CEB-A1B9-506363DC3014}"/>
+                <a16:creationId xmlns:a16="http://schemas.microsoft.com/office/drawing/2014/main" xmlns="" id="{561BA874-797E-4CEB-A1B9-506363DC3014}"/>
               </a:ext>
             </a:extLst>
           </p:cNvPr>
@@ -38012,7 +38236,7 @@
           <p:cNvPr id="31" name="Shape 260">
             <a:extLst>
               <a:ext uri="{FF2B5EF4-FFF2-40B4-BE49-F238E27FC236}">
-                <a16:creationId xmlns="" xmlns:a16="http://schemas.microsoft.com/office/drawing/2014/main" id="{93F8D1C2-AE0C-4DA2-A896-23C6E8BB8143}"/>
+                <a16:creationId xmlns:a16="http://schemas.microsoft.com/office/drawing/2014/main" xmlns="" id="{93F8D1C2-AE0C-4DA2-A896-23C6E8BB8143}"/>
               </a:ext>
             </a:extLst>
           </p:cNvPr>
@@ -38021,8 +38245,8 @@
         </p:nvSpPr>
         <p:spPr>
           <a:xfrm>
-            <a:off x="7449288" y="4584050"/>
-            <a:ext cx="1564199" cy="942000"/>
+            <a:off x="7189076" y="4584050"/>
+            <a:ext cx="1824411" cy="942000"/>
           </a:xfrm>
           <a:prstGeom prst="rect">
             <a:avLst/>
@@ -38055,7 +38279,7 @@
           <p:cNvPr id="32" name="Shape 261">
             <a:extLst>
               <a:ext uri="{FF2B5EF4-FFF2-40B4-BE49-F238E27FC236}">
-                <a16:creationId xmlns="" xmlns:a16="http://schemas.microsoft.com/office/drawing/2014/main" id="{EE20D621-FC4D-4C52-9244-70D750EF5BA8}"/>
+                <a16:creationId xmlns:a16="http://schemas.microsoft.com/office/drawing/2014/main" xmlns="" id="{EE20D621-FC4D-4C52-9244-70D750EF5BA8}"/>
               </a:ext>
             </a:extLst>
           </p:cNvPr>
@@ -38099,7 +38323,7 @@
           <p:cNvPr id="33" name="Shape 262">
             <a:extLst>
               <a:ext uri="{FF2B5EF4-FFF2-40B4-BE49-F238E27FC236}">
-                <a16:creationId xmlns="" xmlns:a16="http://schemas.microsoft.com/office/drawing/2014/main" id="{0FC62B72-0FC7-44CD-8C71-2B73BA442E78}"/>
+                <a16:creationId xmlns:a16="http://schemas.microsoft.com/office/drawing/2014/main" xmlns="" id="{0FC62B72-0FC7-44CD-8C71-2B73BA442E78}"/>
               </a:ext>
             </a:extLst>
           </p:cNvPr>
@@ -38142,7 +38366,7 @@
           <p:cNvPr id="34" name="Shape 264">
             <a:extLst>
               <a:ext uri="{FF2B5EF4-FFF2-40B4-BE49-F238E27FC236}">
-                <a16:creationId xmlns="" xmlns:a16="http://schemas.microsoft.com/office/drawing/2014/main" id="{D6BE562C-8A03-4F70-98D8-03387C0D8B58}"/>
+                <a16:creationId xmlns:a16="http://schemas.microsoft.com/office/drawing/2014/main" xmlns="" id="{D6BE562C-8A03-4F70-98D8-03387C0D8B58}"/>
               </a:ext>
             </a:extLst>
           </p:cNvPr>
@@ -38186,7 +38410,7 @@
           <p:cNvPr id="35" name="Shape 265">
             <a:extLst>
               <a:ext uri="{FF2B5EF4-FFF2-40B4-BE49-F238E27FC236}">
-                <a16:creationId xmlns="" xmlns:a16="http://schemas.microsoft.com/office/drawing/2014/main" id="{D4038CA4-570B-4C36-8331-951AEC967B05}"/>
+                <a16:creationId xmlns:a16="http://schemas.microsoft.com/office/drawing/2014/main" xmlns="" id="{D4038CA4-570B-4C36-8331-951AEC967B05}"/>
               </a:ext>
             </a:extLst>
           </p:cNvPr>
@@ -38238,7 +38462,7 @@
           <p:cNvPr id="36" name="Shape 266">
             <a:extLst>
               <a:ext uri="{FF2B5EF4-FFF2-40B4-BE49-F238E27FC236}">
-                <a16:creationId xmlns="" xmlns:a16="http://schemas.microsoft.com/office/drawing/2014/main" id="{27DB466A-8EDA-423C-AB4A-4CE40C0B0E43}"/>
+                <a16:creationId xmlns:a16="http://schemas.microsoft.com/office/drawing/2014/main" xmlns="" id="{27DB466A-8EDA-423C-AB4A-4CE40C0B0E43}"/>
               </a:ext>
             </a:extLst>
           </p:cNvPr>
@@ -38296,7 +38520,7 @@
           <p:cNvPr id="37" name="Shape 267">
             <a:extLst>
               <a:ext uri="{FF2B5EF4-FFF2-40B4-BE49-F238E27FC236}">
-                <a16:creationId xmlns="" xmlns:a16="http://schemas.microsoft.com/office/drawing/2014/main" id="{56FCF647-38C1-447C-B65D-D9C38693F062}"/>
+                <a16:creationId xmlns:a16="http://schemas.microsoft.com/office/drawing/2014/main" xmlns="" id="{56FCF647-38C1-447C-B65D-D9C38693F062}"/>
               </a:ext>
             </a:extLst>
           </p:cNvPr>
@@ -38354,7 +38578,7 @@
           <p:cNvPr id="38" name="Shape 268">
             <a:extLst>
               <a:ext uri="{FF2B5EF4-FFF2-40B4-BE49-F238E27FC236}">
-                <a16:creationId xmlns="" xmlns:a16="http://schemas.microsoft.com/office/drawing/2014/main" id="{AD643205-7D80-417B-8C62-025D574035B3}"/>
+                <a16:creationId xmlns:a16="http://schemas.microsoft.com/office/drawing/2014/main" xmlns="" id="{AD643205-7D80-417B-8C62-025D574035B3}"/>
               </a:ext>
             </a:extLst>
           </p:cNvPr>
@@ -38399,7 +38623,7 @@
           <p:cNvPr id="39" name="Shape 269">
             <a:extLst>
               <a:ext uri="{FF2B5EF4-FFF2-40B4-BE49-F238E27FC236}">
-                <a16:creationId xmlns="" xmlns:a16="http://schemas.microsoft.com/office/drawing/2014/main" id="{20526A6F-5E4D-4F78-8F70-63773D75BDCB}"/>
+                <a16:creationId xmlns:a16="http://schemas.microsoft.com/office/drawing/2014/main" xmlns="" id="{20526A6F-5E4D-4F78-8F70-63773D75BDCB}"/>
               </a:ext>
             </a:extLst>
           </p:cNvPr>
@@ -38442,7 +38666,7 @@
           <p:cNvPr id="40" name="Shape 270">
             <a:extLst>
               <a:ext uri="{FF2B5EF4-FFF2-40B4-BE49-F238E27FC236}">
-                <a16:creationId xmlns="" xmlns:a16="http://schemas.microsoft.com/office/drawing/2014/main" id="{04960449-D785-4670-BFFA-566822518620}"/>
+                <a16:creationId xmlns:a16="http://schemas.microsoft.com/office/drawing/2014/main" xmlns="" id="{04960449-D785-4670-BFFA-566822518620}"/>
               </a:ext>
             </a:extLst>
           </p:cNvPr>
@@ -38504,7 +38728,7 @@
           <p:cNvPr id="2" name="Date Placeholder 1">
             <a:extLst>
               <a:ext uri="{FF2B5EF4-FFF2-40B4-BE49-F238E27FC236}">
-                <a16:creationId xmlns="" xmlns:a16="http://schemas.microsoft.com/office/drawing/2014/main" id="{F0C49392-A6AB-454B-A8CE-1A222F99465B}"/>
+                <a16:creationId xmlns:a16="http://schemas.microsoft.com/office/drawing/2014/main" xmlns="" id="{F0C49392-A6AB-454B-A8CE-1A222F99465B}"/>
               </a:ext>
             </a:extLst>
           </p:cNvPr>
@@ -38522,7 +38746,7 @@
           <a:p>
             <a:fld id="{6700A58B-DD98-43D0-B791-721480A02982}" type="datetime1">
               <a:rPr lang="en-US" smtClean="0"/>
-              <a:t>6/7/2019</a:t>
+              <a:t>6/18/2019</a:t>
             </a:fld>
             <a:endParaRPr lang="en-US"/>
           </a:p>
@@ -38533,7 +38757,7 @@
           <p:cNvPr id="3" name="Title 2">
             <a:extLst>
               <a:ext uri="{FF2B5EF4-FFF2-40B4-BE49-F238E27FC236}">
-                <a16:creationId xmlns="" xmlns:a16="http://schemas.microsoft.com/office/drawing/2014/main" id="{84D6A954-5268-46B6-A543-95112466DB47}"/>
+                <a16:creationId xmlns:a16="http://schemas.microsoft.com/office/drawing/2014/main" xmlns="" id="{84D6A954-5268-46B6-A543-95112466DB47}"/>
               </a:ext>
             </a:extLst>
           </p:cNvPr>
@@ -38561,7 +38785,7 @@
           <p:cNvPr id="4" name="Footer Placeholder 3">
             <a:extLst>
               <a:ext uri="{FF2B5EF4-FFF2-40B4-BE49-F238E27FC236}">
-                <a16:creationId xmlns="" xmlns:a16="http://schemas.microsoft.com/office/drawing/2014/main" id="{4BC7F7B4-D656-41A4-A871-BFDE44C52003}"/>
+                <a16:creationId xmlns:a16="http://schemas.microsoft.com/office/drawing/2014/main" xmlns="" id="{4BC7F7B4-D656-41A4-A871-BFDE44C52003}"/>
               </a:ext>
             </a:extLst>
           </p:cNvPr>
@@ -38590,7 +38814,7 @@
           <p:cNvPr id="5" name="Slide Number Placeholder 4">
             <a:extLst>
               <a:ext uri="{FF2B5EF4-FFF2-40B4-BE49-F238E27FC236}">
-                <a16:creationId xmlns="" xmlns:a16="http://schemas.microsoft.com/office/drawing/2014/main" id="{A6021B5F-8FDA-4E62-A89E-D815A486DD8E}"/>
+                <a16:creationId xmlns:a16="http://schemas.microsoft.com/office/drawing/2014/main" xmlns="" id="{A6021B5F-8FDA-4E62-A89E-D815A486DD8E}"/>
               </a:ext>
             </a:extLst>
           </p:cNvPr>
@@ -38620,7 +38844,7 @@
           <p:cNvPr id="6" name="Rectangle 5">
             <a:extLst>
               <a:ext uri="{FF2B5EF4-FFF2-40B4-BE49-F238E27FC236}">
-                <a16:creationId xmlns="" xmlns:a16="http://schemas.microsoft.com/office/drawing/2014/main" id="{0551F8BD-DC5B-4CDE-B3CC-716D55A4B32F}"/>
+                <a16:creationId xmlns:a16="http://schemas.microsoft.com/office/drawing/2014/main" xmlns="" id="{0551F8BD-DC5B-4CDE-B3CC-716D55A4B32F}"/>
               </a:ext>
             </a:extLst>
           </p:cNvPr>
@@ -38675,7 +38899,7 @@
           <p:cNvPr id="7" name="Rectangle 6">
             <a:extLst>
               <a:ext uri="{FF2B5EF4-FFF2-40B4-BE49-F238E27FC236}">
-                <a16:creationId xmlns="" xmlns:a16="http://schemas.microsoft.com/office/drawing/2014/main" id="{30C04625-BB82-4F8B-88E1-7D53E1BE9899}"/>
+                <a16:creationId xmlns:a16="http://schemas.microsoft.com/office/drawing/2014/main" xmlns="" id="{30C04625-BB82-4F8B-88E1-7D53E1BE9899}"/>
               </a:ext>
             </a:extLst>
           </p:cNvPr>
@@ -38730,7 +38954,7 @@
           <p:cNvPr id="8" name="TextBox 7">
             <a:extLst>
               <a:ext uri="{FF2B5EF4-FFF2-40B4-BE49-F238E27FC236}">
-                <a16:creationId xmlns="" xmlns:a16="http://schemas.microsoft.com/office/drawing/2014/main" id="{F93AAA8F-CCD8-47AF-ACD5-9B3FE1A08D75}"/>
+                <a16:creationId xmlns:a16="http://schemas.microsoft.com/office/drawing/2014/main" xmlns="" id="{F93AAA8F-CCD8-47AF-ACD5-9B3FE1A08D75}"/>
               </a:ext>
             </a:extLst>
           </p:cNvPr>
@@ -38783,7 +39007,7 @@
           <p:cNvPr id="9" name="TextBox 8">
             <a:extLst>
               <a:ext uri="{FF2B5EF4-FFF2-40B4-BE49-F238E27FC236}">
-                <a16:creationId xmlns="" xmlns:a16="http://schemas.microsoft.com/office/drawing/2014/main" id="{934EF37A-D94F-4C72-8CF4-D671A1C7D8CA}"/>
+                <a16:creationId xmlns:a16="http://schemas.microsoft.com/office/drawing/2014/main" xmlns="" id="{934EF37A-D94F-4C72-8CF4-D671A1C7D8CA}"/>
               </a:ext>
             </a:extLst>
           </p:cNvPr>
@@ -38818,7 +39042,7 @@
           <p:cNvPr id="10" name="Picture 2" descr="Image result for fish meme">
             <a:extLst>
               <a:ext uri="{FF2B5EF4-FFF2-40B4-BE49-F238E27FC236}">
-                <a16:creationId xmlns="" xmlns:a16="http://schemas.microsoft.com/office/drawing/2014/main" id="{D62B2144-0B9D-4419-B583-F2A5706E4E88}"/>
+                <a16:creationId xmlns:a16="http://schemas.microsoft.com/office/drawing/2014/main" xmlns="" id="{D62B2144-0B9D-4419-B583-F2A5706E4E88}"/>
               </a:ext>
             </a:extLst>
           </p:cNvPr>
@@ -38895,7 +39119,7 @@
           <p:cNvPr id="2" name="Date Placeholder 1">
             <a:extLst>
               <a:ext uri="{FF2B5EF4-FFF2-40B4-BE49-F238E27FC236}">
-                <a16:creationId xmlns="" xmlns:a16="http://schemas.microsoft.com/office/drawing/2014/main" id="{F0C49392-A6AB-454B-A8CE-1A222F99465B}"/>
+                <a16:creationId xmlns:a16="http://schemas.microsoft.com/office/drawing/2014/main" xmlns="" id="{F0C49392-A6AB-454B-A8CE-1A222F99465B}"/>
               </a:ext>
             </a:extLst>
           </p:cNvPr>
@@ -38913,7 +39137,7 @@
           <a:p>
             <a:fld id="{6700A58B-DD98-43D0-B791-721480A02982}" type="datetime1">
               <a:rPr lang="en-US" smtClean="0"/>
-              <a:t>6/7/2019</a:t>
+              <a:t>6/18/2019</a:t>
             </a:fld>
             <a:endParaRPr lang="en-US"/>
           </a:p>
@@ -38924,7 +39148,7 @@
           <p:cNvPr id="3" name="Title 2">
             <a:extLst>
               <a:ext uri="{FF2B5EF4-FFF2-40B4-BE49-F238E27FC236}">
-                <a16:creationId xmlns="" xmlns:a16="http://schemas.microsoft.com/office/drawing/2014/main" id="{84D6A954-5268-46B6-A543-95112466DB47}"/>
+                <a16:creationId xmlns:a16="http://schemas.microsoft.com/office/drawing/2014/main" xmlns="" id="{84D6A954-5268-46B6-A543-95112466DB47}"/>
               </a:ext>
             </a:extLst>
           </p:cNvPr>
@@ -38952,7 +39176,7 @@
           <p:cNvPr id="4" name="Footer Placeholder 3">
             <a:extLst>
               <a:ext uri="{FF2B5EF4-FFF2-40B4-BE49-F238E27FC236}">
-                <a16:creationId xmlns="" xmlns:a16="http://schemas.microsoft.com/office/drawing/2014/main" id="{4BC7F7B4-D656-41A4-A871-BFDE44C52003}"/>
+                <a16:creationId xmlns:a16="http://schemas.microsoft.com/office/drawing/2014/main" xmlns="" id="{4BC7F7B4-D656-41A4-A871-BFDE44C52003}"/>
               </a:ext>
             </a:extLst>
           </p:cNvPr>
@@ -38981,7 +39205,7 @@
           <p:cNvPr id="5" name="Slide Number Placeholder 4">
             <a:extLst>
               <a:ext uri="{FF2B5EF4-FFF2-40B4-BE49-F238E27FC236}">
-                <a16:creationId xmlns="" xmlns:a16="http://schemas.microsoft.com/office/drawing/2014/main" id="{A6021B5F-8FDA-4E62-A89E-D815A486DD8E}"/>
+                <a16:creationId xmlns:a16="http://schemas.microsoft.com/office/drawing/2014/main" xmlns="" id="{A6021B5F-8FDA-4E62-A89E-D815A486DD8E}"/>
               </a:ext>
             </a:extLst>
           </p:cNvPr>
@@ -39011,7 +39235,7 @@
           <p:cNvPr id="6" name="Rectangle 5">
             <a:extLst>
               <a:ext uri="{FF2B5EF4-FFF2-40B4-BE49-F238E27FC236}">
-                <a16:creationId xmlns="" xmlns:a16="http://schemas.microsoft.com/office/drawing/2014/main" id="{0551F8BD-DC5B-4CDE-B3CC-716D55A4B32F}"/>
+                <a16:creationId xmlns:a16="http://schemas.microsoft.com/office/drawing/2014/main" xmlns="" id="{0551F8BD-DC5B-4CDE-B3CC-716D55A4B32F}"/>
               </a:ext>
             </a:extLst>
           </p:cNvPr>
@@ -39066,7 +39290,7 @@
           <p:cNvPr id="7" name="Rectangle 6">
             <a:extLst>
               <a:ext uri="{FF2B5EF4-FFF2-40B4-BE49-F238E27FC236}">
-                <a16:creationId xmlns="" xmlns:a16="http://schemas.microsoft.com/office/drawing/2014/main" id="{30C04625-BB82-4F8B-88E1-7D53E1BE9899}"/>
+                <a16:creationId xmlns:a16="http://schemas.microsoft.com/office/drawing/2014/main" xmlns="" id="{30C04625-BB82-4F8B-88E1-7D53E1BE9899}"/>
               </a:ext>
             </a:extLst>
           </p:cNvPr>
@@ -39121,7 +39345,7 @@
           <p:cNvPr id="8" name="TextBox 7">
             <a:extLst>
               <a:ext uri="{FF2B5EF4-FFF2-40B4-BE49-F238E27FC236}">
-                <a16:creationId xmlns="" xmlns:a16="http://schemas.microsoft.com/office/drawing/2014/main" id="{F93AAA8F-CCD8-47AF-ACD5-9B3FE1A08D75}"/>
+                <a16:creationId xmlns:a16="http://schemas.microsoft.com/office/drawing/2014/main" xmlns="" id="{F93AAA8F-CCD8-47AF-ACD5-9B3FE1A08D75}"/>
               </a:ext>
             </a:extLst>
           </p:cNvPr>
@@ -39175,7 +39399,7 @@
           <p:cNvPr id="11" name="TextBox 10">
             <a:extLst>
               <a:ext uri="{FF2B5EF4-FFF2-40B4-BE49-F238E27FC236}">
-                <a16:creationId xmlns="" xmlns:a16="http://schemas.microsoft.com/office/drawing/2014/main" id="{185ACFEF-A83E-43D9-AD64-E503AF112C5B}"/>
+                <a16:creationId xmlns:a16="http://schemas.microsoft.com/office/drawing/2014/main" xmlns="" id="{185ACFEF-A83E-43D9-AD64-E503AF112C5B}"/>
               </a:ext>
             </a:extLst>
           </p:cNvPr>
@@ -39200,11 +39424,15 @@
           <a:p>
             <a:r>
               <a:rPr lang="en-US" dirty="0"/>
-              <a:t>What are </a:t>
+              <a:t>What </a:t>
             </a:r>
             <a:r>
               <a:rPr lang="en-US" dirty="0" smtClean="0"/>
-              <a:t>observed customer personas exist in our customer data?</a:t>
+              <a:t>observed </a:t>
+            </a:r>
+            <a:r>
+              <a:rPr lang="en-US" dirty="0" smtClean="0"/>
+              <a:t>customer personas exist in our customer data?</a:t>
             </a:r>
             <a:endParaRPr lang="en-US" dirty="0"/>
           </a:p>
@@ -39215,7 +39443,7 @@
           <p:cNvPr id="12" name="Picture 2" descr="Image result for customer meme">
             <a:extLst>
               <a:ext uri="{FF2B5EF4-FFF2-40B4-BE49-F238E27FC236}">
-                <a16:creationId xmlns="" xmlns:a16="http://schemas.microsoft.com/office/drawing/2014/main" id="{562B01F6-715B-4C68-B81A-9A9BB211D747}"/>
+                <a16:creationId xmlns:a16="http://schemas.microsoft.com/office/drawing/2014/main" xmlns="" id="{562B01F6-715B-4C68-B81A-9A9BB211D747}"/>
               </a:ext>
             </a:extLst>
           </p:cNvPr>

</xml_diff>

<commit_message>
add better cosine similarity explanation
</commit_message>
<xml_diff>
--- a/C_Wednesday/GSERM_Wedsnesday_UnsupervisedApproaches.pptx
+++ b/C_Wednesday/GSERM_Wedsnesday_UnsupervisedApproaches.pptx
@@ -5,7 +5,7 @@
     <p:sldMasterId id="2147483660" r:id="rId1"/>
   </p:sldMasterIdLst>
   <p:notesMasterIdLst>
-    <p:notesMasterId r:id="rId45"/>
+    <p:notesMasterId r:id="rId48"/>
   </p:notesMasterIdLst>
   <p:sldIdLst>
     <p:sldId id="593" r:id="rId2"/>
@@ -47,10 +47,13 @@
     <p:sldId id="853" r:id="rId38"/>
     <p:sldId id="833" r:id="rId39"/>
     <p:sldId id="854" r:id="rId40"/>
-    <p:sldId id="832" r:id="rId41"/>
-    <p:sldId id="855" r:id="rId42"/>
-    <p:sldId id="856" r:id="rId43"/>
-    <p:sldId id="834" r:id="rId44"/>
+    <p:sldId id="857" r:id="rId41"/>
+    <p:sldId id="858" r:id="rId42"/>
+    <p:sldId id="859" r:id="rId43"/>
+    <p:sldId id="832" r:id="rId44"/>
+    <p:sldId id="855" r:id="rId45"/>
+    <p:sldId id="856" r:id="rId46"/>
+    <p:sldId id="834" r:id="rId47"/>
   </p:sldIdLst>
   <p:sldSz cx="9144000" cy="6858000" type="screen4x3"/>
   <p:notesSz cx="6858000" cy="9144000"/>
@@ -1109,11 +1112,11 @@
           <c:showPercent val="0"/>
           <c:showBubbleSize val="0"/>
         </c:dLbls>
-        <c:axId val="294305616"/>
-        <c:axId val="294306400"/>
+        <c:axId val="305932312"/>
+        <c:axId val="305929960"/>
       </c:scatterChart>
       <c:valAx>
-        <c:axId val="294305616"/>
+        <c:axId val="305932312"/>
         <c:scaling>
           <c:orientation val="minMax"/>
         </c:scaling>
@@ -1155,12 +1158,12 @@
             <a:endParaRPr lang="en-US"/>
           </a:p>
         </c:txPr>
-        <c:crossAx val="294306400"/>
+        <c:crossAx val="305929960"/>
         <c:crosses val="autoZero"/>
         <c:crossBetween val="midCat"/>
       </c:valAx>
       <c:valAx>
-        <c:axId val="294306400"/>
+        <c:axId val="305929960"/>
         <c:scaling>
           <c:orientation val="minMax"/>
         </c:scaling>
@@ -1203,7 +1206,7 @@
             <a:endParaRPr lang="en-US"/>
           </a:p>
         </c:txPr>
-        <c:crossAx val="294305616"/>
+        <c:crossAx val="305932312"/>
         <c:crosses val="autoZero"/>
         <c:crossBetween val="midCat"/>
       </c:valAx>
@@ -2177,11 +2180,11 @@
           <c:showPercent val="0"/>
           <c:showBubbleSize val="0"/>
         </c:dLbls>
-        <c:axId val="294303656"/>
-        <c:axId val="294300520"/>
+        <c:axId val="383907784"/>
+        <c:axId val="383910528"/>
       </c:scatterChart>
       <c:valAx>
-        <c:axId val="294303656"/>
+        <c:axId val="383907784"/>
         <c:scaling>
           <c:orientation val="minMax"/>
         </c:scaling>
@@ -2223,12 +2226,12 @@
             <a:endParaRPr lang="en-US"/>
           </a:p>
         </c:txPr>
-        <c:crossAx val="294300520"/>
+        <c:crossAx val="383910528"/>
         <c:crosses val="autoZero"/>
         <c:crossBetween val="midCat"/>
       </c:valAx>
       <c:valAx>
-        <c:axId val="294300520"/>
+        <c:axId val="383910528"/>
         <c:scaling>
           <c:orientation val="minMax"/>
         </c:scaling>
@@ -2271,7 +2274,7 @@
             <a:endParaRPr lang="en-US"/>
           </a:p>
         </c:txPr>
-        <c:crossAx val="294303656"/>
+        <c:crossAx val="383907784"/>
         <c:crosses val="autoZero"/>
         <c:crossBetween val="midCat"/>
       </c:valAx>
@@ -3245,11 +3248,11 @@
           <c:showPercent val="0"/>
           <c:showBubbleSize val="0"/>
         </c:dLbls>
-        <c:axId val="294304048"/>
-        <c:axId val="294300912"/>
+        <c:axId val="383908176"/>
+        <c:axId val="383912096"/>
       </c:scatterChart>
       <c:valAx>
-        <c:axId val="294304048"/>
+        <c:axId val="383908176"/>
         <c:scaling>
           <c:orientation val="minMax"/>
         </c:scaling>
@@ -3291,12 +3294,12 @@
             <a:endParaRPr lang="en-US"/>
           </a:p>
         </c:txPr>
-        <c:crossAx val="294300912"/>
+        <c:crossAx val="383912096"/>
         <c:crosses val="autoZero"/>
         <c:crossBetween val="midCat"/>
       </c:valAx>
       <c:valAx>
-        <c:axId val="294300912"/>
+        <c:axId val="383912096"/>
         <c:scaling>
           <c:orientation val="minMax"/>
         </c:scaling>
@@ -3339,7 +3342,7 @@
             <a:endParaRPr lang="en-US"/>
           </a:p>
         </c:txPr>
-        <c:crossAx val="294304048"/>
+        <c:crossAx val="383908176"/>
         <c:crosses val="autoZero"/>
         <c:crossBetween val="midCat"/>
       </c:valAx>
@@ -4313,11 +4316,11 @@
           <c:showPercent val="0"/>
           <c:showBubbleSize val="0"/>
         </c:dLbls>
-        <c:axId val="294302088"/>
-        <c:axId val="294302872"/>
+        <c:axId val="383907392"/>
+        <c:axId val="383910136"/>
       </c:scatterChart>
       <c:valAx>
-        <c:axId val="294302088"/>
+        <c:axId val="383907392"/>
         <c:scaling>
           <c:orientation val="minMax"/>
         </c:scaling>
@@ -4359,12 +4362,12 @@
             <a:endParaRPr lang="en-US"/>
           </a:p>
         </c:txPr>
-        <c:crossAx val="294302872"/>
+        <c:crossAx val="383910136"/>
         <c:crosses val="autoZero"/>
         <c:crossBetween val="midCat"/>
       </c:valAx>
       <c:valAx>
-        <c:axId val="294302872"/>
+        <c:axId val="383910136"/>
         <c:scaling>
           <c:orientation val="minMax"/>
         </c:scaling>
@@ -4407,7 +4410,7 @@
             <a:endParaRPr lang="en-US"/>
           </a:p>
         </c:txPr>
-        <c:crossAx val="294302088"/>
+        <c:crossAx val="383907392"/>
         <c:crosses val="autoZero"/>
         <c:crossBetween val="midCat"/>
       </c:valAx>
@@ -5381,11 +5384,11 @@
           <c:showPercent val="0"/>
           <c:showBubbleSize val="0"/>
         </c:dLbls>
-        <c:axId val="364784800"/>
-        <c:axId val="364780488"/>
+        <c:axId val="383908960"/>
+        <c:axId val="383911704"/>
       </c:scatterChart>
       <c:valAx>
-        <c:axId val="364784800"/>
+        <c:axId val="383908960"/>
         <c:scaling>
           <c:orientation val="minMax"/>
         </c:scaling>
@@ -5427,12 +5430,12 @@
             <a:endParaRPr lang="en-US"/>
           </a:p>
         </c:txPr>
-        <c:crossAx val="364780488"/>
+        <c:crossAx val="383911704"/>
         <c:crosses val="autoZero"/>
         <c:crossBetween val="midCat"/>
       </c:valAx>
       <c:valAx>
-        <c:axId val="364780488"/>
+        <c:axId val="383911704"/>
         <c:scaling>
           <c:orientation val="minMax"/>
         </c:scaling>
@@ -5475,7 +5478,7 @@
             <a:endParaRPr lang="en-US"/>
           </a:p>
         </c:txPr>
-        <c:crossAx val="364784800"/>
+        <c:crossAx val="383908960"/>
         <c:crosses val="autoZero"/>
         <c:crossBetween val="midCat"/>
       </c:valAx>
@@ -6449,11 +6452,11 @@
           <c:showPercent val="0"/>
           <c:showBubbleSize val="0"/>
         </c:dLbls>
-        <c:axId val="364779704"/>
-        <c:axId val="364782056"/>
+        <c:axId val="383912488"/>
+        <c:axId val="383912880"/>
       </c:scatterChart>
       <c:valAx>
-        <c:axId val="364779704"/>
+        <c:axId val="383912488"/>
         <c:scaling>
           <c:orientation val="minMax"/>
         </c:scaling>
@@ -6495,12 +6498,12 @@
             <a:endParaRPr lang="en-US"/>
           </a:p>
         </c:txPr>
-        <c:crossAx val="364782056"/>
+        <c:crossAx val="383912880"/>
         <c:crosses val="autoZero"/>
         <c:crossBetween val="midCat"/>
       </c:valAx>
       <c:valAx>
-        <c:axId val="364782056"/>
+        <c:axId val="383912880"/>
         <c:scaling>
           <c:orientation val="minMax"/>
         </c:scaling>
@@ -6543,7 +6546,7 @@
             <a:endParaRPr lang="en-US"/>
           </a:p>
         </c:txPr>
-        <c:crossAx val="364779704"/>
+        <c:crossAx val="383912488"/>
         <c:crosses val="autoZero"/>
         <c:crossBetween val="midCat"/>
       </c:valAx>
@@ -7517,11 +7520,11 @@
           <c:showPercent val="0"/>
           <c:showBubbleSize val="0"/>
         </c:dLbls>
-        <c:axId val="364781664"/>
-        <c:axId val="364783232"/>
+        <c:axId val="383906608"/>
+        <c:axId val="383907000"/>
       </c:scatterChart>
       <c:valAx>
-        <c:axId val="364781664"/>
+        <c:axId val="383906608"/>
         <c:scaling>
           <c:orientation val="minMax"/>
         </c:scaling>
@@ -7563,12 +7566,12 @@
             <a:endParaRPr lang="en-US"/>
           </a:p>
         </c:txPr>
-        <c:crossAx val="364783232"/>
+        <c:crossAx val="383907000"/>
         <c:crosses val="autoZero"/>
         <c:crossBetween val="midCat"/>
       </c:valAx>
       <c:valAx>
-        <c:axId val="364783232"/>
+        <c:axId val="383907000"/>
         <c:scaling>
           <c:orientation val="minMax"/>
         </c:scaling>
@@ -7611,7 +7614,7 @@
             <a:endParaRPr lang="en-US"/>
           </a:p>
         </c:txPr>
-        <c:crossAx val="364781664"/>
+        <c:crossAx val="383906608"/>
         <c:crosses val="autoZero"/>
         <c:crossBetween val="midCat"/>
       </c:valAx>
@@ -8585,11 +8588,11 @@
           <c:showPercent val="0"/>
           <c:showBubbleSize val="0"/>
         </c:dLbls>
-        <c:axId val="364783624"/>
-        <c:axId val="364782448"/>
+        <c:axId val="384808856"/>
+        <c:axId val="384813168"/>
       </c:scatterChart>
       <c:valAx>
-        <c:axId val="364783624"/>
+        <c:axId val="384808856"/>
         <c:scaling>
           <c:orientation val="minMax"/>
         </c:scaling>
@@ -8631,12 +8634,12 @@
             <a:endParaRPr lang="en-US"/>
           </a:p>
         </c:txPr>
-        <c:crossAx val="364782448"/>
+        <c:crossAx val="384813168"/>
         <c:crosses val="autoZero"/>
         <c:crossBetween val="midCat"/>
       </c:valAx>
       <c:valAx>
-        <c:axId val="364782448"/>
+        <c:axId val="384813168"/>
         <c:scaling>
           <c:orientation val="minMax"/>
         </c:scaling>
@@ -8679,7 +8682,7 @@
             <a:endParaRPr lang="en-US"/>
           </a:p>
         </c:txPr>
-        <c:crossAx val="364783624"/>
+        <c:crossAx val="384808856"/>
         <c:crosses val="autoZero"/>
         <c:crossBetween val="midCat"/>
       </c:valAx>
@@ -9653,11 +9656,11 @@
           <c:showPercent val="0"/>
           <c:showBubbleSize val="0"/>
         </c:dLbls>
-        <c:axId val="364786760"/>
-        <c:axId val="364787152"/>
+        <c:axId val="384812776"/>
+        <c:axId val="384810816"/>
       </c:scatterChart>
       <c:valAx>
-        <c:axId val="364786760"/>
+        <c:axId val="384812776"/>
         <c:scaling>
           <c:orientation val="minMax"/>
         </c:scaling>
@@ -9699,12 +9702,12 @@
             <a:endParaRPr lang="en-US"/>
           </a:p>
         </c:txPr>
-        <c:crossAx val="364787152"/>
+        <c:crossAx val="384810816"/>
         <c:crosses val="autoZero"/>
         <c:crossBetween val="midCat"/>
       </c:valAx>
       <c:valAx>
-        <c:axId val="364787152"/>
+        <c:axId val="384810816"/>
         <c:scaling>
           <c:orientation val="minMax"/>
         </c:scaling>
@@ -9747,7 +9750,7 @@
             <a:endParaRPr lang="en-US"/>
           </a:p>
         </c:txPr>
-        <c:crossAx val="364786760"/>
+        <c:crossAx val="384812776"/>
         <c:crosses val="autoZero"/>
         <c:crossBetween val="midCat"/>
       </c:valAx>
@@ -19376,7 +19379,7 @@
           <p:cNvPr id="2" name="Date Placeholder 1">
             <a:extLst>
               <a:ext uri="{FF2B5EF4-FFF2-40B4-BE49-F238E27FC236}">
-                <a16:creationId xmlns:a16="http://schemas.microsoft.com/office/drawing/2014/main" xmlns="" id="{F0C49392-A6AB-454B-A8CE-1A222F99465B}"/>
+                <a16:creationId xmlns="" xmlns:a16="http://schemas.microsoft.com/office/drawing/2014/main" id="{F0C49392-A6AB-454B-A8CE-1A222F99465B}"/>
               </a:ext>
             </a:extLst>
           </p:cNvPr>
@@ -19405,7 +19408,7 @@
           <p:cNvPr id="3" name="Title 2">
             <a:extLst>
               <a:ext uri="{FF2B5EF4-FFF2-40B4-BE49-F238E27FC236}">
-                <a16:creationId xmlns:a16="http://schemas.microsoft.com/office/drawing/2014/main" xmlns="" id="{84D6A954-5268-46B6-A543-95112466DB47}"/>
+                <a16:creationId xmlns="" xmlns:a16="http://schemas.microsoft.com/office/drawing/2014/main" id="{84D6A954-5268-46B6-A543-95112466DB47}"/>
               </a:ext>
             </a:extLst>
           </p:cNvPr>
@@ -19433,7 +19436,7 @@
           <p:cNvPr id="4" name="Footer Placeholder 3">
             <a:extLst>
               <a:ext uri="{FF2B5EF4-FFF2-40B4-BE49-F238E27FC236}">
-                <a16:creationId xmlns:a16="http://schemas.microsoft.com/office/drawing/2014/main" xmlns="" id="{4BC7F7B4-D656-41A4-A871-BFDE44C52003}"/>
+                <a16:creationId xmlns="" xmlns:a16="http://schemas.microsoft.com/office/drawing/2014/main" id="{4BC7F7B4-D656-41A4-A871-BFDE44C52003}"/>
               </a:ext>
             </a:extLst>
           </p:cNvPr>
@@ -19462,7 +19465,7 @@
           <p:cNvPr id="5" name="Slide Number Placeholder 4">
             <a:extLst>
               <a:ext uri="{FF2B5EF4-FFF2-40B4-BE49-F238E27FC236}">
-                <a16:creationId xmlns:a16="http://schemas.microsoft.com/office/drawing/2014/main" xmlns="" id="{A6021B5F-8FDA-4E62-A89E-D815A486DD8E}"/>
+                <a16:creationId xmlns="" xmlns:a16="http://schemas.microsoft.com/office/drawing/2014/main" id="{A6021B5F-8FDA-4E62-A89E-D815A486DD8E}"/>
               </a:ext>
             </a:extLst>
           </p:cNvPr>
@@ -19492,7 +19495,7 @@
           <p:cNvPr id="6" name="Rectangle 5">
             <a:extLst>
               <a:ext uri="{FF2B5EF4-FFF2-40B4-BE49-F238E27FC236}">
-                <a16:creationId xmlns:a16="http://schemas.microsoft.com/office/drawing/2014/main" xmlns="" id="{0551F8BD-DC5B-4CDE-B3CC-716D55A4B32F}"/>
+                <a16:creationId xmlns="" xmlns:a16="http://schemas.microsoft.com/office/drawing/2014/main" id="{0551F8BD-DC5B-4CDE-B3CC-716D55A4B32F}"/>
               </a:ext>
             </a:extLst>
           </p:cNvPr>
@@ -19547,7 +19550,7 @@
           <p:cNvPr id="7" name="Rectangle 6">
             <a:extLst>
               <a:ext uri="{FF2B5EF4-FFF2-40B4-BE49-F238E27FC236}">
-                <a16:creationId xmlns:a16="http://schemas.microsoft.com/office/drawing/2014/main" xmlns="" id="{30C04625-BB82-4F8B-88E1-7D53E1BE9899}"/>
+                <a16:creationId xmlns="" xmlns:a16="http://schemas.microsoft.com/office/drawing/2014/main" id="{30C04625-BB82-4F8B-88E1-7D53E1BE9899}"/>
               </a:ext>
             </a:extLst>
           </p:cNvPr>
@@ -19602,7 +19605,7 @@
           <p:cNvPr id="8" name="TextBox 7">
             <a:extLst>
               <a:ext uri="{FF2B5EF4-FFF2-40B4-BE49-F238E27FC236}">
-                <a16:creationId xmlns:a16="http://schemas.microsoft.com/office/drawing/2014/main" xmlns="" id="{F93AAA8F-CCD8-47AF-ACD5-9B3FE1A08D75}"/>
+                <a16:creationId xmlns="" xmlns:a16="http://schemas.microsoft.com/office/drawing/2014/main" id="{F93AAA8F-CCD8-47AF-ACD5-9B3FE1A08D75}"/>
               </a:ext>
             </a:extLst>
           </p:cNvPr>
@@ -19656,7 +19659,7 @@
           <p:cNvPr id="13" name="TextBox 12">
             <a:extLst>
               <a:ext uri="{FF2B5EF4-FFF2-40B4-BE49-F238E27FC236}">
-                <a16:creationId xmlns:a16="http://schemas.microsoft.com/office/drawing/2014/main" xmlns="" id="{243A2CD2-CDC4-4055-BE5C-7ACF1E7F8744}"/>
+                <a16:creationId xmlns="" xmlns:a16="http://schemas.microsoft.com/office/drawing/2014/main" id="{243A2CD2-CDC4-4055-BE5C-7ACF1E7F8744}"/>
               </a:ext>
             </a:extLst>
           </p:cNvPr>
@@ -19691,7 +19694,7 @@
           <p:cNvPr id="14" name="Picture 2" descr="Image result for urgent care meme">
             <a:extLst>
               <a:ext uri="{FF2B5EF4-FFF2-40B4-BE49-F238E27FC236}">
-                <a16:creationId xmlns:a16="http://schemas.microsoft.com/office/drawing/2014/main" xmlns="" id="{EC2819AE-2602-4F99-A8F9-D64374B3D21B}"/>
+                <a16:creationId xmlns="" xmlns:a16="http://schemas.microsoft.com/office/drawing/2014/main" id="{EC2819AE-2602-4F99-A8F9-D64374B3D21B}"/>
               </a:ext>
             </a:extLst>
           </p:cNvPr>
@@ -19768,7 +19771,7 @@
           <p:cNvPr id="2" name="Date Placeholder 1">
             <a:extLst>
               <a:ext uri="{FF2B5EF4-FFF2-40B4-BE49-F238E27FC236}">
-                <a16:creationId xmlns:a16="http://schemas.microsoft.com/office/drawing/2014/main" xmlns="" id="{22F58142-1FC6-48E2-930A-1ABCA90382F2}"/>
+                <a16:creationId xmlns="" xmlns:a16="http://schemas.microsoft.com/office/drawing/2014/main" id="{22F58142-1FC6-48E2-930A-1ABCA90382F2}"/>
               </a:ext>
             </a:extLst>
           </p:cNvPr>
@@ -19797,7 +19800,7 @@
           <p:cNvPr id="3" name="Title 2">
             <a:extLst>
               <a:ext uri="{FF2B5EF4-FFF2-40B4-BE49-F238E27FC236}">
-                <a16:creationId xmlns:a16="http://schemas.microsoft.com/office/drawing/2014/main" xmlns="" id="{7DCBF78D-BB30-4EA4-92FF-5894C071CDEA}"/>
+                <a16:creationId xmlns="" xmlns:a16="http://schemas.microsoft.com/office/drawing/2014/main" id="{7DCBF78D-BB30-4EA4-92FF-5894C071CDEA}"/>
               </a:ext>
             </a:extLst>
           </p:cNvPr>
@@ -19834,7 +19837,7 @@
           <p:cNvPr id="4" name="Footer Placeholder 3">
             <a:extLst>
               <a:ext uri="{FF2B5EF4-FFF2-40B4-BE49-F238E27FC236}">
-                <a16:creationId xmlns:a16="http://schemas.microsoft.com/office/drawing/2014/main" xmlns="" id="{D63754AC-4F6B-470A-A2CB-89FECF37CBF9}"/>
+                <a16:creationId xmlns="" xmlns:a16="http://schemas.microsoft.com/office/drawing/2014/main" id="{D63754AC-4F6B-470A-A2CB-89FECF37CBF9}"/>
               </a:ext>
             </a:extLst>
           </p:cNvPr>
@@ -19863,7 +19866,7 @@
           <p:cNvPr id="5" name="Slide Number Placeholder 4">
             <a:extLst>
               <a:ext uri="{FF2B5EF4-FFF2-40B4-BE49-F238E27FC236}">
-                <a16:creationId xmlns:a16="http://schemas.microsoft.com/office/drawing/2014/main" xmlns="" id="{526D72EA-36BA-4EE2-AC65-5EEDC382AA55}"/>
+                <a16:creationId xmlns="" xmlns:a16="http://schemas.microsoft.com/office/drawing/2014/main" id="{526D72EA-36BA-4EE2-AC65-5EEDC382AA55}"/>
               </a:ext>
             </a:extLst>
           </p:cNvPr>
@@ -19893,7 +19896,7 @@
           <p:cNvPr id="6" name="TextBox 5">
             <a:extLst>
               <a:ext uri="{FF2B5EF4-FFF2-40B4-BE49-F238E27FC236}">
-                <a16:creationId xmlns:a16="http://schemas.microsoft.com/office/drawing/2014/main" xmlns="" id="{3E747EA3-1AA2-44C7-B883-3A43CAA0B9EE}"/>
+                <a16:creationId xmlns="" xmlns:a16="http://schemas.microsoft.com/office/drawing/2014/main" id="{3E747EA3-1AA2-44C7-B883-3A43CAA0B9EE}"/>
               </a:ext>
             </a:extLst>
           </p:cNvPr>
@@ -19999,7 +20002,7 @@
           <p:cNvPr id="2" name="Date Placeholder 1">
             <a:extLst>
               <a:ext uri="{FF2B5EF4-FFF2-40B4-BE49-F238E27FC236}">
-                <a16:creationId xmlns:a16="http://schemas.microsoft.com/office/drawing/2014/main" xmlns="" id="{CF3303AE-DC79-4075-87D8-B19C4044C6BA}"/>
+                <a16:creationId xmlns="" xmlns:a16="http://schemas.microsoft.com/office/drawing/2014/main" id="{CF3303AE-DC79-4075-87D8-B19C4044C6BA}"/>
               </a:ext>
             </a:extLst>
           </p:cNvPr>
@@ -20028,7 +20031,7 @@
           <p:cNvPr id="3" name="Title 2">
             <a:extLst>
               <a:ext uri="{FF2B5EF4-FFF2-40B4-BE49-F238E27FC236}">
-                <a16:creationId xmlns:a16="http://schemas.microsoft.com/office/drawing/2014/main" xmlns="" id="{5447F8C8-CE7F-43AE-BEA1-8436CB220DA4}"/>
+                <a16:creationId xmlns="" xmlns:a16="http://schemas.microsoft.com/office/drawing/2014/main" id="{5447F8C8-CE7F-43AE-BEA1-8436CB220DA4}"/>
               </a:ext>
             </a:extLst>
           </p:cNvPr>
@@ -20061,7 +20064,7 @@
           <p:cNvPr id="4" name="Footer Placeholder 3">
             <a:extLst>
               <a:ext uri="{FF2B5EF4-FFF2-40B4-BE49-F238E27FC236}">
-                <a16:creationId xmlns:a16="http://schemas.microsoft.com/office/drawing/2014/main" xmlns="" id="{1BDC3D80-3A8C-4952-A46E-D5B8414D6B8D}"/>
+                <a16:creationId xmlns="" xmlns:a16="http://schemas.microsoft.com/office/drawing/2014/main" id="{1BDC3D80-3A8C-4952-A46E-D5B8414D6B8D}"/>
               </a:ext>
             </a:extLst>
           </p:cNvPr>
@@ -20090,7 +20093,7 @@
           <p:cNvPr id="5" name="Slide Number Placeholder 4">
             <a:extLst>
               <a:ext uri="{FF2B5EF4-FFF2-40B4-BE49-F238E27FC236}">
-                <a16:creationId xmlns:a16="http://schemas.microsoft.com/office/drawing/2014/main" xmlns="" id="{CC1B7AE3-7AE3-45B8-B0B3-1193239D0230}"/>
+                <a16:creationId xmlns="" xmlns:a16="http://schemas.microsoft.com/office/drawing/2014/main" id="{CC1B7AE3-7AE3-45B8-B0B3-1193239D0230}"/>
               </a:ext>
             </a:extLst>
           </p:cNvPr>
@@ -20120,7 +20123,7 @@
           <p:cNvPr id="6" name="TextBox 5">
             <a:extLst>
               <a:ext uri="{FF2B5EF4-FFF2-40B4-BE49-F238E27FC236}">
-                <a16:creationId xmlns:a16="http://schemas.microsoft.com/office/drawing/2014/main" xmlns="" id="{FF943204-89BF-4A6A-AA3F-6612D4C6618A}"/>
+                <a16:creationId xmlns="" xmlns:a16="http://schemas.microsoft.com/office/drawing/2014/main" id="{FF943204-89BF-4A6A-AA3F-6612D4C6618A}"/>
               </a:ext>
             </a:extLst>
           </p:cNvPr>
@@ -20216,7 +20219,7 @@
           <p:cNvPr id="8" name="Picture 7">
             <a:extLst>
               <a:ext uri="{FF2B5EF4-FFF2-40B4-BE49-F238E27FC236}">
-                <a16:creationId xmlns:a16="http://schemas.microsoft.com/office/drawing/2014/main" xmlns="" id="{2F6EC7DB-B710-4963-AD64-DBEFF3146C97}"/>
+                <a16:creationId xmlns="" xmlns:a16="http://schemas.microsoft.com/office/drawing/2014/main" id="{2F6EC7DB-B710-4963-AD64-DBEFF3146C97}"/>
               </a:ext>
             </a:extLst>
           </p:cNvPr>
@@ -20246,7 +20249,7 @@
           <p:cNvPr id="9" name="Rectangle 8">
             <a:extLst>
               <a:ext uri="{FF2B5EF4-FFF2-40B4-BE49-F238E27FC236}">
-                <a16:creationId xmlns:a16="http://schemas.microsoft.com/office/drawing/2014/main" xmlns="" id="{F3B99C2F-44A4-47F7-B59A-FA519F8B32C1}"/>
+                <a16:creationId xmlns="" xmlns:a16="http://schemas.microsoft.com/office/drawing/2014/main" id="{F3B99C2F-44A4-47F7-B59A-FA519F8B32C1}"/>
               </a:ext>
             </a:extLst>
           </p:cNvPr>
@@ -20337,7 +20340,7 @@
           <p:cNvPr id="2" name="Date Placeholder 1">
             <a:extLst>
               <a:ext uri="{FF2B5EF4-FFF2-40B4-BE49-F238E27FC236}">
-                <a16:creationId xmlns:a16="http://schemas.microsoft.com/office/drawing/2014/main" xmlns="" id="{57E0559B-108E-42BA-B148-3A7379225216}"/>
+                <a16:creationId xmlns="" xmlns:a16="http://schemas.microsoft.com/office/drawing/2014/main" id="{57E0559B-108E-42BA-B148-3A7379225216}"/>
               </a:ext>
             </a:extLst>
           </p:cNvPr>
@@ -20366,7 +20369,7 @@
           <p:cNvPr id="4" name="Footer Placeholder 3">
             <a:extLst>
               <a:ext uri="{FF2B5EF4-FFF2-40B4-BE49-F238E27FC236}">
-                <a16:creationId xmlns:a16="http://schemas.microsoft.com/office/drawing/2014/main" xmlns="" id="{14B786CE-7946-4E43-8B50-45FD4C2912D4}"/>
+                <a16:creationId xmlns="" xmlns:a16="http://schemas.microsoft.com/office/drawing/2014/main" id="{14B786CE-7946-4E43-8B50-45FD4C2912D4}"/>
               </a:ext>
             </a:extLst>
           </p:cNvPr>
@@ -20395,7 +20398,7 @@
           <p:cNvPr id="5" name="Slide Number Placeholder 4">
             <a:extLst>
               <a:ext uri="{FF2B5EF4-FFF2-40B4-BE49-F238E27FC236}">
-                <a16:creationId xmlns:a16="http://schemas.microsoft.com/office/drawing/2014/main" xmlns="" id="{A1645270-A7E1-4DC5-80A2-101C114D5BC6}"/>
+                <a16:creationId xmlns="" xmlns:a16="http://schemas.microsoft.com/office/drawing/2014/main" id="{A1645270-A7E1-4DC5-80A2-101C114D5BC6}"/>
               </a:ext>
             </a:extLst>
           </p:cNvPr>
@@ -20425,7 +20428,7 @@
           <p:cNvPr id="6" name="Isosceles Triangle 5">
             <a:extLst>
               <a:ext uri="{FF2B5EF4-FFF2-40B4-BE49-F238E27FC236}">
-                <a16:creationId xmlns:a16="http://schemas.microsoft.com/office/drawing/2014/main" xmlns="" id="{568C45E7-36F0-437E-814C-29EDFCBBABCB}"/>
+                <a16:creationId xmlns="" xmlns:a16="http://schemas.microsoft.com/office/drawing/2014/main" id="{568C45E7-36F0-437E-814C-29EDFCBBABCB}"/>
               </a:ext>
             </a:extLst>
           </p:cNvPr>
@@ -20479,7 +20482,7 @@
           <p:cNvPr id="7" name="Title 6">
             <a:extLst>
               <a:ext uri="{FF2B5EF4-FFF2-40B4-BE49-F238E27FC236}">
-                <a16:creationId xmlns:a16="http://schemas.microsoft.com/office/drawing/2014/main" xmlns="" id="{8042F69E-D8CD-41F9-9A70-4D28C8B938E1}"/>
+                <a16:creationId xmlns="" xmlns:a16="http://schemas.microsoft.com/office/drawing/2014/main" id="{8042F69E-D8CD-41F9-9A70-4D28C8B938E1}"/>
               </a:ext>
             </a:extLst>
           </p:cNvPr>
@@ -20534,7 +20537,7 @@
           <p:cNvPr id="8" name="TextBox 7">
             <a:extLst>
               <a:ext uri="{FF2B5EF4-FFF2-40B4-BE49-F238E27FC236}">
-                <a16:creationId xmlns:a16="http://schemas.microsoft.com/office/drawing/2014/main" xmlns="" id="{BDFAF5B9-53B8-43CC-8FDC-C9AD1C1AFDFE}"/>
+                <a16:creationId xmlns="" xmlns:a16="http://schemas.microsoft.com/office/drawing/2014/main" id="{BDFAF5B9-53B8-43CC-8FDC-C9AD1C1AFDFE}"/>
               </a:ext>
             </a:extLst>
           </p:cNvPr>
@@ -20569,7 +20572,7 @@
           <p:cNvPr id="9" name="TextBox 8">
             <a:extLst>
               <a:ext uri="{FF2B5EF4-FFF2-40B4-BE49-F238E27FC236}">
-                <a16:creationId xmlns:a16="http://schemas.microsoft.com/office/drawing/2014/main" xmlns="" id="{36E6C273-906A-46F4-AA13-4DA9F8AE5CCA}"/>
+                <a16:creationId xmlns="" xmlns:a16="http://schemas.microsoft.com/office/drawing/2014/main" id="{36E6C273-906A-46F4-AA13-4DA9F8AE5CCA}"/>
               </a:ext>
             </a:extLst>
           </p:cNvPr>
@@ -20604,7 +20607,7 @@
           <p:cNvPr id="10" name="TextBox 9">
             <a:extLst>
               <a:ext uri="{FF2B5EF4-FFF2-40B4-BE49-F238E27FC236}">
-                <a16:creationId xmlns:a16="http://schemas.microsoft.com/office/drawing/2014/main" xmlns="" id="{B305ABF0-9764-4BC9-AFB1-61C7DC54FCDE}"/>
+                <a16:creationId xmlns="" xmlns:a16="http://schemas.microsoft.com/office/drawing/2014/main" id="{B305ABF0-9764-4BC9-AFB1-61C7DC54FCDE}"/>
               </a:ext>
             </a:extLst>
           </p:cNvPr>
@@ -20639,7 +20642,7 @@
           <p:cNvPr id="11" name="Oval 10">
             <a:extLst>
               <a:ext uri="{FF2B5EF4-FFF2-40B4-BE49-F238E27FC236}">
-                <a16:creationId xmlns:a16="http://schemas.microsoft.com/office/drawing/2014/main" xmlns="" id="{5035009E-8D02-43BD-8B4B-91651CACFE75}"/>
+                <a16:creationId xmlns="" xmlns:a16="http://schemas.microsoft.com/office/drawing/2014/main" id="{5035009E-8D02-43BD-8B4B-91651CACFE75}"/>
               </a:ext>
             </a:extLst>
           </p:cNvPr>
@@ -20685,7 +20688,7 @@
           <p:cNvPr id="12" name="Oval 11">
             <a:extLst>
               <a:ext uri="{FF2B5EF4-FFF2-40B4-BE49-F238E27FC236}">
-                <a16:creationId xmlns:a16="http://schemas.microsoft.com/office/drawing/2014/main" xmlns="" id="{CDE8AAA5-77F6-4054-9B18-5D2F04908586}"/>
+                <a16:creationId xmlns="" xmlns:a16="http://schemas.microsoft.com/office/drawing/2014/main" id="{CDE8AAA5-77F6-4054-9B18-5D2F04908586}"/>
               </a:ext>
             </a:extLst>
           </p:cNvPr>
@@ -20731,7 +20734,7 @@
           <p:cNvPr id="13" name="Oval 12">
             <a:extLst>
               <a:ext uri="{FF2B5EF4-FFF2-40B4-BE49-F238E27FC236}">
-                <a16:creationId xmlns:a16="http://schemas.microsoft.com/office/drawing/2014/main" xmlns="" id="{94E01DF5-0702-4F9D-99BE-16C86DDC4001}"/>
+                <a16:creationId xmlns="" xmlns:a16="http://schemas.microsoft.com/office/drawing/2014/main" id="{94E01DF5-0702-4F9D-99BE-16C86DDC4001}"/>
               </a:ext>
             </a:extLst>
           </p:cNvPr>
@@ -20814,7 +20817,7 @@
           <p:cNvPr id="2" name="Date Placeholder 1">
             <a:extLst>
               <a:ext uri="{FF2B5EF4-FFF2-40B4-BE49-F238E27FC236}">
-                <a16:creationId xmlns:a16="http://schemas.microsoft.com/office/drawing/2014/main" xmlns="" id="{57E0559B-108E-42BA-B148-3A7379225216}"/>
+                <a16:creationId xmlns="" xmlns:a16="http://schemas.microsoft.com/office/drawing/2014/main" id="{57E0559B-108E-42BA-B148-3A7379225216}"/>
               </a:ext>
             </a:extLst>
           </p:cNvPr>
@@ -20843,7 +20846,7 @@
           <p:cNvPr id="4" name="Footer Placeholder 3">
             <a:extLst>
               <a:ext uri="{FF2B5EF4-FFF2-40B4-BE49-F238E27FC236}">
-                <a16:creationId xmlns:a16="http://schemas.microsoft.com/office/drawing/2014/main" xmlns="" id="{14B786CE-7946-4E43-8B50-45FD4C2912D4}"/>
+                <a16:creationId xmlns="" xmlns:a16="http://schemas.microsoft.com/office/drawing/2014/main" id="{14B786CE-7946-4E43-8B50-45FD4C2912D4}"/>
               </a:ext>
             </a:extLst>
           </p:cNvPr>
@@ -20872,7 +20875,7 @@
           <p:cNvPr id="5" name="Slide Number Placeholder 4">
             <a:extLst>
               <a:ext uri="{FF2B5EF4-FFF2-40B4-BE49-F238E27FC236}">
-                <a16:creationId xmlns:a16="http://schemas.microsoft.com/office/drawing/2014/main" xmlns="" id="{A1645270-A7E1-4DC5-80A2-101C114D5BC6}"/>
+                <a16:creationId xmlns="" xmlns:a16="http://schemas.microsoft.com/office/drawing/2014/main" id="{A1645270-A7E1-4DC5-80A2-101C114D5BC6}"/>
               </a:ext>
             </a:extLst>
           </p:cNvPr>
@@ -20902,7 +20905,7 @@
           <p:cNvPr id="6" name="Isosceles Triangle 5">
             <a:extLst>
               <a:ext uri="{FF2B5EF4-FFF2-40B4-BE49-F238E27FC236}">
-                <a16:creationId xmlns:a16="http://schemas.microsoft.com/office/drawing/2014/main" xmlns="" id="{568C45E7-36F0-437E-814C-29EDFCBBABCB}"/>
+                <a16:creationId xmlns="" xmlns:a16="http://schemas.microsoft.com/office/drawing/2014/main" id="{568C45E7-36F0-437E-814C-29EDFCBBABCB}"/>
               </a:ext>
             </a:extLst>
           </p:cNvPr>
@@ -20956,7 +20959,7 @@
           <p:cNvPr id="7" name="Title 6">
             <a:extLst>
               <a:ext uri="{FF2B5EF4-FFF2-40B4-BE49-F238E27FC236}">
-                <a16:creationId xmlns:a16="http://schemas.microsoft.com/office/drawing/2014/main" xmlns="" id="{8042F69E-D8CD-41F9-9A70-4D28C8B938E1}"/>
+                <a16:creationId xmlns="" xmlns:a16="http://schemas.microsoft.com/office/drawing/2014/main" id="{8042F69E-D8CD-41F9-9A70-4D28C8B938E1}"/>
               </a:ext>
             </a:extLst>
           </p:cNvPr>
@@ -20995,7 +20998,7 @@
           <p:cNvPr id="9" name="TextBox 8">
             <a:extLst>
               <a:ext uri="{FF2B5EF4-FFF2-40B4-BE49-F238E27FC236}">
-                <a16:creationId xmlns:a16="http://schemas.microsoft.com/office/drawing/2014/main" xmlns="" id="{36E6C273-906A-46F4-AA13-4DA9F8AE5CCA}"/>
+                <a16:creationId xmlns="" xmlns:a16="http://schemas.microsoft.com/office/drawing/2014/main" id="{36E6C273-906A-46F4-AA13-4DA9F8AE5CCA}"/>
               </a:ext>
             </a:extLst>
           </p:cNvPr>
@@ -21030,7 +21033,7 @@
           <p:cNvPr id="10" name="TextBox 9">
             <a:extLst>
               <a:ext uri="{FF2B5EF4-FFF2-40B4-BE49-F238E27FC236}">
-                <a16:creationId xmlns:a16="http://schemas.microsoft.com/office/drawing/2014/main" xmlns="" id="{B305ABF0-9764-4BC9-AFB1-61C7DC54FCDE}"/>
+                <a16:creationId xmlns="" xmlns:a16="http://schemas.microsoft.com/office/drawing/2014/main" id="{B305ABF0-9764-4BC9-AFB1-61C7DC54FCDE}"/>
               </a:ext>
             </a:extLst>
           </p:cNvPr>
@@ -21065,7 +21068,7 @@
           <p:cNvPr id="11" name="Oval 10">
             <a:extLst>
               <a:ext uri="{FF2B5EF4-FFF2-40B4-BE49-F238E27FC236}">
-                <a16:creationId xmlns:a16="http://schemas.microsoft.com/office/drawing/2014/main" xmlns="" id="{B906B13D-5844-40B6-BCAB-011FB5C3D997}"/>
+                <a16:creationId xmlns="" xmlns:a16="http://schemas.microsoft.com/office/drawing/2014/main" id="{B906B13D-5844-40B6-BCAB-011FB5C3D997}"/>
               </a:ext>
             </a:extLst>
           </p:cNvPr>
@@ -21111,7 +21114,7 @@
           <p:cNvPr id="12" name="Oval 11">
             <a:extLst>
               <a:ext uri="{FF2B5EF4-FFF2-40B4-BE49-F238E27FC236}">
-                <a16:creationId xmlns:a16="http://schemas.microsoft.com/office/drawing/2014/main" xmlns="" id="{C1200B6D-C0CF-435D-9C0E-B289CA598BB6}"/>
+                <a16:creationId xmlns="" xmlns:a16="http://schemas.microsoft.com/office/drawing/2014/main" id="{C1200B6D-C0CF-435D-9C0E-B289CA598BB6}"/>
               </a:ext>
             </a:extLst>
           </p:cNvPr>
@@ -21194,7 +21197,7 @@
           <p:cNvPr id="2" name="Date Placeholder 1">
             <a:extLst>
               <a:ext uri="{FF2B5EF4-FFF2-40B4-BE49-F238E27FC236}">
-                <a16:creationId xmlns:a16="http://schemas.microsoft.com/office/drawing/2014/main" xmlns="" id="{22F37A0D-00C5-409F-A411-69923C02062B}"/>
+                <a16:creationId xmlns="" xmlns:a16="http://schemas.microsoft.com/office/drawing/2014/main" id="{22F37A0D-00C5-409F-A411-69923C02062B}"/>
               </a:ext>
             </a:extLst>
           </p:cNvPr>
@@ -21223,7 +21226,7 @@
           <p:cNvPr id="3" name="Title 2">
             <a:extLst>
               <a:ext uri="{FF2B5EF4-FFF2-40B4-BE49-F238E27FC236}">
-                <a16:creationId xmlns:a16="http://schemas.microsoft.com/office/drawing/2014/main" xmlns="" id="{BC48205D-72D5-4364-B962-8D1738A7D06F}"/>
+                <a16:creationId xmlns="" xmlns:a16="http://schemas.microsoft.com/office/drawing/2014/main" id="{BC48205D-72D5-4364-B962-8D1738A7D06F}"/>
               </a:ext>
             </a:extLst>
           </p:cNvPr>
@@ -21251,7 +21254,7 @@
           <p:cNvPr id="4" name="Footer Placeholder 3">
             <a:extLst>
               <a:ext uri="{FF2B5EF4-FFF2-40B4-BE49-F238E27FC236}">
-                <a16:creationId xmlns:a16="http://schemas.microsoft.com/office/drawing/2014/main" xmlns="" id="{C2AB79FF-FB43-45BB-A5DF-3520D893F70A}"/>
+                <a16:creationId xmlns="" xmlns:a16="http://schemas.microsoft.com/office/drawing/2014/main" id="{C2AB79FF-FB43-45BB-A5DF-3520D893F70A}"/>
               </a:ext>
             </a:extLst>
           </p:cNvPr>
@@ -21280,7 +21283,7 @@
           <p:cNvPr id="5" name="Slide Number Placeholder 4">
             <a:extLst>
               <a:ext uri="{FF2B5EF4-FFF2-40B4-BE49-F238E27FC236}">
-                <a16:creationId xmlns:a16="http://schemas.microsoft.com/office/drawing/2014/main" xmlns="" id="{05A8748C-3062-4F86-A2FC-23AE608875E8}"/>
+                <a16:creationId xmlns="" xmlns:a16="http://schemas.microsoft.com/office/drawing/2014/main" id="{05A8748C-3062-4F86-A2FC-23AE608875E8}"/>
               </a:ext>
             </a:extLst>
           </p:cNvPr>
@@ -21310,7 +21313,7 @@
           <p:cNvPr id="11" name="TextBox 10">
             <a:extLst>
               <a:ext uri="{FF2B5EF4-FFF2-40B4-BE49-F238E27FC236}">
-                <a16:creationId xmlns:a16="http://schemas.microsoft.com/office/drawing/2014/main" xmlns="" id="{F8E40CA8-E36E-4944-B913-427A3979C01B}"/>
+                <a16:creationId xmlns="" xmlns:a16="http://schemas.microsoft.com/office/drawing/2014/main" id="{F8E40CA8-E36E-4944-B913-427A3979C01B}"/>
               </a:ext>
             </a:extLst>
           </p:cNvPr>
@@ -21359,7 +21362,7 @@
           <p:cNvPr id="13" name="Picture 12">
             <a:extLst>
               <a:ext uri="{FF2B5EF4-FFF2-40B4-BE49-F238E27FC236}">
-                <a16:creationId xmlns:a16="http://schemas.microsoft.com/office/drawing/2014/main" xmlns="" id="{A63871AF-8798-4AE2-84AD-E116086DB1BE}"/>
+                <a16:creationId xmlns="" xmlns:a16="http://schemas.microsoft.com/office/drawing/2014/main" id="{A63871AF-8798-4AE2-84AD-E116086DB1BE}"/>
               </a:ext>
             </a:extLst>
           </p:cNvPr>
@@ -21426,7 +21429,7 @@
           <p:cNvPr id="2" name="Date Placeholder 1">
             <a:extLst>
               <a:ext uri="{FF2B5EF4-FFF2-40B4-BE49-F238E27FC236}">
-                <a16:creationId xmlns:a16="http://schemas.microsoft.com/office/drawing/2014/main" xmlns="" id="{22F37A0D-00C5-409F-A411-69923C02062B}"/>
+                <a16:creationId xmlns="" xmlns:a16="http://schemas.microsoft.com/office/drawing/2014/main" id="{22F37A0D-00C5-409F-A411-69923C02062B}"/>
               </a:ext>
             </a:extLst>
           </p:cNvPr>
@@ -21455,7 +21458,7 @@
           <p:cNvPr id="3" name="Title 2">
             <a:extLst>
               <a:ext uri="{FF2B5EF4-FFF2-40B4-BE49-F238E27FC236}">
-                <a16:creationId xmlns:a16="http://schemas.microsoft.com/office/drawing/2014/main" xmlns="" id="{BC48205D-72D5-4364-B962-8D1738A7D06F}"/>
+                <a16:creationId xmlns="" xmlns:a16="http://schemas.microsoft.com/office/drawing/2014/main" id="{BC48205D-72D5-4364-B962-8D1738A7D06F}"/>
               </a:ext>
             </a:extLst>
           </p:cNvPr>
@@ -21483,7 +21486,7 @@
           <p:cNvPr id="4" name="Footer Placeholder 3">
             <a:extLst>
               <a:ext uri="{FF2B5EF4-FFF2-40B4-BE49-F238E27FC236}">
-                <a16:creationId xmlns:a16="http://schemas.microsoft.com/office/drawing/2014/main" xmlns="" id="{C2AB79FF-FB43-45BB-A5DF-3520D893F70A}"/>
+                <a16:creationId xmlns="" xmlns:a16="http://schemas.microsoft.com/office/drawing/2014/main" id="{C2AB79FF-FB43-45BB-A5DF-3520D893F70A}"/>
               </a:ext>
             </a:extLst>
           </p:cNvPr>
@@ -21512,7 +21515,7 @@
           <p:cNvPr id="5" name="Slide Number Placeholder 4">
             <a:extLst>
               <a:ext uri="{FF2B5EF4-FFF2-40B4-BE49-F238E27FC236}">
-                <a16:creationId xmlns:a16="http://schemas.microsoft.com/office/drawing/2014/main" xmlns="" id="{05A8748C-3062-4F86-A2FC-23AE608875E8}"/>
+                <a16:creationId xmlns="" xmlns:a16="http://schemas.microsoft.com/office/drawing/2014/main" id="{05A8748C-3062-4F86-A2FC-23AE608875E8}"/>
               </a:ext>
             </a:extLst>
           </p:cNvPr>
@@ -21542,7 +21545,7 @@
           <p:cNvPr id="9" name="Picture 2" descr="https://upload.wikimedia.org/wikipedia/commons/thumb/5/54/LogDirichletDensity-alpha_0.3_to_alpha_2.0.gif/250px-LogDirichletDensity-alpha_0.3_to_alpha_2.0.gif">
             <a:extLst>
               <a:ext uri="{FF2B5EF4-FFF2-40B4-BE49-F238E27FC236}">
-                <a16:creationId xmlns:a16="http://schemas.microsoft.com/office/drawing/2014/main" xmlns="" id="{431EFBA7-B5DA-4972-BB79-4049700E4E78}"/>
+                <a16:creationId xmlns="" xmlns:a16="http://schemas.microsoft.com/office/drawing/2014/main" id="{431EFBA7-B5DA-4972-BB79-4049700E4E78}"/>
               </a:ext>
             </a:extLst>
           </p:cNvPr>
@@ -21589,7 +21592,7 @@
           <p:cNvPr id="11" name="TextBox 10">
             <a:extLst>
               <a:ext uri="{FF2B5EF4-FFF2-40B4-BE49-F238E27FC236}">
-                <a16:creationId xmlns:a16="http://schemas.microsoft.com/office/drawing/2014/main" xmlns="" id="{F8E40CA8-E36E-4944-B913-427A3979C01B}"/>
+                <a16:creationId xmlns="" xmlns:a16="http://schemas.microsoft.com/office/drawing/2014/main" id="{F8E40CA8-E36E-4944-B913-427A3979C01B}"/>
               </a:ext>
             </a:extLst>
           </p:cNvPr>
@@ -21665,7 +21668,7 @@
           <p:cNvPr id="2" name="Date Placeholder 1">
             <a:extLst>
               <a:ext uri="{FF2B5EF4-FFF2-40B4-BE49-F238E27FC236}">
-                <a16:creationId xmlns:a16="http://schemas.microsoft.com/office/drawing/2014/main" xmlns="" id="{612AF962-D159-495F-94AE-9D1650A29A11}"/>
+                <a16:creationId xmlns="" xmlns:a16="http://schemas.microsoft.com/office/drawing/2014/main" id="{612AF962-D159-495F-94AE-9D1650A29A11}"/>
               </a:ext>
             </a:extLst>
           </p:cNvPr>
@@ -21694,7 +21697,7 @@
           <p:cNvPr id="3" name="Title 2">
             <a:extLst>
               <a:ext uri="{FF2B5EF4-FFF2-40B4-BE49-F238E27FC236}">
-                <a16:creationId xmlns:a16="http://schemas.microsoft.com/office/drawing/2014/main" xmlns="" id="{DE2336EF-9AF2-4CD8-ADF3-2AA1A4645F3F}"/>
+                <a16:creationId xmlns="" xmlns:a16="http://schemas.microsoft.com/office/drawing/2014/main" id="{DE2336EF-9AF2-4CD8-ADF3-2AA1A4645F3F}"/>
               </a:ext>
             </a:extLst>
           </p:cNvPr>
@@ -21722,7 +21725,7 @@
           <p:cNvPr id="4" name="Footer Placeholder 3">
             <a:extLst>
               <a:ext uri="{FF2B5EF4-FFF2-40B4-BE49-F238E27FC236}">
-                <a16:creationId xmlns:a16="http://schemas.microsoft.com/office/drawing/2014/main" xmlns="" id="{25BC9103-9F85-4DF1-B87B-168EE8A47590}"/>
+                <a16:creationId xmlns="" xmlns:a16="http://schemas.microsoft.com/office/drawing/2014/main" id="{25BC9103-9F85-4DF1-B87B-168EE8A47590}"/>
               </a:ext>
             </a:extLst>
           </p:cNvPr>
@@ -21751,7 +21754,7 @@
           <p:cNvPr id="5" name="Slide Number Placeholder 4">
             <a:extLst>
               <a:ext uri="{FF2B5EF4-FFF2-40B4-BE49-F238E27FC236}">
-                <a16:creationId xmlns:a16="http://schemas.microsoft.com/office/drawing/2014/main" xmlns="" id="{0E06C221-C357-47E5-8219-724674DFA438}"/>
+                <a16:creationId xmlns="" xmlns:a16="http://schemas.microsoft.com/office/drawing/2014/main" id="{0E06C221-C357-47E5-8219-724674DFA438}"/>
               </a:ext>
             </a:extLst>
           </p:cNvPr>
@@ -21781,7 +21784,7 @@
           <p:cNvPr id="6" name="TextBox 5">
             <a:extLst>
               <a:ext uri="{FF2B5EF4-FFF2-40B4-BE49-F238E27FC236}">
-                <a16:creationId xmlns:a16="http://schemas.microsoft.com/office/drawing/2014/main" xmlns="" id="{F4C1B3C6-29E0-460A-B856-5710DDE6EC4B}"/>
+                <a16:creationId xmlns="" xmlns:a16="http://schemas.microsoft.com/office/drawing/2014/main" id="{F4C1B3C6-29E0-460A-B856-5710DDE6EC4B}"/>
               </a:ext>
             </a:extLst>
           </p:cNvPr>
@@ -21819,7 +21822,7 @@
           <p:cNvPr id="5122" name="Picture 2" descr="https://www.objectorientedsubject.net/wpdir/wp-content/uploads/2017/12/topicmodeling-lda-intuitions-700x449.png">
             <a:extLst>
               <a:ext uri="{FF2B5EF4-FFF2-40B4-BE49-F238E27FC236}">
-                <a16:creationId xmlns:a16="http://schemas.microsoft.com/office/drawing/2014/main" xmlns="" id="{33C4A265-23B9-4A70-AA91-E67AB49110A1}"/>
+                <a16:creationId xmlns="" xmlns:a16="http://schemas.microsoft.com/office/drawing/2014/main" id="{33C4A265-23B9-4A70-AA91-E67AB49110A1}"/>
               </a:ext>
             </a:extLst>
           </p:cNvPr>
@@ -21903,7 +21906,7 @@
           <p:cNvPr id="2" name="Date Placeholder 1">
             <a:extLst>
               <a:ext uri="{FF2B5EF4-FFF2-40B4-BE49-F238E27FC236}">
-                <a16:creationId xmlns:a16="http://schemas.microsoft.com/office/drawing/2014/main" xmlns="" id="{BD0FB113-F15D-425D-8FEB-E051306B5B11}"/>
+                <a16:creationId xmlns="" xmlns:a16="http://schemas.microsoft.com/office/drawing/2014/main" id="{BD0FB113-F15D-425D-8FEB-E051306B5B11}"/>
               </a:ext>
             </a:extLst>
           </p:cNvPr>
@@ -21932,7 +21935,7 @@
           <p:cNvPr id="3" name="Title 2">
             <a:extLst>
               <a:ext uri="{FF2B5EF4-FFF2-40B4-BE49-F238E27FC236}">
-                <a16:creationId xmlns:a16="http://schemas.microsoft.com/office/drawing/2014/main" xmlns="" id="{EFD3F5D3-1E38-4F52-8298-D78245B3C28B}"/>
+                <a16:creationId xmlns="" xmlns:a16="http://schemas.microsoft.com/office/drawing/2014/main" id="{EFD3F5D3-1E38-4F52-8298-D78245B3C28B}"/>
               </a:ext>
             </a:extLst>
           </p:cNvPr>
@@ -21965,7 +21968,7 @@
           <p:cNvPr id="4" name="Footer Placeholder 3">
             <a:extLst>
               <a:ext uri="{FF2B5EF4-FFF2-40B4-BE49-F238E27FC236}">
-                <a16:creationId xmlns:a16="http://schemas.microsoft.com/office/drawing/2014/main" xmlns="" id="{8D9A779D-C17D-4BAD-9CB4-F63421714926}"/>
+                <a16:creationId xmlns="" xmlns:a16="http://schemas.microsoft.com/office/drawing/2014/main" id="{8D9A779D-C17D-4BAD-9CB4-F63421714926}"/>
               </a:ext>
             </a:extLst>
           </p:cNvPr>
@@ -21994,7 +21997,7 @@
           <p:cNvPr id="5" name="Slide Number Placeholder 4">
             <a:extLst>
               <a:ext uri="{FF2B5EF4-FFF2-40B4-BE49-F238E27FC236}">
-                <a16:creationId xmlns:a16="http://schemas.microsoft.com/office/drawing/2014/main" xmlns="" id="{D99DEF9E-54AF-4FC4-A213-C24639AEB6D6}"/>
+                <a16:creationId xmlns="" xmlns:a16="http://schemas.microsoft.com/office/drawing/2014/main" id="{D99DEF9E-54AF-4FC4-A213-C24639AEB6D6}"/>
               </a:ext>
             </a:extLst>
           </p:cNvPr>
@@ -22024,7 +22027,7 @@
           <p:cNvPr id="2050" name="Picture 2" descr="Image result for after lunch meme">
             <a:extLst>
               <a:ext uri="{FF2B5EF4-FFF2-40B4-BE49-F238E27FC236}">
-                <a16:creationId xmlns:a16="http://schemas.microsoft.com/office/drawing/2014/main" xmlns="" id="{AD246B8A-E953-4FDC-916C-B60D048FE8A0}"/>
+                <a16:creationId xmlns="" xmlns:a16="http://schemas.microsoft.com/office/drawing/2014/main" id="{AD246B8A-E953-4FDC-916C-B60D048FE8A0}"/>
               </a:ext>
             </a:extLst>
           </p:cNvPr>
@@ -22108,7 +22111,7 @@
           <p:cNvPr id="2" name="Date Placeholder 1">
             <a:extLst>
               <a:ext uri="{FF2B5EF4-FFF2-40B4-BE49-F238E27FC236}">
-                <a16:creationId xmlns:a16="http://schemas.microsoft.com/office/drawing/2014/main" xmlns="" id="{483710AC-7DD4-47F9-9E7C-2515755D0AB2}"/>
+                <a16:creationId xmlns="" xmlns:a16="http://schemas.microsoft.com/office/drawing/2014/main" id="{483710AC-7DD4-47F9-9E7C-2515755D0AB2}"/>
               </a:ext>
             </a:extLst>
           </p:cNvPr>
@@ -22137,7 +22140,7 @@
           <p:cNvPr id="3" name="Title 2">
             <a:extLst>
               <a:ext uri="{FF2B5EF4-FFF2-40B4-BE49-F238E27FC236}">
-                <a16:creationId xmlns:a16="http://schemas.microsoft.com/office/drawing/2014/main" xmlns="" id="{2A4513BF-7E9B-49A2-A3AE-8CA02D2714C6}"/>
+                <a16:creationId xmlns="" xmlns:a16="http://schemas.microsoft.com/office/drawing/2014/main" id="{2A4513BF-7E9B-49A2-A3AE-8CA02D2714C6}"/>
               </a:ext>
             </a:extLst>
           </p:cNvPr>
@@ -22169,7 +22172,7 @@
           <p:cNvPr id="4" name="Footer Placeholder 3">
             <a:extLst>
               <a:ext uri="{FF2B5EF4-FFF2-40B4-BE49-F238E27FC236}">
-                <a16:creationId xmlns:a16="http://schemas.microsoft.com/office/drawing/2014/main" xmlns="" id="{D410471F-BB86-4D1F-961D-76EF0B1C69BF}"/>
+                <a16:creationId xmlns="" xmlns:a16="http://schemas.microsoft.com/office/drawing/2014/main" id="{D410471F-BB86-4D1F-961D-76EF0B1C69BF}"/>
               </a:ext>
             </a:extLst>
           </p:cNvPr>
@@ -22198,7 +22201,7 @@
           <p:cNvPr id="5" name="Slide Number Placeholder 4">
             <a:extLst>
               <a:ext uri="{FF2B5EF4-FFF2-40B4-BE49-F238E27FC236}">
-                <a16:creationId xmlns:a16="http://schemas.microsoft.com/office/drawing/2014/main" xmlns="" id="{80D1B1A1-237A-4A88-83EE-2540EC7B8A5B}"/>
+                <a16:creationId xmlns="" xmlns:a16="http://schemas.microsoft.com/office/drawing/2014/main" id="{80D1B1A1-237A-4A88-83EE-2540EC7B8A5B}"/>
               </a:ext>
             </a:extLst>
           </p:cNvPr>
@@ -22228,7 +22231,7 @@
           <p:cNvPr id="7" name="Picture 6">
             <a:extLst>
               <a:ext uri="{FF2B5EF4-FFF2-40B4-BE49-F238E27FC236}">
-                <a16:creationId xmlns:a16="http://schemas.microsoft.com/office/drawing/2014/main" xmlns="" id="{E93A5FBC-D708-427D-BF31-B80DEA2C874D}"/>
+                <a16:creationId xmlns="" xmlns:a16="http://schemas.microsoft.com/office/drawing/2014/main" id="{E93A5FBC-D708-427D-BF31-B80DEA2C874D}"/>
               </a:ext>
             </a:extLst>
           </p:cNvPr>
@@ -22258,7 +22261,7 @@
           <p:cNvPr id="9" name="Straight Arrow Connector 8">
             <a:extLst>
               <a:ext uri="{FF2B5EF4-FFF2-40B4-BE49-F238E27FC236}">
-                <a16:creationId xmlns:a16="http://schemas.microsoft.com/office/drawing/2014/main" xmlns="" id="{E3113C13-BEBD-4C74-8520-D10122A5DD1C}"/>
+                <a16:creationId xmlns="" xmlns:a16="http://schemas.microsoft.com/office/drawing/2014/main" id="{E3113C13-BEBD-4C74-8520-D10122A5DD1C}"/>
               </a:ext>
             </a:extLst>
           </p:cNvPr>
@@ -22298,7 +22301,7 @@
           <p:cNvPr id="11" name="Straight Arrow Connector 10">
             <a:extLst>
               <a:ext uri="{FF2B5EF4-FFF2-40B4-BE49-F238E27FC236}">
-                <a16:creationId xmlns:a16="http://schemas.microsoft.com/office/drawing/2014/main" xmlns="" id="{427AB6EB-0C39-4A7E-B2DA-029B2D27471D}"/>
+                <a16:creationId xmlns="" xmlns:a16="http://schemas.microsoft.com/office/drawing/2014/main" id="{427AB6EB-0C39-4A7E-B2DA-029B2D27471D}"/>
               </a:ext>
             </a:extLst>
           </p:cNvPr>
@@ -22338,7 +22341,7 @@
           <p:cNvPr id="12" name="TextBox 11">
             <a:extLst>
               <a:ext uri="{FF2B5EF4-FFF2-40B4-BE49-F238E27FC236}">
-                <a16:creationId xmlns:a16="http://schemas.microsoft.com/office/drawing/2014/main" xmlns="" id="{2AB74F40-A16E-4329-9538-A52306AE0D35}"/>
+                <a16:creationId xmlns="" xmlns:a16="http://schemas.microsoft.com/office/drawing/2014/main" id="{2AB74F40-A16E-4329-9538-A52306AE0D35}"/>
               </a:ext>
             </a:extLst>
           </p:cNvPr>
@@ -22373,7 +22376,7 @@
           <p:cNvPr id="13" name="TextBox 12">
             <a:extLst>
               <a:ext uri="{FF2B5EF4-FFF2-40B4-BE49-F238E27FC236}">
-                <a16:creationId xmlns:a16="http://schemas.microsoft.com/office/drawing/2014/main" xmlns="" id="{32C5EB55-5408-49B4-9F17-1654637EA46C}"/>
+                <a16:creationId xmlns="" xmlns:a16="http://schemas.microsoft.com/office/drawing/2014/main" id="{32C5EB55-5408-49B4-9F17-1654637EA46C}"/>
               </a:ext>
             </a:extLst>
           </p:cNvPr>
@@ -22408,7 +22411,7 @@
           <p:cNvPr id="14" name="TextBox 13">
             <a:extLst>
               <a:ext uri="{FF2B5EF4-FFF2-40B4-BE49-F238E27FC236}">
-                <a16:creationId xmlns:a16="http://schemas.microsoft.com/office/drawing/2014/main" xmlns="" id="{7F395135-E9A4-4370-94BA-E392EB89C420}"/>
+                <a16:creationId xmlns="" xmlns:a16="http://schemas.microsoft.com/office/drawing/2014/main" id="{7F395135-E9A4-4370-94BA-E392EB89C420}"/>
               </a:ext>
             </a:extLst>
           </p:cNvPr>
@@ -22443,7 +22446,7 @@
           <p:cNvPr id="15" name="TextBox 14">
             <a:extLst>
               <a:ext uri="{FF2B5EF4-FFF2-40B4-BE49-F238E27FC236}">
-                <a16:creationId xmlns:a16="http://schemas.microsoft.com/office/drawing/2014/main" xmlns="" id="{0B27258B-6F51-4225-A5C1-5E031308278F}"/>
+                <a16:creationId xmlns="" xmlns:a16="http://schemas.microsoft.com/office/drawing/2014/main" id="{0B27258B-6F51-4225-A5C1-5E031308278F}"/>
               </a:ext>
             </a:extLst>
           </p:cNvPr>
@@ -22566,21 +22569,21 @@
                 <a:gridCol w="1238445">
                   <a:extLst>
                     <a:ext uri="{9D8B030D-6E8A-4147-A177-3AD203B41FA5}">
-                      <a16:colId xmlns:a16="http://schemas.microsoft.com/office/drawing/2014/main" xmlns="" val="20000"/>
+                      <a16:colId xmlns="" xmlns:a16="http://schemas.microsoft.com/office/drawing/2014/main" val="20000"/>
                     </a:ext>
                   </a:extLst>
                 </a:gridCol>
                 <a:gridCol w="858274">
                   <a:extLst>
                     <a:ext uri="{9D8B030D-6E8A-4147-A177-3AD203B41FA5}">
-                      <a16:colId xmlns:a16="http://schemas.microsoft.com/office/drawing/2014/main" xmlns="" val="20001"/>
+                      <a16:colId xmlns="" xmlns:a16="http://schemas.microsoft.com/office/drawing/2014/main" val="20001"/>
                     </a:ext>
                   </a:extLst>
                 </a:gridCol>
                 <a:gridCol w="5790787">
                   <a:extLst>
                     <a:ext uri="{9D8B030D-6E8A-4147-A177-3AD203B41FA5}">
-                      <a16:colId xmlns:a16="http://schemas.microsoft.com/office/drawing/2014/main" xmlns="" val="20002"/>
+                      <a16:colId xmlns="" xmlns:a16="http://schemas.microsoft.com/office/drawing/2014/main" val="20002"/>
                     </a:ext>
                   </a:extLst>
                 </a:gridCol>
@@ -22809,7 +22812,7 @@
                 </a:tc>
                 <a:extLst>
                   <a:ext uri="{0D108BD9-81ED-4DB2-BD59-A6C34878D82A}">
-                    <a16:rowId xmlns:a16="http://schemas.microsoft.com/office/drawing/2014/main" xmlns="" val="10000"/>
+                    <a16:rowId xmlns="" xmlns:a16="http://schemas.microsoft.com/office/drawing/2014/main" val="10000"/>
                   </a:ext>
                 </a:extLst>
               </a:tr>
@@ -22906,7 +22909,7 @@
                 </a:tc>
                 <a:extLst>
                   <a:ext uri="{0D108BD9-81ED-4DB2-BD59-A6C34878D82A}">
-                    <a16:rowId xmlns:a16="http://schemas.microsoft.com/office/drawing/2014/main" xmlns="" val="10001"/>
+                    <a16:rowId xmlns="" xmlns:a16="http://schemas.microsoft.com/office/drawing/2014/main" val="10001"/>
                   </a:ext>
                 </a:extLst>
               </a:tr>
@@ -22973,7 +22976,7 @@
                 </a:tc>
                 <a:extLst>
                   <a:ext uri="{0D108BD9-81ED-4DB2-BD59-A6C34878D82A}">
-                    <a16:rowId xmlns:a16="http://schemas.microsoft.com/office/drawing/2014/main" xmlns="" val="10002"/>
+                    <a16:rowId xmlns="" xmlns:a16="http://schemas.microsoft.com/office/drawing/2014/main" val="10002"/>
                   </a:ext>
                 </a:extLst>
               </a:tr>
@@ -23040,7 +23043,7 @@
                 </a:tc>
                 <a:extLst>
                   <a:ext uri="{0D108BD9-81ED-4DB2-BD59-A6C34878D82A}">
-                    <a16:rowId xmlns:a16="http://schemas.microsoft.com/office/drawing/2014/main" xmlns="" val="10003"/>
+                    <a16:rowId xmlns="" xmlns:a16="http://schemas.microsoft.com/office/drawing/2014/main" val="10003"/>
                   </a:ext>
                 </a:extLst>
               </a:tr>
@@ -23107,7 +23110,7 @@
                 </a:tc>
                 <a:extLst>
                   <a:ext uri="{0D108BD9-81ED-4DB2-BD59-A6C34878D82A}">
-                    <a16:rowId xmlns:a16="http://schemas.microsoft.com/office/drawing/2014/main" xmlns="" val="10004"/>
+                    <a16:rowId xmlns="" xmlns:a16="http://schemas.microsoft.com/office/drawing/2014/main" val="10004"/>
                   </a:ext>
                 </a:extLst>
               </a:tr>
@@ -23191,7 +23194,7 @@
                 </a:tc>
                 <a:extLst>
                   <a:ext uri="{0D108BD9-81ED-4DB2-BD59-A6C34878D82A}">
-                    <a16:rowId xmlns:a16="http://schemas.microsoft.com/office/drawing/2014/main" xmlns="" val="10005"/>
+                    <a16:rowId xmlns="" xmlns:a16="http://schemas.microsoft.com/office/drawing/2014/main" val="10005"/>
                   </a:ext>
                 </a:extLst>
               </a:tr>
@@ -23258,7 +23261,7 @@
                 </a:tc>
                 <a:extLst>
                   <a:ext uri="{0D108BD9-81ED-4DB2-BD59-A6C34878D82A}">
-                    <a16:rowId xmlns:a16="http://schemas.microsoft.com/office/drawing/2014/main" xmlns="" val="10006"/>
+                    <a16:rowId xmlns="" xmlns:a16="http://schemas.microsoft.com/office/drawing/2014/main" val="10006"/>
                   </a:ext>
                 </a:extLst>
               </a:tr>
@@ -23362,7 +23365,7 @@
                 </a:tc>
                 <a:extLst>
                   <a:ext uri="{0D108BD9-81ED-4DB2-BD59-A6C34878D82A}">
-                    <a16:rowId xmlns:a16="http://schemas.microsoft.com/office/drawing/2014/main" xmlns="" val="10007"/>
+                    <a16:rowId xmlns="" xmlns:a16="http://schemas.microsoft.com/office/drawing/2014/main" val="10007"/>
                   </a:ext>
                 </a:extLst>
               </a:tr>
@@ -23429,7 +23432,7 @@
                 </a:tc>
                 <a:extLst>
                   <a:ext uri="{0D108BD9-81ED-4DB2-BD59-A6C34878D82A}">
-                    <a16:rowId xmlns:a16="http://schemas.microsoft.com/office/drawing/2014/main" xmlns="" val="10008"/>
+                    <a16:rowId xmlns="" xmlns:a16="http://schemas.microsoft.com/office/drawing/2014/main" val="10008"/>
                   </a:ext>
                 </a:extLst>
               </a:tr>
@@ -23548,7 +23551,7 @@
           <p:cNvPr id="2" name="Date Placeholder 1">
             <a:extLst>
               <a:ext uri="{FF2B5EF4-FFF2-40B4-BE49-F238E27FC236}">
-                <a16:creationId xmlns:a16="http://schemas.microsoft.com/office/drawing/2014/main" xmlns="" id="{69B4E7CC-AA1B-4156-9EE4-64316FF4A7F2}"/>
+                <a16:creationId xmlns="" xmlns:a16="http://schemas.microsoft.com/office/drawing/2014/main" id="{69B4E7CC-AA1B-4156-9EE4-64316FF4A7F2}"/>
               </a:ext>
             </a:extLst>
           </p:cNvPr>
@@ -23577,7 +23580,7 @@
           <p:cNvPr id="3" name="Title 2">
             <a:extLst>
               <a:ext uri="{FF2B5EF4-FFF2-40B4-BE49-F238E27FC236}">
-                <a16:creationId xmlns:a16="http://schemas.microsoft.com/office/drawing/2014/main" xmlns="" id="{D0518808-7363-4D87-A35D-6587D555674A}"/>
+                <a16:creationId xmlns="" xmlns:a16="http://schemas.microsoft.com/office/drawing/2014/main" id="{D0518808-7363-4D87-A35D-6587D555674A}"/>
               </a:ext>
             </a:extLst>
           </p:cNvPr>
@@ -23613,7 +23616,7 @@
           <p:cNvPr id="4" name="Footer Placeholder 3">
             <a:extLst>
               <a:ext uri="{FF2B5EF4-FFF2-40B4-BE49-F238E27FC236}">
-                <a16:creationId xmlns:a16="http://schemas.microsoft.com/office/drawing/2014/main" xmlns="" id="{85DC7D7E-456C-4600-9038-F17E96DFE9EB}"/>
+                <a16:creationId xmlns="" xmlns:a16="http://schemas.microsoft.com/office/drawing/2014/main" id="{85DC7D7E-456C-4600-9038-F17E96DFE9EB}"/>
               </a:ext>
             </a:extLst>
           </p:cNvPr>
@@ -23642,7 +23645,7 @@
           <p:cNvPr id="5" name="Slide Number Placeholder 4">
             <a:extLst>
               <a:ext uri="{FF2B5EF4-FFF2-40B4-BE49-F238E27FC236}">
-                <a16:creationId xmlns:a16="http://schemas.microsoft.com/office/drawing/2014/main" xmlns="" id="{57EDC159-BE26-4478-8AF5-F405D818C734}"/>
+                <a16:creationId xmlns="" xmlns:a16="http://schemas.microsoft.com/office/drawing/2014/main" id="{57EDC159-BE26-4478-8AF5-F405D818C734}"/>
               </a:ext>
             </a:extLst>
           </p:cNvPr>
@@ -23672,7 +23675,7 @@
           <p:cNvPr id="6" name="Picture 5">
             <a:extLst>
               <a:ext uri="{FF2B5EF4-FFF2-40B4-BE49-F238E27FC236}">
-                <a16:creationId xmlns:a16="http://schemas.microsoft.com/office/drawing/2014/main" xmlns="" id="{C6A1F8E6-766C-4F37-B944-3CF5627EED4C}"/>
+                <a16:creationId xmlns="" xmlns:a16="http://schemas.microsoft.com/office/drawing/2014/main" id="{C6A1F8E6-766C-4F37-B944-3CF5627EED4C}"/>
               </a:ext>
             </a:extLst>
           </p:cNvPr>
@@ -23739,7 +23742,7 @@
           <p:cNvPr id="2" name="Date Placeholder 1">
             <a:extLst>
               <a:ext uri="{FF2B5EF4-FFF2-40B4-BE49-F238E27FC236}">
-                <a16:creationId xmlns:a16="http://schemas.microsoft.com/office/drawing/2014/main" xmlns="" id="{9BA4292B-986D-44A5-AC64-1181E2865657}"/>
+                <a16:creationId xmlns="" xmlns:a16="http://schemas.microsoft.com/office/drawing/2014/main" id="{9BA4292B-986D-44A5-AC64-1181E2865657}"/>
               </a:ext>
             </a:extLst>
           </p:cNvPr>
@@ -23768,7 +23771,7 @@
           <p:cNvPr id="3" name="Title 2">
             <a:extLst>
               <a:ext uri="{FF2B5EF4-FFF2-40B4-BE49-F238E27FC236}">
-                <a16:creationId xmlns:a16="http://schemas.microsoft.com/office/drawing/2014/main" xmlns="" id="{B3E5548B-DA7A-422C-B64C-7BC37E5A3E51}"/>
+                <a16:creationId xmlns="" xmlns:a16="http://schemas.microsoft.com/office/drawing/2014/main" id="{B3E5548B-DA7A-422C-B64C-7BC37E5A3E51}"/>
               </a:ext>
             </a:extLst>
           </p:cNvPr>
@@ -23804,7 +23807,7 @@
           <p:cNvPr id="4" name="Footer Placeholder 3">
             <a:extLst>
               <a:ext uri="{FF2B5EF4-FFF2-40B4-BE49-F238E27FC236}">
-                <a16:creationId xmlns:a16="http://schemas.microsoft.com/office/drawing/2014/main" xmlns="" id="{48A07C27-6293-49AD-8099-D3F50CA43B5A}"/>
+                <a16:creationId xmlns="" xmlns:a16="http://schemas.microsoft.com/office/drawing/2014/main" id="{48A07C27-6293-49AD-8099-D3F50CA43B5A}"/>
               </a:ext>
             </a:extLst>
           </p:cNvPr>
@@ -23833,7 +23836,7 @@
           <p:cNvPr id="5" name="Slide Number Placeholder 4">
             <a:extLst>
               <a:ext uri="{FF2B5EF4-FFF2-40B4-BE49-F238E27FC236}">
-                <a16:creationId xmlns:a16="http://schemas.microsoft.com/office/drawing/2014/main" xmlns="" id="{7F40F8E2-C7CD-4446-BDBF-1668AED3FA20}"/>
+                <a16:creationId xmlns="" xmlns:a16="http://schemas.microsoft.com/office/drawing/2014/main" id="{7F40F8E2-C7CD-4446-BDBF-1668AED3FA20}"/>
               </a:ext>
             </a:extLst>
           </p:cNvPr>
@@ -23863,7 +23866,7 @@
           <p:cNvPr id="6" name="Picture 5">
             <a:extLst>
               <a:ext uri="{FF2B5EF4-FFF2-40B4-BE49-F238E27FC236}">
-                <a16:creationId xmlns:a16="http://schemas.microsoft.com/office/drawing/2014/main" xmlns="" id="{70CFDBC9-F6F2-483D-9295-01B03890A9A9}"/>
+                <a16:creationId xmlns="" xmlns:a16="http://schemas.microsoft.com/office/drawing/2014/main" id="{70CFDBC9-F6F2-483D-9295-01B03890A9A9}"/>
               </a:ext>
             </a:extLst>
           </p:cNvPr>
@@ -23893,7 +23896,7 @@
           <p:cNvPr id="7" name="TextBox 6">
             <a:extLst>
               <a:ext uri="{FF2B5EF4-FFF2-40B4-BE49-F238E27FC236}">
-                <a16:creationId xmlns:a16="http://schemas.microsoft.com/office/drawing/2014/main" xmlns="" id="{87CEC70F-FD4B-4DCC-92E6-66BC30369DA1}"/>
+                <a16:creationId xmlns="" xmlns:a16="http://schemas.microsoft.com/office/drawing/2014/main" id="{87CEC70F-FD4B-4DCC-92E6-66BC30369DA1}"/>
               </a:ext>
             </a:extLst>
           </p:cNvPr>
@@ -23940,7 +23943,7 @@
           <p:cNvPr id="8" name="Rectangle 7">
             <a:extLst>
               <a:ext uri="{FF2B5EF4-FFF2-40B4-BE49-F238E27FC236}">
-                <a16:creationId xmlns:a16="http://schemas.microsoft.com/office/drawing/2014/main" xmlns="" id="{517953C8-5097-4896-9433-C5729BC0F0A4}"/>
+                <a16:creationId xmlns="" xmlns:a16="http://schemas.microsoft.com/office/drawing/2014/main" id="{517953C8-5097-4896-9433-C5729BC0F0A4}"/>
               </a:ext>
             </a:extLst>
           </p:cNvPr>
@@ -24086,21 +24089,21 @@
                 <a:gridCol w="1238445">
                   <a:extLst>
                     <a:ext uri="{9D8B030D-6E8A-4147-A177-3AD203B41FA5}">
-                      <a16:colId xmlns:a16="http://schemas.microsoft.com/office/drawing/2014/main" xmlns="" val="20000"/>
+                      <a16:colId xmlns="" xmlns:a16="http://schemas.microsoft.com/office/drawing/2014/main" val="20000"/>
                     </a:ext>
                   </a:extLst>
                 </a:gridCol>
                 <a:gridCol w="858274">
                   <a:extLst>
                     <a:ext uri="{9D8B030D-6E8A-4147-A177-3AD203B41FA5}">
-                      <a16:colId xmlns:a16="http://schemas.microsoft.com/office/drawing/2014/main" xmlns="" val="20001"/>
+                      <a16:colId xmlns="" xmlns:a16="http://schemas.microsoft.com/office/drawing/2014/main" val="20001"/>
                     </a:ext>
                   </a:extLst>
                 </a:gridCol>
                 <a:gridCol w="5790787">
                   <a:extLst>
                     <a:ext uri="{9D8B030D-6E8A-4147-A177-3AD203B41FA5}">
-                      <a16:colId xmlns:a16="http://schemas.microsoft.com/office/drawing/2014/main" xmlns="" val="20002"/>
+                      <a16:colId xmlns="" xmlns:a16="http://schemas.microsoft.com/office/drawing/2014/main" val="20002"/>
                     </a:ext>
                   </a:extLst>
                 </a:gridCol>
@@ -24329,7 +24332,7 @@
                 </a:tc>
                 <a:extLst>
                   <a:ext uri="{0D108BD9-81ED-4DB2-BD59-A6C34878D82A}">
-                    <a16:rowId xmlns:a16="http://schemas.microsoft.com/office/drawing/2014/main" xmlns="" val="10000"/>
+                    <a16:rowId xmlns="" xmlns:a16="http://schemas.microsoft.com/office/drawing/2014/main" val="10000"/>
                   </a:ext>
                 </a:extLst>
               </a:tr>
@@ -24426,7 +24429,7 @@
                 </a:tc>
                 <a:extLst>
                   <a:ext uri="{0D108BD9-81ED-4DB2-BD59-A6C34878D82A}">
-                    <a16:rowId xmlns:a16="http://schemas.microsoft.com/office/drawing/2014/main" xmlns="" val="10001"/>
+                    <a16:rowId xmlns="" xmlns:a16="http://schemas.microsoft.com/office/drawing/2014/main" val="10001"/>
                   </a:ext>
                 </a:extLst>
               </a:tr>
@@ -24493,7 +24496,7 @@
                 </a:tc>
                 <a:extLst>
                   <a:ext uri="{0D108BD9-81ED-4DB2-BD59-A6C34878D82A}">
-                    <a16:rowId xmlns:a16="http://schemas.microsoft.com/office/drawing/2014/main" xmlns="" val="10002"/>
+                    <a16:rowId xmlns="" xmlns:a16="http://schemas.microsoft.com/office/drawing/2014/main" val="10002"/>
                   </a:ext>
                 </a:extLst>
               </a:tr>
@@ -24560,7 +24563,7 @@
                 </a:tc>
                 <a:extLst>
                   <a:ext uri="{0D108BD9-81ED-4DB2-BD59-A6C34878D82A}">
-                    <a16:rowId xmlns:a16="http://schemas.microsoft.com/office/drawing/2014/main" xmlns="" val="10003"/>
+                    <a16:rowId xmlns="" xmlns:a16="http://schemas.microsoft.com/office/drawing/2014/main" val="10003"/>
                   </a:ext>
                 </a:extLst>
               </a:tr>
@@ -24627,7 +24630,7 @@
                 </a:tc>
                 <a:extLst>
                   <a:ext uri="{0D108BD9-81ED-4DB2-BD59-A6C34878D82A}">
-                    <a16:rowId xmlns:a16="http://schemas.microsoft.com/office/drawing/2014/main" xmlns="" val="10004"/>
+                    <a16:rowId xmlns="" xmlns:a16="http://schemas.microsoft.com/office/drawing/2014/main" val="10004"/>
                   </a:ext>
                 </a:extLst>
               </a:tr>
@@ -24711,7 +24714,7 @@
                 </a:tc>
                 <a:extLst>
                   <a:ext uri="{0D108BD9-81ED-4DB2-BD59-A6C34878D82A}">
-                    <a16:rowId xmlns:a16="http://schemas.microsoft.com/office/drawing/2014/main" xmlns="" val="10005"/>
+                    <a16:rowId xmlns="" xmlns:a16="http://schemas.microsoft.com/office/drawing/2014/main" val="10005"/>
                   </a:ext>
                 </a:extLst>
               </a:tr>
@@ -24778,7 +24781,7 @@
                 </a:tc>
                 <a:extLst>
                   <a:ext uri="{0D108BD9-81ED-4DB2-BD59-A6C34878D82A}">
-                    <a16:rowId xmlns:a16="http://schemas.microsoft.com/office/drawing/2014/main" xmlns="" val="10006"/>
+                    <a16:rowId xmlns="" xmlns:a16="http://schemas.microsoft.com/office/drawing/2014/main" val="10006"/>
                   </a:ext>
                 </a:extLst>
               </a:tr>
@@ -24882,7 +24885,7 @@
                 </a:tc>
                 <a:extLst>
                   <a:ext uri="{0D108BD9-81ED-4DB2-BD59-A6C34878D82A}">
-                    <a16:rowId xmlns:a16="http://schemas.microsoft.com/office/drawing/2014/main" xmlns="" val="10007"/>
+                    <a16:rowId xmlns="" xmlns:a16="http://schemas.microsoft.com/office/drawing/2014/main" val="10007"/>
                   </a:ext>
                 </a:extLst>
               </a:tr>
@@ -24949,7 +24952,7 @@
                 </a:tc>
                 <a:extLst>
                   <a:ext uri="{0D108BD9-81ED-4DB2-BD59-A6C34878D82A}">
-                    <a16:rowId xmlns:a16="http://schemas.microsoft.com/office/drawing/2014/main" xmlns="" val="10008"/>
+                    <a16:rowId xmlns="" xmlns:a16="http://schemas.microsoft.com/office/drawing/2014/main" val="10008"/>
                   </a:ext>
                 </a:extLst>
               </a:tr>
@@ -25068,7 +25071,7 @@
           <p:cNvPr id="2" name="Date Placeholder 1">
             <a:extLst>
               <a:ext uri="{FF2B5EF4-FFF2-40B4-BE49-F238E27FC236}">
-                <a16:creationId xmlns:a16="http://schemas.microsoft.com/office/drawing/2014/main" xmlns="" id="{6BF190EE-92E3-4313-92EF-4C495CE58CEA}"/>
+                <a16:creationId xmlns="" xmlns:a16="http://schemas.microsoft.com/office/drawing/2014/main" id="{6BF190EE-92E3-4313-92EF-4C495CE58CEA}"/>
               </a:ext>
             </a:extLst>
           </p:cNvPr>
@@ -25097,7 +25100,7 @@
           <p:cNvPr id="3" name="Title 2">
             <a:extLst>
               <a:ext uri="{FF2B5EF4-FFF2-40B4-BE49-F238E27FC236}">
-                <a16:creationId xmlns:a16="http://schemas.microsoft.com/office/drawing/2014/main" xmlns="" id="{5AD8170E-B4B0-4284-8636-D6CCC59E4E9F}"/>
+                <a16:creationId xmlns="" xmlns:a16="http://schemas.microsoft.com/office/drawing/2014/main" id="{5AD8170E-B4B0-4284-8636-D6CCC59E4E9F}"/>
               </a:ext>
             </a:extLst>
           </p:cNvPr>
@@ -25122,7 +25125,7 @@
           <p:cNvPr id="4" name="Footer Placeholder 3">
             <a:extLst>
               <a:ext uri="{FF2B5EF4-FFF2-40B4-BE49-F238E27FC236}">
-                <a16:creationId xmlns:a16="http://schemas.microsoft.com/office/drawing/2014/main" xmlns="" id="{FC8FA931-BB9C-48A1-AE45-F4359BFB5036}"/>
+                <a16:creationId xmlns="" xmlns:a16="http://schemas.microsoft.com/office/drawing/2014/main" id="{FC8FA931-BB9C-48A1-AE45-F4359BFB5036}"/>
               </a:ext>
             </a:extLst>
           </p:cNvPr>
@@ -25151,7 +25154,7 @@
           <p:cNvPr id="5" name="Slide Number Placeholder 4">
             <a:extLst>
               <a:ext uri="{FF2B5EF4-FFF2-40B4-BE49-F238E27FC236}">
-                <a16:creationId xmlns:a16="http://schemas.microsoft.com/office/drawing/2014/main" xmlns="" id="{461FE6D3-DBEB-484F-A373-86A1AD977524}"/>
+                <a16:creationId xmlns="" xmlns:a16="http://schemas.microsoft.com/office/drawing/2014/main" id="{461FE6D3-DBEB-484F-A373-86A1AD977524}"/>
               </a:ext>
             </a:extLst>
           </p:cNvPr>
@@ -25181,7 +25184,7 @@
           <p:cNvPr id="1026" name="Picture 2" descr="Image result for after lunch meme">
             <a:extLst>
               <a:ext uri="{FF2B5EF4-FFF2-40B4-BE49-F238E27FC236}">
-                <a16:creationId xmlns:a16="http://schemas.microsoft.com/office/drawing/2014/main" xmlns="" id="{DA7178C5-ED14-4BAE-99EA-602851F9FF72}"/>
+                <a16:creationId xmlns="" xmlns:a16="http://schemas.microsoft.com/office/drawing/2014/main" id="{DA7178C5-ED14-4BAE-99EA-602851F9FF72}"/>
               </a:ext>
             </a:extLst>
           </p:cNvPr>
@@ -25265,7 +25268,7 @@
           <p:cNvPr id="2" name="Date Placeholder 1">
             <a:extLst>
               <a:ext uri="{FF2B5EF4-FFF2-40B4-BE49-F238E27FC236}">
-                <a16:creationId xmlns:a16="http://schemas.microsoft.com/office/drawing/2014/main" xmlns="" id="{7C3C0867-65AB-4C21-BC3F-CA1D2EB94711}"/>
+                <a16:creationId xmlns="" xmlns:a16="http://schemas.microsoft.com/office/drawing/2014/main" id="{7C3C0867-65AB-4C21-BC3F-CA1D2EB94711}"/>
               </a:ext>
             </a:extLst>
           </p:cNvPr>
@@ -25294,7 +25297,7 @@
           <p:cNvPr id="3" name="Title 2">
             <a:extLst>
               <a:ext uri="{FF2B5EF4-FFF2-40B4-BE49-F238E27FC236}">
-                <a16:creationId xmlns:a16="http://schemas.microsoft.com/office/drawing/2014/main" xmlns="" id="{0803362D-3381-4564-88FC-AE4323988CC8}"/>
+                <a16:creationId xmlns="" xmlns:a16="http://schemas.microsoft.com/office/drawing/2014/main" id="{0803362D-3381-4564-88FC-AE4323988CC8}"/>
               </a:ext>
             </a:extLst>
           </p:cNvPr>
@@ -25323,7 +25326,7 @@
           <p:cNvPr id="4" name="Footer Placeholder 3">
             <a:extLst>
               <a:ext uri="{FF2B5EF4-FFF2-40B4-BE49-F238E27FC236}">
-                <a16:creationId xmlns:a16="http://schemas.microsoft.com/office/drawing/2014/main" xmlns="" id="{A623A14B-73AB-442E-AE75-3E5FFE0C99FE}"/>
+                <a16:creationId xmlns="" xmlns:a16="http://schemas.microsoft.com/office/drawing/2014/main" id="{A623A14B-73AB-442E-AE75-3E5FFE0C99FE}"/>
               </a:ext>
             </a:extLst>
           </p:cNvPr>
@@ -25352,7 +25355,7 @@
           <p:cNvPr id="5" name="Slide Number Placeholder 4">
             <a:extLst>
               <a:ext uri="{FF2B5EF4-FFF2-40B4-BE49-F238E27FC236}">
-                <a16:creationId xmlns:a16="http://schemas.microsoft.com/office/drawing/2014/main" xmlns="" id="{A621A574-0926-4BA6-87B8-D57DD5571C37}"/>
+                <a16:creationId xmlns="" xmlns:a16="http://schemas.microsoft.com/office/drawing/2014/main" id="{A621A574-0926-4BA6-87B8-D57DD5571C37}"/>
               </a:ext>
             </a:extLst>
           </p:cNvPr>
@@ -25496,7 +25499,7 @@
           <p:cNvPr id="2" name="Date Placeholder 1">
             <a:extLst>
               <a:ext uri="{FF2B5EF4-FFF2-40B4-BE49-F238E27FC236}">
-                <a16:creationId xmlns:a16="http://schemas.microsoft.com/office/drawing/2014/main" xmlns="" id="{7C3C0867-65AB-4C21-BC3F-CA1D2EB94711}"/>
+                <a16:creationId xmlns="" xmlns:a16="http://schemas.microsoft.com/office/drawing/2014/main" id="{7C3C0867-65AB-4C21-BC3F-CA1D2EB94711}"/>
               </a:ext>
             </a:extLst>
           </p:cNvPr>
@@ -25525,7 +25528,7 @@
           <p:cNvPr id="3" name="Title 2">
             <a:extLst>
               <a:ext uri="{FF2B5EF4-FFF2-40B4-BE49-F238E27FC236}">
-                <a16:creationId xmlns:a16="http://schemas.microsoft.com/office/drawing/2014/main" xmlns="" id="{0803362D-3381-4564-88FC-AE4323988CC8}"/>
+                <a16:creationId xmlns="" xmlns:a16="http://schemas.microsoft.com/office/drawing/2014/main" id="{0803362D-3381-4564-88FC-AE4323988CC8}"/>
               </a:ext>
             </a:extLst>
           </p:cNvPr>
@@ -25554,7 +25557,7 @@
           <p:cNvPr id="4" name="Footer Placeholder 3">
             <a:extLst>
               <a:ext uri="{FF2B5EF4-FFF2-40B4-BE49-F238E27FC236}">
-                <a16:creationId xmlns:a16="http://schemas.microsoft.com/office/drawing/2014/main" xmlns="" id="{A623A14B-73AB-442E-AE75-3E5FFE0C99FE}"/>
+                <a16:creationId xmlns="" xmlns:a16="http://schemas.microsoft.com/office/drawing/2014/main" id="{A623A14B-73AB-442E-AE75-3E5FFE0C99FE}"/>
               </a:ext>
             </a:extLst>
           </p:cNvPr>
@@ -25583,7 +25586,7 @@
           <p:cNvPr id="5" name="Slide Number Placeholder 4">
             <a:extLst>
               <a:ext uri="{FF2B5EF4-FFF2-40B4-BE49-F238E27FC236}">
-                <a16:creationId xmlns:a16="http://schemas.microsoft.com/office/drawing/2014/main" xmlns="" id="{A621A574-0926-4BA6-87B8-D57DD5571C37}"/>
+                <a16:creationId xmlns="" xmlns:a16="http://schemas.microsoft.com/office/drawing/2014/main" id="{A621A574-0926-4BA6-87B8-D57DD5571C37}"/>
               </a:ext>
             </a:extLst>
           </p:cNvPr>
@@ -25993,7 +25996,7 @@
           <a:graphicData uri="http://schemas.openxmlformats.org/presentationml/2006/ole">
             <mc:AlternateContent xmlns:mc="http://schemas.openxmlformats.org/markup-compatibility/2006">
               <mc:Choice xmlns:v="urn:schemas-microsoft-com:vml" Requires="v">
-                <p:oleObj spid="_x0000_s1040" name="Document" r:id="rId3" imgW="2858268" imgH="544757" progId="Word.Document.12">
+                <p:oleObj spid="_x0000_s1045" name="Document" r:id="rId3" imgW="2858268" imgH="544757" progId="Word.Document.12">
                   <p:embed/>
                 </p:oleObj>
               </mc:Choice>
@@ -26069,7 +26072,7 @@
           <p:cNvPr id="2" name="Date Placeholder 1">
             <a:extLst>
               <a:ext uri="{FF2B5EF4-FFF2-40B4-BE49-F238E27FC236}">
-                <a16:creationId xmlns:a16="http://schemas.microsoft.com/office/drawing/2014/main" xmlns="" id="{FEB02FB2-73D4-4729-A58C-B94EE1FC52A1}"/>
+                <a16:creationId xmlns="" xmlns:a16="http://schemas.microsoft.com/office/drawing/2014/main" id="{FEB02FB2-73D4-4729-A58C-B94EE1FC52A1}"/>
               </a:ext>
             </a:extLst>
           </p:cNvPr>
@@ -26098,7 +26101,7 @@
           <p:cNvPr id="3" name="Title 2">
             <a:extLst>
               <a:ext uri="{FF2B5EF4-FFF2-40B4-BE49-F238E27FC236}">
-                <a16:creationId xmlns:a16="http://schemas.microsoft.com/office/drawing/2014/main" xmlns="" id="{77E938A7-01E0-477E-9303-809145BC8EE8}"/>
+                <a16:creationId xmlns="" xmlns:a16="http://schemas.microsoft.com/office/drawing/2014/main" id="{77E938A7-01E0-477E-9303-809145BC8EE8}"/>
               </a:ext>
             </a:extLst>
           </p:cNvPr>
@@ -26126,7 +26129,7 @@
           <p:cNvPr id="4" name="Footer Placeholder 3">
             <a:extLst>
               <a:ext uri="{FF2B5EF4-FFF2-40B4-BE49-F238E27FC236}">
-                <a16:creationId xmlns:a16="http://schemas.microsoft.com/office/drawing/2014/main" xmlns="" id="{60BD5936-3DE0-4EBD-B007-692DDA8320B3}"/>
+                <a16:creationId xmlns="" xmlns:a16="http://schemas.microsoft.com/office/drawing/2014/main" id="{60BD5936-3DE0-4EBD-B007-692DDA8320B3}"/>
               </a:ext>
             </a:extLst>
           </p:cNvPr>
@@ -26155,7 +26158,7 @@
           <p:cNvPr id="5" name="Slide Number Placeholder 4">
             <a:extLst>
               <a:ext uri="{FF2B5EF4-FFF2-40B4-BE49-F238E27FC236}">
-                <a16:creationId xmlns:a16="http://schemas.microsoft.com/office/drawing/2014/main" xmlns="" id="{76D93A47-CBE7-4000-9944-AF364E2CC2A1}"/>
+                <a16:creationId xmlns="" xmlns:a16="http://schemas.microsoft.com/office/drawing/2014/main" id="{76D93A47-CBE7-4000-9944-AF364E2CC2A1}"/>
               </a:ext>
             </a:extLst>
           </p:cNvPr>
@@ -27564,7 +27567,7 @@
           <p:cNvPr id="2" name="Date Placeholder 1">
             <a:extLst>
               <a:ext uri="{FF2B5EF4-FFF2-40B4-BE49-F238E27FC236}">
-                <a16:creationId xmlns:a16="http://schemas.microsoft.com/office/drawing/2014/main" xmlns="" id="{7C3C0867-65AB-4C21-BC3F-CA1D2EB94711}"/>
+                <a16:creationId xmlns="" xmlns:a16="http://schemas.microsoft.com/office/drawing/2014/main" id="{7C3C0867-65AB-4C21-BC3F-CA1D2EB94711}"/>
               </a:ext>
             </a:extLst>
           </p:cNvPr>
@@ -27593,7 +27596,7 @@
           <p:cNvPr id="3" name="Title 2">
             <a:extLst>
               <a:ext uri="{FF2B5EF4-FFF2-40B4-BE49-F238E27FC236}">
-                <a16:creationId xmlns:a16="http://schemas.microsoft.com/office/drawing/2014/main" xmlns="" id="{0803362D-3381-4564-88FC-AE4323988CC8}"/>
+                <a16:creationId xmlns="" xmlns:a16="http://schemas.microsoft.com/office/drawing/2014/main" id="{0803362D-3381-4564-88FC-AE4323988CC8}"/>
               </a:ext>
             </a:extLst>
           </p:cNvPr>
@@ -27627,7 +27630,7 @@
           <p:cNvPr id="4" name="Footer Placeholder 3">
             <a:extLst>
               <a:ext uri="{FF2B5EF4-FFF2-40B4-BE49-F238E27FC236}">
-                <a16:creationId xmlns:a16="http://schemas.microsoft.com/office/drawing/2014/main" xmlns="" id="{A623A14B-73AB-442E-AE75-3E5FFE0C99FE}"/>
+                <a16:creationId xmlns="" xmlns:a16="http://schemas.microsoft.com/office/drawing/2014/main" id="{A623A14B-73AB-442E-AE75-3E5FFE0C99FE}"/>
               </a:ext>
             </a:extLst>
           </p:cNvPr>
@@ -27656,7 +27659,7 @@
           <p:cNvPr id="5" name="Slide Number Placeholder 4">
             <a:extLst>
               <a:ext uri="{FF2B5EF4-FFF2-40B4-BE49-F238E27FC236}">
-                <a16:creationId xmlns:a16="http://schemas.microsoft.com/office/drawing/2014/main" xmlns="" id="{A621A574-0926-4BA6-87B8-D57DD5571C37}"/>
+                <a16:creationId xmlns="" xmlns:a16="http://schemas.microsoft.com/office/drawing/2014/main" id="{A621A574-0926-4BA6-87B8-D57DD5571C37}"/>
               </a:ext>
             </a:extLst>
           </p:cNvPr>
@@ -27997,7 +28000,7 @@
           <p:cNvPr id="2" name="Date Placeholder 1">
             <a:extLst>
               <a:ext uri="{FF2B5EF4-FFF2-40B4-BE49-F238E27FC236}">
-                <a16:creationId xmlns:a16="http://schemas.microsoft.com/office/drawing/2014/main" xmlns="" id="{7C3C0867-65AB-4C21-BC3F-CA1D2EB94711}"/>
+                <a16:creationId xmlns="" xmlns:a16="http://schemas.microsoft.com/office/drawing/2014/main" id="{7C3C0867-65AB-4C21-BC3F-CA1D2EB94711}"/>
               </a:ext>
             </a:extLst>
           </p:cNvPr>
@@ -28027,7 +28030,7 @@
           <p:cNvPr id="3" name="Title 2">
             <a:extLst>
               <a:ext uri="{FF2B5EF4-FFF2-40B4-BE49-F238E27FC236}">
-                <a16:creationId xmlns:a16="http://schemas.microsoft.com/office/drawing/2014/main" xmlns="" id="{0803362D-3381-4564-88FC-AE4323988CC8}"/>
+                <a16:creationId xmlns="" xmlns:a16="http://schemas.microsoft.com/office/drawing/2014/main" id="{0803362D-3381-4564-88FC-AE4323988CC8}"/>
               </a:ext>
             </a:extLst>
           </p:cNvPr>
@@ -28056,7 +28059,7 @@
           <p:cNvPr id="4" name="Footer Placeholder 3">
             <a:extLst>
               <a:ext uri="{FF2B5EF4-FFF2-40B4-BE49-F238E27FC236}">
-                <a16:creationId xmlns:a16="http://schemas.microsoft.com/office/drawing/2014/main" xmlns="" id="{A623A14B-73AB-442E-AE75-3E5FFE0C99FE}"/>
+                <a16:creationId xmlns="" xmlns:a16="http://schemas.microsoft.com/office/drawing/2014/main" id="{A623A14B-73AB-442E-AE75-3E5FFE0C99FE}"/>
               </a:ext>
             </a:extLst>
           </p:cNvPr>
@@ -28085,7 +28088,7 @@
           <p:cNvPr id="5" name="Slide Number Placeholder 4">
             <a:extLst>
               <a:ext uri="{FF2B5EF4-FFF2-40B4-BE49-F238E27FC236}">
-                <a16:creationId xmlns:a16="http://schemas.microsoft.com/office/drawing/2014/main" xmlns="" id="{A621A574-0926-4BA6-87B8-D57DD5571C37}"/>
+                <a16:creationId xmlns="" xmlns:a16="http://schemas.microsoft.com/office/drawing/2014/main" id="{A621A574-0926-4BA6-87B8-D57DD5571C37}"/>
               </a:ext>
             </a:extLst>
           </p:cNvPr>
@@ -28534,7 +28537,7 @@
           <p:cNvPr id="2" name="Date Placeholder 1">
             <a:extLst>
               <a:ext uri="{FF2B5EF4-FFF2-40B4-BE49-F238E27FC236}">
-                <a16:creationId xmlns:a16="http://schemas.microsoft.com/office/drawing/2014/main" xmlns="" id="{3728DC17-3484-4A87-A056-F55CBA2C41BB}"/>
+                <a16:creationId xmlns="" xmlns:a16="http://schemas.microsoft.com/office/drawing/2014/main" id="{3728DC17-3484-4A87-A056-F55CBA2C41BB}"/>
               </a:ext>
             </a:extLst>
           </p:cNvPr>
@@ -28563,7 +28566,7 @@
           <p:cNvPr id="3" name="Title 2">
             <a:extLst>
               <a:ext uri="{FF2B5EF4-FFF2-40B4-BE49-F238E27FC236}">
-                <a16:creationId xmlns:a16="http://schemas.microsoft.com/office/drawing/2014/main" xmlns="" id="{50A1C8B0-E959-485F-8DF7-20C85B3661D4}"/>
+                <a16:creationId xmlns="" xmlns:a16="http://schemas.microsoft.com/office/drawing/2014/main" id="{50A1C8B0-E959-485F-8DF7-20C85B3661D4}"/>
               </a:ext>
             </a:extLst>
           </p:cNvPr>
@@ -28591,7 +28594,7 @@
           <p:cNvPr id="4" name="Footer Placeholder 3">
             <a:extLst>
               <a:ext uri="{FF2B5EF4-FFF2-40B4-BE49-F238E27FC236}">
-                <a16:creationId xmlns:a16="http://schemas.microsoft.com/office/drawing/2014/main" xmlns="" id="{EC170510-B545-44DA-B6F4-501A364A2A68}"/>
+                <a16:creationId xmlns="" xmlns:a16="http://schemas.microsoft.com/office/drawing/2014/main" id="{EC170510-B545-44DA-B6F4-501A364A2A68}"/>
               </a:ext>
             </a:extLst>
           </p:cNvPr>
@@ -28620,7 +28623,7 @@
           <p:cNvPr id="5" name="Slide Number Placeholder 4">
             <a:extLst>
               <a:ext uri="{FF2B5EF4-FFF2-40B4-BE49-F238E27FC236}">
-                <a16:creationId xmlns:a16="http://schemas.microsoft.com/office/drawing/2014/main" xmlns="" id="{99B04A1B-4969-4AB5-9F4D-39ECB9F302FA}"/>
+                <a16:creationId xmlns="" xmlns:a16="http://schemas.microsoft.com/office/drawing/2014/main" id="{99B04A1B-4969-4AB5-9F4D-39ECB9F302FA}"/>
               </a:ext>
             </a:extLst>
           </p:cNvPr>
@@ -28650,7 +28653,7 @@
           <p:cNvPr id="6" name="Content Placeholder 2">
             <a:extLst>
               <a:ext uri="{FF2B5EF4-FFF2-40B4-BE49-F238E27FC236}">
-                <a16:creationId xmlns:a16="http://schemas.microsoft.com/office/drawing/2014/main" xmlns="" id="{491D4F80-9D6B-4F61-896F-18C90E064806}"/>
+                <a16:creationId xmlns="" xmlns:a16="http://schemas.microsoft.com/office/drawing/2014/main" id="{491D4F80-9D6B-4F61-896F-18C90E064806}"/>
               </a:ext>
             </a:extLst>
           </p:cNvPr>
@@ -28939,7 +28942,7 @@
           <p:cNvPr id="2" name="Date Placeholder 1">
             <a:extLst>
               <a:ext uri="{FF2B5EF4-FFF2-40B4-BE49-F238E27FC236}">
-                <a16:creationId xmlns:a16="http://schemas.microsoft.com/office/drawing/2014/main" xmlns="" id="{7C3C0867-65AB-4C21-BC3F-CA1D2EB94711}"/>
+                <a16:creationId xmlns="" xmlns:a16="http://schemas.microsoft.com/office/drawing/2014/main" id="{7C3C0867-65AB-4C21-BC3F-CA1D2EB94711}"/>
               </a:ext>
             </a:extLst>
           </p:cNvPr>
@@ -28969,7 +28972,7 @@
           <p:cNvPr id="3" name="Title 2">
             <a:extLst>
               <a:ext uri="{FF2B5EF4-FFF2-40B4-BE49-F238E27FC236}">
-                <a16:creationId xmlns:a16="http://schemas.microsoft.com/office/drawing/2014/main" xmlns="" id="{0803362D-3381-4564-88FC-AE4323988CC8}"/>
+                <a16:creationId xmlns="" xmlns:a16="http://schemas.microsoft.com/office/drawing/2014/main" id="{0803362D-3381-4564-88FC-AE4323988CC8}"/>
               </a:ext>
             </a:extLst>
           </p:cNvPr>
@@ -28998,7 +29001,7 @@
           <p:cNvPr id="4" name="Footer Placeholder 3">
             <a:extLst>
               <a:ext uri="{FF2B5EF4-FFF2-40B4-BE49-F238E27FC236}">
-                <a16:creationId xmlns:a16="http://schemas.microsoft.com/office/drawing/2014/main" xmlns="" id="{A623A14B-73AB-442E-AE75-3E5FFE0C99FE}"/>
+                <a16:creationId xmlns="" xmlns:a16="http://schemas.microsoft.com/office/drawing/2014/main" id="{A623A14B-73AB-442E-AE75-3E5FFE0C99FE}"/>
               </a:ext>
             </a:extLst>
           </p:cNvPr>
@@ -29027,7 +29030,7 @@
           <p:cNvPr id="5" name="Slide Number Placeholder 4">
             <a:extLst>
               <a:ext uri="{FF2B5EF4-FFF2-40B4-BE49-F238E27FC236}">
-                <a16:creationId xmlns:a16="http://schemas.microsoft.com/office/drawing/2014/main" xmlns="" id="{A621A574-0926-4BA6-87B8-D57DD5571C37}"/>
+                <a16:creationId xmlns="" xmlns:a16="http://schemas.microsoft.com/office/drawing/2014/main" id="{A621A574-0926-4BA6-87B8-D57DD5571C37}"/>
               </a:ext>
             </a:extLst>
           </p:cNvPr>
@@ -29525,7 +29528,7 @@
           <p:cNvPr id="2" name="Date Placeholder 1">
             <a:extLst>
               <a:ext uri="{FF2B5EF4-FFF2-40B4-BE49-F238E27FC236}">
-                <a16:creationId xmlns:a16="http://schemas.microsoft.com/office/drawing/2014/main" xmlns="" id="{7C3C0867-65AB-4C21-BC3F-CA1D2EB94711}"/>
+                <a16:creationId xmlns="" xmlns:a16="http://schemas.microsoft.com/office/drawing/2014/main" id="{7C3C0867-65AB-4C21-BC3F-CA1D2EB94711}"/>
               </a:ext>
             </a:extLst>
           </p:cNvPr>
@@ -29555,7 +29558,7 @@
           <p:cNvPr id="3" name="Title 2">
             <a:extLst>
               <a:ext uri="{FF2B5EF4-FFF2-40B4-BE49-F238E27FC236}">
-                <a16:creationId xmlns:a16="http://schemas.microsoft.com/office/drawing/2014/main" xmlns="" id="{0803362D-3381-4564-88FC-AE4323988CC8}"/>
+                <a16:creationId xmlns="" xmlns:a16="http://schemas.microsoft.com/office/drawing/2014/main" id="{0803362D-3381-4564-88FC-AE4323988CC8}"/>
               </a:ext>
             </a:extLst>
           </p:cNvPr>
@@ -29584,7 +29587,7 @@
           <p:cNvPr id="4" name="Footer Placeholder 3">
             <a:extLst>
               <a:ext uri="{FF2B5EF4-FFF2-40B4-BE49-F238E27FC236}">
-                <a16:creationId xmlns:a16="http://schemas.microsoft.com/office/drawing/2014/main" xmlns="" id="{A623A14B-73AB-442E-AE75-3E5FFE0C99FE}"/>
+                <a16:creationId xmlns="" xmlns:a16="http://schemas.microsoft.com/office/drawing/2014/main" id="{A623A14B-73AB-442E-AE75-3E5FFE0C99FE}"/>
               </a:ext>
             </a:extLst>
           </p:cNvPr>
@@ -29613,7 +29616,7 @@
           <p:cNvPr id="5" name="Slide Number Placeholder 4">
             <a:extLst>
               <a:ext uri="{FF2B5EF4-FFF2-40B4-BE49-F238E27FC236}">
-                <a16:creationId xmlns:a16="http://schemas.microsoft.com/office/drawing/2014/main" xmlns="" id="{A621A574-0926-4BA6-87B8-D57DD5571C37}"/>
+                <a16:creationId xmlns="" xmlns:a16="http://schemas.microsoft.com/office/drawing/2014/main" id="{A621A574-0926-4BA6-87B8-D57DD5571C37}"/>
               </a:ext>
             </a:extLst>
           </p:cNvPr>
@@ -30222,7 +30225,7 @@
           <p:cNvPr id="2" name="Date Placeholder 1">
             <a:extLst>
               <a:ext uri="{FF2B5EF4-FFF2-40B4-BE49-F238E27FC236}">
-                <a16:creationId xmlns:a16="http://schemas.microsoft.com/office/drawing/2014/main" xmlns="" id="{7C3C0867-65AB-4C21-BC3F-CA1D2EB94711}"/>
+                <a16:creationId xmlns="" xmlns:a16="http://schemas.microsoft.com/office/drawing/2014/main" id="{7C3C0867-65AB-4C21-BC3F-CA1D2EB94711}"/>
               </a:ext>
             </a:extLst>
           </p:cNvPr>
@@ -30252,7 +30255,7 @@
           <p:cNvPr id="3" name="Title 2">
             <a:extLst>
               <a:ext uri="{FF2B5EF4-FFF2-40B4-BE49-F238E27FC236}">
-                <a16:creationId xmlns:a16="http://schemas.microsoft.com/office/drawing/2014/main" xmlns="" id="{0803362D-3381-4564-88FC-AE4323988CC8}"/>
+                <a16:creationId xmlns="" xmlns:a16="http://schemas.microsoft.com/office/drawing/2014/main" id="{0803362D-3381-4564-88FC-AE4323988CC8}"/>
               </a:ext>
             </a:extLst>
           </p:cNvPr>
@@ -30281,7 +30284,7 @@
           <p:cNvPr id="4" name="Footer Placeholder 3">
             <a:extLst>
               <a:ext uri="{FF2B5EF4-FFF2-40B4-BE49-F238E27FC236}">
-                <a16:creationId xmlns:a16="http://schemas.microsoft.com/office/drawing/2014/main" xmlns="" id="{A623A14B-73AB-442E-AE75-3E5FFE0C99FE}"/>
+                <a16:creationId xmlns="" xmlns:a16="http://schemas.microsoft.com/office/drawing/2014/main" id="{A623A14B-73AB-442E-AE75-3E5FFE0C99FE}"/>
               </a:ext>
             </a:extLst>
           </p:cNvPr>
@@ -30310,7 +30313,7 @@
           <p:cNvPr id="5" name="Slide Number Placeholder 4">
             <a:extLst>
               <a:ext uri="{FF2B5EF4-FFF2-40B4-BE49-F238E27FC236}">
-                <a16:creationId xmlns:a16="http://schemas.microsoft.com/office/drawing/2014/main" xmlns="" id="{A621A574-0926-4BA6-87B8-D57DD5571C37}"/>
+                <a16:creationId xmlns="" xmlns:a16="http://schemas.microsoft.com/office/drawing/2014/main" id="{A621A574-0926-4BA6-87B8-D57DD5571C37}"/>
               </a:ext>
             </a:extLst>
           </p:cNvPr>
@@ -30949,7 +30952,7 @@
           <p:cNvPr id="2" name="Date Placeholder 1">
             <a:extLst>
               <a:ext uri="{FF2B5EF4-FFF2-40B4-BE49-F238E27FC236}">
-                <a16:creationId xmlns:a16="http://schemas.microsoft.com/office/drawing/2014/main" xmlns="" id="{7C3C0867-65AB-4C21-BC3F-CA1D2EB94711}"/>
+                <a16:creationId xmlns="" xmlns:a16="http://schemas.microsoft.com/office/drawing/2014/main" id="{7C3C0867-65AB-4C21-BC3F-CA1D2EB94711}"/>
               </a:ext>
             </a:extLst>
           </p:cNvPr>
@@ -30978,7 +30981,7 @@
           <p:cNvPr id="3" name="Title 2">
             <a:extLst>
               <a:ext uri="{FF2B5EF4-FFF2-40B4-BE49-F238E27FC236}">
-                <a16:creationId xmlns:a16="http://schemas.microsoft.com/office/drawing/2014/main" xmlns="" id="{0803362D-3381-4564-88FC-AE4323988CC8}"/>
+                <a16:creationId xmlns="" xmlns:a16="http://schemas.microsoft.com/office/drawing/2014/main" id="{0803362D-3381-4564-88FC-AE4323988CC8}"/>
               </a:ext>
             </a:extLst>
           </p:cNvPr>
@@ -31012,7 +31015,7 @@
           <p:cNvPr id="4" name="Footer Placeholder 3">
             <a:extLst>
               <a:ext uri="{FF2B5EF4-FFF2-40B4-BE49-F238E27FC236}">
-                <a16:creationId xmlns:a16="http://schemas.microsoft.com/office/drawing/2014/main" xmlns="" id="{A623A14B-73AB-442E-AE75-3E5FFE0C99FE}"/>
+                <a16:creationId xmlns="" xmlns:a16="http://schemas.microsoft.com/office/drawing/2014/main" id="{A623A14B-73AB-442E-AE75-3E5FFE0C99FE}"/>
               </a:ext>
             </a:extLst>
           </p:cNvPr>
@@ -31041,7 +31044,7 @@
           <p:cNvPr id="5" name="Slide Number Placeholder 4">
             <a:extLst>
               <a:ext uri="{FF2B5EF4-FFF2-40B4-BE49-F238E27FC236}">
-                <a16:creationId xmlns:a16="http://schemas.microsoft.com/office/drawing/2014/main" xmlns="" id="{A621A574-0926-4BA6-87B8-D57DD5571C37}"/>
+                <a16:creationId xmlns="" xmlns:a16="http://schemas.microsoft.com/office/drawing/2014/main" id="{A621A574-0926-4BA6-87B8-D57DD5571C37}"/>
               </a:ext>
             </a:extLst>
           </p:cNvPr>
@@ -31627,7 +31630,7 @@
           <p:cNvPr id="2" name="Date Placeholder 1">
             <a:extLst>
               <a:ext uri="{FF2B5EF4-FFF2-40B4-BE49-F238E27FC236}">
-                <a16:creationId xmlns:a16="http://schemas.microsoft.com/office/drawing/2014/main" xmlns="" id="{7C3C0867-65AB-4C21-BC3F-CA1D2EB94711}"/>
+                <a16:creationId xmlns="" xmlns:a16="http://schemas.microsoft.com/office/drawing/2014/main" id="{7C3C0867-65AB-4C21-BC3F-CA1D2EB94711}"/>
               </a:ext>
             </a:extLst>
           </p:cNvPr>
@@ -31657,7 +31660,7 @@
           <p:cNvPr id="3" name="Title 2">
             <a:extLst>
               <a:ext uri="{FF2B5EF4-FFF2-40B4-BE49-F238E27FC236}">
-                <a16:creationId xmlns:a16="http://schemas.microsoft.com/office/drawing/2014/main" xmlns="" id="{0803362D-3381-4564-88FC-AE4323988CC8}"/>
+                <a16:creationId xmlns="" xmlns:a16="http://schemas.microsoft.com/office/drawing/2014/main" id="{0803362D-3381-4564-88FC-AE4323988CC8}"/>
               </a:ext>
             </a:extLst>
           </p:cNvPr>
@@ -31686,7 +31689,7 @@
           <p:cNvPr id="4" name="Footer Placeholder 3">
             <a:extLst>
               <a:ext uri="{FF2B5EF4-FFF2-40B4-BE49-F238E27FC236}">
-                <a16:creationId xmlns:a16="http://schemas.microsoft.com/office/drawing/2014/main" xmlns="" id="{A623A14B-73AB-442E-AE75-3E5FFE0C99FE}"/>
+                <a16:creationId xmlns="" xmlns:a16="http://schemas.microsoft.com/office/drawing/2014/main" id="{A623A14B-73AB-442E-AE75-3E5FFE0C99FE}"/>
               </a:ext>
             </a:extLst>
           </p:cNvPr>
@@ -31715,7 +31718,7 @@
           <p:cNvPr id="5" name="Slide Number Placeholder 4">
             <a:extLst>
               <a:ext uri="{FF2B5EF4-FFF2-40B4-BE49-F238E27FC236}">
-                <a16:creationId xmlns:a16="http://schemas.microsoft.com/office/drawing/2014/main" xmlns="" id="{A621A574-0926-4BA6-87B8-D57DD5571C37}"/>
+                <a16:creationId xmlns="" xmlns:a16="http://schemas.microsoft.com/office/drawing/2014/main" id="{A621A574-0926-4BA6-87B8-D57DD5571C37}"/>
               </a:ext>
             </a:extLst>
           </p:cNvPr>
@@ -32016,19 +32019,7 @@
             </a:r>
             <a:r>
               <a:rPr lang="en-US" sz="1600" dirty="0" smtClean="0"/>
-              <a:t> assignments again moves the centroid.  The process repeats until </a:t>
-            </a:r>
-            <a:r>
-              <a:rPr lang="en-US" sz="1600" dirty="0" smtClean="0"/>
-              <a:t>no </a:t>
-            </a:r>
-            <a:r>
-              <a:rPr lang="en-US" sz="1600" dirty="0" smtClean="0"/>
-              <a:t>reassignments occur after moving the </a:t>
-            </a:r>
-            <a:r>
-              <a:rPr lang="en-US" sz="1600" dirty="0" smtClean="0"/>
-              <a:t>centroids (convergence).</a:t>
+              <a:t> assignments again moves the centroid.  The process repeats until no reassignments occur after moving the centroids (convergence).</a:t>
             </a:r>
             <a:endParaRPr lang="en-US" sz="1600" dirty="0"/>
           </a:p>
@@ -32532,7 +32523,7 @@
           <p:cNvPr id="2" name="Date Placeholder 1">
             <a:extLst>
               <a:ext uri="{FF2B5EF4-FFF2-40B4-BE49-F238E27FC236}">
-                <a16:creationId xmlns:a16="http://schemas.microsoft.com/office/drawing/2014/main" xmlns="" id="{FEB02FB2-73D4-4729-A58C-B94EE1FC52A1}"/>
+                <a16:creationId xmlns="" xmlns:a16="http://schemas.microsoft.com/office/drawing/2014/main" id="{FEB02FB2-73D4-4729-A58C-B94EE1FC52A1}"/>
               </a:ext>
             </a:extLst>
           </p:cNvPr>
@@ -32561,7 +32552,7 @@
           <p:cNvPr id="3" name="Title 2">
             <a:extLst>
               <a:ext uri="{FF2B5EF4-FFF2-40B4-BE49-F238E27FC236}">
-                <a16:creationId xmlns:a16="http://schemas.microsoft.com/office/drawing/2014/main" xmlns="" id="{77E938A7-01E0-477E-9303-809145BC8EE8}"/>
+                <a16:creationId xmlns="" xmlns:a16="http://schemas.microsoft.com/office/drawing/2014/main" id="{77E938A7-01E0-477E-9303-809145BC8EE8}"/>
               </a:ext>
             </a:extLst>
           </p:cNvPr>
@@ -32589,7 +32580,7 @@
           <p:cNvPr id="4" name="Footer Placeholder 3">
             <a:extLst>
               <a:ext uri="{FF2B5EF4-FFF2-40B4-BE49-F238E27FC236}">
-                <a16:creationId xmlns:a16="http://schemas.microsoft.com/office/drawing/2014/main" xmlns="" id="{60BD5936-3DE0-4EBD-B007-692DDA8320B3}"/>
+                <a16:creationId xmlns="" xmlns:a16="http://schemas.microsoft.com/office/drawing/2014/main" id="{60BD5936-3DE0-4EBD-B007-692DDA8320B3}"/>
               </a:ext>
             </a:extLst>
           </p:cNvPr>
@@ -32618,7 +32609,7 @@
           <p:cNvPr id="5" name="Slide Number Placeholder 4">
             <a:extLst>
               <a:ext uri="{FF2B5EF4-FFF2-40B4-BE49-F238E27FC236}">
-                <a16:creationId xmlns:a16="http://schemas.microsoft.com/office/drawing/2014/main" xmlns="" id="{76D93A47-CBE7-4000-9944-AF364E2CC2A1}"/>
+                <a16:creationId xmlns="" xmlns:a16="http://schemas.microsoft.com/office/drawing/2014/main" id="{76D93A47-CBE7-4000-9944-AF364E2CC2A1}"/>
               </a:ext>
             </a:extLst>
           </p:cNvPr>
@@ -33510,7 +33501,7 @@
           <p:cNvPr id="2" name="Date Placeholder 1">
             <a:extLst>
               <a:ext uri="{FF2B5EF4-FFF2-40B4-BE49-F238E27FC236}">
-                <a16:creationId xmlns:a16="http://schemas.microsoft.com/office/drawing/2014/main" xmlns="" id="{5983191B-4E53-4811-A794-E51255BCE8A0}"/>
+                <a16:creationId xmlns="" xmlns:a16="http://schemas.microsoft.com/office/drawing/2014/main" id="{5983191B-4E53-4811-A794-E51255BCE8A0}"/>
               </a:ext>
             </a:extLst>
           </p:cNvPr>
@@ -33539,7 +33530,7 @@
           <p:cNvPr id="3" name="Title 2">
             <a:extLst>
               <a:ext uri="{FF2B5EF4-FFF2-40B4-BE49-F238E27FC236}">
-                <a16:creationId xmlns:a16="http://schemas.microsoft.com/office/drawing/2014/main" xmlns="" id="{F90B9183-00C9-4877-AB29-E262769190A0}"/>
+                <a16:creationId xmlns="" xmlns:a16="http://schemas.microsoft.com/office/drawing/2014/main" id="{F90B9183-00C9-4877-AB29-E262769190A0}"/>
               </a:ext>
             </a:extLst>
           </p:cNvPr>
@@ -33575,7 +33566,7 @@
           <p:cNvPr id="4" name="Footer Placeholder 3">
             <a:extLst>
               <a:ext uri="{FF2B5EF4-FFF2-40B4-BE49-F238E27FC236}">
-                <a16:creationId xmlns:a16="http://schemas.microsoft.com/office/drawing/2014/main" xmlns="" id="{1837290B-A78F-4CE0-B1D1-626B8BF8BEBD}"/>
+                <a16:creationId xmlns="" xmlns:a16="http://schemas.microsoft.com/office/drawing/2014/main" id="{1837290B-A78F-4CE0-B1D1-626B8BF8BEBD}"/>
               </a:ext>
             </a:extLst>
           </p:cNvPr>
@@ -33604,7 +33595,7 @@
           <p:cNvPr id="5" name="Slide Number Placeholder 4">
             <a:extLst>
               <a:ext uri="{FF2B5EF4-FFF2-40B4-BE49-F238E27FC236}">
-                <a16:creationId xmlns:a16="http://schemas.microsoft.com/office/drawing/2014/main" xmlns="" id="{D2A7EA73-C18D-468E-8650-F40ADF2720B4}"/>
+                <a16:creationId xmlns="" xmlns:a16="http://schemas.microsoft.com/office/drawing/2014/main" id="{D2A7EA73-C18D-468E-8650-F40ADF2720B4}"/>
               </a:ext>
             </a:extLst>
           </p:cNvPr>
@@ -33667,15 +33658,7 @@
             </a:pPr>
             <a:r>
               <a:rPr lang="en-US" dirty="0" smtClean="0"/>
-              <a:t>Less </a:t>
-            </a:r>
-            <a:r>
-              <a:rPr lang="en-US" dirty="0" smtClean="0"/>
-              <a:t>impacted </a:t>
-            </a:r>
-            <a:r>
-              <a:rPr lang="en-US" dirty="0" smtClean="0"/>
-              <a:t>by outliers</a:t>
+              <a:t>Less impacted by outliers</a:t>
             </a:r>
           </a:p>
           <a:p>
@@ -33827,7 +33810,7 @@
           <p:cNvPr id="2" name="Date Placeholder 1">
             <a:extLst>
               <a:ext uri="{FF2B5EF4-FFF2-40B4-BE49-F238E27FC236}">
-                <a16:creationId xmlns:a16="http://schemas.microsoft.com/office/drawing/2014/main" xmlns="" id="{F2044BC4-137A-48C9-AC90-557A74AB3C65}"/>
+                <a16:creationId xmlns="" xmlns:a16="http://schemas.microsoft.com/office/drawing/2014/main" id="{F2044BC4-137A-48C9-AC90-557A74AB3C65}"/>
               </a:ext>
             </a:extLst>
           </p:cNvPr>
@@ -33856,7 +33839,7 @@
           <p:cNvPr id="3" name="Title 2">
             <a:extLst>
               <a:ext uri="{FF2B5EF4-FFF2-40B4-BE49-F238E27FC236}">
-                <a16:creationId xmlns:a16="http://schemas.microsoft.com/office/drawing/2014/main" xmlns="" id="{194FC0B8-AD59-42B6-87BD-C5F47E278813}"/>
+                <a16:creationId xmlns="" xmlns:a16="http://schemas.microsoft.com/office/drawing/2014/main" id="{194FC0B8-AD59-42B6-87BD-C5F47E278813}"/>
               </a:ext>
             </a:extLst>
           </p:cNvPr>
@@ -33888,7 +33871,7 @@
           <p:cNvPr id="4" name="Footer Placeholder 3">
             <a:extLst>
               <a:ext uri="{FF2B5EF4-FFF2-40B4-BE49-F238E27FC236}">
-                <a16:creationId xmlns:a16="http://schemas.microsoft.com/office/drawing/2014/main" xmlns="" id="{BB32AB7D-41C8-4C00-BF84-12E12E513EA0}"/>
+                <a16:creationId xmlns="" xmlns:a16="http://schemas.microsoft.com/office/drawing/2014/main" id="{BB32AB7D-41C8-4C00-BF84-12E12E513EA0}"/>
               </a:ext>
             </a:extLst>
           </p:cNvPr>
@@ -33917,7 +33900,7 @@
           <p:cNvPr id="5" name="Slide Number Placeholder 4">
             <a:extLst>
               <a:ext uri="{FF2B5EF4-FFF2-40B4-BE49-F238E27FC236}">
-                <a16:creationId xmlns:a16="http://schemas.microsoft.com/office/drawing/2014/main" xmlns="" id="{B123BEAB-D46C-458F-B5E4-79AB83F49BB7}"/>
+                <a16:creationId xmlns="" xmlns:a16="http://schemas.microsoft.com/office/drawing/2014/main" id="{B123BEAB-D46C-458F-B5E4-79AB83F49BB7}"/>
               </a:ext>
             </a:extLst>
           </p:cNvPr>
@@ -34202,7 +34185,7 @@
           <p:cNvPr id="2" name="Date Placeholder 1">
             <a:extLst>
               <a:ext uri="{FF2B5EF4-FFF2-40B4-BE49-F238E27FC236}">
-                <a16:creationId xmlns:a16="http://schemas.microsoft.com/office/drawing/2014/main" xmlns="" id="{69EBB200-FD53-443C-A445-1CEB0D6AF095}"/>
+                <a16:creationId xmlns="" xmlns:a16="http://schemas.microsoft.com/office/drawing/2014/main" id="{69EBB200-FD53-443C-A445-1CEB0D6AF095}"/>
               </a:ext>
             </a:extLst>
           </p:cNvPr>
@@ -34231,7 +34214,7 @@
           <p:cNvPr id="3" name="Title 2">
             <a:extLst>
               <a:ext uri="{FF2B5EF4-FFF2-40B4-BE49-F238E27FC236}">
-                <a16:creationId xmlns:a16="http://schemas.microsoft.com/office/drawing/2014/main" xmlns="" id="{73278885-94D7-46C5-A6EF-8284E42A997B}"/>
+                <a16:creationId xmlns="" xmlns:a16="http://schemas.microsoft.com/office/drawing/2014/main" id="{73278885-94D7-46C5-A6EF-8284E42A997B}"/>
               </a:ext>
             </a:extLst>
           </p:cNvPr>
@@ -34259,7 +34242,7 @@
           <p:cNvPr id="4" name="Footer Placeholder 3">
             <a:extLst>
               <a:ext uri="{FF2B5EF4-FFF2-40B4-BE49-F238E27FC236}">
-                <a16:creationId xmlns:a16="http://schemas.microsoft.com/office/drawing/2014/main" xmlns="" id="{628E2758-EAB0-48B2-A657-DA1A3686F691}"/>
+                <a16:creationId xmlns="" xmlns:a16="http://schemas.microsoft.com/office/drawing/2014/main" id="{628E2758-EAB0-48B2-A657-DA1A3686F691}"/>
               </a:ext>
             </a:extLst>
           </p:cNvPr>
@@ -34288,7 +34271,7 @@
           <p:cNvPr id="5" name="Slide Number Placeholder 4">
             <a:extLst>
               <a:ext uri="{FF2B5EF4-FFF2-40B4-BE49-F238E27FC236}">
-                <a16:creationId xmlns:a16="http://schemas.microsoft.com/office/drawing/2014/main" xmlns="" id="{613D23F0-EACF-4BCF-928D-60A2538E152B}"/>
+                <a16:creationId xmlns="" xmlns:a16="http://schemas.microsoft.com/office/drawing/2014/main" id="{613D23F0-EACF-4BCF-928D-60A2538E152B}"/>
               </a:ext>
             </a:extLst>
           </p:cNvPr>
@@ -34318,7 +34301,7 @@
           <p:cNvPr id="6" name="Shape 278">
             <a:extLst>
               <a:ext uri="{FF2B5EF4-FFF2-40B4-BE49-F238E27FC236}">
-                <a16:creationId xmlns:a16="http://schemas.microsoft.com/office/drawing/2014/main" xmlns="" id="{914AFED0-5CA1-4EEB-B9AD-33A2C567EACA}"/>
+                <a16:creationId xmlns="" xmlns:a16="http://schemas.microsoft.com/office/drawing/2014/main" id="{914AFED0-5CA1-4EEB-B9AD-33A2C567EACA}"/>
               </a:ext>
             </a:extLst>
           </p:cNvPr>
@@ -34366,7 +34349,7 @@
           <p:cNvPr id="7" name="Shape 279">
             <a:extLst>
               <a:ext uri="{FF2B5EF4-FFF2-40B4-BE49-F238E27FC236}">
-                <a16:creationId xmlns:a16="http://schemas.microsoft.com/office/drawing/2014/main" xmlns="" id="{5FF15F1E-6456-4033-AED8-8A1E1406D2ED}"/>
+                <a16:creationId xmlns="" xmlns:a16="http://schemas.microsoft.com/office/drawing/2014/main" id="{5FF15F1E-6456-4033-AED8-8A1E1406D2ED}"/>
               </a:ext>
             </a:extLst>
           </p:cNvPr>
@@ -34409,7 +34392,7 @@
           <p:cNvPr id="8" name="Shape 280">
             <a:extLst>
               <a:ext uri="{FF2B5EF4-FFF2-40B4-BE49-F238E27FC236}">
-                <a16:creationId xmlns:a16="http://schemas.microsoft.com/office/drawing/2014/main" xmlns="" id="{89D91387-F3AF-4970-B655-1BAB74AD1B9B}"/>
+                <a16:creationId xmlns="" xmlns:a16="http://schemas.microsoft.com/office/drawing/2014/main" id="{89D91387-F3AF-4970-B655-1BAB74AD1B9B}"/>
               </a:ext>
             </a:extLst>
           </p:cNvPr>
@@ -34429,7 +34412,7 @@
             <p:cNvPr id="9" name="Shape 281">
               <a:extLst>
                 <a:ext uri="{FF2B5EF4-FFF2-40B4-BE49-F238E27FC236}">
-                  <a16:creationId xmlns:a16="http://schemas.microsoft.com/office/drawing/2014/main" xmlns="" id="{9466159C-F683-4701-8EE6-240B15CE49CE}"/>
+                  <a16:creationId xmlns="" xmlns:a16="http://schemas.microsoft.com/office/drawing/2014/main" id="{9466159C-F683-4701-8EE6-240B15CE49CE}"/>
                 </a:ext>
               </a:extLst>
             </p:cNvPr>
@@ -34472,7 +34455,7 @@
             <p:cNvPr id="10" name="Shape 282">
               <a:extLst>
                 <a:ext uri="{FF2B5EF4-FFF2-40B4-BE49-F238E27FC236}">
-                  <a16:creationId xmlns:a16="http://schemas.microsoft.com/office/drawing/2014/main" xmlns="" id="{397336C6-986A-4222-8529-A81F1650FA7C}"/>
+                  <a16:creationId xmlns="" xmlns:a16="http://schemas.microsoft.com/office/drawing/2014/main" id="{397336C6-986A-4222-8529-A81F1650FA7C}"/>
                 </a:ext>
               </a:extLst>
             </p:cNvPr>
@@ -34515,7 +34498,7 @@
             <p:cNvPr id="11" name="Shape 283">
               <a:extLst>
                 <a:ext uri="{FF2B5EF4-FFF2-40B4-BE49-F238E27FC236}">
-                  <a16:creationId xmlns:a16="http://schemas.microsoft.com/office/drawing/2014/main" xmlns="" id="{BAA57546-2820-4A33-AA79-9E90A0CC752B}"/>
+                  <a16:creationId xmlns="" xmlns:a16="http://schemas.microsoft.com/office/drawing/2014/main" id="{BAA57546-2820-4A33-AA79-9E90A0CC752B}"/>
                 </a:ext>
               </a:extLst>
             </p:cNvPr>
@@ -34558,7 +34541,7 @@
             <p:cNvPr id="12" name="Shape 284">
               <a:extLst>
                 <a:ext uri="{FF2B5EF4-FFF2-40B4-BE49-F238E27FC236}">
-                  <a16:creationId xmlns:a16="http://schemas.microsoft.com/office/drawing/2014/main" xmlns="" id="{207050D0-A7CB-4C7B-A0BF-FEF395EEF480}"/>
+                  <a16:creationId xmlns="" xmlns:a16="http://schemas.microsoft.com/office/drawing/2014/main" id="{207050D0-A7CB-4C7B-A0BF-FEF395EEF480}"/>
                 </a:ext>
               </a:extLst>
             </p:cNvPr>
@@ -34602,7 +34585,7 @@
           <p:cNvPr id="13" name="Shape 285">
             <a:extLst>
               <a:ext uri="{FF2B5EF4-FFF2-40B4-BE49-F238E27FC236}">
-                <a16:creationId xmlns:a16="http://schemas.microsoft.com/office/drawing/2014/main" xmlns="" id="{C4E3B576-7840-41EE-B54D-02E70DEFD9F5}"/>
+                <a16:creationId xmlns="" xmlns:a16="http://schemas.microsoft.com/office/drawing/2014/main" id="{C4E3B576-7840-41EE-B54D-02E70DEFD9F5}"/>
               </a:ext>
             </a:extLst>
           </p:cNvPr>
@@ -34646,7 +34629,7 @@
           <p:cNvPr id="14" name="Shape 286">
             <a:extLst>
               <a:ext uri="{FF2B5EF4-FFF2-40B4-BE49-F238E27FC236}">
-                <a16:creationId xmlns:a16="http://schemas.microsoft.com/office/drawing/2014/main" xmlns="" id="{26E5CBC5-6D55-4FE8-AD6B-51D531BC4DAF}"/>
+                <a16:creationId xmlns="" xmlns:a16="http://schemas.microsoft.com/office/drawing/2014/main" id="{26E5CBC5-6D55-4FE8-AD6B-51D531BC4DAF}"/>
               </a:ext>
             </a:extLst>
           </p:cNvPr>
@@ -34690,7 +34673,7 @@
           <p:cNvPr id="15" name="Shape 287">
             <a:extLst>
               <a:ext uri="{FF2B5EF4-FFF2-40B4-BE49-F238E27FC236}">
-                <a16:creationId xmlns:a16="http://schemas.microsoft.com/office/drawing/2014/main" xmlns="" id="{226197BF-BB15-426F-BE12-7DC2402E3B38}"/>
+                <a16:creationId xmlns="" xmlns:a16="http://schemas.microsoft.com/office/drawing/2014/main" id="{226197BF-BB15-426F-BE12-7DC2402E3B38}"/>
               </a:ext>
             </a:extLst>
           </p:cNvPr>
@@ -34752,7 +34735,7 @@
           <p:cNvPr id="16" name="Shape 288">
             <a:extLst>
               <a:ext uri="{FF2B5EF4-FFF2-40B4-BE49-F238E27FC236}">
-                <a16:creationId xmlns:a16="http://schemas.microsoft.com/office/drawing/2014/main" xmlns="" id="{43814FBE-B194-497C-A05C-F36EF7B124A8}"/>
+                <a16:creationId xmlns="" xmlns:a16="http://schemas.microsoft.com/office/drawing/2014/main" id="{43814FBE-B194-497C-A05C-F36EF7B124A8}"/>
               </a:ext>
             </a:extLst>
           </p:cNvPr>
@@ -34795,7 +34778,7 @@
           <p:cNvPr id="17" name="Shape 289">
             <a:extLst>
               <a:ext uri="{FF2B5EF4-FFF2-40B4-BE49-F238E27FC236}">
-                <a16:creationId xmlns:a16="http://schemas.microsoft.com/office/drawing/2014/main" xmlns="" id="{0188B232-1AFD-4B8A-8E85-A505C81B5749}"/>
+                <a16:creationId xmlns="" xmlns:a16="http://schemas.microsoft.com/office/drawing/2014/main" id="{0188B232-1AFD-4B8A-8E85-A505C81B5749}"/>
               </a:ext>
             </a:extLst>
           </p:cNvPr>
@@ -34838,7 +34821,7 @@
           <p:cNvPr id="18" name="Shape 290">
             <a:extLst>
               <a:ext uri="{FF2B5EF4-FFF2-40B4-BE49-F238E27FC236}">
-                <a16:creationId xmlns:a16="http://schemas.microsoft.com/office/drawing/2014/main" xmlns="" id="{2D2EC717-53D3-4DED-ABBD-FBC1EAEE62D9}"/>
+                <a16:creationId xmlns="" xmlns:a16="http://schemas.microsoft.com/office/drawing/2014/main" id="{2D2EC717-53D3-4DED-ABBD-FBC1EAEE62D9}"/>
               </a:ext>
             </a:extLst>
           </p:cNvPr>
@@ -34882,7 +34865,7 @@
           <p:cNvPr id="19" name="Shape 292">
             <a:extLst>
               <a:ext uri="{FF2B5EF4-FFF2-40B4-BE49-F238E27FC236}">
-                <a16:creationId xmlns:a16="http://schemas.microsoft.com/office/drawing/2014/main" xmlns="" id="{0656DA3D-C3E5-4017-85BF-E87801ABB5EC}"/>
+                <a16:creationId xmlns="" xmlns:a16="http://schemas.microsoft.com/office/drawing/2014/main" id="{0656DA3D-C3E5-4017-85BF-E87801ABB5EC}"/>
               </a:ext>
             </a:extLst>
           </p:cNvPr>
@@ -34926,7 +34909,7 @@
           <p:cNvPr id="20" name="Shape 293">
             <a:extLst>
               <a:ext uri="{FF2B5EF4-FFF2-40B4-BE49-F238E27FC236}">
-                <a16:creationId xmlns:a16="http://schemas.microsoft.com/office/drawing/2014/main" xmlns="" id="{831C07E6-2935-43C3-9F17-8F771CA84AD0}"/>
+                <a16:creationId xmlns="" xmlns:a16="http://schemas.microsoft.com/office/drawing/2014/main" id="{831C07E6-2935-43C3-9F17-8F771CA84AD0}"/>
               </a:ext>
             </a:extLst>
           </p:cNvPr>
@@ -34978,7 +34961,7 @@
           <p:cNvPr id="21" name="Shape 294">
             <a:extLst>
               <a:ext uri="{FF2B5EF4-FFF2-40B4-BE49-F238E27FC236}">
-                <a16:creationId xmlns:a16="http://schemas.microsoft.com/office/drawing/2014/main" xmlns="" id="{0121AB00-D320-4AB1-818E-A9C81D4AC036}"/>
+                <a16:creationId xmlns="" xmlns:a16="http://schemas.microsoft.com/office/drawing/2014/main" id="{0121AB00-D320-4AB1-818E-A9C81D4AC036}"/>
               </a:ext>
             </a:extLst>
           </p:cNvPr>
@@ -35036,7 +35019,7 @@
           <p:cNvPr id="22" name="Shape 296">
             <a:extLst>
               <a:ext uri="{FF2B5EF4-FFF2-40B4-BE49-F238E27FC236}">
-                <a16:creationId xmlns:a16="http://schemas.microsoft.com/office/drawing/2014/main" xmlns="" id="{6445DD1F-C5F2-4A5C-96FC-AD9C6A057ACE}"/>
+                <a16:creationId xmlns="" xmlns:a16="http://schemas.microsoft.com/office/drawing/2014/main" id="{6445DD1F-C5F2-4A5C-96FC-AD9C6A057ACE}"/>
               </a:ext>
             </a:extLst>
           </p:cNvPr>
@@ -35079,7 +35062,7 @@
           <p:cNvPr id="23" name="Shape 297">
             <a:extLst>
               <a:ext uri="{FF2B5EF4-FFF2-40B4-BE49-F238E27FC236}">
-                <a16:creationId xmlns:a16="http://schemas.microsoft.com/office/drawing/2014/main" xmlns="" id="{4605CDF1-BA5A-44AB-8EB2-9BF8A886E0C0}"/>
+                <a16:creationId xmlns="" xmlns:a16="http://schemas.microsoft.com/office/drawing/2014/main" id="{4605CDF1-BA5A-44AB-8EB2-9BF8A886E0C0}"/>
               </a:ext>
             </a:extLst>
           </p:cNvPr>
@@ -35113,7 +35096,7 @@
           <p:cNvPr id="24" name="Shape 298">
             <a:extLst>
               <a:ext uri="{FF2B5EF4-FFF2-40B4-BE49-F238E27FC236}">
-                <a16:creationId xmlns:a16="http://schemas.microsoft.com/office/drawing/2014/main" xmlns="" id="{67309BC7-34DE-4F5A-9BFE-9C0BCA90456A}"/>
+                <a16:creationId xmlns="" xmlns:a16="http://schemas.microsoft.com/office/drawing/2014/main" id="{67309BC7-34DE-4F5A-9BFE-9C0BCA90456A}"/>
               </a:ext>
             </a:extLst>
           </p:cNvPr>
@@ -35147,7 +35130,7 @@
           <p:cNvPr id="25" name="Shape 299">
             <a:extLst>
               <a:ext uri="{FF2B5EF4-FFF2-40B4-BE49-F238E27FC236}">
-                <a16:creationId xmlns:a16="http://schemas.microsoft.com/office/drawing/2014/main" xmlns="" id="{41316317-FC53-4748-95B7-8CC8A8532066}"/>
+                <a16:creationId xmlns="" xmlns:a16="http://schemas.microsoft.com/office/drawing/2014/main" id="{41316317-FC53-4748-95B7-8CC8A8532066}"/>
               </a:ext>
             </a:extLst>
           </p:cNvPr>
@@ -35167,7 +35150,7 @@
             <p:cNvPr id="26" name="Shape 300">
               <a:extLst>
                 <a:ext uri="{FF2B5EF4-FFF2-40B4-BE49-F238E27FC236}">
-                  <a16:creationId xmlns:a16="http://schemas.microsoft.com/office/drawing/2014/main" xmlns="" id="{C16932D2-2E6E-4E3E-95DF-170747ED04A3}"/>
+                  <a16:creationId xmlns="" xmlns:a16="http://schemas.microsoft.com/office/drawing/2014/main" id="{C16932D2-2E6E-4E3E-95DF-170747ED04A3}"/>
                 </a:ext>
               </a:extLst>
             </p:cNvPr>
@@ -35187,7 +35170,7 @@
               <p:cNvPr id="30" name="Shape 301">
                 <a:extLst>
                   <a:ext uri="{FF2B5EF4-FFF2-40B4-BE49-F238E27FC236}">
-                    <a16:creationId xmlns:a16="http://schemas.microsoft.com/office/drawing/2014/main" xmlns="" id="{B14D9B44-D24B-4363-A7CA-08F873A55B81}"/>
+                    <a16:creationId xmlns="" xmlns:a16="http://schemas.microsoft.com/office/drawing/2014/main" id="{B14D9B44-D24B-4363-A7CA-08F873A55B81}"/>
                   </a:ext>
                 </a:extLst>
               </p:cNvPr>
@@ -35230,7 +35213,7 @@
               <p:cNvPr id="31" name="Shape 302">
                 <a:extLst>
                   <a:ext uri="{FF2B5EF4-FFF2-40B4-BE49-F238E27FC236}">
-                    <a16:creationId xmlns:a16="http://schemas.microsoft.com/office/drawing/2014/main" xmlns="" id="{E8A3D05E-D2A3-4A73-A968-874034906CF9}"/>
+                    <a16:creationId xmlns="" xmlns:a16="http://schemas.microsoft.com/office/drawing/2014/main" id="{E8A3D05E-D2A3-4A73-A968-874034906CF9}"/>
                   </a:ext>
                 </a:extLst>
               </p:cNvPr>
@@ -35273,7 +35256,7 @@
               <p:cNvPr id="32" name="Shape 303">
                 <a:extLst>
                   <a:ext uri="{FF2B5EF4-FFF2-40B4-BE49-F238E27FC236}">
-                    <a16:creationId xmlns:a16="http://schemas.microsoft.com/office/drawing/2014/main" xmlns="" id="{12759A16-DEA8-4A6A-8994-2C0103C299E6}"/>
+                    <a16:creationId xmlns="" xmlns:a16="http://schemas.microsoft.com/office/drawing/2014/main" id="{12759A16-DEA8-4A6A-8994-2C0103C299E6}"/>
                   </a:ext>
                 </a:extLst>
               </p:cNvPr>
@@ -35316,7 +35299,7 @@
               <p:cNvPr id="33" name="Shape 304">
                 <a:extLst>
                   <a:ext uri="{FF2B5EF4-FFF2-40B4-BE49-F238E27FC236}">
-                    <a16:creationId xmlns:a16="http://schemas.microsoft.com/office/drawing/2014/main" xmlns="" id="{C387BBBD-5D9D-40DB-BE82-9275CD2717C7}"/>
+                    <a16:creationId xmlns="" xmlns:a16="http://schemas.microsoft.com/office/drawing/2014/main" id="{C387BBBD-5D9D-40DB-BE82-9275CD2717C7}"/>
                   </a:ext>
                 </a:extLst>
               </p:cNvPr>
@@ -35360,7 +35343,7 @@
             <p:cNvPr id="27" name="Shape 305">
               <a:extLst>
                 <a:ext uri="{FF2B5EF4-FFF2-40B4-BE49-F238E27FC236}">
-                  <a16:creationId xmlns:a16="http://schemas.microsoft.com/office/drawing/2014/main" xmlns="" id="{E77BFAA6-78F2-4910-945F-9D2682BAD5D5}"/>
+                  <a16:creationId xmlns="" xmlns:a16="http://schemas.microsoft.com/office/drawing/2014/main" id="{E77BFAA6-78F2-4910-945F-9D2682BAD5D5}"/>
                 </a:ext>
               </a:extLst>
             </p:cNvPr>
@@ -35394,7 +35377,7 @@
             <p:cNvPr id="28" name="Shape 306">
               <a:extLst>
                 <a:ext uri="{FF2B5EF4-FFF2-40B4-BE49-F238E27FC236}">
-                  <a16:creationId xmlns:a16="http://schemas.microsoft.com/office/drawing/2014/main" xmlns="" id="{821BB7C8-EEAB-4B95-82B3-78E894CF6A80}"/>
+                  <a16:creationId xmlns="" xmlns:a16="http://schemas.microsoft.com/office/drawing/2014/main" id="{821BB7C8-EEAB-4B95-82B3-78E894CF6A80}"/>
                 </a:ext>
               </a:extLst>
             </p:cNvPr>
@@ -35428,7 +35411,7 @@
             <p:cNvPr id="29" name="Shape 307">
               <a:extLst>
                 <a:ext uri="{FF2B5EF4-FFF2-40B4-BE49-F238E27FC236}">
-                  <a16:creationId xmlns:a16="http://schemas.microsoft.com/office/drawing/2014/main" xmlns="" id="{42D1DBA9-0D7A-4331-88FA-79C8524A703C}"/>
+                  <a16:creationId xmlns="" xmlns:a16="http://schemas.microsoft.com/office/drawing/2014/main" id="{42D1DBA9-0D7A-4331-88FA-79C8524A703C}"/>
                 </a:ext>
               </a:extLst>
             </p:cNvPr>
@@ -35472,7 +35455,7 @@
           <p:cNvPr id="34" name="Shape 308">
             <a:extLst>
               <a:ext uri="{FF2B5EF4-FFF2-40B4-BE49-F238E27FC236}">
-                <a16:creationId xmlns:a16="http://schemas.microsoft.com/office/drawing/2014/main" xmlns="" id="{AB810761-D369-4074-B6FA-C5064A740985}"/>
+                <a16:creationId xmlns="" xmlns:a16="http://schemas.microsoft.com/office/drawing/2014/main" id="{AB810761-D369-4074-B6FA-C5064A740985}"/>
               </a:ext>
             </a:extLst>
           </p:cNvPr>
@@ -35538,10 +35521,1416 @@
       </p:grpSpPr>
       <p:sp>
         <p:nvSpPr>
+          <p:cNvPr id="2" name="Date Placeholder 1"/>
+          <p:cNvSpPr>
+            <a:spLocks noGrp="1"/>
+          </p:cNvSpPr>
+          <p:nvPr>
+            <p:ph type="dt" sz="half" idx="10"/>
+          </p:nvPr>
+        </p:nvSpPr>
+        <p:spPr/>
+        <p:txBody>
+          <a:bodyPr/>
+          <a:lstStyle/>
+          <a:p>
+            <a:fld id="{6700A58B-DD98-43D0-B791-721480A02982}" type="datetime1">
+              <a:rPr lang="en-US" smtClean="0"/>
+              <a:t>6/18/2019</a:t>
+            </a:fld>
+            <a:endParaRPr lang="en-US"/>
+          </a:p>
+        </p:txBody>
+      </p:sp>
+      <p:sp>
+        <p:nvSpPr>
+          <p:cNvPr id="3" name="Title 2"/>
+          <p:cNvSpPr>
+            <a:spLocks noGrp="1"/>
+          </p:cNvSpPr>
+          <p:nvPr>
+            <p:ph type="title"/>
+          </p:nvPr>
+        </p:nvSpPr>
+        <p:spPr/>
+        <p:txBody>
+          <a:bodyPr/>
+          <a:lstStyle/>
+          <a:p>
+            <a:r>
+              <a:rPr lang="en-US" dirty="0" smtClean="0"/>
+              <a:t>Another way to measure distance</a:t>
+            </a:r>
+            <a:endParaRPr lang="en-US" dirty="0"/>
+          </a:p>
+        </p:txBody>
+      </p:sp>
+      <p:sp>
+        <p:nvSpPr>
+          <p:cNvPr id="4" name="Footer Placeholder 3"/>
+          <p:cNvSpPr>
+            <a:spLocks noGrp="1"/>
+          </p:cNvSpPr>
+          <p:nvPr>
+            <p:ph type="ftr" sz="quarter" idx="3"/>
+          </p:nvPr>
+        </p:nvSpPr>
+        <p:spPr/>
+        <p:txBody>
+          <a:bodyPr/>
+          <a:lstStyle/>
+          <a:p>
+            <a:r>
+              <a:rPr lang="en-US" smtClean="0"/>
+              <a:t>Kwartler</a:t>
+            </a:r>
+            <a:endParaRPr lang="en-US" dirty="0"/>
+          </a:p>
+        </p:txBody>
+      </p:sp>
+      <p:sp>
+        <p:nvSpPr>
+          <p:cNvPr id="5" name="Slide Number Placeholder 4"/>
+          <p:cNvSpPr>
+            <a:spLocks noGrp="1"/>
+          </p:cNvSpPr>
+          <p:nvPr>
+            <p:ph type="sldNum" sz="quarter" idx="4"/>
+          </p:nvPr>
+        </p:nvSpPr>
+        <p:spPr/>
+        <p:txBody>
+          <a:bodyPr/>
+          <a:lstStyle/>
+          <a:p>
+            <a:fld id="{37290FF7-652B-4475-AEAB-8B1A5D23AE09}" type="slidenum">
+              <a:rPr lang="en-US" smtClean="0"/>
+              <a:pPr/>
+              <a:t>40</a:t>
+            </a:fld>
+            <a:endParaRPr lang="en-US" dirty="0"/>
+          </a:p>
+        </p:txBody>
+      </p:sp>
+      <p:sp>
+        <p:nvSpPr>
+          <p:cNvPr id="6" name="TextBox 5"/>
+          <p:cNvSpPr txBox="1"/>
+          <p:nvPr/>
+        </p:nvSpPr>
+        <p:spPr>
+          <a:xfrm>
+            <a:off x="299545" y="1166648"/>
+            <a:ext cx="4144468" cy="646331"/>
+          </a:xfrm>
+          <a:prstGeom prst="rect">
+            <a:avLst/>
+          </a:prstGeom>
+          <a:noFill/>
+        </p:spPr>
+        <p:txBody>
+          <a:bodyPr wrap="none" rtlCol="0">
+            <a:spAutoFit/>
+          </a:bodyPr>
+          <a:lstStyle/>
+          <a:p>
+            <a:r>
+              <a:rPr lang="en-US" b="1" dirty="0" smtClean="0"/>
+              <a:t>Euclidean</a:t>
+            </a:r>
+            <a:r>
+              <a:rPr lang="en-US" dirty="0" smtClean="0"/>
+              <a:t>: How dissimilar are documents?</a:t>
+            </a:r>
+          </a:p>
+          <a:p>
+            <a:r>
+              <a:rPr lang="en-US" b="1" dirty="0" smtClean="0"/>
+              <a:t>Cosine</a:t>
+            </a:r>
+            <a:r>
+              <a:rPr lang="en-US" dirty="0" smtClean="0"/>
+              <a:t>: How similar are documents?</a:t>
+            </a:r>
+          </a:p>
+        </p:txBody>
+      </p:sp>
+      <p:sp>
+        <p:nvSpPr>
+          <p:cNvPr id="7" name="TextBox 6"/>
+          <p:cNvSpPr txBox="1"/>
+          <p:nvPr/>
+        </p:nvSpPr>
+        <p:spPr>
+          <a:xfrm>
+            <a:off x="299545" y="3310765"/>
+            <a:ext cx="1770036" cy="646331"/>
+          </a:xfrm>
+          <a:prstGeom prst="rect">
+            <a:avLst/>
+          </a:prstGeom>
+          <a:noFill/>
+        </p:spPr>
+        <p:txBody>
+          <a:bodyPr wrap="none" rtlCol="0">
+            <a:spAutoFit/>
+          </a:bodyPr>
+          <a:lstStyle/>
+          <a:p>
+            <a:r>
+              <a:rPr lang="en-US" u="sng" dirty="0" smtClean="0">
+                <a:solidFill>
+                  <a:schemeClr val="accent6">
+                    <a:lumMod val="75000"/>
+                  </a:schemeClr>
+                </a:solidFill>
+              </a:rPr>
+              <a:t>Doc1: </a:t>
+            </a:r>
+            <a:r>
+              <a:rPr lang="en-US" dirty="0" smtClean="0">
+                <a:solidFill>
+                  <a:schemeClr val="accent6">
+                    <a:lumMod val="75000"/>
+                  </a:schemeClr>
+                </a:solidFill>
+              </a:rPr>
+              <a:t>1,0,3,6,7,0</a:t>
+            </a:r>
+          </a:p>
+          <a:p>
+            <a:r>
+              <a:rPr lang="en-US" u="sng" dirty="0" smtClean="0">
+                <a:solidFill>
+                  <a:schemeClr val="accent6">
+                    <a:lumMod val="75000"/>
+                  </a:schemeClr>
+                </a:solidFill>
+              </a:rPr>
+              <a:t>Doc2: </a:t>
+            </a:r>
+            <a:r>
+              <a:rPr lang="en-US" dirty="0" smtClean="0">
+                <a:solidFill>
+                  <a:schemeClr val="accent6">
+                    <a:lumMod val="75000"/>
+                  </a:schemeClr>
+                </a:solidFill>
+              </a:rPr>
+              <a:t>0,1,2,6,1,0</a:t>
+            </a:r>
+            <a:endParaRPr lang="en-US" dirty="0">
+              <a:solidFill>
+                <a:schemeClr val="accent6">
+                  <a:lumMod val="75000"/>
+                </a:schemeClr>
+              </a:solidFill>
+            </a:endParaRPr>
+          </a:p>
+        </p:txBody>
+      </p:sp>
+      <p:sp>
+        <p:nvSpPr>
+          <p:cNvPr id="8" name="TextBox 7"/>
+          <p:cNvSpPr txBox="1"/>
+          <p:nvPr/>
+        </p:nvSpPr>
+        <p:spPr>
+          <a:xfrm>
+            <a:off x="315309" y="3058517"/>
+            <a:ext cx="5905014" cy="369332"/>
+          </a:xfrm>
+          <a:prstGeom prst="rect">
+            <a:avLst/>
+          </a:prstGeom>
+          <a:noFill/>
+        </p:spPr>
+        <p:txBody>
+          <a:bodyPr wrap="none" rtlCol="0">
+            <a:spAutoFit/>
+          </a:bodyPr>
+          <a:lstStyle/>
+          <a:p>
+            <a:r>
+              <a:rPr lang="en-US" b="1" dirty="0" smtClean="0">
+                <a:solidFill>
+                  <a:schemeClr val="accent6">
+                    <a:lumMod val="75000"/>
+                  </a:schemeClr>
+                </a:solidFill>
+              </a:rPr>
+              <a:t>Starting with a numeric Vector Representation from tokens </a:t>
+            </a:r>
+            <a:endParaRPr lang="en-US" b="1" dirty="0">
+              <a:solidFill>
+                <a:schemeClr val="accent6">
+                  <a:lumMod val="75000"/>
+                </a:schemeClr>
+              </a:solidFill>
+            </a:endParaRPr>
+          </a:p>
+        </p:txBody>
+      </p:sp>
+      <p:sp>
+        <p:nvSpPr>
+          <p:cNvPr id="9" name="TextBox 8"/>
+          <p:cNvSpPr txBox="1"/>
+          <p:nvPr/>
+        </p:nvSpPr>
+        <p:spPr>
+          <a:xfrm>
+            <a:off x="331076" y="4403845"/>
+            <a:ext cx="4233851" cy="369332"/>
+          </a:xfrm>
+          <a:prstGeom prst="rect">
+            <a:avLst/>
+          </a:prstGeom>
+          <a:noFill/>
+        </p:spPr>
+        <p:txBody>
+          <a:bodyPr wrap="none" rtlCol="0">
+            <a:spAutoFit/>
+          </a:bodyPr>
+          <a:lstStyle/>
+          <a:p>
+            <a:r>
+              <a:rPr lang="en-US" dirty="0" smtClean="0">
+                <a:solidFill>
+                  <a:schemeClr val="accent6">
+                    <a:lumMod val="75000"/>
+                  </a:schemeClr>
+                </a:solidFill>
+              </a:rPr>
+              <a:t>(1*0) + (0*1) + (3*2) + (6*6) + (7*1) + (0*0)</a:t>
+            </a:r>
+            <a:endParaRPr lang="en-US" dirty="0">
+              <a:solidFill>
+                <a:schemeClr val="accent6">
+                  <a:lumMod val="75000"/>
+                </a:schemeClr>
+              </a:solidFill>
+            </a:endParaRPr>
+          </a:p>
+        </p:txBody>
+      </p:sp>
+      <p:sp>
+        <p:nvSpPr>
+          <p:cNvPr id="10" name="TextBox 9"/>
+          <p:cNvSpPr txBox="1"/>
+          <p:nvPr/>
+        </p:nvSpPr>
+        <p:spPr>
+          <a:xfrm>
+            <a:off x="331076" y="4713900"/>
+            <a:ext cx="2406428" cy="369332"/>
+          </a:xfrm>
+          <a:prstGeom prst="rect">
+            <a:avLst/>
+          </a:prstGeom>
+          <a:noFill/>
+        </p:spPr>
+        <p:txBody>
+          <a:bodyPr wrap="none" rtlCol="0">
+            <a:spAutoFit/>
+          </a:bodyPr>
+          <a:lstStyle/>
+          <a:p>
+            <a:r>
+              <a:rPr lang="en-US" dirty="0" smtClean="0">
+                <a:solidFill>
+                  <a:schemeClr val="accent6">
+                    <a:lumMod val="75000"/>
+                  </a:schemeClr>
+                </a:solidFill>
+              </a:rPr>
+              <a:t>0 + 0 + 6+ 36+ 7+ 0 = 49</a:t>
+            </a:r>
+            <a:endParaRPr lang="en-US" dirty="0">
+              <a:solidFill>
+                <a:schemeClr val="accent6">
+                  <a:lumMod val="75000"/>
+                </a:schemeClr>
+              </a:solidFill>
+            </a:endParaRPr>
+          </a:p>
+        </p:txBody>
+      </p:sp>
+      <p:sp>
+        <p:nvSpPr>
+          <p:cNvPr id="12" name="TextBox 11"/>
+          <p:cNvSpPr txBox="1"/>
+          <p:nvPr/>
+        </p:nvSpPr>
+        <p:spPr>
+          <a:xfrm>
+            <a:off x="331076" y="4093791"/>
+            <a:ext cx="4469365" cy="369332"/>
+          </a:xfrm>
+          <a:prstGeom prst="rect">
+            <a:avLst/>
+          </a:prstGeom>
+          <a:noFill/>
+        </p:spPr>
+        <p:txBody>
+          <a:bodyPr wrap="none" rtlCol="0">
+            <a:spAutoFit/>
+          </a:bodyPr>
+          <a:lstStyle/>
+          <a:p>
+            <a:r>
+              <a:rPr lang="en-US" b="1" dirty="0" smtClean="0">
+                <a:solidFill>
+                  <a:schemeClr val="accent6">
+                    <a:lumMod val="75000"/>
+                  </a:schemeClr>
+                </a:solidFill>
+              </a:rPr>
+              <a:t>1. Calculate the “dot product” of the vectors:</a:t>
+            </a:r>
+            <a:endParaRPr lang="en-US" b="1" dirty="0">
+              <a:solidFill>
+                <a:schemeClr val="accent6">
+                  <a:lumMod val="75000"/>
+                </a:schemeClr>
+              </a:solidFill>
+            </a:endParaRPr>
+          </a:p>
+        </p:txBody>
+      </p:sp>
+      <p:pic>
+        <p:nvPicPr>
+          <p:cNvPr id="13" name="Picture 12"/>
+          <p:cNvPicPr>
+            <a:picLocks noChangeAspect="1"/>
+          </p:cNvPicPr>
+          <p:nvPr/>
+        </p:nvPicPr>
+        <p:blipFill>
+          <a:blip r:embed="rId2"/>
+          <a:stretch>
+            <a:fillRect/>
+          </a:stretch>
+        </p:blipFill>
+        <p:spPr>
+          <a:xfrm>
+            <a:off x="6507710" y="1170918"/>
+            <a:ext cx="2371725" cy="1047750"/>
+          </a:xfrm>
+          <a:prstGeom prst="rect">
+            <a:avLst/>
+          </a:prstGeom>
+        </p:spPr>
+      </p:pic>
+    </p:spTree>
+    <p:extLst>
+      <p:ext uri="{BB962C8B-B14F-4D97-AF65-F5344CB8AC3E}">
+        <p14:creationId xmlns:p14="http://schemas.microsoft.com/office/powerpoint/2010/main" val="75766169"/>
+      </p:ext>
+    </p:extLst>
+  </p:cSld>
+  <p:clrMapOvr>
+    <a:masterClrMapping/>
+  </p:clrMapOvr>
+</p:sld>
+</file>
+
+<file path=ppt/slides/slide41.xml><?xml version="1.0" encoding="utf-8"?>
+<p:sld xmlns:a="http://schemas.openxmlformats.org/drawingml/2006/main" xmlns:r="http://schemas.openxmlformats.org/officeDocument/2006/relationships" xmlns:p="http://schemas.openxmlformats.org/presentationml/2006/main">
+  <p:cSld>
+    <p:spTree>
+      <p:nvGrpSpPr>
+        <p:cNvPr id="1" name=""/>
+        <p:cNvGrpSpPr/>
+        <p:nvPr/>
+      </p:nvGrpSpPr>
+      <p:grpSpPr>
+        <a:xfrm>
+          <a:off x="0" y="0"/>
+          <a:ext cx="0" cy="0"/>
+          <a:chOff x="0" y="0"/>
+          <a:chExt cx="0" cy="0"/>
+        </a:xfrm>
+      </p:grpSpPr>
+      <p:sp>
+        <p:nvSpPr>
+          <p:cNvPr id="2" name="Date Placeholder 1"/>
+          <p:cNvSpPr>
+            <a:spLocks noGrp="1"/>
+          </p:cNvSpPr>
+          <p:nvPr>
+            <p:ph type="dt" sz="half" idx="10"/>
+          </p:nvPr>
+        </p:nvSpPr>
+        <p:spPr/>
+        <p:txBody>
+          <a:bodyPr/>
+          <a:lstStyle/>
+          <a:p>
+            <a:fld id="{6700A58B-DD98-43D0-B791-721480A02982}" type="datetime1">
+              <a:rPr lang="en-US" smtClean="0"/>
+              <a:t>6/18/2019</a:t>
+            </a:fld>
+            <a:endParaRPr lang="en-US"/>
+          </a:p>
+        </p:txBody>
+      </p:sp>
+      <p:sp>
+        <p:nvSpPr>
+          <p:cNvPr id="3" name="Title 2"/>
+          <p:cNvSpPr>
+            <a:spLocks noGrp="1"/>
+          </p:cNvSpPr>
+          <p:nvPr>
+            <p:ph type="title"/>
+          </p:nvPr>
+        </p:nvSpPr>
+        <p:spPr/>
+        <p:txBody>
+          <a:bodyPr/>
+          <a:lstStyle/>
+          <a:p>
+            <a:r>
+              <a:rPr lang="en-US" dirty="0" smtClean="0"/>
+              <a:t>Cosine</a:t>
+            </a:r>
+            <a:endParaRPr lang="en-US" dirty="0"/>
+          </a:p>
+        </p:txBody>
+      </p:sp>
+      <p:sp>
+        <p:nvSpPr>
+          <p:cNvPr id="4" name="Footer Placeholder 3"/>
+          <p:cNvSpPr>
+            <a:spLocks noGrp="1"/>
+          </p:cNvSpPr>
+          <p:nvPr>
+            <p:ph type="ftr" sz="quarter" idx="3"/>
+          </p:nvPr>
+        </p:nvSpPr>
+        <p:spPr/>
+        <p:txBody>
+          <a:bodyPr/>
+          <a:lstStyle/>
+          <a:p>
+            <a:r>
+              <a:rPr lang="en-US" smtClean="0"/>
+              <a:t>Kwartler</a:t>
+            </a:r>
+            <a:endParaRPr lang="en-US" dirty="0"/>
+          </a:p>
+        </p:txBody>
+      </p:sp>
+      <p:sp>
+        <p:nvSpPr>
+          <p:cNvPr id="5" name="Slide Number Placeholder 4"/>
+          <p:cNvSpPr>
+            <a:spLocks noGrp="1"/>
+          </p:cNvSpPr>
+          <p:nvPr>
+            <p:ph type="sldNum" sz="quarter" idx="4"/>
+          </p:nvPr>
+        </p:nvSpPr>
+        <p:spPr/>
+        <p:txBody>
+          <a:bodyPr/>
+          <a:lstStyle/>
+          <a:p>
+            <a:fld id="{37290FF7-652B-4475-AEAB-8B1A5D23AE09}" type="slidenum">
+              <a:rPr lang="en-US" smtClean="0"/>
+              <a:pPr/>
+              <a:t>41</a:t>
+            </a:fld>
+            <a:endParaRPr lang="en-US" dirty="0"/>
+          </a:p>
+        </p:txBody>
+      </p:sp>
+      <p:sp>
+        <p:nvSpPr>
+          <p:cNvPr id="6" name="TextBox 5"/>
+          <p:cNvSpPr txBox="1"/>
+          <p:nvPr/>
+        </p:nvSpPr>
+        <p:spPr>
+          <a:xfrm>
+            <a:off x="299545" y="1166648"/>
+            <a:ext cx="3604256" cy="369332"/>
+          </a:xfrm>
+          <a:prstGeom prst="rect">
+            <a:avLst/>
+          </a:prstGeom>
+          <a:noFill/>
+        </p:spPr>
+        <p:txBody>
+          <a:bodyPr wrap="none" rtlCol="0">
+            <a:spAutoFit/>
+          </a:bodyPr>
+          <a:lstStyle/>
+          <a:p>
+            <a:r>
+              <a:rPr lang="en-US" b="1" dirty="0" smtClean="0"/>
+              <a:t>Cosine</a:t>
+            </a:r>
+            <a:r>
+              <a:rPr lang="en-US" dirty="0" smtClean="0"/>
+              <a:t>: How similar are documents?</a:t>
+            </a:r>
+          </a:p>
+        </p:txBody>
+      </p:sp>
+      <p:sp>
+        <p:nvSpPr>
+          <p:cNvPr id="7" name="TextBox 6"/>
+          <p:cNvSpPr txBox="1"/>
+          <p:nvPr/>
+        </p:nvSpPr>
+        <p:spPr>
+          <a:xfrm>
+            <a:off x="299545" y="1671135"/>
+            <a:ext cx="1770036" cy="646331"/>
+          </a:xfrm>
+          <a:prstGeom prst="rect">
+            <a:avLst/>
+          </a:prstGeom>
+          <a:noFill/>
+        </p:spPr>
+        <p:txBody>
+          <a:bodyPr wrap="none" rtlCol="0">
+            <a:spAutoFit/>
+          </a:bodyPr>
+          <a:lstStyle/>
+          <a:p>
+            <a:r>
+              <a:rPr lang="en-US" dirty="0" smtClean="0"/>
+              <a:t>Doc1: 1,0,3,6,7,0</a:t>
+            </a:r>
+          </a:p>
+          <a:p>
+            <a:r>
+              <a:rPr lang="en-US" dirty="0" smtClean="0"/>
+              <a:t>Doc2: 0,1,2,6,1,0</a:t>
+            </a:r>
+            <a:endParaRPr lang="en-US" dirty="0"/>
+          </a:p>
+        </p:txBody>
+      </p:sp>
+      <p:sp>
+        <p:nvSpPr>
+          <p:cNvPr id="8" name="TextBox 7"/>
+          <p:cNvSpPr txBox="1"/>
+          <p:nvPr/>
+        </p:nvSpPr>
+        <p:spPr>
+          <a:xfrm>
+            <a:off x="315309" y="1418887"/>
+            <a:ext cx="5905014" cy="369332"/>
+          </a:xfrm>
+          <a:prstGeom prst="rect">
+            <a:avLst/>
+          </a:prstGeom>
+          <a:noFill/>
+        </p:spPr>
+        <p:txBody>
+          <a:bodyPr wrap="none" rtlCol="0">
+            <a:spAutoFit/>
+          </a:bodyPr>
+          <a:lstStyle/>
+          <a:p>
+            <a:r>
+              <a:rPr lang="en-US" dirty="0" smtClean="0"/>
+              <a:t>Starting with a numeric Vector Representation from tokens </a:t>
+            </a:r>
+            <a:endParaRPr lang="en-US" dirty="0"/>
+          </a:p>
+        </p:txBody>
+      </p:sp>
+      <p:sp>
+        <p:nvSpPr>
+          <p:cNvPr id="9" name="TextBox 8"/>
+          <p:cNvSpPr txBox="1"/>
+          <p:nvPr/>
+        </p:nvSpPr>
+        <p:spPr>
+          <a:xfrm>
+            <a:off x="331076" y="2480430"/>
+            <a:ext cx="4233851" cy="369332"/>
+          </a:xfrm>
+          <a:prstGeom prst="rect">
+            <a:avLst/>
+          </a:prstGeom>
+          <a:noFill/>
+        </p:spPr>
+        <p:txBody>
+          <a:bodyPr wrap="none" rtlCol="0">
+            <a:spAutoFit/>
+          </a:bodyPr>
+          <a:lstStyle/>
+          <a:p>
+            <a:r>
+              <a:rPr lang="en-US" dirty="0" smtClean="0"/>
+              <a:t>(1*0) + (0*1) + (3*2) + (6*6) + (7*1) + (0*0)</a:t>
+            </a:r>
+            <a:endParaRPr lang="en-US" dirty="0"/>
+          </a:p>
+        </p:txBody>
+      </p:sp>
+      <p:sp>
+        <p:nvSpPr>
+          <p:cNvPr id="10" name="TextBox 9"/>
+          <p:cNvSpPr txBox="1"/>
+          <p:nvPr/>
+        </p:nvSpPr>
+        <p:spPr>
+          <a:xfrm>
+            <a:off x="331076" y="2790485"/>
+            <a:ext cx="2406428" cy="369332"/>
+          </a:xfrm>
+          <a:prstGeom prst="rect">
+            <a:avLst/>
+          </a:prstGeom>
+          <a:noFill/>
+        </p:spPr>
+        <p:txBody>
+          <a:bodyPr wrap="none" rtlCol="0">
+            <a:spAutoFit/>
+          </a:bodyPr>
+          <a:lstStyle/>
+          <a:p>
+            <a:r>
+              <a:rPr lang="en-US" dirty="0" smtClean="0"/>
+              <a:t>0 + 0 + 6+ 36+ 7+ 0 = 49</a:t>
+            </a:r>
+            <a:endParaRPr lang="en-US" dirty="0"/>
+          </a:p>
+        </p:txBody>
+      </p:sp>
+      <p:sp>
+        <p:nvSpPr>
+          <p:cNvPr id="12" name="TextBox 11"/>
+          <p:cNvSpPr txBox="1"/>
+          <p:nvPr/>
+        </p:nvSpPr>
+        <p:spPr>
+          <a:xfrm>
+            <a:off x="331076" y="2170376"/>
+            <a:ext cx="4397358" cy="369332"/>
+          </a:xfrm>
+          <a:prstGeom prst="rect">
+            <a:avLst/>
+          </a:prstGeom>
+          <a:noFill/>
+        </p:spPr>
+        <p:txBody>
+          <a:bodyPr wrap="none" rtlCol="0">
+            <a:spAutoFit/>
+          </a:bodyPr>
+          <a:lstStyle/>
+          <a:p>
+            <a:r>
+              <a:rPr lang="en-US" dirty="0" smtClean="0"/>
+              <a:t>1. Calculate the “dot product” of the vectors:</a:t>
+            </a:r>
+            <a:endParaRPr lang="en-US" dirty="0"/>
+          </a:p>
+        </p:txBody>
+      </p:sp>
+      <p:sp>
+        <p:nvSpPr>
+          <p:cNvPr id="13" name="TextBox 12"/>
+          <p:cNvSpPr txBox="1"/>
+          <p:nvPr/>
+        </p:nvSpPr>
+        <p:spPr>
+          <a:xfrm>
+            <a:off x="315310" y="3673366"/>
+            <a:ext cx="4881465" cy="2308324"/>
+          </a:xfrm>
+          <a:prstGeom prst="rect">
+            <a:avLst/>
+          </a:prstGeom>
+          <a:noFill/>
+        </p:spPr>
+        <p:txBody>
+          <a:bodyPr wrap="none" rtlCol="0">
+            <a:spAutoFit/>
+          </a:bodyPr>
+          <a:lstStyle/>
+          <a:p>
+            <a:r>
+              <a:rPr lang="en-US" b="1" dirty="0" smtClean="0">
+                <a:solidFill>
+                  <a:schemeClr val="accent6">
+                    <a:lumMod val="75000"/>
+                  </a:schemeClr>
+                </a:solidFill>
+              </a:rPr>
+              <a:t>2. Calculate the magnitude for a documents</a:t>
+            </a:r>
+          </a:p>
+          <a:p>
+            <a:r>
+              <a:rPr lang="en-US" u="sng" dirty="0" smtClean="0">
+                <a:solidFill>
+                  <a:schemeClr val="accent6">
+                    <a:lumMod val="75000"/>
+                  </a:schemeClr>
+                </a:solidFill>
+              </a:rPr>
+              <a:t>Doc1: </a:t>
+            </a:r>
+            <a:r>
+              <a:rPr lang="en-US" dirty="0" smtClean="0">
+                <a:solidFill>
+                  <a:schemeClr val="accent6">
+                    <a:lumMod val="75000"/>
+                  </a:schemeClr>
+                </a:solidFill>
+              </a:rPr>
+              <a:t>(1*1) + (0*0 )+ (3*3) + (6*6) + (7*7 )+ (0*0) </a:t>
+            </a:r>
+          </a:p>
+          <a:p>
+            <a:r>
+              <a:rPr lang="en-US" dirty="0" smtClean="0">
+                <a:solidFill>
+                  <a:schemeClr val="accent6">
+                    <a:lumMod val="75000"/>
+                  </a:schemeClr>
+                </a:solidFill>
+              </a:rPr>
+              <a:t>1 + 0 + 9 + 36 + 49 + 0 = 95</a:t>
+            </a:r>
+          </a:p>
+          <a:p>
+            <a:r>
+              <a:rPr lang="en-US" dirty="0" err="1" smtClean="0">
+                <a:solidFill>
+                  <a:schemeClr val="accent6">
+                    <a:lumMod val="75000"/>
+                  </a:schemeClr>
+                </a:solidFill>
+              </a:rPr>
+              <a:t>Sqrt</a:t>
+            </a:r>
+            <a:r>
+              <a:rPr lang="en-US" dirty="0" smtClean="0">
+                <a:solidFill>
+                  <a:schemeClr val="accent6">
+                    <a:lumMod val="75000"/>
+                  </a:schemeClr>
+                </a:solidFill>
+              </a:rPr>
+              <a:t>(95) = 9.7</a:t>
+            </a:r>
+          </a:p>
+          <a:p>
+            <a:r>
+              <a:rPr lang="en-US" u="sng" dirty="0" smtClean="0">
+                <a:solidFill>
+                  <a:schemeClr val="accent6">
+                    <a:lumMod val="75000"/>
+                  </a:schemeClr>
+                </a:solidFill>
+              </a:rPr>
+              <a:t>Doc2: </a:t>
+            </a:r>
+            <a:r>
+              <a:rPr lang="en-US" dirty="0" smtClean="0">
+                <a:solidFill>
+                  <a:schemeClr val="accent6">
+                    <a:lumMod val="75000"/>
+                  </a:schemeClr>
+                </a:solidFill>
+              </a:rPr>
+              <a:t>(0*0)+(1*1)+(2*2)+(6*6)+(1*1) + (0*0)</a:t>
+            </a:r>
+          </a:p>
+          <a:p>
+            <a:r>
+              <a:rPr lang="en-US" dirty="0" smtClean="0">
+                <a:solidFill>
+                  <a:schemeClr val="accent6">
+                    <a:lumMod val="75000"/>
+                  </a:schemeClr>
+                </a:solidFill>
+              </a:rPr>
+              <a:t>0 + 1 + 4 + 36 + 1 + 0 = 42</a:t>
+            </a:r>
+          </a:p>
+          <a:p>
+            <a:r>
+              <a:rPr lang="en-US" dirty="0" err="1" smtClean="0">
+                <a:solidFill>
+                  <a:schemeClr val="accent6">
+                    <a:lumMod val="75000"/>
+                  </a:schemeClr>
+                </a:solidFill>
+              </a:rPr>
+              <a:t>Sqrt</a:t>
+            </a:r>
+            <a:r>
+              <a:rPr lang="en-US" dirty="0" smtClean="0">
+                <a:solidFill>
+                  <a:schemeClr val="accent6">
+                    <a:lumMod val="75000"/>
+                  </a:schemeClr>
+                </a:solidFill>
+              </a:rPr>
+              <a:t>(42) = 6.4 </a:t>
+            </a:r>
+          </a:p>
+          <a:p>
+            <a:r>
+              <a:rPr lang="en-US" dirty="0" smtClean="0">
+                <a:solidFill>
+                  <a:schemeClr val="accent6">
+                    <a:lumMod val="75000"/>
+                  </a:schemeClr>
+                </a:solidFill>
+              </a:rPr>
+              <a:t>9.7 * 6.4 = </a:t>
+            </a:r>
+            <a:r>
+              <a:rPr lang="en-US" u="sng" dirty="0" smtClean="0">
+                <a:solidFill>
+                  <a:srgbClr val="FFC000"/>
+                </a:solidFill>
+              </a:rPr>
+              <a:t>63.1</a:t>
+            </a:r>
+            <a:endParaRPr lang="en-US" u="sng" dirty="0">
+              <a:solidFill>
+                <a:srgbClr val="FFC000"/>
+              </a:solidFill>
+            </a:endParaRPr>
+          </a:p>
+        </p:txBody>
+      </p:sp>
+      <p:pic>
+        <p:nvPicPr>
+          <p:cNvPr id="14" name="Picture 13"/>
+          <p:cNvPicPr>
+            <a:picLocks noChangeAspect="1"/>
+          </p:cNvPicPr>
+          <p:nvPr/>
+        </p:nvPicPr>
+        <p:blipFill>
+          <a:blip r:embed="rId2"/>
+          <a:stretch>
+            <a:fillRect/>
+          </a:stretch>
+        </p:blipFill>
+        <p:spPr>
+          <a:xfrm>
+            <a:off x="6507710" y="1170918"/>
+            <a:ext cx="2371725" cy="1047750"/>
+          </a:xfrm>
+          <a:prstGeom prst="rect">
+            <a:avLst/>
+          </a:prstGeom>
+        </p:spPr>
+      </p:pic>
+    </p:spTree>
+    <p:extLst>
+      <p:ext uri="{BB962C8B-B14F-4D97-AF65-F5344CB8AC3E}">
+        <p14:creationId xmlns:p14="http://schemas.microsoft.com/office/powerpoint/2010/main" val="3800385833"/>
+      </p:ext>
+    </p:extLst>
+  </p:cSld>
+  <p:clrMapOvr>
+    <a:masterClrMapping/>
+  </p:clrMapOvr>
+</p:sld>
+</file>
+
+<file path=ppt/slides/slide42.xml><?xml version="1.0" encoding="utf-8"?>
+<p:sld xmlns:a="http://schemas.openxmlformats.org/drawingml/2006/main" xmlns:r="http://schemas.openxmlformats.org/officeDocument/2006/relationships" xmlns:p="http://schemas.openxmlformats.org/presentationml/2006/main">
+  <p:cSld>
+    <p:spTree>
+      <p:nvGrpSpPr>
+        <p:cNvPr id="1" name=""/>
+        <p:cNvGrpSpPr/>
+        <p:nvPr/>
+      </p:nvGrpSpPr>
+      <p:grpSpPr>
+        <a:xfrm>
+          <a:off x="0" y="0"/>
+          <a:ext cx="0" cy="0"/>
+          <a:chOff x="0" y="0"/>
+          <a:chExt cx="0" cy="0"/>
+        </a:xfrm>
+      </p:grpSpPr>
+      <p:sp>
+        <p:nvSpPr>
+          <p:cNvPr id="2" name="Date Placeholder 1"/>
+          <p:cNvSpPr>
+            <a:spLocks noGrp="1"/>
+          </p:cNvSpPr>
+          <p:nvPr>
+            <p:ph type="dt" sz="half" idx="10"/>
+          </p:nvPr>
+        </p:nvSpPr>
+        <p:spPr/>
+        <p:txBody>
+          <a:bodyPr/>
+          <a:lstStyle/>
+          <a:p>
+            <a:fld id="{6700A58B-DD98-43D0-B791-721480A02982}" type="datetime1">
+              <a:rPr lang="en-US" smtClean="0"/>
+              <a:t>6/18/2019</a:t>
+            </a:fld>
+            <a:endParaRPr lang="en-US"/>
+          </a:p>
+        </p:txBody>
+      </p:sp>
+      <p:sp>
+        <p:nvSpPr>
+          <p:cNvPr id="3" name="Title 2"/>
+          <p:cNvSpPr>
+            <a:spLocks noGrp="1"/>
+          </p:cNvSpPr>
+          <p:nvPr>
+            <p:ph type="title"/>
+          </p:nvPr>
+        </p:nvSpPr>
+        <p:spPr/>
+        <p:txBody>
+          <a:bodyPr/>
+          <a:lstStyle/>
+          <a:p>
+            <a:r>
+              <a:rPr lang="en-US" dirty="0" smtClean="0"/>
+              <a:t>Cosine</a:t>
+            </a:r>
+            <a:endParaRPr lang="en-US" dirty="0"/>
+          </a:p>
+        </p:txBody>
+      </p:sp>
+      <p:sp>
+        <p:nvSpPr>
+          <p:cNvPr id="4" name="Footer Placeholder 3"/>
+          <p:cNvSpPr>
+            <a:spLocks noGrp="1"/>
+          </p:cNvSpPr>
+          <p:nvPr>
+            <p:ph type="ftr" sz="quarter" idx="3"/>
+          </p:nvPr>
+        </p:nvSpPr>
+        <p:spPr/>
+        <p:txBody>
+          <a:bodyPr/>
+          <a:lstStyle/>
+          <a:p>
+            <a:r>
+              <a:rPr lang="en-US" smtClean="0"/>
+              <a:t>Kwartler</a:t>
+            </a:r>
+            <a:endParaRPr lang="en-US" dirty="0"/>
+          </a:p>
+        </p:txBody>
+      </p:sp>
+      <p:sp>
+        <p:nvSpPr>
+          <p:cNvPr id="5" name="Slide Number Placeholder 4"/>
+          <p:cNvSpPr>
+            <a:spLocks noGrp="1"/>
+          </p:cNvSpPr>
+          <p:nvPr>
+            <p:ph type="sldNum" sz="quarter" idx="4"/>
+          </p:nvPr>
+        </p:nvSpPr>
+        <p:spPr/>
+        <p:txBody>
+          <a:bodyPr/>
+          <a:lstStyle/>
+          <a:p>
+            <a:fld id="{37290FF7-652B-4475-AEAB-8B1A5D23AE09}" type="slidenum">
+              <a:rPr lang="en-US" smtClean="0"/>
+              <a:pPr/>
+              <a:t>42</a:t>
+            </a:fld>
+            <a:endParaRPr lang="en-US" dirty="0"/>
+          </a:p>
+        </p:txBody>
+      </p:sp>
+      <p:sp>
+        <p:nvSpPr>
+          <p:cNvPr id="6" name="TextBox 5"/>
+          <p:cNvSpPr txBox="1"/>
+          <p:nvPr/>
+        </p:nvSpPr>
+        <p:spPr>
+          <a:xfrm>
+            <a:off x="299545" y="1040520"/>
+            <a:ext cx="3604256" cy="369332"/>
+          </a:xfrm>
+          <a:prstGeom prst="rect">
+            <a:avLst/>
+          </a:prstGeom>
+          <a:noFill/>
+        </p:spPr>
+        <p:txBody>
+          <a:bodyPr wrap="none" rtlCol="0">
+            <a:spAutoFit/>
+          </a:bodyPr>
+          <a:lstStyle/>
+          <a:p>
+            <a:r>
+              <a:rPr lang="en-US" b="1" dirty="0" smtClean="0"/>
+              <a:t>Cosine</a:t>
+            </a:r>
+            <a:r>
+              <a:rPr lang="en-US" dirty="0" smtClean="0"/>
+              <a:t>: How similar are documents?</a:t>
+            </a:r>
+          </a:p>
+        </p:txBody>
+      </p:sp>
+      <p:sp>
+        <p:nvSpPr>
+          <p:cNvPr id="7" name="TextBox 6"/>
+          <p:cNvSpPr txBox="1"/>
+          <p:nvPr/>
+        </p:nvSpPr>
+        <p:spPr>
+          <a:xfrm>
+            <a:off x="299545" y="1545007"/>
+            <a:ext cx="1770036" cy="646331"/>
+          </a:xfrm>
+          <a:prstGeom prst="rect">
+            <a:avLst/>
+          </a:prstGeom>
+          <a:noFill/>
+        </p:spPr>
+        <p:txBody>
+          <a:bodyPr wrap="none" rtlCol="0">
+            <a:spAutoFit/>
+          </a:bodyPr>
+          <a:lstStyle/>
+          <a:p>
+            <a:r>
+              <a:rPr lang="en-US" dirty="0" smtClean="0"/>
+              <a:t>Doc1: 1,0,3,6,7,0</a:t>
+            </a:r>
+          </a:p>
+          <a:p>
+            <a:r>
+              <a:rPr lang="en-US" dirty="0" smtClean="0"/>
+              <a:t>Doc2: 0,1,2,6,1,0</a:t>
+            </a:r>
+            <a:endParaRPr lang="en-US" dirty="0"/>
+          </a:p>
+        </p:txBody>
+      </p:sp>
+      <p:sp>
+        <p:nvSpPr>
+          <p:cNvPr id="8" name="TextBox 7"/>
+          <p:cNvSpPr txBox="1"/>
+          <p:nvPr/>
+        </p:nvSpPr>
+        <p:spPr>
+          <a:xfrm>
+            <a:off x="315309" y="1292759"/>
+            <a:ext cx="5905014" cy="369332"/>
+          </a:xfrm>
+          <a:prstGeom prst="rect">
+            <a:avLst/>
+          </a:prstGeom>
+          <a:noFill/>
+        </p:spPr>
+        <p:txBody>
+          <a:bodyPr wrap="none" rtlCol="0">
+            <a:spAutoFit/>
+          </a:bodyPr>
+          <a:lstStyle/>
+          <a:p>
+            <a:r>
+              <a:rPr lang="en-US" dirty="0" smtClean="0"/>
+              <a:t>Starting with a numeric Vector Representation from tokens </a:t>
+            </a:r>
+            <a:endParaRPr lang="en-US" dirty="0"/>
+          </a:p>
+        </p:txBody>
+      </p:sp>
+      <p:sp>
+        <p:nvSpPr>
+          <p:cNvPr id="9" name="TextBox 8"/>
+          <p:cNvSpPr txBox="1"/>
+          <p:nvPr/>
+        </p:nvSpPr>
+        <p:spPr>
+          <a:xfrm>
+            <a:off x="331076" y="2638087"/>
+            <a:ext cx="4233851" cy="369332"/>
+          </a:xfrm>
+          <a:prstGeom prst="rect">
+            <a:avLst/>
+          </a:prstGeom>
+          <a:noFill/>
+        </p:spPr>
+        <p:txBody>
+          <a:bodyPr wrap="none" rtlCol="0">
+            <a:spAutoFit/>
+          </a:bodyPr>
+          <a:lstStyle/>
+          <a:p>
+            <a:r>
+              <a:rPr lang="en-US" dirty="0" smtClean="0"/>
+              <a:t>(1*0) + (0*1) + (3*2) + (6*6) + (7*1) + (0*0)</a:t>
+            </a:r>
+            <a:endParaRPr lang="en-US" dirty="0"/>
+          </a:p>
+        </p:txBody>
+      </p:sp>
+      <p:sp>
+        <p:nvSpPr>
+          <p:cNvPr id="10" name="TextBox 9"/>
+          <p:cNvSpPr txBox="1"/>
+          <p:nvPr/>
+        </p:nvSpPr>
+        <p:spPr>
+          <a:xfrm>
+            <a:off x="331076" y="2948142"/>
+            <a:ext cx="2406428" cy="369332"/>
+          </a:xfrm>
+          <a:prstGeom prst="rect">
+            <a:avLst/>
+          </a:prstGeom>
+          <a:noFill/>
+        </p:spPr>
+        <p:txBody>
+          <a:bodyPr wrap="none" rtlCol="0">
+            <a:spAutoFit/>
+          </a:bodyPr>
+          <a:lstStyle/>
+          <a:p>
+            <a:r>
+              <a:rPr lang="en-US" dirty="0" smtClean="0"/>
+              <a:t>0 + 0 + 6+ 36+ 7+ 0 = 49</a:t>
+            </a:r>
+            <a:endParaRPr lang="en-US" dirty="0"/>
+          </a:p>
+        </p:txBody>
+      </p:sp>
+      <p:sp>
+        <p:nvSpPr>
+          <p:cNvPr id="12" name="TextBox 11"/>
+          <p:cNvSpPr txBox="1"/>
+          <p:nvPr/>
+        </p:nvSpPr>
+        <p:spPr>
+          <a:xfrm>
+            <a:off x="331076" y="2328033"/>
+            <a:ext cx="4397358" cy="369332"/>
+          </a:xfrm>
+          <a:prstGeom prst="rect">
+            <a:avLst/>
+          </a:prstGeom>
+          <a:noFill/>
+        </p:spPr>
+        <p:txBody>
+          <a:bodyPr wrap="none" rtlCol="0">
+            <a:spAutoFit/>
+          </a:bodyPr>
+          <a:lstStyle/>
+          <a:p>
+            <a:r>
+              <a:rPr lang="en-US" dirty="0" smtClean="0"/>
+              <a:t>1. Calculate the “dot product” of the vectors:</a:t>
+            </a:r>
+            <a:endParaRPr lang="en-US" dirty="0"/>
+          </a:p>
+        </p:txBody>
+      </p:sp>
+      <p:sp>
+        <p:nvSpPr>
+          <p:cNvPr id="13" name="TextBox 12"/>
+          <p:cNvSpPr txBox="1"/>
+          <p:nvPr/>
+        </p:nvSpPr>
+        <p:spPr>
+          <a:xfrm>
+            <a:off x="315310" y="3405344"/>
+            <a:ext cx="4881465" cy="2308324"/>
+          </a:xfrm>
+          <a:prstGeom prst="rect">
+            <a:avLst/>
+          </a:prstGeom>
+          <a:noFill/>
+        </p:spPr>
+        <p:txBody>
+          <a:bodyPr wrap="none" rtlCol="0">
+            <a:spAutoFit/>
+          </a:bodyPr>
+          <a:lstStyle/>
+          <a:p>
+            <a:r>
+              <a:rPr lang="en-US" dirty="0" smtClean="0"/>
+              <a:t>2. Calculate the magnitude for a document</a:t>
+            </a:r>
+          </a:p>
+          <a:p>
+            <a:r>
+              <a:rPr lang="en-US" dirty="0" smtClean="0"/>
+              <a:t>Doc1: (1*1) + (0*0 )+ (3*3) + (6*6) + (7*7 )+ (0*0) </a:t>
+            </a:r>
+          </a:p>
+          <a:p>
+            <a:r>
+              <a:rPr lang="en-US" dirty="0" smtClean="0"/>
+              <a:t>1 + 0 + 9 + 36 + 49 + 0 = 95</a:t>
+            </a:r>
+          </a:p>
+          <a:p>
+            <a:r>
+              <a:rPr lang="en-US" dirty="0" err="1" smtClean="0"/>
+              <a:t>Sqrt</a:t>
+            </a:r>
+            <a:r>
+              <a:rPr lang="en-US" dirty="0" smtClean="0"/>
+              <a:t>(95) = 9.7</a:t>
+            </a:r>
+          </a:p>
+          <a:p>
+            <a:r>
+              <a:rPr lang="en-US" dirty="0" smtClean="0"/>
+              <a:t>Doc2: (0*0)+(1*1)+(2*2)+(6*6)+(1*1) + (0*0)</a:t>
+            </a:r>
+          </a:p>
+          <a:p>
+            <a:r>
+              <a:rPr lang="en-US" dirty="0" smtClean="0"/>
+              <a:t>0 + 1 + 4 + 36 + 1 + 0 = 42</a:t>
+            </a:r>
+          </a:p>
+          <a:p>
+            <a:r>
+              <a:rPr lang="en-US" dirty="0" err="1" smtClean="0"/>
+              <a:t>Sqrt</a:t>
+            </a:r>
+            <a:r>
+              <a:rPr lang="en-US" dirty="0" smtClean="0"/>
+              <a:t>(42) = 6.4 </a:t>
+            </a:r>
+          </a:p>
+          <a:p>
+            <a:r>
+              <a:rPr lang="en-US" dirty="0"/>
+              <a:t>9.7 * 6.4 = </a:t>
+            </a:r>
+            <a:r>
+              <a:rPr lang="en-US" dirty="0"/>
+              <a:t>63.1</a:t>
+            </a:r>
+            <a:endParaRPr lang="en-US" dirty="0"/>
+          </a:p>
+        </p:txBody>
+      </p:sp>
+      <p:sp>
+        <p:nvSpPr>
+          <p:cNvPr id="11" name="TextBox 10"/>
+          <p:cNvSpPr txBox="1"/>
+          <p:nvPr/>
+        </p:nvSpPr>
+        <p:spPr>
+          <a:xfrm>
+            <a:off x="268013" y="5754415"/>
+            <a:ext cx="3678828" cy="369332"/>
+          </a:xfrm>
+          <a:prstGeom prst="rect">
+            <a:avLst/>
+          </a:prstGeom>
+          <a:noFill/>
+        </p:spPr>
+        <p:txBody>
+          <a:bodyPr wrap="none" rtlCol="0">
+            <a:spAutoFit/>
+          </a:bodyPr>
+          <a:lstStyle/>
+          <a:p>
+            <a:r>
+              <a:rPr lang="en-US" dirty="0" smtClean="0">
+                <a:solidFill>
+                  <a:schemeClr val="accent6"/>
+                </a:solidFill>
+              </a:rPr>
+              <a:t>3. Distance Measure: 49 / 63.1 </a:t>
+            </a:r>
+            <a:r>
+              <a:rPr lang="en-US" u="sng" dirty="0" smtClean="0">
+                <a:solidFill>
+                  <a:srgbClr val="FFC000"/>
+                </a:solidFill>
+              </a:rPr>
+              <a:t>= 0.77</a:t>
+            </a:r>
+            <a:endParaRPr lang="en-US" u="sng" dirty="0">
+              <a:solidFill>
+                <a:srgbClr val="FFC000"/>
+              </a:solidFill>
+            </a:endParaRPr>
+          </a:p>
+        </p:txBody>
+      </p:sp>
+      <p:pic>
+        <p:nvPicPr>
+          <p:cNvPr id="14" name="Picture 13"/>
+          <p:cNvPicPr>
+            <a:picLocks noChangeAspect="1"/>
+          </p:cNvPicPr>
+          <p:nvPr/>
+        </p:nvPicPr>
+        <p:blipFill>
+          <a:blip r:embed="rId2"/>
+          <a:stretch>
+            <a:fillRect/>
+          </a:stretch>
+        </p:blipFill>
+        <p:spPr>
+          <a:xfrm>
+            <a:off x="6507710" y="1170918"/>
+            <a:ext cx="2371725" cy="1047750"/>
+          </a:xfrm>
+          <a:prstGeom prst="rect">
+            <a:avLst/>
+          </a:prstGeom>
+        </p:spPr>
+      </p:pic>
+    </p:spTree>
+    <p:extLst>
+      <p:ext uri="{BB962C8B-B14F-4D97-AF65-F5344CB8AC3E}">
+        <p14:creationId xmlns:p14="http://schemas.microsoft.com/office/powerpoint/2010/main" val="1233393929"/>
+      </p:ext>
+    </p:extLst>
+  </p:cSld>
+  <p:clrMapOvr>
+    <a:masterClrMapping/>
+  </p:clrMapOvr>
+</p:sld>
+</file>
+
+<file path=ppt/slides/slide43.xml><?xml version="1.0" encoding="utf-8"?>
+<p:sld xmlns:a="http://schemas.openxmlformats.org/drawingml/2006/main" xmlns:r="http://schemas.openxmlformats.org/officeDocument/2006/relationships" xmlns:p="http://schemas.openxmlformats.org/presentationml/2006/main">
+  <p:cSld>
+    <p:spTree>
+      <p:nvGrpSpPr>
+        <p:cNvPr id="1" name=""/>
+        <p:cNvGrpSpPr/>
+        <p:nvPr/>
+      </p:nvGrpSpPr>
+      <p:grpSpPr>
+        <a:xfrm>
+          <a:off x="0" y="0"/>
+          <a:ext cx="0" cy="0"/>
+          <a:chOff x="0" y="0"/>
+          <a:chExt cx="0" cy="0"/>
+        </a:xfrm>
+      </p:grpSpPr>
+      <p:sp>
+        <p:nvSpPr>
           <p:cNvPr id="2" name="Date Placeholder 1">
             <a:extLst>
               <a:ext uri="{FF2B5EF4-FFF2-40B4-BE49-F238E27FC236}">
-                <a16:creationId xmlns:a16="http://schemas.microsoft.com/office/drawing/2014/main" xmlns="" id="{F2044BC4-137A-48C9-AC90-557A74AB3C65}"/>
+                <a16:creationId xmlns="" xmlns:a16="http://schemas.microsoft.com/office/drawing/2014/main" id="{F2044BC4-137A-48C9-AC90-557A74AB3C65}"/>
               </a:ext>
             </a:extLst>
           </p:cNvPr>
@@ -35570,7 +36959,7 @@
           <p:cNvPr id="3" name="Title 2">
             <a:extLst>
               <a:ext uri="{FF2B5EF4-FFF2-40B4-BE49-F238E27FC236}">
-                <a16:creationId xmlns:a16="http://schemas.microsoft.com/office/drawing/2014/main" xmlns="" id="{194FC0B8-AD59-42B6-87BD-C5F47E278813}"/>
+                <a16:creationId xmlns="" xmlns:a16="http://schemas.microsoft.com/office/drawing/2014/main" id="{194FC0B8-AD59-42B6-87BD-C5F47E278813}"/>
               </a:ext>
             </a:extLst>
           </p:cNvPr>
@@ -35598,7 +36987,7 @@
           <p:cNvPr id="4" name="Footer Placeholder 3">
             <a:extLst>
               <a:ext uri="{FF2B5EF4-FFF2-40B4-BE49-F238E27FC236}">
-                <a16:creationId xmlns:a16="http://schemas.microsoft.com/office/drawing/2014/main" xmlns="" id="{BB32AB7D-41C8-4C00-BF84-12E12E513EA0}"/>
+                <a16:creationId xmlns="" xmlns:a16="http://schemas.microsoft.com/office/drawing/2014/main" id="{BB32AB7D-41C8-4C00-BF84-12E12E513EA0}"/>
               </a:ext>
             </a:extLst>
           </p:cNvPr>
@@ -35627,7 +37016,7 @@
           <p:cNvPr id="5" name="Slide Number Placeholder 4">
             <a:extLst>
               <a:ext uri="{FF2B5EF4-FFF2-40B4-BE49-F238E27FC236}">
-                <a16:creationId xmlns:a16="http://schemas.microsoft.com/office/drawing/2014/main" xmlns="" id="{B123BEAB-D46C-458F-B5E4-79AB83F49BB7}"/>
+                <a16:creationId xmlns="" xmlns:a16="http://schemas.microsoft.com/office/drawing/2014/main" id="{B123BEAB-D46C-458F-B5E4-79AB83F49BB7}"/>
               </a:ext>
             </a:extLst>
           </p:cNvPr>
@@ -35646,7 +37035,7 @@
             <a:fld id="{37290FF7-652B-4475-AEAB-8B1A5D23AE09}" type="slidenum">
               <a:rPr lang="en-US" smtClean="0"/>
               <a:pPr/>
-              <a:t>40</a:t>
+              <a:t>43</a:t>
             </a:fld>
             <a:endParaRPr lang="en-US" dirty="0"/>
           </a:p>
@@ -35660,7 +37049,7 @@
         </p:nvSpPr>
         <p:spPr>
           <a:xfrm>
-            <a:off x="394138" y="1056290"/>
+            <a:off x="204952" y="1608081"/>
             <a:ext cx="8135007" cy="923330"/>
           </a:xfrm>
           <a:prstGeom prst="rect">
@@ -35711,7 +37100,7 @@
                   </a:schemeClr>
                 </a:solidFill>
               </a:rPr>
-              <a:t>As documents become less similar their cosines decrease from 1</a:t>
+              <a:t>Cosine is measuring similarity…so a value of 0 means orthogonal (independent)</a:t>
             </a:r>
             <a:endParaRPr lang="en-US" b="1" dirty="0">
               <a:solidFill>
@@ -35723,34 +37112,6 @@
           </a:p>
         </p:txBody>
       </p:sp>
-      <p:pic>
-        <p:nvPicPr>
-          <p:cNvPr id="8" name="Picture 7"/>
-          <p:cNvPicPr/>
-          <p:nvPr/>
-        </p:nvPicPr>
-        <p:blipFill rotWithShape="1">
-          <a:blip r:embed="rId2">
-            <a:extLst>
-              <a:ext uri="{28A0092B-C50C-407E-A947-70E740481C1C}">
-                <a14:useLocalDpi xmlns:a14="http://schemas.microsoft.com/office/drawing/2010/main" val="0"/>
-              </a:ext>
-            </a:extLst>
-          </a:blip>
-          <a:srcRect l="51481" r="969"/>
-          <a:stretch/>
-        </p:blipFill>
-        <p:spPr bwMode="auto">
-          <a:xfrm>
-            <a:off x="2427889" y="2087541"/>
-            <a:ext cx="3641835" cy="3668843"/>
-          </a:xfrm>
-          <a:prstGeom prst="rect">
-            <a:avLst/>
-          </a:prstGeom>
-          <a:noFill/>
-        </p:spPr>
-      </p:pic>
       <p:sp>
         <p:nvSpPr>
           <p:cNvPr id="9" name="Rectangle 8"/>
@@ -35804,21 +37165,155 @@
           </a:p>
         </p:txBody>
       </p:sp>
-      <p:sp>
-        <p:nvSpPr>
-          <p:cNvPr id="10" name="Oval 9"/>
-          <p:cNvSpPr/>
+      <p:grpSp>
+        <p:nvGrpSpPr>
+          <p:cNvPr id="7" name="Group 6"/>
+          <p:cNvGrpSpPr/>
           <p:nvPr/>
+        </p:nvGrpSpPr>
+        <p:grpSpPr>
+          <a:xfrm>
+            <a:off x="2751083" y="2465921"/>
+            <a:ext cx="3641835" cy="3668843"/>
+            <a:chOff x="2506719" y="2465921"/>
+            <a:chExt cx="3641835" cy="3668843"/>
+          </a:xfrm>
+        </p:grpSpPr>
+        <p:pic>
+          <p:nvPicPr>
+            <p:cNvPr id="8" name="Picture 7"/>
+            <p:cNvPicPr/>
+            <p:nvPr/>
+          </p:nvPicPr>
+          <p:blipFill rotWithShape="1">
+            <a:blip r:embed="rId2">
+              <a:extLst>
+                <a:ext uri="{28A0092B-C50C-407E-A947-70E740481C1C}">
+                  <a14:useLocalDpi xmlns:a14="http://schemas.microsoft.com/office/drawing/2010/main" val="0"/>
+                </a:ext>
+              </a:extLst>
+            </a:blip>
+            <a:srcRect l="51481" r="969"/>
+            <a:stretch/>
+          </p:blipFill>
+          <p:spPr bwMode="auto">
+            <a:xfrm>
+              <a:off x="2506719" y="2465921"/>
+              <a:ext cx="3641835" cy="3668843"/>
+            </a:xfrm>
+            <a:prstGeom prst="rect">
+              <a:avLst/>
+            </a:prstGeom>
+            <a:noFill/>
+          </p:spPr>
+        </p:pic>
+        <p:sp>
+          <p:nvSpPr>
+            <p:cNvPr id="10" name="Oval 9"/>
+            <p:cNvSpPr/>
+            <p:nvPr/>
+          </p:nvSpPr>
+          <p:spPr>
+            <a:xfrm rot="19149861">
+              <a:off x="4224190" y="3567945"/>
+              <a:ext cx="940298" cy="909845"/>
+            </a:xfrm>
+            <a:prstGeom prst="ellipse">
+              <a:avLst/>
+            </a:prstGeom>
+            <a:noFill/>
+          </p:spPr>
+          <p:style>
+            <a:lnRef idx="2">
+              <a:schemeClr val="accent1">
+                <a:shade val="50000"/>
+              </a:schemeClr>
+            </a:lnRef>
+            <a:fillRef idx="1">
+              <a:schemeClr val="accent1"/>
+            </a:fillRef>
+            <a:effectRef idx="0">
+              <a:schemeClr val="accent1"/>
+            </a:effectRef>
+            <a:fontRef idx="minor">
+              <a:schemeClr val="lt1"/>
+            </a:fontRef>
+          </p:style>
+          <p:txBody>
+            <a:bodyPr rtlCol="0" anchor="ctr"/>
+            <a:lstStyle/>
+            <a:p>
+              <a:pPr algn="ctr"/>
+              <a:endParaRPr lang="en-US"/>
+            </a:p>
+          </p:txBody>
+        </p:sp>
+      </p:grpSp>
+      <p:sp>
+        <p:nvSpPr>
+          <p:cNvPr id="12" name="TextBox 11"/>
+          <p:cNvSpPr txBox="1"/>
+          <p:nvPr/>
         </p:nvSpPr>
         <p:spPr>
-          <a:xfrm rot="19149861">
-            <a:off x="4145360" y="3189565"/>
-            <a:ext cx="940298" cy="909845"/>
+          <a:xfrm>
+            <a:off x="252249" y="1056289"/>
+            <a:ext cx="4144468" cy="646331"/>
           </a:xfrm>
-          <a:prstGeom prst="ellipse">
+          <a:prstGeom prst="rect">
             <a:avLst/>
           </a:prstGeom>
           <a:noFill/>
+        </p:spPr>
+        <p:txBody>
+          <a:bodyPr wrap="none" rtlCol="0">
+            <a:spAutoFit/>
+          </a:bodyPr>
+          <a:lstStyle/>
+          <a:p>
+            <a:r>
+              <a:rPr lang="en-US" b="1" dirty="0" smtClean="0"/>
+              <a:t>Euclidean</a:t>
+            </a:r>
+            <a:r>
+              <a:rPr lang="en-US" dirty="0" smtClean="0"/>
+              <a:t>: How dissimilar are documents?</a:t>
+            </a:r>
+          </a:p>
+          <a:p>
+            <a:r>
+              <a:rPr lang="en-US" b="1" dirty="0" smtClean="0"/>
+              <a:t>Cosine</a:t>
+            </a:r>
+            <a:r>
+              <a:rPr lang="en-US" dirty="0" smtClean="0"/>
+              <a:t>: How similar are documents?</a:t>
+            </a:r>
+          </a:p>
+        </p:txBody>
+      </p:sp>
+      <p:sp>
+        <p:nvSpPr>
+          <p:cNvPr id="13" name="Rectangle 12"/>
+          <p:cNvSpPr/>
+          <p:nvPr/>
+        </p:nvSpPr>
+        <p:spPr>
+          <a:xfrm>
+            <a:off x="6053959" y="3168868"/>
+            <a:ext cx="2916619" cy="677917"/>
+          </a:xfrm>
+          <a:prstGeom prst="rect">
+            <a:avLst/>
+          </a:prstGeom>
+          <a:solidFill>
+            <a:schemeClr val="accent2"/>
+          </a:solidFill>
+          <a:ln>
+            <a:solidFill>
+              <a:schemeClr val="accent4"/>
+            </a:solidFill>
+          </a:ln>
         </p:spPr>
         <p:style>
           <a:lnRef idx="2">
@@ -35841,10 +37336,52 @@
           <a:lstStyle/>
           <a:p>
             <a:pPr algn="ctr"/>
-            <a:endParaRPr lang="en-US"/>
-          </a:p>
-        </p:txBody>
-      </p:sp>
+            <a:r>
+              <a:rPr lang="en-US" dirty="0" smtClean="0"/>
+              <a:t>These are similar to the cosine similarity is closer to 1</a:t>
+            </a:r>
+            <a:endParaRPr lang="en-US" dirty="0"/>
+          </a:p>
+        </p:txBody>
+      </p:sp>
+      <p:cxnSp>
+        <p:nvCxnSpPr>
+          <p:cNvPr id="15" name="Straight Arrow Connector 14"/>
+          <p:cNvCxnSpPr>
+            <a:endCxn id="10" idx="6"/>
+          </p:cNvCxnSpPr>
+          <p:nvPr/>
+        </p:nvCxnSpPr>
+        <p:spPr>
+          <a:xfrm flipH="1">
+            <a:off x="5294413" y="3515710"/>
+            <a:ext cx="743780" cy="199731"/>
+          </a:xfrm>
+          <a:prstGeom prst="straightConnector1">
+            <a:avLst/>
+          </a:prstGeom>
+          <a:ln>
+            <a:solidFill>
+              <a:schemeClr val="accent4"/>
+            </a:solidFill>
+            <a:tailEnd type="triangle"/>
+          </a:ln>
+        </p:spPr>
+        <p:style>
+          <a:lnRef idx="1">
+            <a:schemeClr val="accent1"/>
+          </a:lnRef>
+          <a:fillRef idx="0">
+            <a:schemeClr val="accent1"/>
+          </a:fillRef>
+          <a:effectRef idx="0">
+            <a:schemeClr val="accent1"/>
+          </a:effectRef>
+          <a:fontRef idx="minor">
+            <a:schemeClr val="tx1"/>
+          </a:fontRef>
+        </p:style>
+      </p:cxnSp>
     </p:spTree>
     <p:extLst>
       <p:ext uri="{BB962C8B-B14F-4D97-AF65-F5344CB8AC3E}">
@@ -35858,7 +37395,7 @@
 </p:sld>
 </file>
 
-<file path=ppt/slides/slide41.xml><?xml version="1.0" encoding="utf-8"?>
+<file path=ppt/slides/slide44.xml><?xml version="1.0" encoding="utf-8"?>
 <p:sld xmlns:a="http://schemas.openxmlformats.org/drawingml/2006/main" xmlns:r="http://schemas.openxmlformats.org/officeDocument/2006/relationships" xmlns:p="http://schemas.openxmlformats.org/presentationml/2006/main">
   <p:cSld>
     <p:spTree>
@@ -35962,7 +37499,7 @@
             <a:fld id="{37290FF7-652B-4475-AEAB-8B1A5D23AE09}" type="slidenum">
               <a:rPr lang="en-US" smtClean="0"/>
               <a:pPr/>
-              <a:t>41</a:t>
+              <a:t>44</a:t>
             </a:fld>
             <a:endParaRPr lang="en-US" dirty="0"/>
           </a:p>
@@ -35996,6 +37533,68 @@
           <a:noFill/>
         </p:spPr>
       </p:pic>
+      <p:sp>
+        <p:nvSpPr>
+          <p:cNvPr id="6" name="TextBox 5"/>
+          <p:cNvSpPr txBox="1"/>
+          <p:nvPr/>
+        </p:nvSpPr>
+        <p:spPr>
+          <a:xfrm>
+            <a:off x="851339" y="5102772"/>
+            <a:ext cx="3389586" cy="646331"/>
+          </a:xfrm>
+          <a:prstGeom prst="rect">
+            <a:avLst/>
+          </a:prstGeom>
+          <a:noFill/>
+        </p:spPr>
+        <p:txBody>
+          <a:bodyPr wrap="square" rtlCol="0">
+            <a:spAutoFit/>
+          </a:bodyPr>
+          <a:lstStyle/>
+          <a:p>
+            <a:pPr algn="ctr"/>
+            <a:r>
+              <a:rPr lang="en-US" dirty="0" smtClean="0"/>
+              <a:t>Big distance D4 to D2 means they are far apart.</a:t>
+            </a:r>
+            <a:endParaRPr lang="en-US" dirty="0"/>
+          </a:p>
+        </p:txBody>
+      </p:sp>
+      <p:sp>
+        <p:nvSpPr>
+          <p:cNvPr id="8" name="TextBox 7"/>
+          <p:cNvSpPr txBox="1"/>
+          <p:nvPr/>
+        </p:nvSpPr>
+        <p:spPr>
+          <a:xfrm>
+            <a:off x="5260428" y="5102772"/>
+            <a:ext cx="3126827" cy="923330"/>
+          </a:xfrm>
+          <a:prstGeom prst="rect">
+            <a:avLst/>
+          </a:prstGeom>
+          <a:noFill/>
+        </p:spPr>
+        <p:txBody>
+          <a:bodyPr wrap="square" rtlCol="0">
+            <a:spAutoFit/>
+          </a:bodyPr>
+          <a:lstStyle/>
+          <a:p>
+            <a:pPr algn="ctr"/>
+            <a:r>
+              <a:rPr lang="en-US" dirty="0" smtClean="0"/>
+              <a:t>D4:D1  Small angle distance so the cosine similarity will get closer to 1.</a:t>
+            </a:r>
+            <a:endParaRPr lang="en-US" dirty="0"/>
+          </a:p>
+        </p:txBody>
+      </p:sp>
     </p:spTree>
     <p:extLst>
       <p:ext uri="{BB962C8B-B14F-4D97-AF65-F5344CB8AC3E}">
@@ -36009,7 +37608,7 @@
 </p:sld>
 </file>
 
-<file path=ppt/slides/slide42.xml><?xml version="1.0" encoding="utf-8"?>
+<file path=ppt/slides/slide45.xml><?xml version="1.0" encoding="utf-8"?>
 <p:sld xmlns:a="http://schemas.openxmlformats.org/drawingml/2006/main" xmlns:r="http://schemas.openxmlformats.org/officeDocument/2006/relationships" xmlns:p="http://schemas.openxmlformats.org/presentationml/2006/main">
   <p:cSld>
     <p:spTree>
@@ -36109,7 +37708,7 @@
             <a:fld id="{37290FF7-652B-4475-AEAB-8B1A5D23AE09}" type="slidenum">
               <a:rPr lang="en-US" smtClean="0"/>
               <a:pPr/>
-              <a:t>42</a:t>
+              <a:t>45</a:t>
             </a:fld>
             <a:endParaRPr lang="en-US" dirty="0"/>
           </a:p>
@@ -36207,7 +37806,7 @@
 </p:sld>
 </file>
 
-<file path=ppt/slides/slide43.xml><?xml version="1.0" encoding="utf-8"?>
+<file path=ppt/slides/slide46.xml><?xml version="1.0" encoding="utf-8"?>
 <p:sld xmlns:a="http://schemas.openxmlformats.org/drawingml/2006/main" xmlns:r="http://schemas.openxmlformats.org/officeDocument/2006/relationships" xmlns:p="http://schemas.openxmlformats.org/presentationml/2006/main">
   <p:cSld>
     <p:spTree>
@@ -36229,7 +37828,7 @@
           <p:cNvPr id="2" name="Date Placeholder 1">
             <a:extLst>
               <a:ext uri="{FF2B5EF4-FFF2-40B4-BE49-F238E27FC236}">
-                <a16:creationId xmlns:a16="http://schemas.microsoft.com/office/drawing/2014/main" xmlns="" id="{AB52415D-80F9-4EB9-8BA7-C2A978A69297}"/>
+                <a16:creationId xmlns="" xmlns:a16="http://schemas.microsoft.com/office/drawing/2014/main" id="{AB52415D-80F9-4EB9-8BA7-C2A978A69297}"/>
               </a:ext>
             </a:extLst>
           </p:cNvPr>
@@ -36258,7 +37857,7 @@
           <p:cNvPr id="3" name="Title 2">
             <a:extLst>
               <a:ext uri="{FF2B5EF4-FFF2-40B4-BE49-F238E27FC236}">
-                <a16:creationId xmlns:a16="http://schemas.microsoft.com/office/drawing/2014/main" xmlns="" id="{FAD8764D-2274-4DF5-958E-CF9BB346C3ED}"/>
+                <a16:creationId xmlns="" xmlns:a16="http://schemas.microsoft.com/office/drawing/2014/main" id="{FAD8764D-2274-4DF5-958E-CF9BB346C3ED}"/>
               </a:ext>
             </a:extLst>
           </p:cNvPr>
@@ -36286,7 +37885,7 @@
           <p:cNvPr id="4" name="Footer Placeholder 3">
             <a:extLst>
               <a:ext uri="{FF2B5EF4-FFF2-40B4-BE49-F238E27FC236}">
-                <a16:creationId xmlns:a16="http://schemas.microsoft.com/office/drawing/2014/main" xmlns="" id="{4D33D3F6-DAA2-438C-8852-DCC7AB6E9162}"/>
+                <a16:creationId xmlns="" xmlns:a16="http://schemas.microsoft.com/office/drawing/2014/main" id="{4D33D3F6-DAA2-438C-8852-DCC7AB6E9162}"/>
               </a:ext>
             </a:extLst>
           </p:cNvPr>
@@ -36315,7 +37914,7 @@
           <p:cNvPr id="5" name="Slide Number Placeholder 4">
             <a:extLst>
               <a:ext uri="{FF2B5EF4-FFF2-40B4-BE49-F238E27FC236}">
-                <a16:creationId xmlns:a16="http://schemas.microsoft.com/office/drawing/2014/main" xmlns="" id="{4233A2DF-7076-4BB0-8206-0B50536182B6}"/>
+                <a16:creationId xmlns="" xmlns:a16="http://schemas.microsoft.com/office/drawing/2014/main" id="{4233A2DF-7076-4BB0-8206-0B50536182B6}"/>
               </a:ext>
             </a:extLst>
           </p:cNvPr>
@@ -36334,7 +37933,7 @@
             <a:fld id="{37290FF7-652B-4475-AEAB-8B1A5D23AE09}" type="slidenum">
               <a:rPr lang="en-US" smtClean="0"/>
               <a:pPr/>
-              <a:t>43</a:t>
+              <a:t>46</a:t>
             </a:fld>
             <a:endParaRPr lang="en-US" dirty="0"/>
           </a:p>
@@ -36345,7 +37944,7 @@
           <p:cNvPr id="6" name="TextBox 5">
             <a:extLst>
               <a:ext uri="{FF2B5EF4-FFF2-40B4-BE49-F238E27FC236}">
-                <a16:creationId xmlns:a16="http://schemas.microsoft.com/office/drawing/2014/main" xmlns="" id="{30B25324-6EF1-4D65-9C1A-DB49D24BFFAF}"/>
+                <a16:creationId xmlns="" xmlns:a16="http://schemas.microsoft.com/office/drawing/2014/main" id="{30B25324-6EF1-4D65-9C1A-DB49D24BFFAF}"/>
               </a:ext>
             </a:extLst>
           </p:cNvPr>
@@ -36432,7 +38031,7 @@
           <p:cNvPr id="9218" name="Picture 2" descr="Image result for professor meme">
             <a:extLst>
               <a:ext uri="{FF2B5EF4-FFF2-40B4-BE49-F238E27FC236}">
-                <a16:creationId xmlns:a16="http://schemas.microsoft.com/office/drawing/2014/main" xmlns="" id="{5D0EA8E1-0165-4C0D-911D-97F50C9A01AC}"/>
+                <a16:creationId xmlns="" xmlns:a16="http://schemas.microsoft.com/office/drawing/2014/main" id="{5D0EA8E1-0165-4C0D-911D-97F50C9A01AC}"/>
               </a:ext>
             </a:extLst>
           </p:cNvPr>
@@ -36509,7 +38108,7 @@
           <p:cNvPr id="2" name="Date Placeholder 1">
             <a:extLst>
               <a:ext uri="{FF2B5EF4-FFF2-40B4-BE49-F238E27FC236}">
-                <a16:creationId xmlns:a16="http://schemas.microsoft.com/office/drawing/2014/main" xmlns="" id="{38B5C42E-683C-4425-ABD1-02308F60C3D8}"/>
+                <a16:creationId xmlns="" xmlns:a16="http://schemas.microsoft.com/office/drawing/2014/main" id="{38B5C42E-683C-4425-ABD1-02308F60C3D8}"/>
               </a:ext>
             </a:extLst>
           </p:cNvPr>
@@ -36538,7 +38137,7 @@
           <p:cNvPr id="3" name="Title 2">
             <a:extLst>
               <a:ext uri="{FF2B5EF4-FFF2-40B4-BE49-F238E27FC236}">
-                <a16:creationId xmlns:a16="http://schemas.microsoft.com/office/drawing/2014/main" xmlns="" id="{311F6C59-D5C1-4C48-9CAE-313150C6B940}"/>
+                <a16:creationId xmlns="" xmlns:a16="http://schemas.microsoft.com/office/drawing/2014/main" id="{311F6C59-D5C1-4C48-9CAE-313150C6B940}"/>
               </a:ext>
             </a:extLst>
           </p:cNvPr>
@@ -36566,7 +38165,7 @@
           <p:cNvPr id="4" name="Footer Placeholder 3">
             <a:extLst>
               <a:ext uri="{FF2B5EF4-FFF2-40B4-BE49-F238E27FC236}">
-                <a16:creationId xmlns:a16="http://schemas.microsoft.com/office/drawing/2014/main" xmlns="" id="{EB6ABA55-77A2-4208-9C68-4EED6DAC5637}"/>
+                <a16:creationId xmlns="" xmlns:a16="http://schemas.microsoft.com/office/drawing/2014/main" id="{EB6ABA55-77A2-4208-9C68-4EED6DAC5637}"/>
               </a:ext>
             </a:extLst>
           </p:cNvPr>
@@ -36595,7 +38194,7 @@
           <p:cNvPr id="5" name="Slide Number Placeholder 4">
             <a:extLst>
               <a:ext uri="{FF2B5EF4-FFF2-40B4-BE49-F238E27FC236}">
-                <a16:creationId xmlns:a16="http://schemas.microsoft.com/office/drawing/2014/main" xmlns="" id="{465B6F0D-C07E-45D7-8154-18A7802F0920}"/>
+                <a16:creationId xmlns="" xmlns:a16="http://schemas.microsoft.com/office/drawing/2014/main" id="{465B6F0D-C07E-45D7-8154-18A7802F0920}"/>
               </a:ext>
             </a:extLst>
           </p:cNvPr>
@@ -36625,7 +38224,7 @@
           <p:cNvPr id="6" name="TextBox 5">
             <a:extLst>
               <a:ext uri="{FF2B5EF4-FFF2-40B4-BE49-F238E27FC236}">
-                <a16:creationId xmlns:a16="http://schemas.microsoft.com/office/drawing/2014/main" xmlns="" id="{5D68324B-36C0-45B5-BD33-A444BB3D2561}"/>
+                <a16:creationId xmlns="" xmlns:a16="http://schemas.microsoft.com/office/drawing/2014/main" id="{5D68324B-36C0-45B5-BD33-A444BB3D2561}"/>
               </a:ext>
             </a:extLst>
           </p:cNvPr>
@@ -36728,7 +38327,7 @@
           <p:cNvPr id="2" name="Date Placeholder 1">
             <a:extLst>
               <a:ext uri="{FF2B5EF4-FFF2-40B4-BE49-F238E27FC236}">
-                <a16:creationId xmlns:a16="http://schemas.microsoft.com/office/drawing/2014/main" xmlns="" id="{05374BC4-5CA7-41AE-A3FE-E7F6A16DB20B}"/>
+                <a16:creationId xmlns="" xmlns:a16="http://schemas.microsoft.com/office/drawing/2014/main" id="{05374BC4-5CA7-41AE-A3FE-E7F6A16DB20B}"/>
               </a:ext>
             </a:extLst>
           </p:cNvPr>
@@ -36757,7 +38356,7 @@
           <p:cNvPr id="3" name="Title 2">
             <a:extLst>
               <a:ext uri="{FF2B5EF4-FFF2-40B4-BE49-F238E27FC236}">
-                <a16:creationId xmlns:a16="http://schemas.microsoft.com/office/drawing/2014/main" xmlns="" id="{8EF1F1BE-EAA4-483B-AB28-0E98E01DB3A5}"/>
+                <a16:creationId xmlns="" xmlns:a16="http://schemas.microsoft.com/office/drawing/2014/main" id="{8EF1F1BE-EAA4-483B-AB28-0E98E01DB3A5}"/>
               </a:ext>
             </a:extLst>
           </p:cNvPr>
@@ -36785,7 +38384,7 @@
           <p:cNvPr id="4" name="Footer Placeholder 3">
             <a:extLst>
               <a:ext uri="{FF2B5EF4-FFF2-40B4-BE49-F238E27FC236}">
-                <a16:creationId xmlns:a16="http://schemas.microsoft.com/office/drawing/2014/main" xmlns="" id="{078806BB-E54E-4349-A652-F45615C285C9}"/>
+                <a16:creationId xmlns="" xmlns:a16="http://schemas.microsoft.com/office/drawing/2014/main" id="{078806BB-E54E-4349-A652-F45615C285C9}"/>
               </a:ext>
             </a:extLst>
           </p:cNvPr>
@@ -36814,7 +38413,7 @@
           <p:cNvPr id="5" name="Slide Number Placeholder 4">
             <a:extLst>
               <a:ext uri="{FF2B5EF4-FFF2-40B4-BE49-F238E27FC236}">
-                <a16:creationId xmlns:a16="http://schemas.microsoft.com/office/drawing/2014/main" xmlns="" id="{2DB954FC-566C-4D1E-A2EC-9B04283D3F56}"/>
+                <a16:creationId xmlns="" xmlns:a16="http://schemas.microsoft.com/office/drawing/2014/main" id="{2DB954FC-566C-4D1E-A2EC-9B04283D3F56}"/>
               </a:ext>
             </a:extLst>
           </p:cNvPr>
@@ -36844,7 +38443,7 @@
           <p:cNvPr id="6" name="Content Placeholder 2">
             <a:extLst>
               <a:ext uri="{FF2B5EF4-FFF2-40B4-BE49-F238E27FC236}">
-                <a16:creationId xmlns:a16="http://schemas.microsoft.com/office/drawing/2014/main" xmlns="" id="{E5FDA6E8-1A19-4845-BBF5-E31365C797B7}"/>
+                <a16:creationId xmlns="" xmlns:a16="http://schemas.microsoft.com/office/drawing/2014/main" id="{E5FDA6E8-1A19-4845-BBF5-E31365C797B7}"/>
               </a:ext>
             </a:extLst>
           </p:cNvPr>
@@ -37111,7 +38710,7 @@
           <p:cNvPr id="2" name="Date Placeholder 1">
             <a:extLst>
               <a:ext uri="{FF2B5EF4-FFF2-40B4-BE49-F238E27FC236}">
-                <a16:creationId xmlns:a16="http://schemas.microsoft.com/office/drawing/2014/main" xmlns="" id="{EBF86C61-4D40-48D9-91D6-FE14DA82446F}"/>
+                <a16:creationId xmlns="" xmlns:a16="http://schemas.microsoft.com/office/drawing/2014/main" id="{EBF86C61-4D40-48D9-91D6-FE14DA82446F}"/>
               </a:ext>
             </a:extLst>
           </p:cNvPr>
@@ -37140,7 +38739,7 @@
           <p:cNvPr id="3" name="Title 2">
             <a:extLst>
               <a:ext uri="{FF2B5EF4-FFF2-40B4-BE49-F238E27FC236}">
-                <a16:creationId xmlns:a16="http://schemas.microsoft.com/office/drawing/2014/main" xmlns="" id="{12AED3E6-890D-452D-B80F-BB83E47E2AFA}"/>
+                <a16:creationId xmlns="" xmlns:a16="http://schemas.microsoft.com/office/drawing/2014/main" id="{12AED3E6-890D-452D-B80F-BB83E47E2AFA}"/>
               </a:ext>
             </a:extLst>
           </p:cNvPr>
@@ -37168,7 +38767,7 @@
           <p:cNvPr id="4" name="Footer Placeholder 3">
             <a:extLst>
               <a:ext uri="{FF2B5EF4-FFF2-40B4-BE49-F238E27FC236}">
-                <a16:creationId xmlns:a16="http://schemas.microsoft.com/office/drawing/2014/main" xmlns="" id="{D448FD2A-B986-43F8-AB22-0E7B94EB03EB}"/>
+                <a16:creationId xmlns="" xmlns:a16="http://schemas.microsoft.com/office/drawing/2014/main" id="{D448FD2A-B986-43F8-AB22-0E7B94EB03EB}"/>
               </a:ext>
             </a:extLst>
           </p:cNvPr>
@@ -37197,7 +38796,7 @@
           <p:cNvPr id="5" name="Slide Number Placeholder 4">
             <a:extLst>
               <a:ext uri="{FF2B5EF4-FFF2-40B4-BE49-F238E27FC236}">
-                <a16:creationId xmlns:a16="http://schemas.microsoft.com/office/drawing/2014/main" xmlns="" id="{9D09D7D4-E343-4CA0-915E-C1E9A7D66EAB}"/>
+                <a16:creationId xmlns="" xmlns:a16="http://schemas.microsoft.com/office/drawing/2014/main" id="{9D09D7D4-E343-4CA0-915E-C1E9A7D66EAB}"/>
               </a:ext>
             </a:extLst>
           </p:cNvPr>
@@ -37227,7 +38826,7 @@
           <p:cNvPr id="6" name="Shape 239">
             <a:extLst>
               <a:ext uri="{FF2B5EF4-FFF2-40B4-BE49-F238E27FC236}">
-                <a16:creationId xmlns:a16="http://schemas.microsoft.com/office/drawing/2014/main" xmlns="" id="{47C77ADE-F2A3-4236-BE40-68B51DF79378}"/>
+                <a16:creationId xmlns="" xmlns:a16="http://schemas.microsoft.com/office/drawing/2014/main" id="{47C77ADE-F2A3-4236-BE40-68B51DF79378}"/>
               </a:ext>
             </a:extLst>
           </p:cNvPr>
@@ -37275,7 +38874,7 @@
           <p:cNvPr id="7" name="Shape 240">
             <a:extLst>
               <a:ext uri="{FF2B5EF4-FFF2-40B4-BE49-F238E27FC236}">
-                <a16:creationId xmlns:a16="http://schemas.microsoft.com/office/drawing/2014/main" xmlns="" id="{536C7D8C-0FEA-4FF6-A0DE-5EF4EEBAA497}"/>
+                <a16:creationId xmlns="" xmlns:a16="http://schemas.microsoft.com/office/drawing/2014/main" id="{536C7D8C-0FEA-4FF6-A0DE-5EF4EEBAA497}"/>
               </a:ext>
             </a:extLst>
           </p:cNvPr>
@@ -37318,7 +38917,7 @@
           <p:cNvPr id="8" name="Shape 231">
             <a:extLst>
               <a:ext uri="{FF2B5EF4-FFF2-40B4-BE49-F238E27FC236}">
-                <a16:creationId xmlns:a16="http://schemas.microsoft.com/office/drawing/2014/main" xmlns="" id="{4330E06C-C231-49A3-AE30-EAAB1A8F08B6}"/>
+                <a16:creationId xmlns="" xmlns:a16="http://schemas.microsoft.com/office/drawing/2014/main" id="{4330E06C-C231-49A3-AE30-EAAB1A8F08B6}"/>
               </a:ext>
             </a:extLst>
           </p:cNvPr>
@@ -37338,7 +38937,7 @@
             <p:cNvPr id="9" name="Shape 232">
               <a:extLst>
                 <a:ext uri="{FF2B5EF4-FFF2-40B4-BE49-F238E27FC236}">
-                  <a16:creationId xmlns:a16="http://schemas.microsoft.com/office/drawing/2014/main" xmlns="" id="{F3270045-39C1-4164-A3A5-A955A4D6BDA8}"/>
+                  <a16:creationId xmlns="" xmlns:a16="http://schemas.microsoft.com/office/drawing/2014/main" id="{F3270045-39C1-4164-A3A5-A955A4D6BDA8}"/>
                 </a:ext>
               </a:extLst>
             </p:cNvPr>
@@ -37381,7 +38980,7 @@
             <p:cNvPr id="10" name="Shape 233">
               <a:extLst>
                 <a:ext uri="{FF2B5EF4-FFF2-40B4-BE49-F238E27FC236}">
-                  <a16:creationId xmlns:a16="http://schemas.microsoft.com/office/drawing/2014/main" xmlns="" id="{6FE3A028-274E-44DF-A00C-5D5C75964E30}"/>
+                  <a16:creationId xmlns="" xmlns:a16="http://schemas.microsoft.com/office/drawing/2014/main" id="{6FE3A028-274E-44DF-A00C-5D5C75964E30}"/>
                 </a:ext>
               </a:extLst>
             </p:cNvPr>
@@ -37424,7 +39023,7 @@
             <p:cNvPr id="11" name="Shape 234">
               <a:extLst>
                 <a:ext uri="{FF2B5EF4-FFF2-40B4-BE49-F238E27FC236}">
-                  <a16:creationId xmlns:a16="http://schemas.microsoft.com/office/drawing/2014/main" xmlns="" id="{D96704CA-772B-4B45-A7FA-E01B1E407EAA}"/>
+                  <a16:creationId xmlns="" xmlns:a16="http://schemas.microsoft.com/office/drawing/2014/main" id="{D96704CA-772B-4B45-A7FA-E01B1E407EAA}"/>
                 </a:ext>
               </a:extLst>
             </p:cNvPr>
@@ -37467,7 +39066,7 @@
             <p:cNvPr id="12" name="Shape 235">
               <a:extLst>
                 <a:ext uri="{FF2B5EF4-FFF2-40B4-BE49-F238E27FC236}">
-                  <a16:creationId xmlns:a16="http://schemas.microsoft.com/office/drawing/2014/main" xmlns="" id="{0628A70E-9052-4749-961F-E90671E1BBA9}"/>
+                  <a16:creationId xmlns="" xmlns:a16="http://schemas.microsoft.com/office/drawing/2014/main" id="{0628A70E-9052-4749-961F-E90671E1BBA9}"/>
                 </a:ext>
               </a:extLst>
             </p:cNvPr>
@@ -37511,7 +39110,7 @@
           <p:cNvPr id="13" name="Shape 241">
             <a:extLst>
               <a:ext uri="{FF2B5EF4-FFF2-40B4-BE49-F238E27FC236}">
-                <a16:creationId xmlns:a16="http://schemas.microsoft.com/office/drawing/2014/main" xmlns="" id="{191C209D-41BE-445A-8F56-4606D5A5F0E9}"/>
+                <a16:creationId xmlns="" xmlns:a16="http://schemas.microsoft.com/office/drawing/2014/main" id="{191C209D-41BE-445A-8F56-4606D5A5F0E9}"/>
               </a:ext>
             </a:extLst>
           </p:cNvPr>
@@ -37531,7 +39130,7 @@
             <p:cNvPr id="14" name="Shape 242">
               <a:extLst>
                 <a:ext uri="{FF2B5EF4-FFF2-40B4-BE49-F238E27FC236}">
-                  <a16:creationId xmlns:a16="http://schemas.microsoft.com/office/drawing/2014/main" xmlns="" id="{85E246BC-25B0-468E-9999-13E7346EC9F0}"/>
+                  <a16:creationId xmlns="" xmlns:a16="http://schemas.microsoft.com/office/drawing/2014/main" id="{85E246BC-25B0-468E-9999-13E7346EC9F0}"/>
                 </a:ext>
               </a:extLst>
             </p:cNvPr>
@@ -37574,7 +39173,7 @@
             <p:cNvPr id="15" name="Shape 243">
               <a:extLst>
                 <a:ext uri="{FF2B5EF4-FFF2-40B4-BE49-F238E27FC236}">
-                  <a16:creationId xmlns:a16="http://schemas.microsoft.com/office/drawing/2014/main" xmlns="" id="{C1D52266-27CB-4A1F-BAE7-52BAE94D115F}"/>
+                  <a16:creationId xmlns="" xmlns:a16="http://schemas.microsoft.com/office/drawing/2014/main" id="{C1D52266-27CB-4A1F-BAE7-52BAE94D115F}"/>
                 </a:ext>
               </a:extLst>
             </p:cNvPr>
@@ -37617,7 +39216,7 @@
             <p:cNvPr id="16" name="Shape 244">
               <a:extLst>
                 <a:ext uri="{FF2B5EF4-FFF2-40B4-BE49-F238E27FC236}">
-                  <a16:creationId xmlns:a16="http://schemas.microsoft.com/office/drawing/2014/main" xmlns="" id="{059233CE-70EB-4DBF-903F-EE0AC68FCEB0}"/>
+                  <a16:creationId xmlns="" xmlns:a16="http://schemas.microsoft.com/office/drawing/2014/main" id="{059233CE-70EB-4DBF-903F-EE0AC68FCEB0}"/>
                 </a:ext>
               </a:extLst>
             </p:cNvPr>
@@ -37660,7 +39259,7 @@
             <p:cNvPr id="17" name="Shape 245">
               <a:extLst>
                 <a:ext uri="{FF2B5EF4-FFF2-40B4-BE49-F238E27FC236}">
-                  <a16:creationId xmlns:a16="http://schemas.microsoft.com/office/drawing/2014/main" xmlns="" id="{8B6A0396-DF61-4783-A621-0CF46CBF4DC6}"/>
+                  <a16:creationId xmlns="" xmlns:a16="http://schemas.microsoft.com/office/drawing/2014/main" id="{8B6A0396-DF61-4783-A621-0CF46CBF4DC6}"/>
                 </a:ext>
               </a:extLst>
             </p:cNvPr>
@@ -37704,7 +39303,7 @@
           <p:cNvPr id="18" name="Shape 246">
             <a:extLst>
               <a:ext uri="{FF2B5EF4-FFF2-40B4-BE49-F238E27FC236}">
-                <a16:creationId xmlns:a16="http://schemas.microsoft.com/office/drawing/2014/main" xmlns="" id="{E15F5042-624D-41A8-9E01-67992CF141F8}"/>
+                <a16:creationId xmlns="" xmlns:a16="http://schemas.microsoft.com/office/drawing/2014/main" id="{E15F5042-624D-41A8-9E01-67992CF141F8}"/>
               </a:ext>
             </a:extLst>
           </p:cNvPr>
@@ -37738,7 +39337,7 @@
           <p:cNvPr id="19" name="Shape 247">
             <a:extLst>
               <a:ext uri="{FF2B5EF4-FFF2-40B4-BE49-F238E27FC236}">
-                <a16:creationId xmlns:a16="http://schemas.microsoft.com/office/drawing/2014/main" xmlns="" id="{990B4EA5-B321-4AA7-8C2D-916580BCABA2}"/>
+                <a16:creationId xmlns="" xmlns:a16="http://schemas.microsoft.com/office/drawing/2014/main" id="{990B4EA5-B321-4AA7-8C2D-916580BCABA2}"/>
               </a:ext>
             </a:extLst>
           </p:cNvPr>
@@ -37782,7 +39381,7 @@
           <p:cNvPr id="20" name="Shape 249">
             <a:extLst>
               <a:ext uri="{FF2B5EF4-FFF2-40B4-BE49-F238E27FC236}">
-                <a16:creationId xmlns:a16="http://schemas.microsoft.com/office/drawing/2014/main" xmlns="" id="{A11BC223-9284-41F0-A96F-9A020AF5F95C}"/>
+                <a16:creationId xmlns="" xmlns:a16="http://schemas.microsoft.com/office/drawing/2014/main" id="{A11BC223-9284-41F0-A96F-9A020AF5F95C}"/>
               </a:ext>
             </a:extLst>
           </p:cNvPr>
@@ -37826,7 +39425,7 @@
           <p:cNvPr id="21" name="Shape 250">
             <a:extLst>
               <a:ext uri="{FF2B5EF4-FFF2-40B4-BE49-F238E27FC236}">
-                <a16:creationId xmlns:a16="http://schemas.microsoft.com/office/drawing/2014/main" xmlns="" id="{541B85F8-23E7-474A-96C6-83F926E7EE39}"/>
+                <a16:creationId xmlns="" xmlns:a16="http://schemas.microsoft.com/office/drawing/2014/main" id="{541B85F8-23E7-474A-96C6-83F926E7EE39}"/>
               </a:ext>
             </a:extLst>
           </p:cNvPr>
@@ -37846,7 +39445,7 @@
             <p:cNvPr id="22" name="Shape 251">
               <a:extLst>
                 <a:ext uri="{FF2B5EF4-FFF2-40B4-BE49-F238E27FC236}">
-                  <a16:creationId xmlns:a16="http://schemas.microsoft.com/office/drawing/2014/main" xmlns="" id="{5426F7FB-26C3-43C9-B21C-842ADF5C12D8}"/>
+                  <a16:creationId xmlns="" xmlns:a16="http://schemas.microsoft.com/office/drawing/2014/main" id="{5426F7FB-26C3-43C9-B21C-842ADF5C12D8}"/>
                 </a:ext>
               </a:extLst>
             </p:cNvPr>
@@ -37889,7 +39488,7 @@
             <p:cNvPr id="23" name="Shape 252">
               <a:extLst>
                 <a:ext uri="{FF2B5EF4-FFF2-40B4-BE49-F238E27FC236}">
-                  <a16:creationId xmlns:a16="http://schemas.microsoft.com/office/drawing/2014/main" xmlns="" id="{1B87E3CA-020C-4D4B-936C-0CFAEE4CB85B}"/>
+                  <a16:creationId xmlns="" xmlns:a16="http://schemas.microsoft.com/office/drawing/2014/main" id="{1B87E3CA-020C-4D4B-936C-0CFAEE4CB85B}"/>
                 </a:ext>
               </a:extLst>
             </p:cNvPr>
@@ -37932,7 +39531,7 @@
             <p:cNvPr id="24" name="Shape 253">
               <a:extLst>
                 <a:ext uri="{FF2B5EF4-FFF2-40B4-BE49-F238E27FC236}">
-                  <a16:creationId xmlns:a16="http://schemas.microsoft.com/office/drawing/2014/main" xmlns="" id="{65353976-FBE4-4C68-9FC5-C7AE165C9D67}"/>
+                  <a16:creationId xmlns="" xmlns:a16="http://schemas.microsoft.com/office/drawing/2014/main" id="{65353976-FBE4-4C68-9FC5-C7AE165C9D67}"/>
                 </a:ext>
               </a:extLst>
             </p:cNvPr>
@@ -37977,7 +39576,7 @@
             <p:cNvPr id="25" name="Shape 254">
               <a:extLst>
                 <a:ext uri="{FF2B5EF4-FFF2-40B4-BE49-F238E27FC236}">
-                  <a16:creationId xmlns:a16="http://schemas.microsoft.com/office/drawing/2014/main" xmlns="" id="{3364260B-6989-4066-97F8-C0A90AC3B43C}"/>
+                  <a16:creationId xmlns="" xmlns:a16="http://schemas.microsoft.com/office/drawing/2014/main" id="{3364260B-6989-4066-97F8-C0A90AC3B43C}"/>
                 </a:ext>
               </a:extLst>
             </p:cNvPr>
@@ -38020,7 +39619,7 @@
             <p:cNvPr id="26" name="Shape 255">
               <a:extLst>
                 <a:ext uri="{FF2B5EF4-FFF2-40B4-BE49-F238E27FC236}">
-                  <a16:creationId xmlns:a16="http://schemas.microsoft.com/office/drawing/2014/main" xmlns="" id="{30F5135C-AA30-463F-8E97-B498E2705E5E}"/>
+                  <a16:creationId xmlns="" xmlns:a16="http://schemas.microsoft.com/office/drawing/2014/main" id="{30F5135C-AA30-463F-8E97-B498E2705E5E}"/>
                 </a:ext>
               </a:extLst>
             </p:cNvPr>
@@ -38063,7 +39662,7 @@
             <p:cNvPr id="27" name="Shape 256">
               <a:extLst>
                 <a:ext uri="{FF2B5EF4-FFF2-40B4-BE49-F238E27FC236}">
-                  <a16:creationId xmlns:a16="http://schemas.microsoft.com/office/drawing/2014/main" xmlns="" id="{BF84871C-25E7-4056-A109-42092838DA26}"/>
+                  <a16:creationId xmlns="" xmlns:a16="http://schemas.microsoft.com/office/drawing/2014/main" id="{BF84871C-25E7-4056-A109-42092838DA26}"/>
                 </a:ext>
               </a:extLst>
             </p:cNvPr>
@@ -38106,7 +39705,7 @@
             <p:cNvPr id="28" name="Shape 257">
               <a:extLst>
                 <a:ext uri="{FF2B5EF4-FFF2-40B4-BE49-F238E27FC236}">
-                  <a16:creationId xmlns:a16="http://schemas.microsoft.com/office/drawing/2014/main" xmlns="" id="{9A652748-E156-4500-B302-B54AE96EA84D}"/>
+                  <a16:creationId xmlns="" xmlns:a16="http://schemas.microsoft.com/office/drawing/2014/main" id="{9A652748-E156-4500-B302-B54AE96EA84D}"/>
                 </a:ext>
               </a:extLst>
             </p:cNvPr>
@@ -38150,7 +39749,7 @@
           <p:cNvPr id="29" name="Shape 258">
             <a:extLst>
               <a:ext uri="{FF2B5EF4-FFF2-40B4-BE49-F238E27FC236}">
-                <a16:creationId xmlns:a16="http://schemas.microsoft.com/office/drawing/2014/main" xmlns="" id="{8DC23100-BB85-40BE-A7B5-3EFF49919F3D}"/>
+                <a16:creationId xmlns="" xmlns:a16="http://schemas.microsoft.com/office/drawing/2014/main" id="{8DC23100-BB85-40BE-A7B5-3EFF49919F3D}"/>
               </a:ext>
             </a:extLst>
           </p:cNvPr>
@@ -38193,7 +39792,7 @@
           <p:cNvPr id="30" name="Shape 259">
             <a:extLst>
               <a:ext uri="{FF2B5EF4-FFF2-40B4-BE49-F238E27FC236}">
-                <a16:creationId xmlns:a16="http://schemas.microsoft.com/office/drawing/2014/main" xmlns="" id="{561BA874-797E-4CEB-A1B9-506363DC3014}"/>
+                <a16:creationId xmlns="" xmlns:a16="http://schemas.microsoft.com/office/drawing/2014/main" id="{561BA874-797E-4CEB-A1B9-506363DC3014}"/>
               </a:ext>
             </a:extLst>
           </p:cNvPr>
@@ -38236,7 +39835,7 @@
           <p:cNvPr id="31" name="Shape 260">
             <a:extLst>
               <a:ext uri="{FF2B5EF4-FFF2-40B4-BE49-F238E27FC236}">
-                <a16:creationId xmlns:a16="http://schemas.microsoft.com/office/drawing/2014/main" xmlns="" id="{93F8D1C2-AE0C-4DA2-A896-23C6E8BB8143}"/>
+                <a16:creationId xmlns="" xmlns:a16="http://schemas.microsoft.com/office/drawing/2014/main" id="{93F8D1C2-AE0C-4DA2-A896-23C6E8BB8143}"/>
               </a:ext>
             </a:extLst>
           </p:cNvPr>
@@ -38279,7 +39878,7 @@
           <p:cNvPr id="32" name="Shape 261">
             <a:extLst>
               <a:ext uri="{FF2B5EF4-FFF2-40B4-BE49-F238E27FC236}">
-                <a16:creationId xmlns:a16="http://schemas.microsoft.com/office/drawing/2014/main" xmlns="" id="{EE20D621-FC4D-4C52-9244-70D750EF5BA8}"/>
+                <a16:creationId xmlns="" xmlns:a16="http://schemas.microsoft.com/office/drawing/2014/main" id="{EE20D621-FC4D-4C52-9244-70D750EF5BA8}"/>
               </a:ext>
             </a:extLst>
           </p:cNvPr>
@@ -38323,7 +39922,7 @@
           <p:cNvPr id="33" name="Shape 262">
             <a:extLst>
               <a:ext uri="{FF2B5EF4-FFF2-40B4-BE49-F238E27FC236}">
-                <a16:creationId xmlns:a16="http://schemas.microsoft.com/office/drawing/2014/main" xmlns="" id="{0FC62B72-0FC7-44CD-8C71-2B73BA442E78}"/>
+                <a16:creationId xmlns="" xmlns:a16="http://schemas.microsoft.com/office/drawing/2014/main" id="{0FC62B72-0FC7-44CD-8C71-2B73BA442E78}"/>
               </a:ext>
             </a:extLst>
           </p:cNvPr>
@@ -38366,7 +39965,7 @@
           <p:cNvPr id="34" name="Shape 264">
             <a:extLst>
               <a:ext uri="{FF2B5EF4-FFF2-40B4-BE49-F238E27FC236}">
-                <a16:creationId xmlns:a16="http://schemas.microsoft.com/office/drawing/2014/main" xmlns="" id="{D6BE562C-8A03-4F70-98D8-03387C0D8B58}"/>
+                <a16:creationId xmlns="" xmlns:a16="http://schemas.microsoft.com/office/drawing/2014/main" id="{D6BE562C-8A03-4F70-98D8-03387C0D8B58}"/>
               </a:ext>
             </a:extLst>
           </p:cNvPr>
@@ -38410,7 +40009,7 @@
           <p:cNvPr id="35" name="Shape 265">
             <a:extLst>
               <a:ext uri="{FF2B5EF4-FFF2-40B4-BE49-F238E27FC236}">
-                <a16:creationId xmlns:a16="http://schemas.microsoft.com/office/drawing/2014/main" xmlns="" id="{D4038CA4-570B-4C36-8331-951AEC967B05}"/>
+                <a16:creationId xmlns="" xmlns:a16="http://schemas.microsoft.com/office/drawing/2014/main" id="{D4038CA4-570B-4C36-8331-951AEC967B05}"/>
               </a:ext>
             </a:extLst>
           </p:cNvPr>
@@ -38462,7 +40061,7 @@
           <p:cNvPr id="36" name="Shape 266">
             <a:extLst>
               <a:ext uri="{FF2B5EF4-FFF2-40B4-BE49-F238E27FC236}">
-                <a16:creationId xmlns:a16="http://schemas.microsoft.com/office/drawing/2014/main" xmlns="" id="{27DB466A-8EDA-423C-AB4A-4CE40C0B0E43}"/>
+                <a16:creationId xmlns="" xmlns:a16="http://schemas.microsoft.com/office/drawing/2014/main" id="{27DB466A-8EDA-423C-AB4A-4CE40C0B0E43}"/>
               </a:ext>
             </a:extLst>
           </p:cNvPr>
@@ -38520,7 +40119,7 @@
           <p:cNvPr id="37" name="Shape 267">
             <a:extLst>
               <a:ext uri="{FF2B5EF4-FFF2-40B4-BE49-F238E27FC236}">
-                <a16:creationId xmlns:a16="http://schemas.microsoft.com/office/drawing/2014/main" xmlns="" id="{56FCF647-38C1-447C-B65D-D9C38693F062}"/>
+                <a16:creationId xmlns="" xmlns:a16="http://schemas.microsoft.com/office/drawing/2014/main" id="{56FCF647-38C1-447C-B65D-D9C38693F062}"/>
               </a:ext>
             </a:extLst>
           </p:cNvPr>
@@ -38578,7 +40177,7 @@
           <p:cNvPr id="38" name="Shape 268">
             <a:extLst>
               <a:ext uri="{FF2B5EF4-FFF2-40B4-BE49-F238E27FC236}">
-                <a16:creationId xmlns:a16="http://schemas.microsoft.com/office/drawing/2014/main" xmlns="" id="{AD643205-7D80-417B-8C62-025D574035B3}"/>
+                <a16:creationId xmlns="" xmlns:a16="http://schemas.microsoft.com/office/drawing/2014/main" id="{AD643205-7D80-417B-8C62-025D574035B3}"/>
               </a:ext>
             </a:extLst>
           </p:cNvPr>
@@ -38623,7 +40222,7 @@
           <p:cNvPr id="39" name="Shape 269">
             <a:extLst>
               <a:ext uri="{FF2B5EF4-FFF2-40B4-BE49-F238E27FC236}">
-                <a16:creationId xmlns:a16="http://schemas.microsoft.com/office/drawing/2014/main" xmlns="" id="{20526A6F-5E4D-4F78-8F70-63773D75BDCB}"/>
+                <a16:creationId xmlns="" xmlns:a16="http://schemas.microsoft.com/office/drawing/2014/main" id="{20526A6F-5E4D-4F78-8F70-63773D75BDCB}"/>
               </a:ext>
             </a:extLst>
           </p:cNvPr>
@@ -38666,7 +40265,7 @@
           <p:cNvPr id="40" name="Shape 270">
             <a:extLst>
               <a:ext uri="{FF2B5EF4-FFF2-40B4-BE49-F238E27FC236}">
-                <a16:creationId xmlns:a16="http://schemas.microsoft.com/office/drawing/2014/main" xmlns="" id="{04960449-D785-4670-BFFA-566822518620}"/>
+                <a16:creationId xmlns="" xmlns:a16="http://schemas.microsoft.com/office/drawing/2014/main" id="{04960449-D785-4670-BFFA-566822518620}"/>
               </a:ext>
             </a:extLst>
           </p:cNvPr>
@@ -38728,7 +40327,7 @@
           <p:cNvPr id="2" name="Date Placeholder 1">
             <a:extLst>
               <a:ext uri="{FF2B5EF4-FFF2-40B4-BE49-F238E27FC236}">
-                <a16:creationId xmlns:a16="http://schemas.microsoft.com/office/drawing/2014/main" xmlns="" id="{F0C49392-A6AB-454B-A8CE-1A222F99465B}"/>
+                <a16:creationId xmlns="" xmlns:a16="http://schemas.microsoft.com/office/drawing/2014/main" id="{F0C49392-A6AB-454B-A8CE-1A222F99465B}"/>
               </a:ext>
             </a:extLst>
           </p:cNvPr>
@@ -38757,7 +40356,7 @@
           <p:cNvPr id="3" name="Title 2">
             <a:extLst>
               <a:ext uri="{FF2B5EF4-FFF2-40B4-BE49-F238E27FC236}">
-                <a16:creationId xmlns:a16="http://schemas.microsoft.com/office/drawing/2014/main" xmlns="" id="{84D6A954-5268-46B6-A543-95112466DB47}"/>
+                <a16:creationId xmlns="" xmlns:a16="http://schemas.microsoft.com/office/drawing/2014/main" id="{84D6A954-5268-46B6-A543-95112466DB47}"/>
               </a:ext>
             </a:extLst>
           </p:cNvPr>
@@ -38785,7 +40384,7 @@
           <p:cNvPr id="4" name="Footer Placeholder 3">
             <a:extLst>
               <a:ext uri="{FF2B5EF4-FFF2-40B4-BE49-F238E27FC236}">
-                <a16:creationId xmlns:a16="http://schemas.microsoft.com/office/drawing/2014/main" xmlns="" id="{4BC7F7B4-D656-41A4-A871-BFDE44C52003}"/>
+                <a16:creationId xmlns="" xmlns:a16="http://schemas.microsoft.com/office/drawing/2014/main" id="{4BC7F7B4-D656-41A4-A871-BFDE44C52003}"/>
               </a:ext>
             </a:extLst>
           </p:cNvPr>
@@ -38814,7 +40413,7 @@
           <p:cNvPr id="5" name="Slide Number Placeholder 4">
             <a:extLst>
               <a:ext uri="{FF2B5EF4-FFF2-40B4-BE49-F238E27FC236}">
-                <a16:creationId xmlns:a16="http://schemas.microsoft.com/office/drawing/2014/main" xmlns="" id="{A6021B5F-8FDA-4E62-A89E-D815A486DD8E}"/>
+                <a16:creationId xmlns="" xmlns:a16="http://schemas.microsoft.com/office/drawing/2014/main" id="{A6021B5F-8FDA-4E62-A89E-D815A486DD8E}"/>
               </a:ext>
             </a:extLst>
           </p:cNvPr>
@@ -38844,7 +40443,7 @@
           <p:cNvPr id="6" name="Rectangle 5">
             <a:extLst>
               <a:ext uri="{FF2B5EF4-FFF2-40B4-BE49-F238E27FC236}">
-                <a16:creationId xmlns:a16="http://schemas.microsoft.com/office/drawing/2014/main" xmlns="" id="{0551F8BD-DC5B-4CDE-B3CC-716D55A4B32F}"/>
+                <a16:creationId xmlns="" xmlns:a16="http://schemas.microsoft.com/office/drawing/2014/main" id="{0551F8BD-DC5B-4CDE-B3CC-716D55A4B32F}"/>
               </a:ext>
             </a:extLst>
           </p:cNvPr>
@@ -38899,7 +40498,7 @@
           <p:cNvPr id="7" name="Rectangle 6">
             <a:extLst>
               <a:ext uri="{FF2B5EF4-FFF2-40B4-BE49-F238E27FC236}">
-                <a16:creationId xmlns:a16="http://schemas.microsoft.com/office/drawing/2014/main" xmlns="" id="{30C04625-BB82-4F8B-88E1-7D53E1BE9899}"/>
+                <a16:creationId xmlns="" xmlns:a16="http://schemas.microsoft.com/office/drawing/2014/main" id="{30C04625-BB82-4F8B-88E1-7D53E1BE9899}"/>
               </a:ext>
             </a:extLst>
           </p:cNvPr>
@@ -38954,7 +40553,7 @@
           <p:cNvPr id="8" name="TextBox 7">
             <a:extLst>
               <a:ext uri="{FF2B5EF4-FFF2-40B4-BE49-F238E27FC236}">
-                <a16:creationId xmlns:a16="http://schemas.microsoft.com/office/drawing/2014/main" xmlns="" id="{F93AAA8F-CCD8-47AF-ACD5-9B3FE1A08D75}"/>
+                <a16:creationId xmlns="" xmlns:a16="http://schemas.microsoft.com/office/drawing/2014/main" id="{F93AAA8F-CCD8-47AF-ACD5-9B3FE1A08D75}"/>
               </a:ext>
             </a:extLst>
           </p:cNvPr>
@@ -39007,7 +40606,7 @@
           <p:cNvPr id="9" name="TextBox 8">
             <a:extLst>
               <a:ext uri="{FF2B5EF4-FFF2-40B4-BE49-F238E27FC236}">
-                <a16:creationId xmlns:a16="http://schemas.microsoft.com/office/drawing/2014/main" xmlns="" id="{934EF37A-D94F-4C72-8CF4-D671A1C7D8CA}"/>
+                <a16:creationId xmlns="" xmlns:a16="http://schemas.microsoft.com/office/drawing/2014/main" id="{934EF37A-D94F-4C72-8CF4-D671A1C7D8CA}"/>
               </a:ext>
             </a:extLst>
           </p:cNvPr>
@@ -39042,7 +40641,7 @@
           <p:cNvPr id="10" name="Picture 2" descr="Image result for fish meme">
             <a:extLst>
               <a:ext uri="{FF2B5EF4-FFF2-40B4-BE49-F238E27FC236}">
-                <a16:creationId xmlns:a16="http://schemas.microsoft.com/office/drawing/2014/main" xmlns="" id="{D62B2144-0B9D-4419-B583-F2A5706E4E88}"/>
+                <a16:creationId xmlns="" xmlns:a16="http://schemas.microsoft.com/office/drawing/2014/main" id="{D62B2144-0B9D-4419-B583-F2A5706E4E88}"/>
               </a:ext>
             </a:extLst>
           </p:cNvPr>
@@ -39119,7 +40718,7 @@
           <p:cNvPr id="2" name="Date Placeholder 1">
             <a:extLst>
               <a:ext uri="{FF2B5EF4-FFF2-40B4-BE49-F238E27FC236}">
-                <a16:creationId xmlns:a16="http://schemas.microsoft.com/office/drawing/2014/main" xmlns="" id="{F0C49392-A6AB-454B-A8CE-1A222F99465B}"/>
+                <a16:creationId xmlns="" xmlns:a16="http://schemas.microsoft.com/office/drawing/2014/main" id="{F0C49392-A6AB-454B-A8CE-1A222F99465B}"/>
               </a:ext>
             </a:extLst>
           </p:cNvPr>
@@ -39148,7 +40747,7 @@
           <p:cNvPr id="3" name="Title 2">
             <a:extLst>
               <a:ext uri="{FF2B5EF4-FFF2-40B4-BE49-F238E27FC236}">
-                <a16:creationId xmlns:a16="http://schemas.microsoft.com/office/drawing/2014/main" xmlns="" id="{84D6A954-5268-46B6-A543-95112466DB47}"/>
+                <a16:creationId xmlns="" xmlns:a16="http://schemas.microsoft.com/office/drawing/2014/main" id="{84D6A954-5268-46B6-A543-95112466DB47}"/>
               </a:ext>
             </a:extLst>
           </p:cNvPr>
@@ -39176,7 +40775,7 @@
           <p:cNvPr id="4" name="Footer Placeholder 3">
             <a:extLst>
               <a:ext uri="{FF2B5EF4-FFF2-40B4-BE49-F238E27FC236}">
-                <a16:creationId xmlns:a16="http://schemas.microsoft.com/office/drawing/2014/main" xmlns="" id="{4BC7F7B4-D656-41A4-A871-BFDE44C52003}"/>
+                <a16:creationId xmlns="" xmlns:a16="http://schemas.microsoft.com/office/drawing/2014/main" id="{4BC7F7B4-D656-41A4-A871-BFDE44C52003}"/>
               </a:ext>
             </a:extLst>
           </p:cNvPr>
@@ -39205,7 +40804,7 @@
           <p:cNvPr id="5" name="Slide Number Placeholder 4">
             <a:extLst>
               <a:ext uri="{FF2B5EF4-FFF2-40B4-BE49-F238E27FC236}">
-                <a16:creationId xmlns:a16="http://schemas.microsoft.com/office/drawing/2014/main" xmlns="" id="{A6021B5F-8FDA-4E62-A89E-D815A486DD8E}"/>
+                <a16:creationId xmlns="" xmlns:a16="http://schemas.microsoft.com/office/drawing/2014/main" id="{A6021B5F-8FDA-4E62-A89E-D815A486DD8E}"/>
               </a:ext>
             </a:extLst>
           </p:cNvPr>
@@ -39235,7 +40834,7 @@
           <p:cNvPr id="6" name="Rectangle 5">
             <a:extLst>
               <a:ext uri="{FF2B5EF4-FFF2-40B4-BE49-F238E27FC236}">
-                <a16:creationId xmlns:a16="http://schemas.microsoft.com/office/drawing/2014/main" xmlns="" id="{0551F8BD-DC5B-4CDE-B3CC-716D55A4B32F}"/>
+                <a16:creationId xmlns="" xmlns:a16="http://schemas.microsoft.com/office/drawing/2014/main" id="{0551F8BD-DC5B-4CDE-B3CC-716D55A4B32F}"/>
               </a:ext>
             </a:extLst>
           </p:cNvPr>
@@ -39290,7 +40889,7 @@
           <p:cNvPr id="7" name="Rectangle 6">
             <a:extLst>
               <a:ext uri="{FF2B5EF4-FFF2-40B4-BE49-F238E27FC236}">
-                <a16:creationId xmlns:a16="http://schemas.microsoft.com/office/drawing/2014/main" xmlns="" id="{30C04625-BB82-4F8B-88E1-7D53E1BE9899}"/>
+                <a16:creationId xmlns="" xmlns:a16="http://schemas.microsoft.com/office/drawing/2014/main" id="{30C04625-BB82-4F8B-88E1-7D53E1BE9899}"/>
               </a:ext>
             </a:extLst>
           </p:cNvPr>
@@ -39345,7 +40944,7 @@
           <p:cNvPr id="8" name="TextBox 7">
             <a:extLst>
               <a:ext uri="{FF2B5EF4-FFF2-40B4-BE49-F238E27FC236}">
-                <a16:creationId xmlns:a16="http://schemas.microsoft.com/office/drawing/2014/main" xmlns="" id="{F93AAA8F-CCD8-47AF-ACD5-9B3FE1A08D75}"/>
+                <a16:creationId xmlns="" xmlns:a16="http://schemas.microsoft.com/office/drawing/2014/main" id="{F93AAA8F-CCD8-47AF-ACD5-9B3FE1A08D75}"/>
               </a:ext>
             </a:extLst>
           </p:cNvPr>
@@ -39399,7 +40998,7 @@
           <p:cNvPr id="11" name="TextBox 10">
             <a:extLst>
               <a:ext uri="{FF2B5EF4-FFF2-40B4-BE49-F238E27FC236}">
-                <a16:creationId xmlns:a16="http://schemas.microsoft.com/office/drawing/2014/main" xmlns="" id="{185ACFEF-A83E-43D9-AD64-E503AF112C5B}"/>
+                <a16:creationId xmlns="" xmlns:a16="http://schemas.microsoft.com/office/drawing/2014/main" id="{185ACFEF-A83E-43D9-AD64-E503AF112C5B}"/>
               </a:ext>
             </a:extLst>
           </p:cNvPr>
@@ -39428,11 +41027,7 @@
             </a:r>
             <a:r>
               <a:rPr lang="en-US" dirty="0" smtClean="0"/>
-              <a:t>observed </a:t>
-            </a:r>
-            <a:r>
-              <a:rPr lang="en-US" dirty="0" smtClean="0"/>
-              <a:t>customer personas exist in our customer data?</a:t>
+              <a:t>observed customer personas exist in our customer data?</a:t>
             </a:r>
             <a:endParaRPr lang="en-US" dirty="0"/>
           </a:p>
@@ -39443,7 +41038,7 @@
           <p:cNvPr id="12" name="Picture 2" descr="Image result for customer meme">
             <a:extLst>
               <a:ext uri="{FF2B5EF4-FFF2-40B4-BE49-F238E27FC236}">
-                <a16:creationId xmlns:a16="http://schemas.microsoft.com/office/drawing/2014/main" xmlns="" id="{562B01F6-715B-4C68-B81A-9A9BB211D747}"/>
+                <a16:creationId xmlns="" xmlns:a16="http://schemas.microsoft.com/office/drawing/2014/main" id="{562B01F6-715B-4C68-B81A-9A9BB211D747}"/>
               </a:ext>
             </a:extLst>
           </p:cNvPr>

</xml_diff>